<commit_message>
adding the ppt slides
</commit_message>
<xml_diff>
--- a/Summary/SummarySlides.pptx
+++ b/Summary/SummarySlides.pptx
@@ -8724,6 +8724,50 @@
               <a:t>‹#›</a:t>
             </a:fld>
             <a:endParaRPr lang="en-US" dirty="0"/>
+          </a:p>
+        </p:txBody>
+      </p:sp>
+      <p:sp>
+        <p:nvSpPr>
+          <p:cNvPr id="5" name="TextBox 4"/>
+          <p:cNvSpPr txBox="1"/>
+          <p:nvPr userDrawn="1"/>
+        </p:nvSpPr>
+        <p:spPr>
+          <a:xfrm>
+            <a:off x="7467202" y="10454"/>
+            <a:ext cx="1677195" cy="707886"/>
+          </a:xfrm>
+          <a:prstGeom prst="rect">
+            <a:avLst/>
+          </a:prstGeom>
+          <a:noFill/>
+        </p:spPr>
+        <p:txBody>
+          <a:bodyPr wrap="square" rtlCol="0">
+            <a:spAutoFit/>
+          </a:bodyPr>
+          <a:lstStyle/>
+          <a:p>
+            <a:r>
+              <a:rPr lang="en-US" sz="4000" dirty="0" smtClean="0">
+                <a:solidFill>
+                  <a:schemeClr val="accent1">
+                    <a:lumMod val="40000"/>
+                    <a:lumOff val="60000"/>
+                  </a:schemeClr>
+                </a:solidFill>
+              </a:rPr>
+              <a:t>DRAFT</a:t>
+            </a:r>
+            <a:endParaRPr lang="en-US" sz="4000" dirty="0">
+              <a:solidFill>
+                <a:schemeClr val="accent1">
+                  <a:lumMod val="40000"/>
+                  <a:lumOff val="60000"/>
+                </a:schemeClr>
+              </a:solidFill>
+            </a:endParaRPr>
           </a:p>
         </p:txBody>
       </p:sp>

</xml_diff>

<commit_message>
Added the SAND number to the slides.
</commit_message>
<xml_diff>
--- a/Summary/SummarySlides.pptx
+++ b/Summary/SummarySlides.pptx
@@ -231,7 +231,7 @@
             <a:fld id="{E02E8FA7-2F4C-5D49-9BA4-AF921E49AE74}" type="datetime1">
               <a:rPr lang="en-US" smtClean="0"/>
               <a:pPr/>
-              <a:t>2/13/13</a:t>
+              <a:t>2/20/13</a:t>
             </a:fld>
             <a:endParaRPr lang="en-US"/>
           </a:p>
@@ -399,7 +399,7 @@
             <a:fld id="{0426B0FB-EA67-3A40-825F-8F252A860502}" type="datetime1">
               <a:rPr lang="en-US" smtClean="0"/>
               <a:pPr/>
-              <a:t>2/13/13</a:t>
+              <a:t>2/20/13</a:t>
             </a:fld>
             <a:endParaRPr lang="en-US"/>
           </a:p>
@@ -1356,7 +1356,7 @@
             <a:fld id="{E3A661A9-AB95-644B-88B2-9DDC7A23F4F4}" type="datetime1">
               <a:rPr lang="en-US" smtClean="0"/>
               <a:pPr/>
-              <a:t>2/13/13</a:t>
+              <a:t>2/20/13</a:t>
             </a:fld>
             <a:endParaRPr lang="en-US" dirty="0"/>
           </a:p>
@@ -1864,7 +1864,7 @@
             <a:fld id="{2D31639C-5EF8-8C48-833F-078F90087180}" type="datetime1">
               <a:rPr lang="en-US" smtClean="0"/>
               <a:pPr/>
-              <a:t>2/13/13</a:t>
+              <a:t>2/20/13</a:t>
             </a:fld>
             <a:endParaRPr lang="en-US"/>
           </a:p>
@@ -1997,7 +1997,7 @@
             <a:fld id="{B535C3D4-B14E-194D-A22F-ABBD9D7BE7F7}" type="datetime1">
               <a:rPr lang="en-US" smtClean="0"/>
               <a:pPr/>
-              <a:t>2/13/13</a:t>
+              <a:t>2/20/13</a:t>
             </a:fld>
             <a:endParaRPr lang="en-US"/>
           </a:p>
@@ -2107,7 +2107,7 @@
             <a:fld id="{91CFF6A9-F7ED-464D-9ECE-18CDAAFFF013}" type="datetime1">
               <a:rPr lang="en-US" smtClean="0"/>
               <a:pPr/>
-              <a:t>2/13/13</a:t>
+              <a:t>2/20/13</a:t>
             </a:fld>
             <a:endParaRPr lang="en-US"/>
           </a:p>
@@ -2399,7 +2399,7 @@
             <a:fld id="{C7865AE2-28C7-4947-8319-D60EEB07BE79}" type="datetime1">
               <a:rPr lang="en-US" smtClean="0"/>
               <a:pPr/>
-              <a:t>2/13/13</a:t>
+              <a:t>2/20/13</a:t>
             </a:fld>
             <a:endParaRPr lang="en-US"/>
           </a:p>
@@ -2671,7 +2671,7 @@
             <a:fld id="{D6782EBC-51D7-AB40-8702-393A26BF0924}" type="datetime1">
               <a:rPr lang="en-US" smtClean="0"/>
               <a:pPr/>
-              <a:t>2/13/13</a:t>
+              <a:t>2/20/13</a:t>
             </a:fld>
             <a:endParaRPr lang="en-US"/>
           </a:p>
@@ -2856,7 +2856,7 @@
             <a:fld id="{199A187D-6C3F-6D41-880E-F6B6C4095670}" type="datetime1">
               <a:rPr lang="en-US" smtClean="0"/>
               <a:pPr/>
-              <a:t>2/13/13</a:t>
+              <a:t>2/20/13</a:t>
             </a:fld>
             <a:endParaRPr lang="en-US"/>
           </a:p>
@@ -3051,7 +3051,7 @@
             <a:fld id="{AA07F8E1-8F00-1645-9B46-B2F7ACC8F53A}" type="datetime1">
               <a:rPr lang="en-US" smtClean="0"/>
               <a:pPr/>
-              <a:t>2/13/13</a:t>
+              <a:t>2/20/13</a:t>
             </a:fld>
             <a:endParaRPr lang="en-US"/>
           </a:p>
@@ -3358,7 +3358,7 @@
             <a:fld id="{8138B7F0-25BC-B045-8049-7CADA7B3A1D1}" type="datetime1">
               <a:rPr lang="en-US" smtClean="0"/>
               <a:pPr/>
-              <a:t>2/13/13</a:t>
+              <a:t>2/20/13</a:t>
             </a:fld>
             <a:endParaRPr lang="en-US"/>
           </a:p>
@@ -4023,7 +4023,7 @@
             <a:fld id="{1B799630-9E30-DE4D-BE8D-4E9CA304B925}" type="datetime1">
               <a:rPr lang="en-US" smtClean="0"/>
               <a:pPr/>
-              <a:t>2/13/13</a:t>
+              <a:t>2/20/13</a:t>
             </a:fld>
             <a:endParaRPr lang="en-US"/>
           </a:p>
@@ -4755,7 +4755,7 @@
             <a:fld id="{504244A8-8889-154D-9568-D8C635C53E9B}" type="datetime1">
               <a:rPr lang="en-US" smtClean="0"/>
               <a:pPr/>
-              <a:t>2/13/13</a:t>
+              <a:t>2/20/13</a:t>
             </a:fld>
             <a:endParaRPr lang="en-US"/>
           </a:p>
@@ -5644,7 +5644,7 @@
             <a:fld id="{9522E0D4-989F-3A4B-AA2E-486ADFE0E698}" type="datetime1">
               <a:rPr lang="en-US" smtClean="0"/>
               <a:pPr/>
-              <a:t>2/13/13</a:t>
+              <a:t>2/20/13</a:t>
             </a:fld>
             <a:endParaRPr lang="en-US"/>
           </a:p>
@@ -6341,7 +6341,7 @@
             <a:fld id="{5B35050C-AFC0-D74A-963F-148736DC45A4}" type="datetime1">
               <a:rPr lang="en-US" smtClean="0"/>
               <a:pPr/>
-              <a:t>2/13/13</a:t>
+              <a:t>2/20/13</a:t>
             </a:fld>
             <a:endParaRPr lang="en-US" dirty="0"/>
           </a:p>
@@ -7420,7 +7420,7 @@
             <a:fld id="{7D098A99-26EF-B34F-91F8-30EA53688AF7}" type="datetime1">
               <a:rPr lang="en-US" smtClean="0"/>
               <a:pPr/>
-              <a:t>2/13/13</a:t>
+              <a:t>2/20/13</a:t>
             </a:fld>
             <a:endParaRPr lang="en-US" dirty="0"/>
           </a:p>
@@ -7708,7 +7708,7 @@
             <a:fld id="{C9CA6C2B-6061-6F46-BF6B-C0454CDDAB35}" type="datetime1">
               <a:rPr lang="en-US" smtClean="0"/>
               <a:pPr/>
-              <a:t>2/13/13</a:t>
+              <a:t>2/20/13</a:t>
             </a:fld>
             <a:endParaRPr lang="en-US"/>
           </a:p>
@@ -7939,7 +7939,7 @@
             <a:fld id="{DADE15B5-4D50-754D-8585-236811896E05}" type="datetime1">
               <a:rPr lang="en-US" smtClean="0"/>
               <a:pPr/>
-              <a:t>2/13/13</a:t>
+              <a:t>2/20/13</a:t>
             </a:fld>
             <a:endParaRPr lang="en-US"/>
           </a:p>
@@ -8242,7 +8242,7 @@
             <a:fld id="{114F66A0-55BE-484A-9667-5C4C7A46FB26}" type="datetime1">
               <a:rPr lang="en-US" smtClean="0"/>
               <a:pPr/>
-              <a:t>2/13/13</a:t>
+              <a:t>2/20/13</a:t>
             </a:fld>
             <a:endParaRPr lang="en-US"/>
           </a:p>
@@ -8621,7 +8621,7 @@
             <a:fld id="{30B37176-1C50-7042-8162-64D2C2671FE5}" type="datetime1">
               <a:rPr lang="en-US" smtClean="0"/>
               <a:pPr/>
-              <a:t>2/13/13</a:t>
+              <a:t>2/20/13</a:t>
             </a:fld>
             <a:endParaRPr lang="en-US" dirty="0"/>
           </a:p>
@@ -9250,6 +9250,15 @@
             <a:pPr marL="0" indent="0">
               <a:buNone/>
             </a:pPr>
+            <a:r>
+              <a:rPr lang="en-US" sz="1600" dirty="0"/>
+              <a:t>SAND# 2013-1427 P </a:t>
+            </a:r>
+          </a:p>
+          <a:p>
+            <a:pPr marL="0" indent="0">
+              <a:buNone/>
+            </a:pPr>
             <a:endParaRPr lang="en-US" sz="1600" dirty="0"/>
           </a:p>
           <a:p>
@@ -9264,14 +9273,12 @@
             </a:pPr>
             <a:r>
               <a:rPr lang="en-US" sz="1600" dirty="0" smtClean="0"/>
-              <a:t>Preliminary Executive Summary of Milestone Report</a:t>
-            </a:r>
-          </a:p>
-          <a:p>
-            <a:pPr marL="0" indent="0">
-              <a:buNone/>
-            </a:pPr>
-            <a:endParaRPr lang="en-US" sz="1600" dirty="0"/>
+              <a:t>Preliminary Executive Summary of Milestone </a:t>
+            </a:r>
+            <a:r>
+              <a:rPr lang="en-US" sz="1600" dirty="0" smtClean="0"/>
+              <a:t>Report</a:t>
+            </a:r>
           </a:p>
           <a:p>
             <a:pPr marL="0" indent="0">

</xml_diff>

<commit_message>
Changed slide 10 to reflect complete spyplot time.
</commit_message>
<xml_diff>
--- a/Summary/SummarySlides.pptx
+++ b/Summary/SummarySlides.pptx
@@ -9273,11 +9273,7 @@
             </a:pPr>
             <a:r>
               <a:rPr lang="en-US" sz="1600" dirty="0" smtClean="0"/>
-              <a:t>Preliminary Executive Summary of Milestone </a:t>
-            </a:r>
-            <a:r>
-              <a:rPr lang="en-US" sz="1600" dirty="0" smtClean="0"/>
-              <a:t>Report</a:t>
+              <a:t>Preliminary Executive Summary of Milestone Report</a:t>
             </a:r>
           </a:p>
           <a:p>
@@ -9599,7 +9595,27 @@
             </a:r>
             <a:r>
               <a:rPr lang="en-US" dirty="0" smtClean="0"/>
-              <a:t> files from CTH with no analysis</a:t>
+              <a:t> files from </a:t>
+            </a:r>
+            <a:r>
+              <a:rPr lang="en-US" dirty="0" smtClean="0"/>
+              <a:t>CTH, </a:t>
+            </a:r>
+            <a:r>
+              <a:rPr lang="en-US" smtClean="0"/>
+              <a:t>then post </a:t>
+            </a:r>
+            <a:r>
+              <a:rPr lang="en-US" dirty="0" smtClean="0"/>
+              <a:t>process analysis by reading back in and batch processing in </a:t>
+            </a:r>
+            <a:r>
+              <a:rPr lang="en-US" dirty="0" err="1" smtClean="0"/>
+              <a:t>ParaView</a:t>
+            </a:r>
+            <a:r>
+              <a:rPr lang="en-US" dirty="0" smtClean="0"/>
+              <a:t>.</a:t>
             </a:r>
             <a:endParaRPr lang="en-US" b="1" dirty="0"/>
           </a:p>

</xml_diff>

<commit_message>
Add conclusion about balancing time spent in simulation and analysis.
</commit_message>
<xml_diff>
--- a/Summary/SummarySlides.pptx
+++ b/Summary/SummarySlides.pptx
@@ -5,10 +5,10 @@
     <p:sldMasterId id="2147483783" r:id="rId1"/>
   </p:sldMasterIdLst>
   <p:notesMasterIdLst>
-    <p:notesMasterId r:id="rId45"/>
+    <p:notesMasterId r:id="rId46"/>
   </p:notesMasterIdLst>
   <p:handoutMasterIdLst>
-    <p:handoutMasterId r:id="rId46"/>
+    <p:handoutMasterId r:id="rId47"/>
   </p:handoutMasterIdLst>
   <p:sldIdLst>
     <p:sldId id="273" r:id="rId2"/>
@@ -49,11 +49,12 @@
     <p:sldId id="272" r:id="rId37"/>
     <p:sldId id="302" r:id="rId38"/>
     <p:sldId id="279" r:id="rId39"/>
-    <p:sldId id="280" r:id="rId40"/>
-    <p:sldId id="281" r:id="rId41"/>
-    <p:sldId id="282" r:id="rId42"/>
-    <p:sldId id="284" r:id="rId43"/>
-    <p:sldId id="311" r:id="rId44"/>
+    <p:sldId id="314" r:id="rId40"/>
+    <p:sldId id="280" r:id="rId41"/>
+    <p:sldId id="281" r:id="rId42"/>
+    <p:sldId id="282" r:id="rId43"/>
+    <p:sldId id="284" r:id="rId44"/>
+    <p:sldId id="311" r:id="rId45"/>
   </p:sldIdLst>
   <p:sldSz cx="9144000" cy="6858000" type="screen4x3"/>
   <p:notesSz cx="6858000" cy="9144000"/>
@@ -238,7 +239,7 @@
             <a:fld id="{E02E8FA7-2F4C-5D49-9BA4-AF921E49AE74}" type="datetime1">
               <a:rPr lang="en-US" smtClean="0"/>
               <a:pPr/>
-              <a:t>3/2/13</a:t>
+              <a:t>3/4/13</a:t>
             </a:fld>
             <a:endParaRPr lang="en-US"/>
           </a:p>
@@ -406,7 +407,7 @@
             <a:fld id="{0426B0FB-EA67-3A40-825F-8F252A860502}" type="datetime1">
               <a:rPr lang="en-US" smtClean="0"/>
               <a:pPr/>
-              <a:t>3/2/13</a:t>
+              <a:t>3/4/13</a:t>
             </a:fld>
             <a:endParaRPr lang="en-US"/>
           </a:p>
@@ -2098,7 +2099,7 @@
             <a:fld id="{E3A661A9-AB95-644B-88B2-9DDC7A23F4F4}" type="datetime1">
               <a:rPr lang="en-US" smtClean="0"/>
               <a:pPr/>
-              <a:t>3/2/13</a:t>
+              <a:t>3/4/13</a:t>
             </a:fld>
             <a:endParaRPr lang="en-US" dirty="0"/>
           </a:p>
@@ -2606,7 +2607,7 @@
             <a:fld id="{2D31639C-5EF8-8C48-833F-078F90087180}" type="datetime1">
               <a:rPr lang="en-US" smtClean="0"/>
               <a:pPr/>
-              <a:t>3/2/13</a:t>
+              <a:t>3/4/13</a:t>
             </a:fld>
             <a:endParaRPr lang="en-US"/>
           </a:p>
@@ -2739,7 +2740,7 @@
             <a:fld id="{B535C3D4-B14E-194D-A22F-ABBD9D7BE7F7}" type="datetime1">
               <a:rPr lang="en-US" smtClean="0"/>
               <a:pPr/>
-              <a:t>3/2/13</a:t>
+              <a:t>3/4/13</a:t>
             </a:fld>
             <a:endParaRPr lang="en-US"/>
           </a:p>
@@ -2849,7 +2850,7 @@
             <a:fld id="{91CFF6A9-F7ED-464D-9ECE-18CDAAFFF013}" type="datetime1">
               <a:rPr lang="en-US" smtClean="0"/>
               <a:pPr/>
-              <a:t>3/2/13</a:t>
+              <a:t>3/4/13</a:t>
             </a:fld>
             <a:endParaRPr lang="en-US"/>
           </a:p>
@@ -3141,7 +3142,7 @@
             <a:fld id="{C7865AE2-28C7-4947-8319-D60EEB07BE79}" type="datetime1">
               <a:rPr lang="en-US" smtClean="0"/>
               <a:pPr/>
-              <a:t>3/2/13</a:t>
+              <a:t>3/4/13</a:t>
             </a:fld>
             <a:endParaRPr lang="en-US"/>
           </a:p>
@@ -3413,7 +3414,7 @@
             <a:fld id="{D6782EBC-51D7-AB40-8702-393A26BF0924}" type="datetime1">
               <a:rPr lang="en-US" smtClean="0"/>
               <a:pPr/>
-              <a:t>3/2/13</a:t>
+              <a:t>3/4/13</a:t>
             </a:fld>
             <a:endParaRPr lang="en-US"/>
           </a:p>
@@ -3598,7 +3599,7 @@
             <a:fld id="{199A187D-6C3F-6D41-880E-F6B6C4095670}" type="datetime1">
               <a:rPr lang="en-US" smtClean="0"/>
               <a:pPr/>
-              <a:t>3/2/13</a:t>
+              <a:t>3/4/13</a:t>
             </a:fld>
             <a:endParaRPr lang="en-US"/>
           </a:p>
@@ -3793,7 +3794,7 @@
             <a:fld id="{AA07F8E1-8F00-1645-9B46-B2F7ACC8F53A}" type="datetime1">
               <a:rPr lang="en-US" smtClean="0"/>
               <a:pPr/>
-              <a:t>3/2/13</a:t>
+              <a:t>3/4/13</a:t>
             </a:fld>
             <a:endParaRPr lang="en-US"/>
           </a:p>
@@ -4100,7 +4101,7 @@
             <a:fld id="{8138B7F0-25BC-B045-8049-7CADA7B3A1D1}" type="datetime1">
               <a:rPr lang="en-US" smtClean="0"/>
               <a:pPr/>
-              <a:t>3/2/13</a:t>
+              <a:t>3/4/13</a:t>
             </a:fld>
             <a:endParaRPr lang="en-US"/>
           </a:p>
@@ -4765,7 +4766,7 @@
             <a:fld id="{1B799630-9E30-DE4D-BE8D-4E9CA304B925}" type="datetime1">
               <a:rPr lang="en-US" smtClean="0"/>
               <a:pPr/>
-              <a:t>3/2/13</a:t>
+              <a:t>3/4/13</a:t>
             </a:fld>
             <a:endParaRPr lang="en-US"/>
           </a:p>
@@ -5497,7 +5498,7 @@
             <a:fld id="{504244A8-8889-154D-9568-D8C635C53E9B}" type="datetime1">
               <a:rPr lang="en-US" smtClean="0"/>
               <a:pPr/>
-              <a:t>3/2/13</a:t>
+              <a:t>3/4/13</a:t>
             </a:fld>
             <a:endParaRPr lang="en-US"/>
           </a:p>
@@ -6386,7 +6387,7 @@
             <a:fld id="{9522E0D4-989F-3A4B-AA2E-486ADFE0E698}" type="datetime1">
               <a:rPr lang="en-US" smtClean="0"/>
               <a:pPr/>
-              <a:t>3/2/13</a:t>
+              <a:t>3/4/13</a:t>
             </a:fld>
             <a:endParaRPr lang="en-US"/>
           </a:p>
@@ -7083,7 +7084,7 @@
             <a:fld id="{5B35050C-AFC0-D74A-963F-148736DC45A4}" type="datetime1">
               <a:rPr lang="en-US" smtClean="0"/>
               <a:pPr/>
-              <a:t>3/2/13</a:t>
+              <a:t>3/4/13</a:t>
             </a:fld>
             <a:endParaRPr lang="en-US" dirty="0"/>
           </a:p>
@@ -8162,7 +8163,7 @@
             <a:fld id="{7D098A99-26EF-B34F-91F8-30EA53688AF7}" type="datetime1">
               <a:rPr lang="en-US" smtClean="0"/>
               <a:pPr/>
-              <a:t>3/2/13</a:t>
+              <a:t>3/4/13</a:t>
             </a:fld>
             <a:endParaRPr lang="en-US" dirty="0"/>
           </a:p>
@@ -8450,7 +8451,7 @@
             <a:fld id="{C9CA6C2B-6061-6F46-BF6B-C0454CDDAB35}" type="datetime1">
               <a:rPr lang="en-US" smtClean="0"/>
               <a:pPr/>
-              <a:t>3/2/13</a:t>
+              <a:t>3/4/13</a:t>
             </a:fld>
             <a:endParaRPr lang="en-US"/>
           </a:p>
@@ -8681,7 +8682,7 @@
             <a:fld id="{DADE15B5-4D50-754D-8585-236811896E05}" type="datetime1">
               <a:rPr lang="en-US" smtClean="0"/>
               <a:pPr/>
-              <a:t>3/2/13</a:t>
+              <a:t>3/4/13</a:t>
             </a:fld>
             <a:endParaRPr lang="en-US"/>
           </a:p>
@@ -8984,7 +8985,7 @@
             <a:fld id="{114F66A0-55BE-484A-9667-5C4C7A46FB26}" type="datetime1">
               <a:rPr lang="en-US" smtClean="0"/>
               <a:pPr/>
-              <a:t>3/2/13</a:t>
+              <a:t>3/4/13</a:t>
             </a:fld>
             <a:endParaRPr lang="en-US"/>
           </a:p>
@@ -9363,7 +9364,7 @@
             <a:fld id="{30B37176-1C50-7042-8162-64D2C2671FE5}" type="datetime1">
               <a:rPr lang="en-US" smtClean="0"/>
               <a:pPr/>
-              <a:t>3/2/13</a:t>
+              <a:t>3/4/13</a:t>
             </a:fld>
             <a:endParaRPr lang="en-US" dirty="0"/>
           </a:p>
@@ -39015,7 +39016,6 @@
               <a:rPr lang="en-US" sz="3600" dirty="0"/>
               <a:t>Pipeline Summary Timing (1.5m blocks)</a:t>
             </a:r>
-            <a:endParaRPr lang="en-US" sz="3600" dirty="0"/>
           </a:p>
         </p:txBody>
       </p:sp>
@@ -39089,19 +39089,7 @@
             <a:pPr algn="just"/>
             <a:r>
               <a:rPr lang="en-US" dirty="0" smtClean="0"/>
-              <a:t>Acce</a:t>
-            </a:r>
-            <a:r>
-              <a:rPr lang="en-US" dirty="0" smtClean="0"/>
-              <a:t>ptable </a:t>
-            </a:r>
-            <a:r>
-              <a:rPr lang="en-US" dirty="0" smtClean="0"/>
-              <a:t>scaling </a:t>
-            </a:r>
-            <a:r>
-              <a:rPr lang="en-US" dirty="0" smtClean="0"/>
-              <a:t>performance, with the  exception of the </a:t>
+              <a:t>Acceptable scaling performance, with the  exception of the </a:t>
             </a:r>
             <a:r>
               <a:rPr lang="en-US" dirty="0"/>
@@ -39467,11 +39455,7 @@
           <a:p>
             <a:r>
               <a:rPr lang="en-US" sz="3600" dirty="0" smtClean="0"/>
-              <a:t>Pipeline Summary </a:t>
-            </a:r>
-            <a:r>
-              <a:rPr lang="en-US" sz="3600" dirty="0" smtClean="0"/>
-              <a:t>Timing (1.5m blocks)</a:t>
+              <a:t>Pipeline Summary Timing (1.5m blocks)</a:t>
             </a:r>
             <a:endParaRPr lang="en-US" sz="3600" dirty="0"/>
           </a:p>
@@ -39666,7 +39650,6 @@
               <a:rPr lang="en-US" sz="3600" dirty="0"/>
               <a:t>Pipeline Summary Timing (1.5m blocks)</a:t>
             </a:r>
-            <a:endParaRPr lang="en-US" sz="3600" dirty="0"/>
           </a:p>
         </p:txBody>
       </p:sp>
@@ -39859,7 +39842,6 @@
               <a:rPr lang="en-US" sz="3600" dirty="0"/>
               <a:t>Pipeline Summary Timing (1.5m blocks)</a:t>
             </a:r>
-            <a:endParaRPr lang="en-US" sz="3600" dirty="0"/>
           </a:p>
         </p:txBody>
       </p:sp>
@@ -39933,11 +39915,7 @@
             <a:pPr algn="just"/>
             <a:r>
               <a:rPr lang="en-US" dirty="0" smtClean="0"/>
-              <a:t>“Sweet spot” </a:t>
-            </a:r>
-            <a:r>
-              <a:rPr lang="en-US" dirty="0" smtClean="0"/>
-              <a:t>at 8K cores: </a:t>
+              <a:t>“Sweet spot” at 8K cores: </a:t>
             </a:r>
             <a:r>
               <a:rPr lang="en-US" i="1" dirty="0" smtClean="0"/>
@@ -40383,7 +40361,6 @@
               <a:rPr lang="en-US" dirty="0" smtClean="0"/>
               <a:t>CTH scales well.</a:t>
             </a:r>
-            <a:endParaRPr lang="en-US" dirty="0" smtClean="0"/>
           </a:p>
           <a:p>
             <a:pPr marL="285750" indent="-285750" algn="just">
@@ -40396,13 +40373,8 @@
             </a:r>
             <a:r>
               <a:rPr lang="en-US" dirty="0" smtClean="0"/>
-              <a:t> I/O </a:t>
-            </a:r>
-            <a:r>
-              <a:rPr lang="en-US" dirty="0" smtClean="0"/>
-              <a:t>not bad</a:t>
-            </a:r>
-            <a:endParaRPr lang="en-US" dirty="0" smtClean="0"/>
+              <a:t> I/O not bad</a:t>
+            </a:r>
           </a:p>
           <a:p>
             <a:pPr marL="285750" indent="-285750" algn="just">
@@ -40922,11 +40894,7 @@
             </a:r>
             <a:r>
               <a:rPr lang="en-US" dirty="0" smtClean="0"/>
-              <a:t>passed. Not done for in-transit experiments</a:t>
-            </a:r>
-            <a:r>
-              <a:rPr lang="en-US" dirty="0" smtClean="0"/>
-              <a:t>.</a:t>
+              <a:t>passed. Not done for in-transit experiments.</a:t>
             </a:r>
             <a:endParaRPr lang="en-US" dirty="0"/>
           </a:p>
@@ -41425,23 +41393,7 @@
             </a:r>
             <a:r>
               <a:rPr lang="en-US" dirty="0" smtClean="0"/>
-              <a:t>ervice </a:t>
-            </a:r>
-            <a:r>
-              <a:rPr lang="en-US" dirty="0" smtClean="0"/>
-              <a:t>is </a:t>
-            </a:r>
-            <a:r>
-              <a:rPr lang="en-US" dirty="0" smtClean="0"/>
-              <a:t>a fixed size (800 nodes), </a:t>
-            </a:r>
-            <a:r>
-              <a:rPr lang="en-US" dirty="0" smtClean="0"/>
-              <a:t>the wait time should be independent of the number of cores on the client</a:t>
-            </a:r>
-            <a:r>
-              <a:rPr lang="en-US" dirty="0" smtClean="0"/>
-              <a:t>.</a:t>
+              <a:t>ervice is a fixed size (800 nodes), the wait time should be independent of the number of cores on the client.</a:t>
             </a:r>
           </a:p>
           <a:p>
@@ -42535,11 +42487,7 @@
             </a:r>
             <a:r>
               <a:rPr lang="en-US" dirty="0" smtClean="0"/>
-              <a:t>changes very little</a:t>
-            </a:r>
-            <a:r>
-              <a:rPr lang="en-US" dirty="0" smtClean="0"/>
-              <a:t>, </a:t>
+              <a:t>changes very little, </a:t>
             </a:r>
             <a:r>
               <a:rPr lang="en-US" dirty="0"/>
@@ -42583,7 +42531,6 @@
               <a:rPr lang="en-US" dirty="0" smtClean="0"/>
               <a:t> is less than viz.</a:t>
             </a:r>
-            <a:endParaRPr lang="en-US" dirty="0" smtClean="0"/>
           </a:p>
           <a:p>
             <a:pPr algn="just"/>
@@ -42774,11 +42721,7 @@
             <a:pPr algn="just"/>
             <a:r>
               <a:rPr lang="en-US" dirty="0" smtClean="0"/>
-              <a:t>Anomalies that cause large variance are </a:t>
-            </a:r>
-            <a:r>
-              <a:rPr lang="en-US" dirty="0" smtClean="0"/>
-              <a:t>clearly identified in overlay plot. </a:t>
+              <a:t>Anomalies that cause large variance are clearly identified in overlay plot. </a:t>
             </a:r>
           </a:p>
           <a:p>
@@ -43079,11 +43022,7 @@
             <a:pPr algn="just"/>
             <a:r>
               <a:rPr lang="en-US" dirty="0" smtClean="0"/>
-              <a:t>Refined algorithm has much less communication, resulting in less variance.</a:t>
-            </a:r>
-            <a:r>
-              <a:rPr lang="en-US" dirty="0" smtClean="0"/>
-              <a:t> </a:t>
+              <a:t>Refined algorithm has much less communication, resulting in less variance. </a:t>
             </a:r>
           </a:p>
           <a:p>
@@ -43094,11 +43033,7 @@
             </a:r>
             <a:r>
               <a:rPr lang="en-US" dirty="0" smtClean="0"/>
-              <a:t>cales are different in the two plots. </a:t>
-            </a:r>
-            <a:r>
-              <a:rPr lang="en-US" dirty="0" smtClean="0"/>
-              <a:t> </a:t>
+              <a:t>cales are different in the two plots.  </a:t>
             </a:r>
             <a:endParaRPr lang="en-US" dirty="0"/>
           </a:p>
@@ -43735,11 +43670,7 @@
             <a:pPr algn="just"/>
             <a:r>
               <a:rPr lang="en-US" dirty="0" smtClean="0"/>
-              <a:t>Scheduler </a:t>
-            </a:r>
-            <a:r>
-              <a:rPr lang="en-US" dirty="0" smtClean="0"/>
-              <a:t>does not optimize allocations for transfers between jobs.</a:t>
+              <a:t>Scheduler does not optimize allocations for transfers between jobs.</a:t>
             </a:r>
           </a:p>
           <a:p>
@@ -43802,11 +43733,7 @@
           <a:p>
             <a:r>
               <a:rPr lang="en-US" dirty="0" smtClean="0"/>
-              <a:t>Block Processing </a:t>
-            </a:r>
-            <a:r>
-              <a:rPr lang="en-US" dirty="0" smtClean="0"/>
-              <a:t>Rate (</a:t>
+              <a:t>Block Processing Rate (</a:t>
             </a:r>
             <a:r>
               <a:rPr lang="en-US" dirty="0" err="1" smtClean="0"/>
@@ -44263,11 +44190,7 @@
             </a:pPr>
             <a:r>
               <a:rPr lang="en-US" sz="1600" dirty="0" smtClean="0"/>
-              <a:t>Client idle waiting </a:t>
-            </a:r>
-            <a:r>
-              <a:rPr lang="en-US" sz="1600" dirty="0" smtClean="0"/>
-              <a:t>for servers (also affects </a:t>
+              <a:t>Client idle waiting for servers (also affects </a:t>
             </a:r>
             <a:r>
               <a:rPr lang="en-US" sz="1600" dirty="0" err="1" smtClean="0"/>
@@ -45663,8 +45586,12 @@
               <a:buNone/>
             </a:pPr>
             <a:r>
+              <a:rPr lang="en-US" sz="1800" b="1" i="1" dirty="0"/>
+              <a:t>In transit </a:t>
+            </a:r>
+            <a:r>
               <a:rPr lang="en-US" sz="1800" b="1" dirty="0"/>
-              <a:t>In transit can provide a performance improvement over in situ in some </a:t>
+              <a:t>can provide a performance improvement over in situ in some </a:t>
             </a:r>
             <a:r>
               <a:rPr lang="en-US" sz="1800" b="1" dirty="0" smtClean="0"/>
@@ -45808,51 +45735,33 @@
             </a:pPr>
             <a:r>
               <a:rPr lang="en-US" sz="1800" b="1" dirty="0"/>
-              <a:t>Memory overhead will be an important trade-off space.	</a:t>
-            </a:r>
-            <a:endParaRPr lang="en-US" sz="1800" b="1" dirty="0" smtClean="0"/>
+              <a:t>The efficiency of </a:t>
+            </a:r>
+            <a:r>
+              <a:rPr lang="en-US" sz="1800" b="1" i="1" dirty="0"/>
+              <a:t>in transit </a:t>
+            </a:r>
+            <a:r>
+              <a:rPr lang="en-US" sz="1800" b="1" dirty="0"/>
+              <a:t>relies on balancing the time spent in simulation and analysis.</a:t>
+            </a:r>
+            <a:endParaRPr lang="en-US" sz="1800" dirty="0" smtClean="0"/>
           </a:p>
           <a:p>
             <a:pPr marL="0" indent="0" algn="just">
               <a:buNone/>
             </a:pPr>
-            <a:endParaRPr lang="en-US" sz="1800" dirty="0"/>
-          </a:p>
-          <a:p>
-            <a:pPr marL="0" indent="0" algn="just">
-              <a:buNone/>
-            </a:pPr>
-            <a:r>
-              <a:rPr lang="en-US" sz="1800" dirty="0" smtClean="0"/>
-              <a:t>The </a:t>
-            </a:r>
             <a:r>
               <a:rPr lang="en-US" sz="1800" dirty="0"/>
-              <a:t>baseline amount of memory added to the CTH job to perform in situ processing is roughly 100MB per core. Considering that our embedded in situ library is a fully featured visualization toolkit </a:t>
-            </a:r>
-            <a:r>
-              <a:rPr lang="en-US" sz="1800" dirty="0" smtClean="0"/>
-              <a:t>containing </a:t>
+              <a:t>The significant overhead cost, apart from data transfer, in the </a:t>
+            </a:r>
+            <a:r>
+              <a:rPr lang="en-US" sz="1800" i="1" dirty="0"/>
+              <a:t>in transit </a:t>
             </a:r>
             <a:r>
               <a:rPr lang="en-US" sz="1800" dirty="0"/>
-              <a:t>over 2 million lines of code and algorithms developed over almost 2 decades, this overhead is not unreasonable. Nevertheless, this footprint can be problematic for </a:t>
-            </a:r>
-            <a:r>
-              <a:rPr lang="en-US" sz="1800" dirty="0" smtClean="0"/>
-              <a:t>simulations </a:t>
-            </a:r>
-            <a:r>
-              <a:rPr lang="en-US" sz="1800" dirty="0"/>
-              <a:t>already tight on memory. Because of this, efforts are already underway to improve our memory footprint by making finer modules and being more selective on the available algorithms. This, of course, requires a compromise between the size of the library and the algorithms that are dynamically available. We also note that our algorithm has the </a:t>
-            </a:r>
-            <a:r>
-              <a:rPr lang="en-US" sz="1800" dirty="0" smtClean="0"/>
-              <a:t>potential </a:t>
-            </a:r>
-            <a:r>
-              <a:rPr lang="en-US" sz="1800" dirty="0"/>
-              <a:t>to generate sizable meshes of its own. Thus, it may be fruitful to pursue and support incremental algorithms where possible.</a:t>
+              <a:t>workflow is the idle time spent in the simulation waiting for the visualization and data analysis service to become ready or the idle time spent in the visualization and data analysis service waiting for the simulation to send more data. This idle waiting time is minimized when the simulation and analysis spend the same amount of wall clock time between transfers. Although not demonstrated in this work, it is possible to “auto-balance” the work between simulation and analysis by, at every iteration of the simulation, transfer data to the analysis if and only if the analysis service is ready to accept more work. The disadvantage of such an approach is that the idle process time could be replaced with unnecessary extra analysis or less analysis than necessary. However, we suspect that controlling the amount of visualization and data analysis performed through job allocation sizes fits well with users’ rules of thumb about resource allocation.</a:t>
             </a:r>
             <a:endParaRPr lang="en-US" sz="1800" dirty="0" smtClean="0"/>
           </a:p>
@@ -45885,7 +45794,7 @@
     </p:spTree>
     <p:extLst>
       <p:ext uri="{BB962C8B-B14F-4D97-AF65-F5344CB8AC3E}">
-        <p14:creationId xmlns:p14="http://schemas.microsoft.com/office/powerpoint/2010/main" val="3340254881"/>
+        <p14:creationId xmlns:p14="http://schemas.microsoft.com/office/powerpoint/2010/main" val="1537622542"/>
       </p:ext>
     </p:extLst>
   </p:cSld>
@@ -46140,59 +46049,9 @@
             </a:pPr>
             <a:r>
               <a:rPr lang="en-US" sz="1800" b="1" dirty="0"/>
-              <a:t>Initialization time </a:t>
-            </a:r>
-            <a:r>
-              <a:rPr lang="en-US" sz="1800" b="1" dirty="0" smtClean="0"/>
-              <a:t>matters</a:t>
-            </a:r>
-          </a:p>
-          <a:p>
-            <a:pPr marL="0" indent="0" algn="just">
-              <a:buNone/>
-            </a:pPr>
-            <a:endParaRPr lang="en-US" sz="1800" dirty="0" smtClean="0"/>
-          </a:p>
-          <a:p>
-            <a:pPr marL="0" indent="0" algn="just">
-              <a:buNone/>
-            </a:pPr>
-            <a:r>
-              <a:rPr lang="en-US" sz="1800" dirty="0" smtClean="0"/>
-              <a:t>Our </a:t>
-            </a:r>
-            <a:r>
-              <a:rPr lang="en-US" sz="1800" dirty="0"/>
-              <a:t>scaling efforts to date focus on the scalability of the </a:t>
-            </a:r>
-            <a:r>
-              <a:rPr lang="en-US" sz="1800" dirty="0" smtClean="0"/>
-              <a:t>algorithms </a:t>
-            </a:r>
-            <a:r>
-              <a:rPr lang="en-US" sz="1800" dirty="0"/>
-              <a:t>invoked during the run of a simulation. The initialization cost, a one-time penalty, has yet to be seriously considered. However, based on our </a:t>
-            </a:r>
-            <a:r>
-              <a:rPr lang="en-US" sz="1800" dirty="0" err="1"/>
-              <a:t>HPCToolkit</a:t>
-            </a:r>
-            <a:r>
-              <a:rPr lang="en-US" sz="1800" dirty="0"/>
-              <a:t> measurements, </a:t>
-            </a:r>
-            <a:r>
-              <a:rPr lang="en-US" sz="1800" dirty="0" smtClean="0"/>
-              <a:t>initialization </a:t>
-            </a:r>
-            <a:r>
-              <a:rPr lang="en-US" sz="1800" dirty="0"/>
-              <a:t>becomes a significant cost at high process counts</a:t>
-            </a:r>
-            <a:r>
-              <a:rPr lang="en-US" sz="1800" dirty="0" smtClean="0"/>
-              <a:t>.</a:t>
-            </a:r>
+              <a:t>Memory overhead will be an important trade-off space.	</a:t>
+            </a:r>
+            <a:endParaRPr lang="en-US" sz="1800" b="1" dirty="0" smtClean="0"/>
           </a:p>
           <a:p>
             <a:pPr marL="0" indent="0" algn="just">
@@ -46201,39 +46060,40 @@
             <a:endParaRPr lang="en-US" sz="1800" dirty="0"/>
           </a:p>
           <a:p>
-            <a:pPr marL="0" indent="0">
+            <a:pPr marL="0" indent="0" algn="just">
               <a:buNone/>
             </a:pPr>
             <a:r>
-              <a:rPr lang="en-US" sz="1800" b="1" dirty="0" smtClean="0"/>
-              <a:t>Disk-based I/O is not dead . . . yet.	</a:t>
-            </a:r>
-          </a:p>
-          <a:p>
-            <a:pPr marL="0" indent="0">
-              <a:buNone/>
-            </a:pPr>
-            <a:endParaRPr lang="en-US" sz="1800" dirty="0"/>
-          </a:p>
-          <a:p>
-            <a:pPr marL="0" indent="0">
-              <a:buNone/>
-            </a:pPr>
-            <a:r>
               <a:rPr lang="en-US" sz="1800" dirty="0" smtClean="0"/>
-              <a:t>Our </a:t>
+              <a:t>The </a:t>
             </a:r>
             <a:r>
               <a:rPr lang="en-US" sz="1800" dirty="0"/>
-              <a:t>initial assumption was that it would not be feasible to output full results at a fine enough temporal resolution from CTH to disk storage to perform our high fidelity analysis. However, our control workflow shows that although the overall time to write data to disk and then read back again incurs a large cost, it </a:t>
+              <a:t>baseline amount of memory added to the CTH job to perform in situ processing is roughly 100MB per core. Considering that our embedded in situ library is a fully featured visualization toolkit </a:t>
             </a:r>
             <a:r>
               <a:rPr lang="en-US" sz="1800" dirty="0" smtClean="0"/>
-              <a:t>is still </a:t>
+              <a:t>containing </a:t>
             </a:r>
             <a:r>
               <a:rPr lang="en-US" sz="1800" dirty="0"/>
-              <a:t>realistic to do so. Thus, users may still choose to incur the extra overhead to use a traditional offline post-processing visualization and data analysis workflow.</a:t>
+              <a:t>over 2 million lines of code and algorithms developed over almost 2 decades, this overhead is not unreasonable. Nevertheless, this footprint can be problematic for </a:t>
+            </a:r>
+            <a:r>
+              <a:rPr lang="en-US" sz="1800" dirty="0" smtClean="0"/>
+              <a:t>simulations </a:t>
+            </a:r>
+            <a:r>
+              <a:rPr lang="en-US" sz="1800" dirty="0"/>
+              <a:t>already tight on memory. Because of this, efforts are already underway to improve our memory footprint by making finer modules and being more selective on the available algorithms. This, of course, requires a compromise between the size of the library and the algorithms that are dynamically available. We also note that our algorithm has the </a:t>
+            </a:r>
+            <a:r>
+              <a:rPr lang="en-US" sz="1800" dirty="0" smtClean="0"/>
+              <a:t>potential </a:t>
+            </a:r>
+            <a:r>
+              <a:rPr lang="en-US" sz="1800" dirty="0"/>
+              <a:t>to generate sizable meshes of its own. Thus, it may be fruitful to pursue and support incremental algorithms where possible.</a:t>
             </a:r>
             <a:endParaRPr lang="en-US" sz="1800" dirty="0" smtClean="0"/>
           </a:p>
@@ -46343,11 +46203,58 @@
             </a:pPr>
             <a:r>
               <a:rPr lang="en-US" sz="1800" b="1" dirty="0"/>
-              <a:t>Better job scheduling is </a:t>
+              <a:t>Initialization time </a:t>
             </a:r>
             <a:r>
               <a:rPr lang="en-US" sz="1800" b="1" dirty="0" smtClean="0"/>
-              <a:t>important</a:t>
+              <a:t>matters</a:t>
+            </a:r>
+          </a:p>
+          <a:p>
+            <a:pPr marL="0" indent="0" algn="just">
+              <a:buNone/>
+            </a:pPr>
+            <a:endParaRPr lang="en-US" sz="1800" dirty="0" smtClean="0"/>
+          </a:p>
+          <a:p>
+            <a:pPr marL="0" indent="0" algn="just">
+              <a:buNone/>
+            </a:pPr>
+            <a:r>
+              <a:rPr lang="en-US" sz="1800" dirty="0" smtClean="0"/>
+              <a:t>Our </a:t>
+            </a:r>
+            <a:r>
+              <a:rPr lang="en-US" sz="1800" dirty="0"/>
+              <a:t>scaling efforts to date focus on the scalability of the </a:t>
+            </a:r>
+            <a:r>
+              <a:rPr lang="en-US" sz="1800" dirty="0" smtClean="0"/>
+              <a:t>algorithms </a:t>
+            </a:r>
+            <a:r>
+              <a:rPr lang="en-US" sz="1800" dirty="0"/>
+              <a:t>invoked during the run of a simulation. The initialization cost, a one-time penalty, has yet to be seriously considered. However, based on our </a:t>
+            </a:r>
+            <a:r>
+              <a:rPr lang="en-US" sz="1800" dirty="0" err="1"/>
+              <a:t>HPCToolkit</a:t>
+            </a:r>
+            <a:r>
+              <a:rPr lang="en-US" sz="1800" dirty="0"/>
+              <a:t> measurements, </a:t>
+            </a:r>
+            <a:r>
+              <a:rPr lang="en-US" sz="1800" dirty="0" smtClean="0"/>
+              <a:t>initialization </a:t>
+            </a:r>
+            <a:r>
+              <a:rPr lang="en-US" sz="1800" dirty="0"/>
+              <a:t>becomes a significant cost at high process counts</a:t>
+            </a:r>
+            <a:r>
+              <a:rPr lang="en-US" sz="1800" dirty="0" smtClean="0"/>
+              <a:t>.</a:t>
             </a:r>
           </a:p>
           <a:p>
@@ -46357,16 +46264,39 @@
             <a:endParaRPr lang="en-US" sz="1800" dirty="0"/>
           </a:p>
           <a:p>
-            <a:pPr marL="0" indent="0" algn="just">
+            <a:pPr marL="0" indent="0">
               <a:buNone/>
             </a:pPr>
             <a:r>
+              <a:rPr lang="en-US" sz="1800" b="1" dirty="0" smtClean="0"/>
+              <a:t>Disk-based I/O is not dead . . . yet.	</a:t>
+            </a:r>
+          </a:p>
+          <a:p>
+            <a:pPr marL="0" indent="0">
+              <a:buNone/>
+            </a:pPr>
+            <a:endParaRPr lang="en-US" sz="1800" dirty="0"/>
+          </a:p>
+          <a:p>
+            <a:pPr marL="0" indent="0">
+              <a:buNone/>
+            </a:pPr>
+            <a:r>
               <a:rPr lang="en-US" sz="1800" dirty="0" smtClean="0"/>
-              <a:t>One </a:t>
+              <a:t>Our </a:t>
             </a:r>
             <a:r>
               <a:rPr lang="en-US" sz="1800" dirty="0"/>
-              <a:t>of the more complicated parts of running an in transit workflow is scheduling the simulation job and service job to run in tandem. Frankly, the capabilities of the scheduler are inadequate for our needs. We cannot start and stop jobs independently and make reconnections dynamically. Another experiment we would like to do but is challenging to schedule is to allow simulation and service to share nodes. Since each node has 16 cores, perhaps we could get better transfer performance by allocating one core per node for service and the rest for simulation. A similar scheduling scheme will be important to take advantage of burst buffers in future architectures.</a:t>
+              <a:t>initial assumption was that it would not be feasible to output full results at a fine enough temporal resolution from CTH to disk storage to perform our high fidelity analysis. However, our control workflow shows that although the overall time to write data to disk and then read back again incurs a large cost, it </a:t>
+            </a:r>
+            <a:r>
+              <a:rPr lang="en-US" sz="1800" dirty="0" smtClean="0"/>
+              <a:t>is still </a:t>
+            </a:r>
+            <a:r>
+              <a:rPr lang="en-US" sz="1800" dirty="0"/>
+              <a:t>realistic to do so. Thus, users may still choose to incur the extra overhead to use a traditional offline post-processing visualization and data analysis workflow.</a:t>
             </a:r>
             <a:endParaRPr lang="en-US" sz="1800" dirty="0" smtClean="0"/>
           </a:p>
@@ -46399,7 +46329,7 @@
     </p:spTree>
     <p:extLst>
       <p:ext uri="{BB962C8B-B14F-4D97-AF65-F5344CB8AC3E}">
-        <p14:creationId xmlns:p14="http://schemas.microsoft.com/office/powerpoint/2010/main" val="855609389"/>
+        <p14:creationId xmlns:p14="http://schemas.microsoft.com/office/powerpoint/2010/main" val="3340254881"/>
       </p:ext>
     </p:extLst>
   </p:cSld>
@@ -46450,7 +46380,7 @@
           <a:p>
             <a:r>
               <a:rPr lang="en-US" dirty="0" smtClean="0"/>
-              <a:t>Future Work</a:t>
+              <a:t>Conclusions</a:t>
             </a:r>
             <a:endParaRPr lang="en-US" dirty="0"/>
           </a:p>
@@ -46471,109 +46401,37 @@
           <a:bodyPr/>
           <a:lstStyle/>
           <a:p>
-            <a:pPr rtl="0" eaLnBrk="1" fontAlgn="base" hangingPunct="1"/>
-            <a:r>
-              <a:rPr lang="en-US" dirty="0" smtClean="0"/>
-              <a:t>Algorithm comparison.  Three similar algorithms with three different scaling </a:t>
-            </a:r>
-            <a:r>
-              <a:rPr lang="en-US" dirty="0" err="1" smtClean="0"/>
-              <a:t>bahaviors</a:t>
-            </a:r>
-            <a:endParaRPr lang="en-US" dirty="0" smtClean="0"/>
-          </a:p>
-          <a:p>
-            <a:pPr lvl="1"/>
-            <a:r>
-              <a:rPr lang="en-US" dirty="0" smtClean="0">
-                <a:effectLst/>
-              </a:rPr>
-              <a:t>Contour algorithm (perfectly scalable)</a:t>
-            </a:r>
-          </a:p>
-          <a:p>
-            <a:pPr lvl="1"/>
-            <a:r>
-              <a:rPr lang="en-US" dirty="0" smtClean="0"/>
-              <a:t>Refined water tight contours (reasonably scalable)</a:t>
-            </a:r>
-          </a:p>
-          <a:p>
-            <a:pPr lvl="1"/>
-            <a:r>
-              <a:rPr lang="en-US" dirty="0" smtClean="0">
-                <a:effectLst/>
-              </a:rPr>
-              <a:t>Baseline water tight contours (not scalable)</a:t>
-            </a:r>
-          </a:p>
-          <a:p>
-            <a:r>
-              <a:rPr lang="en-US" dirty="0" smtClean="0"/>
-              <a:t>No-wait analysis (in-transit)</a:t>
-            </a:r>
-            <a:endParaRPr lang="en-US" dirty="0"/>
-          </a:p>
-          <a:p>
-            <a:pPr lvl="1"/>
-            <a:r>
-              <a:rPr lang="en-US" dirty="0" smtClean="0"/>
-              <a:t>Perform analysis if and only if the service is ready</a:t>
-            </a:r>
-          </a:p>
-          <a:p>
-            <a:r>
-              <a:rPr lang="en-US" dirty="0" smtClean="0"/>
-              <a:t>Investigate initialization cost of in-situ </a:t>
-            </a:r>
-            <a:r>
-              <a:rPr lang="en-US" dirty="0" err="1" smtClean="0"/>
-              <a:t>vis</a:t>
-            </a:r>
-            <a:endParaRPr lang="en-US" dirty="0" smtClean="0"/>
-          </a:p>
-          <a:p>
-            <a:r>
-              <a:rPr lang="en-US" dirty="0" smtClean="0"/>
-              <a:t>Zero copy </a:t>
-            </a:r>
-            <a:r>
-              <a:rPr lang="en-US" dirty="0" smtClean="0"/>
-              <a:t>transfers (in-transit)</a:t>
-            </a:r>
-            <a:endParaRPr lang="en-US" dirty="0" smtClean="0"/>
-          </a:p>
-          <a:p>
-            <a:r>
-              <a:rPr lang="en-US" dirty="0" smtClean="0"/>
-              <a:t>Additional apps at </a:t>
-            </a:r>
-            <a:r>
-              <a:rPr lang="en-US" dirty="0" err="1" smtClean="0"/>
-              <a:t>Cielo</a:t>
-            </a:r>
-            <a:r>
-              <a:rPr lang="en-US" dirty="0" smtClean="0"/>
-              <a:t> scale</a:t>
-            </a:r>
-          </a:p>
-          <a:p>
-            <a:r>
-              <a:rPr lang="en-US" dirty="0" smtClean="0"/>
-              <a:t>Improved OS and runtime </a:t>
-            </a:r>
-            <a:r>
-              <a:rPr lang="en-US" dirty="0" smtClean="0"/>
-              <a:t>support</a:t>
-            </a:r>
-          </a:p>
-          <a:p>
-            <a:pPr lvl="1"/>
-            <a:r>
-              <a:rPr lang="en-US" dirty="0" smtClean="0"/>
-              <a:t>Scheduling, placement, node sharing, specialized runtimes, …</a:t>
-            </a:r>
-            <a:endParaRPr lang="en-US" dirty="0" smtClean="0"/>
+            <a:pPr marL="0" indent="0" algn="just">
+              <a:buNone/>
+            </a:pPr>
+            <a:r>
+              <a:rPr lang="en-US" sz="1800" b="1" dirty="0"/>
+              <a:t>Better job scheduling is </a:t>
+            </a:r>
+            <a:r>
+              <a:rPr lang="en-US" sz="1800" b="1" dirty="0" smtClean="0"/>
+              <a:t>important</a:t>
+            </a:r>
+          </a:p>
+          <a:p>
+            <a:pPr marL="0" indent="0" algn="just">
+              <a:buNone/>
+            </a:pPr>
+            <a:endParaRPr lang="en-US" sz="1800" dirty="0"/>
+          </a:p>
+          <a:p>
+            <a:pPr marL="0" indent="0" algn="just">
+              <a:buNone/>
+            </a:pPr>
+            <a:r>
+              <a:rPr lang="en-US" sz="1800" dirty="0" smtClean="0"/>
+              <a:t>One </a:t>
+            </a:r>
+            <a:r>
+              <a:rPr lang="en-US" sz="1800" dirty="0"/>
+              <a:t>of the more complicated parts of running an in transit workflow is scheduling the simulation job and service job to run in tandem. Frankly, the capabilities of the scheduler are inadequate for our needs. We cannot start and stop jobs independently and make reconnections dynamically. Another experiment we would like to do but is challenging to schedule is to allow simulation and service to share nodes. Since each node has 16 cores, perhaps we could get better transfer performance by allocating one core per node for service and the rest for simulation. A similar scheduling scheme will be important to take advantage of burst buffers in future architectures.</a:t>
+            </a:r>
+            <a:endParaRPr lang="en-US" sz="1800" dirty="0" smtClean="0"/>
           </a:p>
         </p:txBody>
       </p:sp>
@@ -46604,7 +46462,7 @@
     </p:spTree>
     <p:extLst>
       <p:ext uri="{BB962C8B-B14F-4D97-AF65-F5344CB8AC3E}">
-        <p14:creationId xmlns:p14="http://schemas.microsoft.com/office/powerpoint/2010/main" val="3843009092"/>
+        <p14:creationId xmlns:p14="http://schemas.microsoft.com/office/powerpoint/2010/main" val="855609389"/>
       </p:ext>
     </p:extLst>
   </p:cSld>
@@ -46655,7 +46513,7 @@
           <a:p>
             <a:r>
               <a:rPr lang="en-US" dirty="0" smtClean="0"/>
-              <a:t>Summary</a:t>
+              <a:t>Future Work</a:t>
             </a:r>
             <a:endParaRPr lang="en-US" dirty="0"/>
           </a:p>
@@ -46678,152 +46536,97 @@
           <a:p>
             <a:pPr rtl="0" eaLnBrk="1" fontAlgn="base" hangingPunct="1"/>
             <a:r>
-              <a:rPr lang="en-US" sz="2400" dirty="0" smtClean="0">
-                <a:solidFill>
-                  <a:schemeClr val="tx1"/>
-                </a:solidFill>
+              <a:rPr lang="en-US" dirty="0" smtClean="0"/>
+              <a:t>Algorithm comparison.  Three similar algorithms with three different scaling </a:t>
+            </a:r>
+            <a:r>
+              <a:rPr lang="en-US" dirty="0" err="1" smtClean="0"/>
+              <a:t>bahaviors</a:t>
+            </a:r>
+            <a:endParaRPr lang="en-US" dirty="0" smtClean="0"/>
+          </a:p>
+          <a:p>
+            <a:pPr lvl="1"/>
+            <a:r>
+              <a:rPr lang="en-US" dirty="0" smtClean="0">
                 <a:effectLst/>
-                <a:latin typeface="Calibri"/>
-                <a:ea typeface="ＭＳ Ｐゴシック" charset="-128"/>
-                <a:cs typeface="Calibri"/>
               </a:rPr>
-              <a:t>Milestone 4745 “Data Co-Processing for Extreme Scale Analysis” was successfully completed on time, and demonstrated against the letter and spirit of stated Milestone.</a:t>
-            </a:r>
-            <a:endParaRPr lang="en-US" sz="2400" dirty="0" smtClean="0">
-              <a:effectLst/>
-            </a:endParaRPr>
-          </a:p>
-          <a:p>
-            <a:pPr rtl="0" eaLnBrk="1" fontAlgn="base" hangingPunct="1"/>
-            <a:r>
-              <a:rPr lang="en-US" sz="2400" dirty="0" smtClean="0">
-                <a:solidFill>
-                  <a:schemeClr val="tx1"/>
-                </a:solidFill>
+              <a:t>Contour algorithm (perfectly scalable)</a:t>
+            </a:r>
+          </a:p>
+          <a:p>
+            <a:pPr lvl="1"/>
+            <a:r>
+              <a:rPr lang="en-US" dirty="0" smtClean="0"/>
+              <a:t>Refined water tight contours (reasonably scalable)</a:t>
+            </a:r>
+          </a:p>
+          <a:p>
+            <a:pPr lvl="1"/>
+            <a:r>
+              <a:rPr lang="en-US" dirty="0" smtClean="0">
                 <a:effectLst/>
-                <a:latin typeface="Calibri"/>
-                <a:ea typeface="ＭＳ Ｐゴシック" charset="-128"/>
-                <a:cs typeface="Calibri"/>
               </a:rPr>
-              <a:t>The Milestone Team completed over 9 million node hours of </a:t>
-            </a:r>
-            <a:r>
-              <a:rPr lang="en-US" sz="2400" dirty="0" err="1" smtClean="0">
-                <a:solidFill>
-                  <a:schemeClr val="tx1"/>
-                </a:solidFill>
-                <a:effectLst/>
-                <a:latin typeface="Calibri"/>
-                <a:ea typeface="ＭＳ Ｐゴシック" charset="-128"/>
-                <a:cs typeface="Calibri"/>
-              </a:rPr>
+              <a:t>Baseline water tight contours (not scalable)</a:t>
+            </a:r>
+          </a:p>
+          <a:p>
+            <a:r>
+              <a:rPr lang="en-US" dirty="0" smtClean="0"/>
+              <a:t>No-wait analysis (in-transit)</a:t>
+            </a:r>
+            <a:endParaRPr lang="en-US" dirty="0"/>
+          </a:p>
+          <a:p>
+            <a:pPr lvl="1"/>
+            <a:r>
+              <a:rPr lang="en-US" dirty="0" smtClean="0"/>
+              <a:t>Perform analysis if and only if the service is ready</a:t>
+            </a:r>
+          </a:p>
+          <a:p>
+            <a:r>
+              <a:rPr lang="en-US" dirty="0" smtClean="0"/>
+              <a:t>Investigate initialization cost of in-situ </a:t>
+            </a:r>
+            <a:r>
+              <a:rPr lang="en-US" dirty="0" err="1" smtClean="0"/>
+              <a:t>vis</a:t>
+            </a:r>
+            <a:endParaRPr lang="en-US" dirty="0" smtClean="0"/>
+          </a:p>
+          <a:p>
+            <a:r>
+              <a:rPr lang="en-US" dirty="0" smtClean="0"/>
+              <a:t>Zero copy transfers (in-transit)</a:t>
+            </a:r>
+          </a:p>
+          <a:p>
+            <a:r>
+              <a:rPr lang="en-US" dirty="0" smtClean="0"/>
+              <a:t>Additional apps at </a:t>
+            </a:r>
+            <a:r>
+              <a:rPr lang="en-US" dirty="0" err="1" smtClean="0"/>
               <a:t>Cielo</a:t>
             </a:r>
             <a:r>
-              <a:rPr lang="en-US" sz="2400" dirty="0" smtClean="0">
-                <a:solidFill>
-                  <a:schemeClr val="tx1"/>
-                </a:solidFill>
-                <a:effectLst/>
-                <a:latin typeface="Calibri"/>
-                <a:ea typeface="ＭＳ Ｐゴシック" charset="-128"/>
-                <a:cs typeface="Calibri"/>
-              </a:rPr>
-              <a:t> tests on both </a:t>
-            </a:r>
-            <a:r>
-              <a:rPr lang="en-US" sz="2400" i="1" dirty="0" smtClean="0">
-                <a:solidFill>
-                  <a:schemeClr val="tx1"/>
-                </a:solidFill>
-                <a:effectLst/>
-                <a:latin typeface="Calibri"/>
-                <a:ea typeface="ＭＳ Ｐゴシック" charset="-128"/>
-                <a:cs typeface="Calibri"/>
-              </a:rPr>
-              <a:t>in-situ</a:t>
-            </a:r>
-            <a:r>
-              <a:rPr lang="en-US" sz="2400" dirty="0" smtClean="0">
-                <a:solidFill>
-                  <a:schemeClr val="tx1"/>
-                </a:solidFill>
-                <a:effectLst/>
-                <a:latin typeface="Calibri"/>
-                <a:ea typeface="ＭＳ Ｐゴシック" charset="-128"/>
-                <a:cs typeface="Calibri"/>
-              </a:rPr>
-              <a:t> and </a:t>
-            </a:r>
-            <a:r>
-              <a:rPr lang="en-US" sz="2400" i="1" dirty="0" smtClean="0">
-                <a:solidFill>
-                  <a:schemeClr val="tx1"/>
-                </a:solidFill>
-                <a:effectLst/>
-                <a:latin typeface="Calibri"/>
-                <a:ea typeface="ＭＳ Ｐゴシック" charset="-128"/>
-                <a:cs typeface="Calibri"/>
-              </a:rPr>
-              <a:t>in-transit</a:t>
-            </a:r>
-            <a:r>
-              <a:rPr lang="en-US" sz="2400" dirty="0" smtClean="0">
-                <a:solidFill>
-                  <a:schemeClr val="tx1"/>
-                </a:solidFill>
-                <a:effectLst/>
-                <a:latin typeface="Calibri"/>
-                <a:ea typeface="ＭＳ Ｐゴシック" charset="-128"/>
-                <a:cs typeface="Calibri"/>
-              </a:rPr>
-              <a:t> analysis capabilities on a problem provided by a Sandia analyst.</a:t>
-            </a:r>
-            <a:endParaRPr lang="en-US" dirty="0" smtClean="0">
-              <a:effectLst/>
-            </a:endParaRPr>
-          </a:p>
-          <a:p>
-            <a:pPr rtl="0" eaLnBrk="1" fontAlgn="base" hangingPunct="1"/>
-            <a:r>
-              <a:rPr lang="en-US" sz="2400" dirty="0" smtClean="0">
-                <a:solidFill>
-                  <a:schemeClr val="tx1"/>
-                </a:solidFill>
-                <a:effectLst/>
-                <a:latin typeface="Calibri"/>
-                <a:ea typeface="ＭＳ Ｐゴシック" charset="-128"/>
-                <a:cs typeface="Calibri"/>
-              </a:rPr>
-              <a:t>The results of these experiments have been detailed in a SAND report, which is published as an unclassified unlimited release document, available to the entire mod/</a:t>
-            </a:r>
-            <a:r>
-              <a:rPr lang="en-US" sz="2400" dirty="0" err="1" smtClean="0">
-                <a:solidFill>
-                  <a:schemeClr val="tx1"/>
-                </a:solidFill>
-                <a:effectLst/>
-                <a:latin typeface="Calibri"/>
-                <a:ea typeface="ＭＳ Ｐゴシック" charset="-128"/>
-                <a:cs typeface="Calibri"/>
-              </a:rPr>
-              <a:t>sim</a:t>
-            </a:r>
-            <a:r>
-              <a:rPr lang="en-US" sz="2400" dirty="0" smtClean="0">
-                <a:solidFill>
-                  <a:schemeClr val="tx1"/>
-                </a:solidFill>
-                <a:effectLst/>
-                <a:latin typeface="Calibri"/>
-                <a:ea typeface="ＭＳ Ｐゴシック" charset="-128"/>
-                <a:cs typeface="Calibri"/>
-              </a:rPr>
-              <a:t> community</a:t>
-            </a:r>
-            <a:endParaRPr lang="en-US" dirty="0" smtClean="0">
-              <a:effectLst/>
-            </a:endParaRPr>
+              <a:rPr lang="en-US" dirty="0" smtClean="0"/>
+              <a:t> scale</a:t>
+            </a:r>
+          </a:p>
+          <a:p>
+            <a:r>
+              <a:rPr lang="en-US" dirty="0" smtClean="0"/>
+              <a:t>Improved OS and runtime support</a:t>
+            </a:r>
+          </a:p>
+          <a:p>
+            <a:pPr lvl="1"/>
+            <a:r>
+              <a:rPr lang="en-US" dirty="0" smtClean="0"/>
+              <a:t>Scheduling, placement, node sharing, specialized runtimes, …</a:t>
+            </a:r>
           </a:p>
         </p:txBody>
       </p:sp>
@@ -46846,6 +46649,256 @@
               <a:rPr lang="en-US" smtClean="0"/>
               <a:pPr/>
               <a:t>43</a:t>
+            </a:fld>
+            <a:endParaRPr lang="en-US"/>
+          </a:p>
+        </p:txBody>
+      </p:sp>
+    </p:spTree>
+    <p:extLst>
+      <p:ext uri="{BB962C8B-B14F-4D97-AF65-F5344CB8AC3E}">
+        <p14:creationId xmlns:p14="http://schemas.microsoft.com/office/powerpoint/2010/main" val="3843009092"/>
+      </p:ext>
+    </p:extLst>
+  </p:cSld>
+  <p:clrMapOvr>
+    <a:masterClrMapping/>
+  </p:clrMapOvr>
+  <p:timing>
+    <p:tnLst>
+      <p:par>
+        <p:cTn xmlns:p14="http://schemas.microsoft.com/office/powerpoint/2010/main" id="1" dur="indefinite" restart="never" nodeType="tmRoot"/>
+      </p:par>
+    </p:tnLst>
+  </p:timing>
+</p:sld>
+</file>
+
+<file path=ppt/slides/slide44.xml><?xml version="1.0" encoding="utf-8"?>
+<p:sld xmlns:a="http://schemas.openxmlformats.org/drawingml/2006/main" xmlns:r="http://schemas.openxmlformats.org/officeDocument/2006/relationships" xmlns:p="http://schemas.openxmlformats.org/presentationml/2006/main">
+  <p:cSld>
+    <p:spTree>
+      <p:nvGrpSpPr>
+        <p:cNvPr id="1" name=""/>
+        <p:cNvGrpSpPr/>
+        <p:nvPr/>
+      </p:nvGrpSpPr>
+      <p:grpSpPr>
+        <a:xfrm>
+          <a:off x="0" y="0"/>
+          <a:ext cx="0" cy="0"/>
+          <a:chOff x="0" y="0"/>
+          <a:chExt cx="0" cy="0"/>
+        </a:xfrm>
+      </p:grpSpPr>
+      <p:sp>
+        <p:nvSpPr>
+          <p:cNvPr id="2" name="Title 1"/>
+          <p:cNvSpPr>
+            <a:spLocks noGrp="1"/>
+          </p:cNvSpPr>
+          <p:nvPr>
+            <p:ph type="title"/>
+          </p:nvPr>
+        </p:nvSpPr>
+        <p:spPr/>
+        <p:txBody>
+          <a:bodyPr/>
+          <a:lstStyle/>
+          <a:p>
+            <a:r>
+              <a:rPr lang="en-US" dirty="0" smtClean="0"/>
+              <a:t>Summary</a:t>
+            </a:r>
+            <a:endParaRPr lang="en-US" dirty="0"/>
+          </a:p>
+        </p:txBody>
+      </p:sp>
+      <p:sp>
+        <p:nvSpPr>
+          <p:cNvPr id="3" name="Content Placeholder 2"/>
+          <p:cNvSpPr>
+            <a:spLocks noGrp="1"/>
+          </p:cNvSpPr>
+          <p:nvPr>
+            <p:ph idx="1"/>
+          </p:nvPr>
+        </p:nvSpPr>
+        <p:spPr/>
+        <p:txBody>
+          <a:bodyPr/>
+          <a:lstStyle/>
+          <a:p>
+            <a:pPr rtl="0" eaLnBrk="1" fontAlgn="base" hangingPunct="1"/>
+            <a:r>
+              <a:rPr lang="en-US" sz="2400" dirty="0" smtClean="0">
+                <a:solidFill>
+                  <a:schemeClr val="tx1"/>
+                </a:solidFill>
+                <a:effectLst/>
+                <a:latin typeface="Calibri"/>
+                <a:ea typeface="ＭＳ Ｐゴシック" charset="-128"/>
+                <a:cs typeface="Calibri"/>
+              </a:rPr>
+              <a:t>Milestone 4745 “Data Co-Processing for Extreme Scale Analysis” was successfully completed on time, and demonstrated against the letter and spirit of stated Milestone.</a:t>
+            </a:r>
+            <a:endParaRPr lang="en-US" sz="2400" dirty="0" smtClean="0">
+              <a:effectLst/>
+            </a:endParaRPr>
+          </a:p>
+          <a:p>
+            <a:pPr rtl="0" eaLnBrk="1" fontAlgn="base" hangingPunct="1"/>
+            <a:r>
+              <a:rPr lang="en-US" sz="2400" dirty="0" smtClean="0">
+                <a:solidFill>
+                  <a:schemeClr val="tx1"/>
+                </a:solidFill>
+                <a:effectLst/>
+                <a:latin typeface="Calibri"/>
+                <a:ea typeface="ＭＳ Ｐゴシック" charset="-128"/>
+                <a:cs typeface="Calibri"/>
+              </a:rPr>
+              <a:t>The Milestone Team completed over 9 million node hours of </a:t>
+            </a:r>
+            <a:r>
+              <a:rPr lang="en-US" sz="2400" dirty="0" err="1" smtClean="0">
+                <a:solidFill>
+                  <a:schemeClr val="tx1"/>
+                </a:solidFill>
+                <a:effectLst/>
+                <a:latin typeface="Calibri"/>
+                <a:ea typeface="ＭＳ Ｐゴシック" charset="-128"/>
+                <a:cs typeface="Calibri"/>
+              </a:rPr>
+              <a:t>Cielo</a:t>
+            </a:r>
+            <a:r>
+              <a:rPr lang="en-US" sz="2400" dirty="0" smtClean="0">
+                <a:solidFill>
+                  <a:schemeClr val="tx1"/>
+                </a:solidFill>
+                <a:effectLst/>
+                <a:latin typeface="Calibri"/>
+                <a:ea typeface="ＭＳ Ｐゴシック" charset="-128"/>
+                <a:cs typeface="Calibri"/>
+              </a:rPr>
+              <a:t> tests on both </a:t>
+            </a:r>
+            <a:r>
+              <a:rPr lang="en-US" sz="2400" i="1" dirty="0" smtClean="0">
+                <a:solidFill>
+                  <a:schemeClr val="tx1"/>
+                </a:solidFill>
+                <a:effectLst/>
+                <a:latin typeface="Calibri"/>
+                <a:ea typeface="ＭＳ Ｐゴシック" charset="-128"/>
+                <a:cs typeface="Calibri"/>
+              </a:rPr>
+              <a:t>in-situ</a:t>
+            </a:r>
+            <a:r>
+              <a:rPr lang="en-US" sz="2400" dirty="0" smtClean="0">
+                <a:solidFill>
+                  <a:schemeClr val="tx1"/>
+                </a:solidFill>
+                <a:effectLst/>
+                <a:latin typeface="Calibri"/>
+                <a:ea typeface="ＭＳ Ｐゴシック" charset="-128"/>
+                <a:cs typeface="Calibri"/>
+              </a:rPr>
+              <a:t> and </a:t>
+            </a:r>
+            <a:r>
+              <a:rPr lang="en-US" sz="2400" i="1" dirty="0" smtClean="0">
+                <a:solidFill>
+                  <a:schemeClr val="tx1"/>
+                </a:solidFill>
+                <a:effectLst/>
+                <a:latin typeface="Calibri"/>
+                <a:ea typeface="ＭＳ Ｐゴシック" charset="-128"/>
+                <a:cs typeface="Calibri"/>
+              </a:rPr>
+              <a:t>in-transit</a:t>
+            </a:r>
+            <a:r>
+              <a:rPr lang="en-US" sz="2400" dirty="0" smtClean="0">
+                <a:solidFill>
+                  <a:schemeClr val="tx1"/>
+                </a:solidFill>
+                <a:effectLst/>
+                <a:latin typeface="Calibri"/>
+                <a:ea typeface="ＭＳ Ｐゴシック" charset="-128"/>
+                <a:cs typeface="Calibri"/>
+              </a:rPr>
+              <a:t> analysis capabilities on a problem provided by a Sandia analyst.</a:t>
+            </a:r>
+            <a:endParaRPr lang="en-US" dirty="0" smtClean="0">
+              <a:effectLst/>
+            </a:endParaRPr>
+          </a:p>
+          <a:p>
+            <a:pPr rtl="0" eaLnBrk="1" fontAlgn="base" hangingPunct="1"/>
+            <a:r>
+              <a:rPr lang="en-US" sz="2400" dirty="0" smtClean="0">
+                <a:solidFill>
+                  <a:schemeClr val="tx1"/>
+                </a:solidFill>
+                <a:effectLst/>
+                <a:latin typeface="Calibri"/>
+                <a:ea typeface="ＭＳ Ｐゴシック" charset="-128"/>
+                <a:cs typeface="Calibri"/>
+              </a:rPr>
+              <a:t>The results of these experiments have been detailed in a SAND report, which is published as an unclassified unlimited release document, available to the entire mod/</a:t>
+            </a:r>
+            <a:r>
+              <a:rPr lang="en-US" sz="2400" dirty="0" err="1" smtClean="0">
+                <a:solidFill>
+                  <a:schemeClr val="tx1"/>
+                </a:solidFill>
+                <a:effectLst/>
+                <a:latin typeface="Calibri"/>
+                <a:ea typeface="ＭＳ Ｐゴシック" charset="-128"/>
+                <a:cs typeface="Calibri"/>
+              </a:rPr>
+              <a:t>sim</a:t>
+            </a:r>
+            <a:r>
+              <a:rPr lang="en-US" sz="2400" dirty="0" smtClean="0">
+                <a:solidFill>
+                  <a:schemeClr val="tx1"/>
+                </a:solidFill>
+                <a:effectLst/>
+                <a:latin typeface="Calibri"/>
+                <a:ea typeface="ＭＳ Ｐゴシック" charset="-128"/>
+                <a:cs typeface="Calibri"/>
+              </a:rPr>
+              <a:t> community</a:t>
+            </a:r>
+            <a:endParaRPr lang="en-US" dirty="0" smtClean="0">
+              <a:effectLst/>
+            </a:endParaRPr>
+          </a:p>
+        </p:txBody>
+      </p:sp>
+      <p:sp>
+        <p:nvSpPr>
+          <p:cNvPr id="4" name="Slide Number Placeholder 3"/>
+          <p:cNvSpPr>
+            <a:spLocks noGrp="1"/>
+          </p:cNvSpPr>
+          <p:nvPr>
+            <p:ph type="sldNum" sz="quarter" idx="12"/>
+          </p:nvPr>
+        </p:nvSpPr>
+        <p:spPr/>
+        <p:txBody>
+          <a:bodyPr/>
+          <a:lstStyle/>
+          <a:p>
+            <a:fld id="{A5E55A7B-7854-E145-92D9-B491DF4BAE2D}" type="slidenum">
+              <a:rPr lang="en-US" smtClean="0"/>
+              <a:pPr/>
+              <a:t>44</a:t>
             </a:fld>
             <a:endParaRPr lang="en-US"/>
           </a:p>

</xml_diff>

<commit_message>
Make use of in situ and in transit words consistent.
In all cases they are not hyphenated and italicized.
</commit_message>
<xml_diff>
--- a/Summary/SummarySlides.pptx
+++ b/Summary/SummarySlides.pptx
@@ -10294,23 +10294,7 @@
             </a:r>
             <a:r>
               <a:rPr lang="en-US" dirty="0" smtClean="0"/>
-              <a:t> files from CTH, </a:t>
-            </a:r>
-            <a:r>
-              <a:rPr lang="en-US" smtClean="0"/>
-              <a:t>then post </a:t>
-            </a:r>
-            <a:r>
-              <a:rPr lang="en-US" dirty="0" smtClean="0"/>
-              <a:t>process analysis by reading back in and batch processing in </a:t>
-            </a:r>
-            <a:r>
-              <a:rPr lang="en-US" dirty="0" err="1" smtClean="0"/>
-              <a:t>ParaView</a:t>
-            </a:r>
-            <a:r>
-              <a:rPr lang="en-US" dirty="0" smtClean="0"/>
-              <a:t>.</a:t>
+              <a:t> files from CTH, then post process analysis by reading back in and batch processing in ParaView.</a:t>
             </a:r>
             <a:endParaRPr lang="en-US" b="1" dirty="0"/>
           </a:p>
@@ -38035,16 +38019,24 @@
               <a:t>of analysis operations performed by the </a:t>
             </a:r>
             <a:r>
-              <a:rPr lang="en-US" dirty="0" smtClean="0"/>
-              <a:t>in-situ </a:t>
+              <a:rPr lang="en-US" i="1" dirty="0" smtClean="0"/>
+              <a:t>in situ </a:t>
             </a:r>
             <a:r>
               <a:rPr lang="en-US" dirty="0"/>
               <a:t>and </a:t>
             </a:r>
             <a:r>
+              <a:rPr lang="en-US" i="1" dirty="0" smtClean="0"/>
+              <a:t>in transit</a:t>
+            </a:r>
+            <a:r>
               <a:rPr lang="en-US" dirty="0" smtClean="0"/>
-              <a:t>in-transit applications</a:t>
+              <a:t> </a:t>
+            </a:r>
+            <a:r>
+              <a:rPr lang="en-US" dirty="0" smtClean="0"/>
+              <a:t>applications</a:t>
             </a:r>
           </a:p>
           <a:p>
@@ -39267,7 +39259,7 @@
                 <a:ea typeface="ＭＳ Ｐゴシック" charset="-128"/>
                 <a:cs typeface="Calibri"/>
               </a:rPr>
-              <a:t>in-situ</a:t>
+              <a:t>in situ</a:t>
             </a:r>
             <a:r>
               <a:rPr lang="en-US" sz="2400" dirty="0" smtClean="0">
@@ -39279,10 +39271,10 @@
                 <a:ea typeface="ＭＳ Ｐゴシック" charset="-128"/>
                 <a:cs typeface="Calibri"/>
               </a:rPr>
-              <a:t> and </a:t>
-            </a:r>
-            <a:r>
-              <a:rPr lang="en-US" sz="2400" i="1" dirty="0" smtClean="0">
+              <a:t> </a:t>
+            </a:r>
+            <a:r>
+              <a:rPr lang="en-US" sz="2400" dirty="0" smtClean="0">
                 <a:solidFill>
                   <a:schemeClr val="tx1"/>
                 </a:solidFill>
@@ -39291,10 +39283,10 @@
                 <a:ea typeface="ＭＳ Ｐゴシック" charset="-128"/>
                 <a:cs typeface="Calibri"/>
               </a:rPr>
-              <a:t>in-transit</a:t>
-            </a:r>
-            <a:r>
-              <a:rPr lang="en-US" sz="2400" dirty="0" smtClean="0">
+              <a:t>and </a:t>
+            </a:r>
+            <a:r>
+              <a:rPr lang="en-US" sz="2400" i="1" dirty="0" smtClean="0">
                 <a:solidFill>
                   <a:schemeClr val="tx1"/>
                 </a:solidFill>
@@ -39303,7 +39295,31 @@
                 <a:ea typeface="ＭＳ Ｐゴシック" charset="-128"/>
                 <a:cs typeface="Calibri"/>
               </a:rPr>
-              <a:t> analysis capabilities on a problem provided by a Sandia analyst.</a:t>
+              <a:t>in transit</a:t>
+            </a:r>
+            <a:r>
+              <a:rPr lang="en-US" sz="2400" dirty="0" smtClean="0">
+                <a:solidFill>
+                  <a:schemeClr val="tx1"/>
+                </a:solidFill>
+                <a:effectLst/>
+                <a:latin typeface="Calibri"/>
+                <a:ea typeface="ＭＳ Ｐゴシック" charset="-128"/>
+                <a:cs typeface="Calibri"/>
+              </a:rPr>
+              <a:t> </a:t>
+            </a:r>
+            <a:r>
+              <a:rPr lang="en-US" sz="2400" dirty="0" smtClean="0">
+                <a:solidFill>
+                  <a:schemeClr val="tx1"/>
+                </a:solidFill>
+                <a:effectLst/>
+                <a:latin typeface="Calibri"/>
+                <a:ea typeface="ＭＳ Ｐゴシック" charset="-128"/>
+                <a:cs typeface="Calibri"/>
+              </a:rPr>
+              <a:t>analysis capabilities on a problem provided by a Sandia analyst.</a:t>
             </a:r>
             <a:endParaRPr lang="en-US" dirty="0" smtClean="0">
               <a:effectLst/>
@@ -40894,7 +40910,19 @@
             </a:r>
             <a:r>
               <a:rPr lang="en-US" dirty="0" smtClean="0"/>
-              <a:t>passed. Not done for in-transit experiments.</a:t>
+              <a:t>passed. Not done for </a:t>
+            </a:r>
+            <a:r>
+              <a:rPr lang="en-US" i="1" dirty="0" smtClean="0"/>
+              <a:t>in transit</a:t>
+            </a:r>
+            <a:r>
+              <a:rPr lang="en-US" dirty="0" smtClean="0"/>
+              <a:t> </a:t>
+            </a:r>
+            <a:r>
+              <a:rPr lang="en-US" dirty="0" smtClean="0"/>
+              <a:t>experiments.</a:t>
             </a:r>
             <a:endParaRPr lang="en-US" dirty="0"/>
           </a:p>
@@ -42520,8 +42548,12 @@
           <a:p>
             <a:pPr algn="just"/>
             <a:r>
+              <a:rPr lang="en-US" i="1" dirty="0" smtClean="0"/>
+              <a:t>In transit</a:t>
+            </a:r>
+            <a:r>
               <a:rPr lang="en-US" dirty="0" smtClean="0"/>
-              <a:t>In transit will “win” when </a:t>
+              <a:t> will “win” when </a:t>
             </a:r>
             <a:r>
               <a:rPr lang="en-US" dirty="0" err="1" smtClean="0"/>
@@ -42539,12 +42571,16 @@
           <a:p>
             <a:pPr algn="just"/>
             <a:r>
-              <a:rPr lang="en-US" dirty="0" smtClean="0"/>
+              <a:rPr lang="en-US" i="1" dirty="0" smtClean="0"/>
               <a:t>In </a:t>
             </a:r>
             <a:r>
+              <a:rPr lang="en-US" i="1" dirty="0"/>
+              <a:t>transit</a:t>
+            </a:r>
+            <a:r>
               <a:rPr lang="en-US" dirty="0"/>
-              <a:t>transit can flatten the runtime as long as extra simulation time consumes only wait time.</a:t>
+              <a:t> can flatten the runtime as long as extra simulation time consumes only wait time.</a:t>
             </a:r>
           </a:p>
           <a:p>
@@ -43187,7 +43223,15 @@
             </a:r>
             <a:r>
               <a:rPr lang="en-US" dirty="0" smtClean="0"/>
-              <a:t>, an open source in-situ analysis capability, and </a:t>
+              <a:t>, an open source </a:t>
+            </a:r>
+            <a:r>
+              <a:rPr lang="en-US" i="1" dirty="0" smtClean="0"/>
+              <a:t>in situ </a:t>
+            </a:r>
+            <a:r>
+              <a:rPr lang="en-US" dirty="0" smtClean="0"/>
+              <a:t>analysis capability, and </a:t>
             </a:r>
             <a:r>
               <a:rPr lang="en-US" i="1" dirty="0" err="1" smtClean="0"/>
@@ -43647,8 +43691,20 @@
           <a:p>
             <a:pPr algn="just"/>
             <a:r>
+              <a:rPr lang="en-US" i="1" dirty="0"/>
+              <a:t>I</a:t>
+            </a:r>
+            <a:r>
+              <a:rPr lang="en-US" i="1" dirty="0" smtClean="0"/>
+              <a:t>n transit</a:t>
+            </a:r>
+            <a:r>
               <a:rPr lang="en-US" dirty="0" smtClean="0"/>
-              <a:t>In-transit transfer times have noticeable variance.</a:t>
+              <a:t> </a:t>
+            </a:r>
+            <a:r>
+              <a:rPr lang="en-US" dirty="0" smtClean="0"/>
+              <a:t>transfer times have noticeable variance.</a:t>
             </a:r>
           </a:p>
           <a:p>
@@ -45410,8 +45466,12 @@
           <a:p>
             <a:pPr algn="just"/>
             <a:r>
+              <a:rPr lang="en-US" i="1" dirty="0" smtClean="0"/>
+              <a:t>In transit</a:t>
+            </a:r>
+            <a:r>
               <a:rPr lang="en-US" dirty="0" smtClean="0"/>
-              <a:t>In transit generally has less memory overhead, but requires extra nodes allocated</a:t>
+              <a:t> generally has less memory overhead, but requires extra nodes allocated</a:t>
             </a:r>
             <a:endParaRPr lang="en-US" dirty="0"/>
           </a:p>
@@ -45591,7 +45651,15 @@
             </a:r>
             <a:r>
               <a:rPr lang="en-US" sz="1800" b="1" dirty="0"/>
-              <a:t>can provide a performance improvement over in situ in some </a:t>
+              <a:t>can provide a performance improvement over </a:t>
+            </a:r>
+            <a:r>
+              <a:rPr lang="en-US" sz="1800" b="1" i="1" dirty="0"/>
+              <a:t>in situ</a:t>
+            </a:r>
+            <a:r>
+              <a:rPr lang="en-US" sz="1800" b="1" dirty="0"/>
+              <a:t> in some </a:t>
             </a:r>
             <a:r>
               <a:rPr lang="en-US" sz="1800" b="1" dirty="0" smtClean="0"/>
@@ -45625,8 +45693,52 @@
               <a:buNone/>
             </a:pPr>
             <a:r>
+              <a:rPr lang="en-US" sz="1800" i="1" dirty="0" smtClean="0"/>
+              <a:t>In transit</a:t>
+            </a:r>
+            <a:r>
               <a:rPr lang="en-US" sz="1800" dirty="0" smtClean="0"/>
-              <a:t>In transit analysis has an added overhead above embedded in situ analysis involving transferring data between parallel jobs. Given an analysis with perfect linear scalability, we suspect in transit workflows will always have an added cost, and our results support this. With an analysis that does not scale perfectly, possibly due to communication overhead, it is theoretically possible for in transit to be faster by reducing the size of the analysis job. This is one of the motivations for choosing an analysis task that requires significant communication. In our results, we do find instances where in transit is faster, but by a smaller margin and for fewer configurations than we initially anticipated. So although in transit has several other positive features, we do not anticipate performance to be the main motivations for using it.</a:t>
+              <a:t> analysis has an added overhead above embedded </a:t>
+            </a:r>
+            <a:r>
+              <a:rPr lang="en-US" sz="1800" i="1" dirty="0" smtClean="0"/>
+              <a:t>in situ</a:t>
+            </a:r>
+            <a:r>
+              <a:rPr lang="en-US" sz="1800" dirty="0" smtClean="0"/>
+              <a:t> analysis involving transferring data between parallel jobs. Given an analysis with perfect linear scalability, we suspect </a:t>
+            </a:r>
+            <a:r>
+              <a:rPr lang="en-US" sz="1800" i="1" dirty="0" smtClean="0"/>
+              <a:t>in transit</a:t>
+            </a:r>
+            <a:r>
+              <a:rPr lang="en-US" sz="1800" dirty="0" smtClean="0"/>
+              <a:t> workflows will always have an added cost, and our results support this. With an analysis that does not scale perfectly, possibly due to communication overhead, it is theoretically possible for </a:t>
+            </a:r>
+            <a:r>
+              <a:rPr lang="en-US" sz="1800" i="1" dirty="0" smtClean="0"/>
+              <a:t>in transit</a:t>
+            </a:r>
+            <a:r>
+              <a:rPr lang="en-US" sz="1800" dirty="0" smtClean="0"/>
+              <a:t> to be faster by reducing the size of the analysis job. This is one of the motivations for choosing an analysis task that requires significant communication. In our results, we do find instances where </a:t>
+            </a:r>
+            <a:r>
+              <a:rPr lang="en-US" sz="1800" i="1" dirty="0" smtClean="0"/>
+              <a:t>in transit</a:t>
+            </a:r>
+            <a:r>
+              <a:rPr lang="en-US" sz="1800" dirty="0" smtClean="0"/>
+              <a:t> is faster, but by a smaller margin and for fewer configurations than we initially anticipated. So although </a:t>
+            </a:r>
+            <a:r>
+              <a:rPr lang="en-US" sz="1800" i="1" dirty="0" smtClean="0"/>
+              <a:t>in transit</a:t>
+            </a:r>
+            <a:r>
+              <a:rPr lang="en-US" sz="1800" dirty="0" smtClean="0"/>
+              <a:t> has several other positive features, we do not anticipate performance to be the main motivations for using it.</a:t>
             </a:r>
           </a:p>
         </p:txBody>
@@ -46069,7 +46181,23 @@
             </a:r>
             <a:r>
               <a:rPr lang="en-US" sz="1800" dirty="0"/>
-              <a:t>baseline amount of memory added to the CTH job to perform in situ processing is roughly 100MB per core. Considering that our embedded in situ library is a fully featured visualization toolkit </a:t>
+              <a:t>baseline amount of memory added to the CTH job to perform </a:t>
+            </a:r>
+            <a:r>
+              <a:rPr lang="en-US" sz="1800" i="1" dirty="0"/>
+              <a:t>in situ</a:t>
+            </a:r>
+            <a:r>
+              <a:rPr lang="en-US" sz="1800" dirty="0"/>
+              <a:t> processing is roughly 100MB per core. Considering that our embedded </a:t>
+            </a:r>
+            <a:r>
+              <a:rPr lang="en-US" sz="1800" i="1" dirty="0"/>
+              <a:t>in situ</a:t>
+            </a:r>
+            <a:r>
+              <a:rPr lang="en-US" sz="1800" dirty="0"/>
+              <a:t> library is a fully featured visualization toolkit </a:t>
             </a:r>
             <a:r>
               <a:rPr lang="en-US" sz="1800" dirty="0" smtClean="0"/>
@@ -46429,7 +46557,15 @@
             </a:r>
             <a:r>
               <a:rPr lang="en-US" sz="1800" dirty="0"/>
-              <a:t>of the more complicated parts of running an in transit workflow is scheduling the simulation job and service job to run in tandem. Frankly, the capabilities of the scheduler are inadequate for our needs. We cannot start and stop jobs independently and make reconnections dynamically. Another experiment we would like to do but is challenging to schedule is to allow simulation and service to share nodes. Since each node has 16 cores, perhaps we could get better transfer performance by allocating one core per node for service and the rest for simulation. A similar scheduling scheme will be important to take advantage of burst buffers in future architectures.</a:t>
+              <a:t>of the more complicated parts of running an </a:t>
+            </a:r>
+            <a:r>
+              <a:rPr lang="en-US" sz="1800" i="1" dirty="0"/>
+              <a:t>in transit</a:t>
+            </a:r>
+            <a:r>
+              <a:rPr lang="en-US" sz="1800" dirty="0"/>
+              <a:t> workflow is scheduling the simulation job and service job to run in tandem. Frankly, the capabilities of the scheduler are inadequate for our needs. We cannot start and stop jobs independently and make reconnections dynamically. Another experiment we would like to do but is challenging to schedule is to allow simulation and service to share nodes. Since each node has 16 cores, perhaps we could get better transfer performance by allocating one core per node for service and the rest for simulation. A similar scheduling scheme will be important to take advantage of burst buffers in future architectures.</a:t>
             </a:r>
             <a:endParaRPr lang="en-US" sz="1800" dirty="0" smtClean="0"/>
           </a:p>
@@ -46540,8 +46676,8 @@
               <a:t>Algorithm comparison.  Three similar algorithms with three different scaling </a:t>
             </a:r>
             <a:r>
-              <a:rPr lang="en-US" dirty="0" err="1" smtClean="0"/>
-              <a:t>bahaviors</a:t>
+              <a:rPr lang="en-US" dirty="0" smtClean="0"/>
+              <a:t>behaviors</a:t>
             </a:r>
             <a:endParaRPr lang="en-US" dirty="0" smtClean="0"/>
           </a:p>
@@ -46573,7 +46709,19 @@
           <a:p>
             <a:r>
               <a:rPr lang="en-US" dirty="0" smtClean="0"/>
-              <a:t>No-wait analysis (in-transit)</a:t>
+              <a:t>No-wait analysis </a:t>
+            </a:r>
+            <a:r>
+              <a:rPr lang="en-US" dirty="0" smtClean="0"/>
+              <a:t>(</a:t>
+            </a:r>
+            <a:r>
+              <a:rPr lang="en-US" i="1" dirty="0" smtClean="0"/>
+              <a:t>in transit</a:t>
+            </a:r>
+            <a:r>
+              <a:rPr lang="en-US" dirty="0" smtClean="0"/>
+              <a:t>)</a:t>
             </a:r>
             <a:endParaRPr lang="en-US" dirty="0"/>
           </a:p>
@@ -46587,7 +46735,11 @@
           <a:p>
             <a:r>
               <a:rPr lang="en-US" dirty="0" smtClean="0"/>
-              <a:t>Investigate initialization cost of in-situ </a:t>
+              <a:t>Investigate initialization cost of </a:t>
+            </a:r>
+            <a:r>
+              <a:rPr lang="en-US" i="1" dirty="0" smtClean="0"/>
+              <a:t>in situ </a:t>
             </a:r>
             <a:r>
               <a:rPr lang="en-US" dirty="0" err="1" smtClean="0"/>
@@ -46598,8 +46750,21 @@
           <a:p>
             <a:r>
               <a:rPr lang="en-US" dirty="0" smtClean="0"/>
-              <a:t>Zero copy transfers (in-transit)</a:t>
-            </a:r>
+              <a:t>Zero copy transfers </a:t>
+            </a:r>
+            <a:r>
+              <a:rPr lang="en-US" dirty="0" smtClean="0"/>
+              <a:t>(</a:t>
+            </a:r>
+            <a:r>
+              <a:rPr lang="en-US" i="1" dirty="0" smtClean="0"/>
+              <a:t>in transit</a:t>
+            </a:r>
+            <a:r>
+              <a:rPr lang="en-US" dirty="0" smtClean="0"/>
+              <a:t>)</a:t>
+            </a:r>
+            <a:endParaRPr lang="en-US" dirty="0" smtClean="0"/>
           </a:p>
           <a:p>
             <a:r>
@@ -46794,7 +46959,7 @@
                 <a:ea typeface="ＭＳ Ｐゴシック" charset="-128"/>
                 <a:cs typeface="Calibri"/>
               </a:rPr>
-              <a:t>in-situ</a:t>
+              <a:t>in situ</a:t>
             </a:r>
             <a:r>
               <a:rPr lang="en-US" sz="2400" dirty="0" smtClean="0">
@@ -46806,10 +46971,10 @@
                 <a:ea typeface="ＭＳ Ｐゴシック" charset="-128"/>
                 <a:cs typeface="Calibri"/>
               </a:rPr>
-              <a:t> and </a:t>
-            </a:r>
-            <a:r>
-              <a:rPr lang="en-US" sz="2400" i="1" dirty="0" smtClean="0">
+              <a:t> </a:t>
+            </a:r>
+            <a:r>
+              <a:rPr lang="en-US" sz="2400" dirty="0" smtClean="0">
                 <a:solidFill>
                   <a:schemeClr val="tx1"/>
                 </a:solidFill>
@@ -46818,10 +46983,10 @@
                 <a:ea typeface="ＭＳ Ｐゴシック" charset="-128"/>
                 <a:cs typeface="Calibri"/>
               </a:rPr>
-              <a:t>in-transit</a:t>
-            </a:r>
-            <a:r>
-              <a:rPr lang="en-US" sz="2400" dirty="0" smtClean="0">
+              <a:t>and </a:t>
+            </a:r>
+            <a:r>
+              <a:rPr lang="en-US" sz="2400" i="1" dirty="0" smtClean="0">
                 <a:solidFill>
                   <a:schemeClr val="tx1"/>
                 </a:solidFill>
@@ -46830,7 +46995,31 @@
                 <a:ea typeface="ＭＳ Ｐゴシック" charset="-128"/>
                 <a:cs typeface="Calibri"/>
               </a:rPr>
-              <a:t> analysis capabilities on a problem provided by a Sandia analyst.</a:t>
+              <a:t>in transit</a:t>
+            </a:r>
+            <a:r>
+              <a:rPr lang="en-US" sz="2400" dirty="0" smtClean="0">
+                <a:solidFill>
+                  <a:schemeClr val="tx1"/>
+                </a:solidFill>
+                <a:effectLst/>
+                <a:latin typeface="Calibri"/>
+                <a:ea typeface="ＭＳ Ｐゴシック" charset="-128"/>
+                <a:cs typeface="Calibri"/>
+              </a:rPr>
+              <a:t> </a:t>
+            </a:r>
+            <a:r>
+              <a:rPr lang="en-US" sz="2400" dirty="0" smtClean="0">
+                <a:solidFill>
+                  <a:schemeClr val="tx1"/>
+                </a:solidFill>
+                <a:effectLst/>
+                <a:latin typeface="Calibri"/>
+                <a:ea typeface="ＭＳ Ｐゴシック" charset="-128"/>
+                <a:cs typeface="Calibri"/>
+              </a:rPr>
+              <a:t>analysis capabilities on a problem provided by a Sandia analyst.</a:t>
             </a:r>
             <a:endParaRPr lang="en-US" dirty="0" smtClean="0">
               <a:effectLst/>
@@ -47084,8 +47273,24 @@
           <a:lstStyle/>
           <a:p>
             <a:r>
+              <a:rPr lang="en-US" i="1" dirty="0" smtClean="0"/>
+              <a:t>In situ </a:t>
+            </a:r>
+            <a:r>
               <a:rPr lang="en-US" dirty="0" smtClean="0"/>
-              <a:t>In-situ and In-transit workflows</a:t>
+              <a:t>and </a:t>
+            </a:r>
+            <a:r>
+              <a:rPr lang="en-US" i="1" dirty="0" smtClean="0"/>
+              <a:t>in transit</a:t>
+            </a:r>
+            <a:r>
+              <a:rPr lang="en-US" dirty="0" smtClean="0"/>
+              <a:t> </a:t>
+            </a:r>
+            <a:r>
+              <a:rPr lang="en-US" dirty="0" smtClean="0"/>
+              <a:t>workflows</a:t>
             </a:r>
             <a:endParaRPr lang="en-US" dirty="0"/>
           </a:p>
@@ -47112,8 +47317,20 @@
           <a:lstStyle/>
           <a:p>
             <a:r>
+              <a:rPr lang="en-US" sz="2000" i="1" dirty="0" smtClean="0"/>
+              <a:t>In situ </a:t>
+            </a:r>
+            <a:r>
               <a:rPr lang="en-US" sz="2000" dirty="0"/>
-              <a:t>In-situ processing provides ``tightly-coupled'' analysis capabilities through libraries linked directly with the simulation.  SNL has collaborated on developing an in-situ capability designed for this purpose</a:t>
+              <a:t>processing provides ``tightly-coupled'' analysis capabilities through libraries linked directly with the simulation.  SNL has collaborated on developing an </a:t>
+            </a:r>
+            <a:r>
+              <a:rPr lang="en-US" sz="2000" i="1" dirty="0" smtClean="0"/>
+              <a:t>in situ </a:t>
+            </a:r>
+            <a:r>
+              <a:rPr lang="en-US" sz="2000" dirty="0"/>
+              <a:t>capability designed for this purpose</a:t>
             </a:r>
             <a:r>
               <a:rPr lang="en-US" sz="2000" dirty="0" smtClean="0"/>
@@ -47131,8 +47348,20 @@
           </a:p>
           <a:p>
             <a:r>
+              <a:rPr lang="en-US" sz="2000" i="1" dirty="0"/>
+              <a:t>I</a:t>
+            </a:r>
+            <a:r>
+              <a:rPr lang="en-US" sz="2000" i="1" dirty="0" smtClean="0"/>
+              <a:t>n transit</a:t>
+            </a:r>
+            <a:r>
+              <a:rPr lang="en-US" sz="2000" dirty="0" smtClean="0"/>
+              <a:t> </a:t>
+            </a:r>
+            <a:r>
               <a:rPr lang="en-US" sz="2000" dirty="0"/>
-              <a:t>In-transit processing provides ``loosely-coupled'' analysis capabilities by performing the analysis on separate processing resources.  SNL provides this capability through a ``data services'' capability designed for this purpose.</a:t>
+              <a:t>processing provides ``loosely-coupled'' analysis capabilities by performing the analysis on separate processing resources.  SNL provides this capability through a ``data services'' capability designed for this purpose.</a:t>
             </a:r>
           </a:p>
           <a:p>
@@ -47248,7 +47477,15 @@
           <a:p>
             <a:r>
               <a:rPr lang="en-US" sz="1200" dirty="0" smtClean="0"/>
-              <a:t>Diagram of in-situ workflow, accomplished in this Milestone through the use of </a:t>
+              <a:t>Diagram of </a:t>
+            </a:r>
+            <a:r>
+              <a:rPr lang="en-US" sz="1200" i="1" dirty="0" smtClean="0"/>
+              <a:t>in situ </a:t>
+            </a:r>
+            <a:r>
+              <a:rPr lang="en-US" sz="1200" dirty="0" smtClean="0"/>
+              <a:t>workflow, accomplished in this Milestone through the use of </a:t>
             </a:r>
             <a:r>
               <a:rPr lang="en-US" sz="1200" i="1" dirty="0" smtClean="0"/>
@@ -47286,7 +47523,19 @@
           <a:p>
             <a:r>
               <a:rPr lang="en-US" sz="1200" dirty="0" smtClean="0"/>
-              <a:t>Diagram of in-transit workflow, in which the science code communicates with data services nodes to perform analysis operations.  This is accomplished in this Milestone through the use of </a:t>
+              <a:t>Diagram of </a:t>
+            </a:r>
+            <a:r>
+              <a:rPr lang="en-US" sz="1200" i="1" dirty="0" smtClean="0"/>
+              <a:t>in transit</a:t>
+            </a:r>
+            <a:r>
+              <a:rPr lang="en-US" sz="1200" dirty="0" smtClean="0"/>
+              <a:t> </a:t>
+            </a:r>
+            <a:r>
+              <a:rPr lang="en-US" sz="1200" dirty="0" smtClean="0"/>
+              <a:t>workflow, in which the science code communicates with data services nodes to perform analysis operations.  This is accomplished in this Milestone through the use of </a:t>
             </a:r>
             <a:r>
               <a:rPr lang="en-US" sz="1200" i="1" dirty="0" err="1" smtClean="0"/>

</xml_diff>

<commit_message>
Delete repeated slide in wrong place.
</commit_message>
<xml_diff>
--- a/Summary/SummarySlides.pptx
+++ b/Summary/SummarySlides.pptx
@@ -5,10 +5,10 @@
     <p:sldMasterId id="2147483783" r:id="rId1"/>
   </p:sldMasterIdLst>
   <p:notesMasterIdLst>
-    <p:notesMasterId r:id="rId46"/>
+    <p:notesMasterId r:id="rId45"/>
   </p:notesMasterIdLst>
   <p:handoutMasterIdLst>
-    <p:handoutMasterId r:id="rId47"/>
+    <p:handoutMasterId r:id="rId46"/>
   </p:handoutMasterIdLst>
   <p:sldIdLst>
     <p:sldId id="273" r:id="rId2"/>
@@ -21,40 +21,39 @@
     <p:sldId id="276" r:id="rId9"/>
     <p:sldId id="298" r:id="rId10"/>
     <p:sldId id="258" r:id="rId11"/>
-    <p:sldId id="307" r:id="rId12"/>
-    <p:sldId id="290" r:id="rId13"/>
-    <p:sldId id="256" r:id="rId14"/>
-    <p:sldId id="299" r:id="rId15"/>
-    <p:sldId id="300" r:id="rId16"/>
-    <p:sldId id="306" r:id="rId17"/>
-    <p:sldId id="301" r:id="rId18"/>
-    <p:sldId id="257" r:id="rId19"/>
-    <p:sldId id="297" r:id="rId20"/>
-    <p:sldId id="304" r:id="rId21"/>
-    <p:sldId id="305" r:id="rId22"/>
-    <p:sldId id="303" r:id="rId23"/>
-    <p:sldId id="262" r:id="rId24"/>
-    <p:sldId id="263" r:id="rId25"/>
-    <p:sldId id="308" r:id="rId26"/>
-    <p:sldId id="309" r:id="rId27"/>
-    <p:sldId id="264" r:id="rId28"/>
-    <p:sldId id="265" r:id="rId29"/>
-    <p:sldId id="312" r:id="rId30"/>
-    <p:sldId id="266" r:id="rId31"/>
-    <p:sldId id="267" r:id="rId32"/>
-    <p:sldId id="268" r:id="rId33"/>
-    <p:sldId id="313" r:id="rId34"/>
-    <p:sldId id="270" r:id="rId35"/>
-    <p:sldId id="271" r:id="rId36"/>
-    <p:sldId id="272" r:id="rId37"/>
-    <p:sldId id="302" r:id="rId38"/>
-    <p:sldId id="279" r:id="rId39"/>
-    <p:sldId id="314" r:id="rId40"/>
-    <p:sldId id="280" r:id="rId41"/>
-    <p:sldId id="281" r:id="rId42"/>
-    <p:sldId id="282" r:id="rId43"/>
-    <p:sldId id="284" r:id="rId44"/>
-    <p:sldId id="311" r:id="rId45"/>
+    <p:sldId id="290" r:id="rId12"/>
+    <p:sldId id="256" r:id="rId13"/>
+    <p:sldId id="299" r:id="rId14"/>
+    <p:sldId id="300" r:id="rId15"/>
+    <p:sldId id="306" r:id="rId16"/>
+    <p:sldId id="301" r:id="rId17"/>
+    <p:sldId id="257" r:id="rId18"/>
+    <p:sldId id="297" r:id="rId19"/>
+    <p:sldId id="304" r:id="rId20"/>
+    <p:sldId id="305" r:id="rId21"/>
+    <p:sldId id="303" r:id="rId22"/>
+    <p:sldId id="262" r:id="rId23"/>
+    <p:sldId id="263" r:id="rId24"/>
+    <p:sldId id="308" r:id="rId25"/>
+    <p:sldId id="309" r:id="rId26"/>
+    <p:sldId id="264" r:id="rId27"/>
+    <p:sldId id="265" r:id="rId28"/>
+    <p:sldId id="312" r:id="rId29"/>
+    <p:sldId id="266" r:id="rId30"/>
+    <p:sldId id="267" r:id="rId31"/>
+    <p:sldId id="268" r:id="rId32"/>
+    <p:sldId id="313" r:id="rId33"/>
+    <p:sldId id="270" r:id="rId34"/>
+    <p:sldId id="271" r:id="rId35"/>
+    <p:sldId id="272" r:id="rId36"/>
+    <p:sldId id="302" r:id="rId37"/>
+    <p:sldId id="279" r:id="rId38"/>
+    <p:sldId id="314" r:id="rId39"/>
+    <p:sldId id="280" r:id="rId40"/>
+    <p:sldId id="281" r:id="rId41"/>
+    <p:sldId id="282" r:id="rId42"/>
+    <p:sldId id="284" r:id="rId43"/>
+    <p:sldId id="311" r:id="rId44"/>
   </p:sldIdLst>
   <p:sldSz cx="9144000" cy="6858000" type="screen4x3"/>
   <p:notesSz cx="6858000" cy="9144000"/>
@@ -10346,241 +10345,6 @@
       </p:grpSpPr>
       <p:sp>
         <p:nvSpPr>
-          <p:cNvPr id="2" name="Title 1"/>
-          <p:cNvSpPr>
-            <a:spLocks noGrp="1"/>
-          </p:cNvSpPr>
-          <p:nvPr>
-            <p:ph type="title"/>
-          </p:nvPr>
-        </p:nvSpPr>
-        <p:spPr/>
-        <p:txBody>
-          <a:bodyPr/>
-          <a:lstStyle/>
-          <a:p>
-            <a:r>
-              <a:rPr lang="en-US" dirty="0" smtClean="0"/>
-              <a:t>Experiment, cont’d</a:t>
-            </a:r>
-            <a:endParaRPr lang="en-US" dirty="0"/>
-          </a:p>
-        </p:txBody>
-      </p:sp>
-      <p:sp>
-        <p:nvSpPr>
-          <p:cNvPr id="3" name="Content Placeholder 2"/>
-          <p:cNvSpPr>
-            <a:spLocks noGrp="1"/>
-          </p:cNvSpPr>
-          <p:nvPr>
-            <p:ph idx="1"/>
-          </p:nvPr>
-        </p:nvSpPr>
-        <p:spPr>
-          <a:xfrm>
-            <a:off x="457200" y="991675"/>
-            <a:ext cx="8229600" cy="5134489"/>
-          </a:xfrm>
-        </p:spPr>
-        <p:txBody>
-          <a:bodyPr/>
-          <a:lstStyle/>
-          <a:p>
-            <a:r>
-              <a:rPr lang="en-US" dirty="0"/>
-              <a:t>For each application, we ran strong scaling experiments for three </a:t>
-            </a:r>
-            <a:r>
-              <a:rPr lang="en-US" dirty="0" smtClean="0"/>
-              <a:t>different datasets</a:t>
-            </a:r>
-            <a:r>
-              <a:rPr lang="en-US" dirty="0"/>
-              <a:t>.  </a:t>
-            </a:r>
-            <a:endParaRPr lang="en-US" dirty="0" smtClean="0"/>
-          </a:p>
-          <a:p>
-            <a:pPr lvl="1"/>
-            <a:r>
-              <a:rPr lang="en-US" dirty="0" smtClean="0"/>
-              <a:t>Each </a:t>
-            </a:r>
-            <a:r>
-              <a:rPr lang="en-US" dirty="0"/>
-              <a:t>data set comes from the same initial conditions but with </a:t>
-            </a:r>
-            <a:r>
-              <a:rPr lang="en-US" dirty="0" smtClean="0"/>
-              <a:t>a different </a:t>
-            </a:r>
-            <a:r>
-              <a:rPr lang="en-US" dirty="0"/>
-              <a:t>maximum level of </a:t>
-            </a:r>
-            <a:r>
-              <a:rPr lang="en-US" dirty="0" smtClean="0"/>
-              <a:t>refinement</a:t>
-            </a:r>
-          </a:p>
-          <a:p>
-            <a:pPr lvl="1"/>
-            <a:r>
-              <a:rPr lang="en-US" dirty="0"/>
-              <a:t>M</a:t>
-            </a:r>
-            <a:r>
-              <a:rPr lang="en-US" dirty="0" smtClean="0"/>
-              <a:t>easurements </a:t>
-            </a:r>
-            <a:r>
-              <a:rPr lang="en-US" dirty="0"/>
-              <a:t>of different </a:t>
-            </a:r>
-            <a:r>
-              <a:rPr lang="en-US" dirty="0" smtClean="0"/>
-              <a:t>job sizes </a:t>
-            </a:r>
-            <a:r>
-              <a:rPr lang="en-US" dirty="0"/>
-              <a:t>with different data set sizes provides a weak scaling overview</a:t>
-            </a:r>
-            <a:r>
-              <a:rPr lang="en-US" dirty="0" smtClean="0"/>
-              <a:t>.</a:t>
-            </a:r>
-            <a:endParaRPr lang="en-US" dirty="0"/>
-          </a:p>
-        </p:txBody>
-      </p:sp>
-      <p:sp>
-        <p:nvSpPr>
-          <p:cNvPr id="4" name="Slide Number Placeholder 3"/>
-          <p:cNvSpPr>
-            <a:spLocks noGrp="1"/>
-          </p:cNvSpPr>
-          <p:nvPr>
-            <p:ph type="sldNum" sz="quarter" idx="12"/>
-          </p:nvPr>
-        </p:nvSpPr>
-        <p:spPr/>
-        <p:txBody>
-          <a:bodyPr/>
-          <a:lstStyle/>
-          <a:p>
-            <a:fld id="{A5E55A7B-7854-E145-92D9-B491DF4BAE2D}" type="slidenum">
-              <a:rPr lang="en-US" smtClean="0"/>
-              <a:pPr/>
-              <a:t>11</a:t>
-            </a:fld>
-            <a:endParaRPr lang="en-US" dirty="0"/>
-          </a:p>
-        </p:txBody>
-      </p:sp>
-      <p:pic>
-        <p:nvPicPr>
-          <p:cNvPr id="5" name="Content Placeholder 6"/>
-          <p:cNvPicPr>
-            <a:picLocks noChangeAspect="1"/>
-          </p:cNvPicPr>
-          <p:nvPr/>
-        </p:nvPicPr>
-        <p:blipFill>
-          <a:blip r:embed="rId2"/>
-          <a:srcRect l="-11191" r="-11191"/>
-          <a:stretch>
-            <a:fillRect/>
-          </a:stretch>
-        </p:blipFill>
-        <p:spPr bwMode="auto">
-          <a:xfrm>
-            <a:off x="2660997" y="3337352"/>
-            <a:ext cx="4190946" cy="2468564"/>
-          </a:xfrm>
-          <a:prstGeom prst="rect">
-            <a:avLst/>
-          </a:prstGeom>
-          <a:noFill/>
-          <a:ln w="9525">
-            <a:noFill/>
-            <a:miter lim="800000"/>
-            <a:headEnd/>
-            <a:tailEnd/>
-          </a:ln>
-        </p:spPr>
-      </p:pic>
-      <p:sp>
-        <p:nvSpPr>
-          <p:cNvPr id="6" name="TextBox 5"/>
-          <p:cNvSpPr txBox="1"/>
-          <p:nvPr/>
-        </p:nvSpPr>
-        <p:spPr>
-          <a:xfrm>
-            <a:off x="2660996" y="5874603"/>
-            <a:ext cx="4190947" cy="830997"/>
-          </a:xfrm>
-          <a:prstGeom prst="rect">
-            <a:avLst/>
-          </a:prstGeom>
-          <a:noFill/>
-        </p:spPr>
-        <p:txBody>
-          <a:bodyPr wrap="square" rtlCol="0">
-            <a:spAutoFit/>
-          </a:bodyPr>
-          <a:lstStyle/>
-          <a:p>
-            <a:r>
-              <a:rPr lang="en-US" sz="1000" dirty="0"/>
-              <a:t>Table shows the range of core sizes used for the various experiments.  For every application we used the maximum 16 cores-per-node for the CTH client, since CTH is primarily bound b computation and scales very well.</a:t>
-            </a:r>
-          </a:p>
-          <a:p>
-            <a:endParaRPr lang="en-US" dirty="0"/>
-          </a:p>
-        </p:txBody>
-      </p:sp>
-    </p:spTree>
-    <p:extLst>
-      <p:ext uri="{BB962C8B-B14F-4D97-AF65-F5344CB8AC3E}">
-        <p14:creationId xmlns:p14="http://schemas.microsoft.com/office/powerpoint/2010/main" val="3817208936"/>
-      </p:ext>
-    </p:extLst>
-  </p:cSld>
-  <p:clrMapOvr>
-    <a:masterClrMapping/>
-  </p:clrMapOvr>
-  <p:timing>
-    <p:tnLst>
-      <p:par>
-        <p:cTn xmlns:p14="http://schemas.microsoft.com/office/powerpoint/2010/main" id="1" dur="indefinite" restart="never" nodeType="tmRoot"/>
-      </p:par>
-    </p:tnLst>
-  </p:timing>
-</p:sld>
-</file>
-
-<file path=ppt/slides/slide12.xml><?xml version="1.0" encoding="utf-8"?>
-<p:sld xmlns:a="http://schemas.openxmlformats.org/drawingml/2006/main" xmlns:r="http://schemas.openxmlformats.org/officeDocument/2006/relationships" xmlns:p="http://schemas.openxmlformats.org/presentationml/2006/main">
-  <p:cSld>
-    <p:spTree>
-      <p:nvGrpSpPr>
-        <p:cNvPr id="1" name=""/>
-        <p:cNvGrpSpPr/>
-        <p:nvPr/>
-      </p:nvGrpSpPr>
-      <p:grpSpPr>
-        <a:xfrm>
-          <a:off x="0" y="0"/>
-          <a:ext cx="0" cy="0"/>
-          <a:chOff x="0" y="0"/>
-          <a:chExt cx="0" cy="0"/>
-        </a:xfrm>
-      </p:grpSpPr>
-      <p:sp>
-        <p:nvSpPr>
           <p:cNvPr id="300" name="Right Arrow 299"/>
           <p:cNvSpPr/>
           <p:nvPr/>
@@ -37721,7 +37485,7 @@
 </p:sld>
 </file>
 
-<file path=ppt/slides/slide13.xml><?xml version="1.0" encoding="utf-8"?>
+<file path=ppt/slides/slide12.xml><?xml version="1.0" encoding="utf-8"?>
 <p:sld xmlns:a="http://schemas.openxmlformats.org/drawingml/2006/main" xmlns:r="http://schemas.openxmlformats.org/officeDocument/2006/relationships" xmlns:p="http://schemas.openxmlformats.org/presentationml/2006/main">
   <p:cSld>
     <p:spTree>
@@ -37848,6 +37612,186 @@
     <p:extLst>
       <p:ext uri="{BB962C8B-B14F-4D97-AF65-F5344CB8AC3E}">
         <p14:creationId xmlns:p14="http://schemas.microsoft.com/office/powerpoint/2010/main" val="3136931298"/>
+      </p:ext>
+    </p:extLst>
+  </p:cSld>
+  <p:clrMapOvr>
+    <a:masterClrMapping/>
+  </p:clrMapOvr>
+  <p:timing>
+    <p:tnLst>
+      <p:par>
+        <p:cTn xmlns:p14="http://schemas.microsoft.com/office/powerpoint/2010/main" id="1" dur="indefinite" restart="never" nodeType="tmRoot"/>
+      </p:par>
+    </p:tnLst>
+  </p:timing>
+</p:sld>
+</file>
+
+<file path=ppt/slides/slide13.xml><?xml version="1.0" encoding="utf-8"?>
+<p:sld xmlns:a="http://schemas.openxmlformats.org/drawingml/2006/main" xmlns:r="http://schemas.openxmlformats.org/officeDocument/2006/relationships" xmlns:p="http://schemas.openxmlformats.org/presentationml/2006/main">
+  <p:cSld>
+    <p:spTree>
+      <p:nvGrpSpPr>
+        <p:cNvPr id="1" name=""/>
+        <p:cNvGrpSpPr/>
+        <p:nvPr/>
+      </p:nvGrpSpPr>
+      <p:grpSpPr>
+        <a:xfrm>
+          <a:off x="0" y="0"/>
+          <a:ext cx="0" cy="0"/>
+          <a:chOff x="0" y="0"/>
+          <a:chExt cx="0" cy="0"/>
+        </a:xfrm>
+      </p:grpSpPr>
+      <p:sp>
+        <p:nvSpPr>
+          <p:cNvPr id="2" name="Title 1"/>
+          <p:cNvSpPr>
+            <a:spLocks noGrp="1"/>
+          </p:cNvSpPr>
+          <p:nvPr>
+            <p:ph type="title"/>
+          </p:nvPr>
+        </p:nvSpPr>
+        <p:spPr/>
+        <p:txBody>
+          <a:bodyPr/>
+          <a:lstStyle/>
+          <a:p>
+            <a:r>
+              <a:rPr lang="en-US" dirty="0" smtClean="0"/>
+              <a:t>Experiment, cont’d</a:t>
+            </a:r>
+            <a:endParaRPr lang="en-US" dirty="0"/>
+          </a:p>
+        </p:txBody>
+      </p:sp>
+      <p:sp>
+        <p:nvSpPr>
+          <p:cNvPr id="3" name="Content Placeholder 2"/>
+          <p:cNvSpPr>
+            <a:spLocks noGrp="1"/>
+          </p:cNvSpPr>
+          <p:nvPr>
+            <p:ph idx="1"/>
+          </p:nvPr>
+        </p:nvSpPr>
+        <p:spPr/>
+        <p:txBody>
+          <a:bodyPr/>
+          <a:lstStyle/>
+          <a:p>
+            <a:r>
+              <a:rPr lang="en-US" dirty="0"/>
+              <a:t>All applications complete 500 cycles (i.e., timestep calculations) of the CTH code. </a:t>
+            </a:r>
+            <a:endParaRPr lang="en-US" dirty="0" smtClean="0"/>
+          </a:p>
+          <a:p>
+            <a:r>
+              <a:rPr lang="en-US" dirty="0" smtClean="0"/>
+              <a:t>The </a:t>
+            </a:r>
+            <a:r>
+              <a:rPr lang="en-US" dirty="0"/>
+              <a:t>first four applications execute an analysis operation once every 10 </a:t>
+            </a:r>
+            <a:r>
+              <a:rPr lang="en-US" dirty="0" smtClean="0"/>
+              <a:t>cycles</a:t>
+            </a:r>
+          </a:p>
+          <a:p>
+            <a:r>
+              <a:rPr lang="en-US" dirty="0" smtClean="0"/>
+              <a:t>Spyplot </a:t>
+            </a:r>
+            <a:r>
+              <a:rPr lang="en-US" dirty="0"/>
+              <a:t>file </a:t>
+            </a:r>
+            <a:r>
+              <a:rPr lang="en-US" dirty="0" smtClean="0"/>
+              <a:t>application outputs </a:t>
+            </a:r>
+            <a:r>
+              <a:rPr lang="en-US" dirty="0"/>
+              <a:t>spyplot data at a fixed interval in simulated time, calculated so that the application executed </a:t>
+            </a:r>
+            <a:r>
+              <a:rPr lang="en-US" dirty="0" smtClean="0"/>
+              <a:t>the same number </a:t>
+            </a:r>
+            <a:r>
+              <a:rPr lang="en-US" dirty="0"/>
+              <a:t>of analysis operations performed by the </a:t>
+            </a:r>
+            <a:r>
+              <a:rPr lang="en-US" i="1" dirty="0" smtClean="0"/>
+              <a:t>in situ </a:t>
+            </a:r>
+            <a:r>
+              <a:rPr lang="en-US" dirty="0"/>
+              <a:t>and </a:t>
+            </a:r>
+            <a:r>
+              <a:rPr lang="en-US" i="1" dirty="0" smtClean="0"/>
+              <a:t>in transit</a:t>
+            </a:r>
+            <a:r>
+              <a:rPr lang="en-US" dirty="0" smtClean="0"/>
+              <a:t> </a:t>
+            </a:r>
+            <a:r>
+              <a:rPr lang="en-US" dirty="0" smtClean="0"/>
+              <a:t>applications</a:t>
+            </a:r>
+          </a:p>
+          <a:p>
+            <a:pPr lvl="1"/>
+            <a:r>
+              <a:rPr lang="en-US" dirty="0" smtClean="0"/>
+              <a:t>Total number of analysis operations is the same</a:t>
+            </a:r>
+          </a:p>
+          <a:p>
+            <a:r>
+              <a:rPr lang="en-US" dirty="0" smtClean="0"/>
+              <a:t>Data captured was from instrumented code and HPCToolkit</a:t>
+            </a:r>
+          </a:p>
+        </p:txBody>
+      </p:sp>
+      <p:sp>
+        <p:nvSpPr>
+          <p:cNvPr id="4" name="Slide Number Placeholder 3"/>
+          <p:cNvSpPr>
+            <a:spLocks noGrp="1"/>
+          </p:cNvSpPr>
+          <p:nvPr>
+            <p:ph type="sldNum" sz="quarter" idx="12"/>
+          </p:nvPr>
+        </p:nvSpPr>
+        <p:spPr/>
+        <p:txBody>
+          <a:bodyPr/>
+          <a:lstStyle/>
+          <a:p>
+            <a:fld id="{A5E55A7B-7854-E145-92D9-B491DF4BAE2D}" type="slidenum">
+              <a:rPr lang="en-US" smtClean="0"/>
+              <a:pPr/>
+              <a:t>13</a:t>
+            </a:fld>
+            <a:endParaRPr lang="en-US" dirty="0"/>
+          </a:p>
+        </p:txBody>
+      </p:sp>
+    </p:spTree>
+    <p:extLst>
+      <p:ext uri="{BB962C8B-B14F-4D97-AF65-F5344CB8AC3E}">
+        <p14:creationId xmlns:p14="http://schemas.microsoft.com/office/powerpoint/2010/main" val="2656664516"/>
       </p:ext>
     </p:extLst>
   </p:cSld>
@@ -37914,89 +37858,80 @@
             <p:ph idx="1"/>
           </p:nvPr>
         </p:nvSpPr>
-        <p:spPr/>
+        <p:spPr>
+          <a:xfrm>
+            <a:off x="457200" y="991675"/>
+            <a:ext cx="8229600" cy="5134489"/>
+          </a:xfrm>
+        </p:spPr>
         <p:txBody>
           <a:bodyPr/>
           <a:lstStyle/>
           <a:p>
             <a:r>
               <a:rPr lang="en-US" dirty="0"/>
-              <a:t>All applications complete 500 cycles (i.e., timestep calculations) of the CTH code. </a:t>
+              <a:t>For each application, we ran strong scaling experiments for three </a:t>
+            </a:r>
+            <a:r>
+              <a:rPr lang="en-US" dirty="0" smtClean="0"/>
+              <a:t>different datasets</a:t>
+            </a:r>
+            <a:r>
+              <a:rPr lang="en-US" dirty="0"/>
+              <a:t>.  </a:t>
             </a:r>
             <a:endParaRPr lang="en-US" dirty="0" smtClean="0"/>
           </a:p>
           <a:p>
+            <a:pPr lvl="1"/>
             <a:r>
               <a:rPr lang="en-US" dirty="0" smtClean="0"/>
-              <a:t>The </a:t>
+              <a:t>Each </a:t>
             </a:r>
             <a:r>
               <a:rPr lang="en-US" dirty="0"/>
-              <a:t>first four applications execute an analysis operation once every 10 </a:t>
+              <a:t>data set comes from the same initial conditions but with </a:t>
             </a:r>
             <a:r>
               <a:rPr lang="en-US" dirty="0" smtClean="0"/>
-              <a:t>cycles</a:t>
-            </a:r>
-          </a:p>
-          <a:p>
+              <a:t>a different </a:t>
+            </a:r>
+            <a:r>
+              <a:rPr lang="en-US" dirty="0"/>
+              <a:t>maximum level of </a:t>
+            </a:r>
             <a:r>
               <a:rPr lang="en-US" dirty="0" smtClean="0"/>
-              <a:t>Spyplot </a:t>
-            </a:r>
+              <a:t>refinement</a:t>
+            </a:r>
+          </a:p>
+          <a:p>
+            <a:pPr lvl="1"/>
             <a:r>
               <a:rPr lang="en-US" dirty="0"/>
-              <a:t>file </a:t>
+              <a:t>M</a:t>
             </a:r>
             <a:r>
               <a:rPr lang="en-US" dirty="0" smtClean="0"/>
-              <a:t>application outputs </a:t>
+              <a:t>easurements </a:t>
             </a:r>
             <a:r>
               <a:rPr lang="en-US" dirty="0"/>
-              <a:t>spyplot data at a fixed interval in simulated time, calculated so that the application executed </a:t>
+              <a:t>of different </a:t>
             </a:r>
             <a:r>
               <a:rPr lang="en-US" dirty="0" smtClean="0"/>
-              <a:t>the same number </a:t>
+              <a:t>job sizes </a:t>
             </a:r>
             <a:r>
               <a:rPr lang="en-US" dirty="0"/>
-              <a:t>of analysis operations performed by the </a:t>
-            </a:r>
-            <a:r>
-              <a:rPr lang="en-US" i="1" dirty="0" smtClean="0"/>
-              <a:t>in situ </a:t>
-            </a:r>
-            <a:r>
-              <a:rPr lang="en-US" dirty="0"/>
-              <a:t>and </a:t>
-            </a:r>
-            <a:r>
-              <a:rPr lang="en-US" i="1" dirty="0" smtClean="0"/>
-              <a:t>in transit</a:t>
+              <a:t>with different data set sizes provides a weak scaling overview</a:t>
             </a:r>
             <a:r>
               <a:rPr lang="en-US" dirty="0" smtClean="0"/>
-              <a:t> </a:t>
-            </a:r>
-            <a:r>
-              <a:rPr lang="en-US" dirty="0" smtClean="0"/>
-              <a:t>applications</a:t>
-            </a:r>
-          </a:p>
-          <a:p>
-            <a:pPr lvl="1"/>
-            <a:r>
-              <a:rPr lang="en-US" dirty="0" smtClean="0"/>
-              <a:t>Total number of analysis operations is the same</a:t>
-            </a:r>
-          </a:p>
-          <a:p>
-            <a:r>
-              <a:rPr lang="en-US" dirty="0" smtClean="0"/>
-              <a:t>Data captured was from instrumented code and HPCToolkit</a:t>
-            </a:r>
+              <a:t>.</a:t>
+            </a:r>
+            <a:endParaRPr lang="en-US" dirty="0"/>
           </a:p>
         </p:txBody>
       </p:sp>
@@ -38019,177 +37954,6 @@
               <a:rPr lang="en-US" smtClean="0"/>
               <a:pPr/>
               <a:t>14</a:t>
-            </a:fld>
-            <a:endParaRPr lang="en-US" dirty="0"/>
-          </a:p>
-        </p:txBody>
-      </p:sp>
-    </p:spTree>
-    <p:extLst>
-      <p:ext uri="{BB962C8B-B14F-4D97-AF65-F5344CB8AC3E}">
-        <p14:creationId xmlns:p14="http://schemas.microsoft.com/office/powerpoint/2010/main" val="2656664516"/>
-      </p:ext>
-    </p:extLst>
-  </p:cSld>
-  <p:clrMapOvr>
-    <a:masterClrMapping/>
-  </p:clrMapOvr>
-  <p:timing>
-    <p:tnLst>
-      <p:par>
-        <p:cTn xmlns:p14="http://schemas.microsoft.com/office/powerpoint/2010/main" id="1" dur="indefinite" restart="never" nodeType="tmRoot"/>
-      </p:par>
-    </p:tnLst>
-  </p:timing>
-</p:sld>
-</file>
-
-<file path=ppt/slides/slide15.xml><?xml version="1.0" encoding="utf-8"?>
-<p:sld xmlns:a="http://schemas.openxmlformats.org/drawingml/2006/main" xmlns:r="http://schemas.openxmlformats.org/officeDocument/2006/relationships" xmlns:p="http://schemas.openxmlformats.org/presentationml/2006/main">
-  <p:cSld>
-    <p:spTree>
-      <p:nvGrpSpPr>
-        <p:cNvPr id="1" name=""/>
-        <p:cNvGrpSpPr/>
-        <p:nvPr/>
-      </p:nvGrpSpPr>
-      <p:grpSpPr>
-        <a:xfrm>
-          <a:off x="0" y="0"/>
-          <a:ext cx="0" cy="0"/>
-          <a:chOff x="0" y="0"/>
-          <a:chExt cx="0" cy="0"/>
-        </a:xfrm>
-      </p:grpSpPr>
-      <p:sp>
-        <p:nvSpPr>
-          <p:cNvPr id="2" name="Title 1"/>
-          <p:cNvSpPr>
-            <a:spLocks noGrp="1"/>
-          </p:cNvSpPr>
-          <p:nvPr>
-            <p:ph type="title"/>
-          </p:nvPr>
-        </p:nvSpPr>
-        <p:spPr/>
-        <p:txBody>
-          <a:bodyPr/>
-          <a:lstStyle/>
-          <a:p>
-            <a:r>
-              <a:rPr lang="en-US" dirty="0" smtClean="0"/>
-              <a:t>Experiment, cont’d</a:t>
-            </a:r>
-            <a:endParaRPr lang="en-US" dirty="0"/>
-          </a:p>
-        </p:txBody>
-      </p:sp>
-      <p:sp>
-        <p:nvSpPr>
-          <p:cNvPr id="3" name="Content Placeholder 2"/>
-          <p:cNvSpPr>
-            <a:spLocks noGrp="1"/>
-          </p:cNvSpPr>
-          <p:nvPr>
-            <p:ph idx="1"/>
-          </p:nvPr>
-        </p:nvSpPr>
-        <p:spPr>
-          <a:xfrm>
-            <a:off x="457200" y="991675"/>
-            <a:ext cx="8229600" cy="5134489"/>
-          </a:xfrm>
-        </p:spPr>
-        <p:txBody>
-          <a:bodyPr/>
-          <a:lstStyle/>
-          <a:p>
-            <a:r>
-              <a:rPr lang="en-US" dirty="0"/>
-              <a:t>For each application, we ran strong scaling experiments for three </a:t>
-            </a:r>
-            <a:r>
-              <a:rPr lang="en-US" dirty="0" smtClean="0"/>
-              <a:t>different datasets</a:t>
-            </a:r>
-            <a:r>
-              <a:rPr lang="en-US" dirty="0"/>
-              <a:t>.  </a:t>
-            </a:r>
-            <a:endParaRPr lang="en-US" dirty="0" smtClean="0"/>
-          </a:p>
-          <a:p>
-            <a:pPr lvl="1"/>
-            <a:r>
-              <a:rPr lang="en-US" dirty="0" smtClean="0"/>
-              <a:t>Each </a:t>
-            </a:r>
-            <a:r>
-              <a:rPr lang="en-US" dirty="0"/>
-              <a:t>data set comes from the same initial conditions but with </a:t>
-            </a:r>
-            <a:r>
-              <a:rPr lang="en-US" dirty="0" smtClean="0"/>
-              <a:t>a different </a:t>
-            </a:r>
-            <a:r>
-              <a:rPr lang="en-US" dirty="0"/>
-              <a:t>maximum level of </a:t>
-            </a:r>
-            <a:r>
-              <a:rPr lang="en-US" dirty="0" smtClean="0"/>
-              <a:t>refinement</a:t>
-            </a:r>
-          </a:p>
-          <a:p>
-            <a:pPr lvl="1"/>
-            <a:r>
-              <a:rPr lang="en-US" dirty="0"/>
-              <a:t>M</a:t>
-            </a:r>
-            <a:r>
-              <a:rPr lang="en-US" dirty="0" smtClean="0"/>
-              <a:t>easurements </a:t>
-            </a:r>
-            <a:r>
-              <a:rPr lang="en-US" dirty="0"/>
-              <a:t>of different </a:t>
-            </a:r>
-            <a:r>
-              <a:rPr lang="en-US" dirty="0" smtClean="0"/>
-              <a:t>job sizes </a:t>
-            </a:r>
-            <a:r>
-              <a:rPr lang="en-US" dirty="0"/>
-              <a:t>with different data set sizes provides a weak scaling overview</a:t>
-            </a:r>
-            <a:r>
-              <a:rPr lang="en-US" dirty="0" smtClean="0"/>
-              <a:t>.</a:t>
-            </a:r>
-            <a:endParaRPr lang="en-US" dirty="0"/>
-          </a:p>
-        </p:txBody>
-      </p:sp>
-      <p:sp>
-        <p:nvSpPr>
-          <p:cNvPr id="4" name="Slide Number Placeholder 3"/>
-          <p:cNvSpPr>
-            <a:spLocks noGrp="1"/>
-          </p:cNvSpPr>
-          <p:nvPr>
-            <p:ph type="sldNum" sz="quarter" idx="12"/>
-          </p:nvPr>
-        </p:nvSpPr>
-        <p:spPr/>
-        <p:txBody>
-          <a:bodyPr/>
-          <a:lstStyle/>
-          <a:p>
-            <a:fld id="{A5E55A7B-7854-E145-92D9-B491DF4BAE2D}" type="slidenum">
-              <a:rPr lang="en-US" smtClean="0"/>
-              <a:pPr/>
-              <a:t>15</a:t>
             </a:fld>
             <a:endParaRPr lang="en-US" dirty="0"/>
           </a:p>
@@ -38279,7 +38043,7 @@
 </p:sld>
 </file>
 
-<file path=ppt/slides/slide16.xml><?xml version="1.0" encoding="utf-8"?>
+<file path=ppt/slides/slide15.xml><?xml version="1.0" encoding="utf-8"?>
 <p:sld xmlns:a="http://schemas.openxmlformats.org/drawingml/2006/main" xmlns:r="http://schemas.openxmlformats.org/officeDocument/2006/relationships" xmlns:p="http://schemas.openxmlformats.org/presentationml/2006/main">
   <p:cSld>
     <p:spTree>
@@ -38314,7 +38078,7 @@
             <a:fld id="{A5E55A7B-7854-E145-92D9-B491DF4BAE2D}" type="slidenum">
               <a:rPr lang="en-US" smtClean="0"/>
               <a:pPr/>
-              <a:t>16</a:t>
+              <a:t>15</a:t>
             </a:fld>
             <a:endParaRPr lang="en-US" dirty="0"/>
           </a:p>
@@ -38372,7 +38136,7 @@
 </p:sld>
 </file>
 
-<file path=ppt/slides/slide17.xml><?xml version="1.0" encoding="utf-8"?>
+<file path=ppt/slides/slide16.xml><?xml version="1.0" encoding="utf-8"?>
 <p:sld xmlns:a="http://schemas.openxmlformats.org/drawingml/2006/main" xmlns:r="http://schemas.openxmlformats.org/officeDocument/2006/relationships" xmlns:p="http://schemas.openxmlformats.org/presentationml/2006/main">
   <p:cSld>
     <p:spTree>
@@ -38436,7 +38200,7 @@
             <a:fld id="{A5E55A7B-7854-E145-92D9-B491DF4BAE2D}" type="slidenum">
               <a:rPr lang="en-US" smtClean="0"/>
               <a:pPr/>
-              <a:t>17</a:t>
+              <a:t>16</a:t>
             </a:fld>
             <a:endParaRPr lang="en-US" dirty="0"/>
           </a:p>
@@ -38462,7 +38226,7 @@
 </p:sld>
 </file>
 
-<file path=ppt/slides/slide18.xml><?xml version="1.0" encoding="utf-8"?>
+<file path=ppt/slides/slide17.xml><?xml version="1.0" encoding="utf-8"?>
 <p:sld xmlns:a="http://schemas.openxmlformats.org/drawingml/2006/main" xmlns:r="http://schemas.openxmlformats.org/officeDocument/2006/relationships" xmlns:p="http://schemas.openxmlformats.org/presentationml/2006/main">
   <p:cSld>
     <p:spTree>
@@ -38568,7 +38332,7 @@
             <a:fld id="{A5E55A7B-7854-E145-92D9-B491DF4BAE2D}" type="slidenum">
               <a:rPr lang="en-US" smtClean="0"/>
               <a:pPr/>
-              <a:t>18</a:t>
+              <a:t>17</a:t>
             </a:fld>
             <a:endParaRPr lang="en-US" dirty="0"/>
           </a:p>
@@ -38909,7 +38673,7 @@
 </p:sld>
 </file>
 
-<file path=ppt/slides/slide19.xml><?xml version="1.0" encoding="utf-8"?>
+<file path=ppt/slides/slide18.xml><?xml version="1.0" encoding="utf-8"?>
 <p:sld xmlns:a="http://schemas.openxmlformats.org/drawingml/2006/main" xmlns:r="http://schemas.openxmlformats.org/officeDocument/2006/relationships" xmlns:p="http://schemas.openxmlformats.org/presentationml/2006/main">
   <p:cSld>
     <p:spTree>
@@ -38966,7 +38730,7 @@
             <a:fld id="{A5E55A7B-7854-E145-92D9-B491DF4BAE2D}" type="slidenum">
               <a:rPr lang="en-US" smtClean="0"/>
               <a:pPr/>
-              <a:t>19</a:t>
+              <a:t>18</a:t>
             </a:fld>
             <a:endParaRPr lang="en-US" dirty="0"/>
           </a:p>
@@ -39060,6 +38824,199 @@
     <p:extLst>
       <p:ext uri="{BB962C8B-B14F-4D97-AF65-F5344CB8AC3E}">
         <p14:creationId xmlns:p14="http://schemas.microsoft.com/office/powerpoint/2010/main" val="4142435012"/>
+      </p:ext>
+    </p:extLst>
+  </p:cSld>
+  <p:clrMapOvr>
+    <a:masterClrMapping/>
+  </p:clrMapOvr>
+  <p:timing>
+    <p:tnLst>
+      <p:par>
+        <p:cTn xmlns:p14="http://schemas.microsoft.com/office/powerpoint/2010/main" id="1" dur="indefinite" restart="never" nodeType="tmRoot"/>
+      </p:par>
+    </p:tnLst>
+  </p:timing>
+</p:sld>
+</file>
+
+<file path=ppt/slides/slide19.xml><?xml version="1.0" encoding="utf-8"?>
+<p:sld xmlns:a="http://schemas.openxmlformats.org/drawingml/2006/main" xmlns:r="http://schemas.openxmlformats.org/officeDocument/2006/relationships" xmlns:p="http://schemas.openxmlformats.org/presentationml/2006/main">
+  <p:cSld>
+    <p:spTree>
+      <p:nvGrpSpPr>
+        <p:cNvPr id="1" name=""/>
+        <p:cNvGrpSpPr/>
+        <p:nvPr/>
+      </p:nvGrpSpPr>
+      <p:grpSpPr>
+        <a:xfrm>
+          <a:off x="0" y="0"/>
+          <a:ext cx="0" cy="0"/>
+          <a:chOff x="0" y="0"/>
+          <a:chExt cx="0" cy="0"/>
+        </a:xfrm>
+      </p:grpSpPr>
+      <p:pic>
+        <p:nvPicPr>
+          <p:cNvPr id="9" name="Picture 8"/>
+          <p:cNvPicPr>
+            <a:picLocks noChangeAspect="1"/>
+          </p:cNvPicPr>
+          <p:nvPr/>
+        </p:nvPicPr>
+        <p:blipFill>
+          <a:blip r:embed="rId2"/>
+          <a:stretch>
+            <a:fillRect/>
+          </a:stretch>
+        </p:blipFill>
+        <p:spPr>
+          <a:xfrm>
+            <a:off x="1371600" y="914400"/>
+            <a:ext cx="6400800" cy="4572000"/>
+          </a:xfrm>
+          <a:prstGeom prst="rect">
+            <a:avLst/>
+          </a:prstGeom>
+        </p:spPr>
+      </p:pic>
+      <p:sp>
+        <p:nvSpPr>
+          <p:cNvPr id="4" name="Title 3"/>
+          <p:cNvSpPr>
+            <a:spLocks noGrp="1"/>
+          </p:cNvSpPr>
+          <p:nvPr>
+            <p:ph type="title"/>
+          </p:nvPr>
+        </p:nvSpPr>
+        <p:spPr/>
+        <p:txBody>
+          <a:bodyPr/>
+          <a:lstStyle/>
+          <a:p>
+            <a:r>
+              <a:rPr lang="en-US" sz="3600" dirty="0" smtClean="0"/>
+              <a:t>Pipeline Summary Timing (1.5m blocks)</a:t>
+            </a:r>
+            <a:endParaRPr lang="en-US" sz="3600" dirty="0"/>
+          </a:p>
+        </p:txBody>
+      </p:sp>
+      <p:sp>
+        <p:nvSpPr>
+          <p:cNvPr id="3" name="Slide Number Placeholder 2"/>
+          <p:cNvSpPr>
+            <a:spLocks noGrp="1"/>
+          </p:cNvSpPr>
+          <p:nvPr>
+            <p:ph type="sldNum" sz="quarter" idx="12"/>
+          </p:nvPr>
+        </p:nvSpPr>
+        <p:spPr/>
+        <p:txBody>
+          <a:bodyPr/>
+          <a:lstStyle/>
+          <a:p>
+            <a:fld id="{A5E55A7B-7854-E145-92D9-B491DF4BAE2D}" type="slidenum">
+              <a:rPr lang="en-US" smtClean="0"/>
+              <a:pPr/>
+              <a:t>19</a:t>
+            </a:fld>
+            <a:endParaRPr lang="en-US" dirty="0"/>
+          </a:p>
+        </p:txBody>
+      </p:sp>
+      <p:sp>
+        <p:nvSpPr>
+          <p:cNvPr id="8" name="Rectangle 7"/>
+          <p:cNvSpPr/>
+          <p:nvPr/>
+        </p:nvSpPr>
+        <p:spPr>
+          <a:xfrm>
+            <a:off x="457200" y="5563247"/>
+            <a:ext cx="8229600" cy="742950"/>
+          </a:xfrm>
+          <a:prstGeom prst="rect">
+            <a:avLst/>
+          </a:prstGeom>
+          <a:solidFill>
+            <a:schemeClr val="bg1">
+              <a:lumMod val="50000"/>
+            </a:schemeClr>
+          </a:solidFill>
+          <a:ln>
+            <a:solidFill>
+              <a:schemeClr val="tx1"/>
+            </a:solidFill>
+          </a:ln>
+        </p:spPr>
+        <p:style>
+          <a:lnRef idx="1">
+            <a:schemeClr val="accent1"/>
+          </a:lnRef>
+          <a:fillRef idx="3">
+            <a:schemeClr val="accent1"/>
+          </a:fillRef>
+          <a:effectRef idx="2">
+            <a:schemeClr val="accent1"/>
+          </a:effectRef>
+          <a:fontRef idx="minor">
+            <a:schemeClr val="lt1"/>
+          </a:fontRef>
+        </p:style>
+        <p:txBody>
+          <a:bodyPr rtlCol="0" anchor="t" anchorCtr="0"/>
+          <a:lstStyle/>
+          <a:p>
+            <a:pPr algn="just"/>
+            <a:r>
+              <a:rPr lang="en-US" dirty="0" smtClean="0"/>
+              <a:t>No significant improvement at 32K cores.  Probably insufficient work for analysis (only 45 blocks per process).</a:t>
+            </a:r>
+            <a:endParaRPr lang="en-US" dirty="0"/>
+          </a:p>
+        </p:txBody>
+      </p:sp>
+      <p:cxnSp>
+        <p:nvCxnSpPr>
+          <p:cNvPr id="6" name="Straight Arrow Connector 5"/>
+          <p:cNvCxnSpPr/>
+          <p:nvPr/>
+        </p:nvCxnSpPr>
+        <p:spPr>
+          <a:xfrm flipV="1">
+            <a:off x="3657600" y="3962400"/>
+            <a:ext cx="3505200" cy="1676400"/>
+          </a:xfrm>
+          <a:prstGeom prst="straightConnector1">
+            <a:avLst/>
+          </a:prstGeom>
+          <a:ln>
+            <a:tailEnd type="arrow"/>
+          </a:ln>
+        </p:spPr>
+        <p:style>
+          <a:lnRef idx="2">
+            <a:schemeClr val="accent1"/>
+          </a:lnRef>
+          <a:fillRef idx="0">
+            <a:schemeClr val="accent1"/>
+          </a:fillRef>
+          <a:effectRef idx="1">
+            <a:schemeClr val="accent1"/>
+          </a:effectRef>
+          <a:fontRef idx="minor">
+            <a:schemeClr val="tx1"/>
+          </a:fontRef>
+        </p:style>
+      </p:cxnSp>
+    </p:spTree>
+    <p:extLst>
+      <p:ext uri="{BB962C8B-B14F-4D97-AF65-F5344CB8AC3E}">
+        <p14:creationId xmlns:p14="http://schemas.microsoft.com/office/powerpoint/2010/main" val="169757570"/>
       </p:ext>
     </p:extLst>
   </p:cSld>
@@ -39359,10 +39316,9 @@
           <a:lstStyle/>
           <a:p>
             <a:r>
-              <a:rPr lang="en-US" sz="3600" dirty="0" smtClean="0"/>
+              <a:rPr lang="en-US" sz="3600" dirty="0"/>
               <a:t>Pipeline Summary Timing (1.5m blocks)</a:t>
             </a:r>
-            <a:endParaRPr lang="en-US" sz="3600" dirty="0"/>
           </a:p>
         </p:txBody>
       </p:sp>
@@ -39436,7 +39392,7 @@
             <a:pPr algn="just"/>
             <a:r>
               <a:rPr lang="en-US" dirty="0" smtClean="0"/>
-              <a:t>No significant improvement at 32K cores.  Probably insufficient work for analysis (only 45 blocks per process).</a:t>
+              <a:t>Writing files surprisingly fast.  Although slower than most alternatives, still a viable option.</a:t>
             </a:r>
             <a:endParaRPr lang="en-US" dirty="0"/>
           </a:p>
@@ -39450,8 +39406,8 @@
         </p:nvCxnSpPr>
         <p:spPr>
           <a:xfrm flipV="1">
-            <a:off x="3657600" y="3962400"/>
-            <a:ext cx="3505200" cy="1676400"/>
+            <a:off x="1981200" y="2743200"/>
+            <a:ext cx="1981200" cy="2895600"/>
           </a:xfrm>
           <a:prstGeom prst="straightConnector1">
             <a:avLst/>
@@ -39478,7 +39434,7 @@
     </p:spTree>
     <p:extLst>
       <p:ext uri="{BB962C8B-B14F-4D97-AF65-F5344CB8AC3E}">
-        <p14:creationId xmlns:p14="http://schemas.microsoft.com/office/powerpoint/2010/main" val="169757570"/>
+        <p14:creationId xmlns:p14="http://schemas.microsoft.com/office/powerpoint/2010/main" val="691400929"/>
       </p:ext>
     </p:extLst>
   </p:cSld>
@@ -39628,198 +39584,6 @@
             <a:pPr algn="just"/>
             <a:r>
               <a:rPr lang="en-US" dirty="0" smtClean="0"/>
-              <a:t>Writing files surprisingly fast.  Although slower than most alternatives, still a viable option.</a:t>
-            </a:r>
-            <a:endParaRPr lang="en-US" dirty="0"/>
-          </a:p>
-        </p:txBody>
-      </p:sp>
-      <p:cxnSp>
-        <p:nvCxnSpPr>
-          <p:cNvPr id="6" name="Straight Arrow Connector 5"/>
-          <p:cNvCxnSpPr/>
-          <p:nvPr/>
-        </p:nvCxnSpPr>
-        <p:spPr>
-          <a:xfrm flipV="1">
-            <a:off x="1981200" y="2743200"/>
-            <a:ext cx="1981200" cy="2895600"/>
-          </a:xfrm>
-          <a:prstGeom prst="straightConnector1">
-            <a:avLst/>
-          </a:prstGeom>
-          <a:ln>
-            <a:tailEnd type="arrow"/>
-          </a:ln>
-        </p:spPr>
-        <p:style>
-          <a:lnRef idx="2">
-            <a:schemeClr val="accent1"/>
-          </a:lnRef>
-          <a:fillRef idx="0">
-            <a:schemeClr val="accent1"/>
-          </a:fillRef>
-          <a:effectRef idx="1">
-            <a:schemeClr val="accent1"/>
-          </a:effectRef>
-          <a:fontRef idx="minor">
-            <a:schemeClr val="tx1"/>
-          </a:fontRef>
-        </p:style>
-      </p:cxnSp>
-    </p:spTree>
-    <p:extLst>
-      <p:ext uri="{BB962C8B-B14F-4D97-AF65-F5344CB8AC3E}">
-        <p14:creationId xmlns:p14="http://schemas.microsoft.com/office/powerpoint/2010/main" val="691400929"/>
-      </p:ext>
-    </p:extLst>
-  </p:cSld>
-  <p:clrMapOvr>
-    <a:masterClrMapping/>
-  </p:clrMapOvr>
-  <p:timing>
-    <p:tnLst>
-      <p:par>
-        <p:cTn xmlns:p14="http://schemas.microsoft.com/office/powerpoint/2010/main" id="1" dur="indefinite" restart="never" nodeType="tmRoot"/>
-      </p:par>
-    </p:tnLst>
-  </p:timing>
-</p:sld>
-</file>
-
-<file path=ppt/slides/slide22.xml><?xml version="1.0" encoding="utf-8"?>
-<p:sld xmlns:a="http://schemas.openxmlformats.org/drawingml/2006/main" xmlns:r="http://schemas.openxmlformats.org/officeDocument/2006/relationships" xmlns:p="http://schemas.openxmlformats.org/presentationml/2006/main">
-  <p:cSld>
-    <p:spTree>
-      <p:nvGrpSpPr>
-        <p:cNvPr id="1" name=""/>
-        <p:cNvGrpSpPr/>
-        <p:nvPr/>
-      </p:nvGrpSpPr>
-      <p:grpSpPr>
-        <a:xfrm>
-          <a:off x="0" y="0"/>
-          <a:ext cx="0" cy="0"/>
-          <a:chOff x="0" y="0"/>
-          <a:chExt cx="0" cy="0"/>
-        </a:xfrm>
-      </p:grpSpPr>
-      <p:pic>
-        <p:nvPicPr>
-          <p:cNvPr id="9" name="Picture 8"/>
-          <p:cNvPicPr>
-            <a:picLocks noChangeAspect="1"/>
-          </p:cNvPicPr>
-          <p:nvPr/>
-        </p:nvPicPr>
-        <p:blipFill>
-          <a:blip r:embed="rId2"/>
-          <a:stretch>
-            <a:fillRect/>
-          </a:stretch>
-        </p:blipFill>
-        <p:spPr>
-          <a:xfrm>
-            <a:off x="1371600" y="914400"/>
-            <a:ext cx="6400800" cy="4572000"/>
-          </a:xfrm>
-          <a:prstGeom prst="rect">
-            <a:avLst/>
-          </a:prstGeom>
-        </p:spPr>
-      </p:pic>
-      <p:sp>
-        <p:nvSpPr>
-          <p:cNvPr id="4" name="Title 3"/>
-          <p:cNvSpPr>
-            <a:spLocks noGrp="1"/>
-          </p:cNvSpPr>
-          <p:nvPr>
-            <p:ph type="title"/>
-          </p:nvPr>
-        </p:nvSpPr>
-        <p:spPr/>
-        <p:txBody>
-          <a:bodyPr/>
-          <a:lstStyle/>
-          <a:p>
-            <a:r>
-              <a:rPr lang="en-US" sz="3600" dirty="0"/>
-              <a:t>Pipeline Summary Timing (1.5m blocks)</a:t>
-            </a:r>
-          </a:p>
-        </p:txBody>
-      </p:sp>
-      <p:sp>
-        <p:nvSpPr>
-          <p:cNvPr id="3" name="Slide Number Placeholder 2"/>
-          <p:cNvSpPr>
-            <a:spLocks noGrp="1"/>
-          </p:cNvSpPr>
-          <p:nvPr>
-            <p:ph type="sldNum" sz="quarter" idx="12"/>
-          </p:nvPr>
-        </p:nvSpPr>
-        <p:spPr/>
-        <p:txBody>
-          <a:bodyPr/>
-          <a:lstStyle/>
-          <a:p>
-            <a:fld id="{A5E55A7B-7854-E145-92D9-B491DF4BAE2D}" type="slidenum">
-              <a:rPr lang="en-US" smtClean="0"/>
-              <a:pPr/>
-              <a:t>22</a:t>
-            </a:fld>
-            <a:endParaRPr lang="en-US" dirty="0"/>
-          </a:p>
-        </p:txBody>
-      </p:sp>
-      <p:sp>
-        <p:nvSpPr>
-          <p:cNvPr id="8" name="Rectangle 7"/>
-          <p:cNvSpPr/>
-          <p:nvPr/>
-        </p:nvSpPr>
-        <p:spPr>
-          <a:xfrm>
-            <a:off x="457200" y="5563247"/>
-            <a:ext cx="8229600" cy="742950"/>
-          </a:xfrm>
-          <a:prstGeom prst="rect">
-            <a:avLst/>
-          </a:prstGeom>
-          <a:solidFill>
-            <a:schemeClr val="bg1">
-              <a:lumMod val="50000"/>
-            </a:schemeClr>
-          </a:solidFill>
-          <a:ln>
-            <a:solidFill>
-              <a:schemeClr val="tx1"/>
-            </a:solidFill>
-          </a:ln>
-        </p:spPr>
-        <p:style>
-          <a:lnRef idx="1">
-            <a:schemeClr val="accent1"/>
-          </a:lnRef>
-          <a:fillRef idx="3">
-            <a:schemeClr val="accent1"/>
-          </a:fillRef>
-          <a:effectRef idx="2">
-            <a:schemeClr val="accent1"/>
-          </a:effectRef>
-          <a:fontRef idx="minor">
-            <a:schemeClr val="lt1"/>
-          </a:fontRef>
-        </p:style>
-        <p:txBody>
-          <a:bodyPr rtlCol="0" anchor="t" anchorCtr="0"/>
-          <a:lstStyle/>
-          <a:p>
-            <a:pPr algn="just"/>
-            <a:r>
-              <a:rPr lang="en-US" dirty="0" smtClean="0"/>
               <a:t>“Sweet spot” at 8K cores: </a:t>
             </a:r>
             <a:r>
@@ -39895,7 +39659,7 @@
 </p:sld>
 </file>
 
-<file path=ppt/slides/slide23.xml><?xml version="1.0" encoding="utf-8"?>
+<file path=ppt/slides/slide22.xml><?xml version="1.0" encoding="utf-8"?>
 <p:sld xmlns:a="http://schemas.openxmlformats.org/drawingml/2006/main" xmlns:r="http://schemas.openxmlformats.org/officeDocument/2006/relationships" xmlns:p="http://schemas.openxmlformats.org/presentationml/2006/main">
   <p:cSld>
     <p:spTree>
@@ -40073,7 +39837,7 @@
             <a:fld id="{A5E55A7B-7854-E145-92D9-B491DF4BAE2D}" type="slidenum">
               <a:rPr lang="en-US" smtClean="0"/>
               <a:pPr/>
-              <a:t>23</a:t>
+              <a:t>22</a:t>
             </a:fld>
             <a:endParaRPr lang="en-US" dirty="0"/>
           </a:p>
@@ -40357,6 +40121,526 @@
     <p:extLst>
       <p:ext uri="{BB962C8B-B14F-4D97-AF65-F5344CB8AC3E}">
         <p14:creationId xmlns:p14="http://schemas.microsoft.com/office/powerpoint/2010/main" val="362960426"/>
+      </p:ext>
+    </p:extLst>
+  </p:cSld>
+  <p:clrMapOvr>
+    <a:masterClrMapping/>
+  </p:clrMapOvr>
+  <p:timing>
+    <p:tnLst>
+      <p:par>
+        <p:cTn xmlns:p14="http://schemas.microsoft.com/office/powerpoint/2010/main" id="1" dur="indefinite" restart="never" nodeType="tmRoot"/>
+      </p:par>
+    </p:tnLst>
+  </p:timing>
+</p:sld>
+</file>
+
+<file path=ppt/slides/slide23.xml><?xml version="1.0" encoding="utf-8"?>
+<p:sld xmlns:a="http://schemas.openxmlformats.org/drawingml/2006/main" xmlns:r="http://schemas.openxmlformats.org/officeDocument/2006/relationships" xmlns:p="http://schemas.openxmlformats.org/presentationml/2006/main">
+  <p:cSld>
+    <p:spTree>
+      <p:nvGrpSpPr>
+        <p:cNvPr id="1" name=""/>
+        <p:cNvGrpSpPr/>
+        <p:nvPr/>
+      </p:nvGrpSpPr>
+      <p:grpSpPr>
+        <a:xfrm>
+          <a:off x="0" y="0"/>
+          <a:ext cx="0" cy="0"/>
+          <a:chOff x="0" y="0"/>
+          <a:chExt cx="0" cy="0"/>
+        </a:xfrm>
+      </p:grpSpPr>
+      <p:pic>
+        <p:nvPicPr>
+          <p:cNvPr id="12" name="Picture 11" descr="in-transit-inclusive-bar.pdf"/>
+          <p:cNvPicPr>
+            <a:picLocks noChangeAspect="1"/>
+          </p:cNvPicPr>
+          <p:nvPr/>
+        </p:nvPicPr>
+        <p:blipFill>
+          <a:blip r:embed="rId3">
+            <a:extLst>
+              <a:ext uri="{28A0092B-C50C-407E-A947-70E740481C1C}">
+                <a14:useLocalDpi xmlns:a14="http://schemas.microsoft.com/office/drawing/2010/main" val="0"/>
+              </a:ext>
+            </a:extLst>
+          </a:blip>
+          <a:stretch>
+            <a:fillRect/>
+          </a:stretch>
+        </p:blipFill>
+        <p:spPr>
+          <a:xfrm>
+            <a:off x="3049524" y="3581400"/>
+            <a:ext cx="3044952" cy="2435962"/>
+          </a:xfrm>
+          <a:prstGeom prst="rect">
+            <a:avLst/>
+          </a:prstGeom>
+        </p:spPr>
+      </p:pic>
+      <p:pic>
+        <p:nvPicPr>
+          <p:cNvPr id="11" name="Picture 10" descr="in-transit-extra-bar.pdf"/>
+          <p:cNvPicPr>
+            <a:picLocks noChangeAspect="1"/>
+          </p:cNvPicPr>
+          <p:nvPr/>
+        </p:nvPicPr>
+        <p:blipFill>
+          <a:blip r:embed="rId4">
+            <a:extLst>
+              <a:ext uri="{28A0092B-C50C-407E-A947-70E740481C1C}">
+                <a14:useLocalDpi xmlns:a14="http://schemas.microsoft.com/office/drawing/2010/main" val="0"/>
+              </a:ext>
+            </a:extLst>
+          </a:blip>
+          <a:stretch>
+            <a:fillRect/>
+          </a:stretch>
+        </p:blipFill>
+        <p:spPr>
+          <a:xfrm>
+            <a:off x="8466" y="3581400"/>
+            <a:ext cx="3044952" cy="2435962"/>
+          </a:xfrm>
+          <a:prstGeom prst="rect">
+            <a:avLst/>
+          </a:prstGeom>
+        </p:spPr>
+      </p:pic>
+      <p:pic>
+        <p:nvPicPr>
+          <p:cNvPr id="9" name="Picture 8" descr="in-situ-opt-bar.pdf"/>
+          <p:cNvPicPr>
+            <a:picLocks noChangeAspect="1"/>
+          </p:cNvPicPr>
+          <p:nvPr/>
+        </p:nvPicPr>
+        <p:blipFill>
+          <a:blip r:embed="rId5">
+            <a:extLst>
+              <a:ext uri="{28A0092B-C50C-407E-A947-70E740481C1C}">
+                <a14:useLocalDpi xmlns:a14="http://schemas.microsoft.com/office/drawing/2010/main" val="0"/>
+              </a:ext>
+            </a:extLst>
+          </a:blip>
+          <a:stretch>
+            <a:fillRect/>
+          </a:stretch>
+        </p:blipFill>
+        <p:spPr>
+          <a:xfrm>
+            <a:off x="3049524" y="914400"/>
+            <a:ext cx="3044952" cy="2435962"/>
+          </a:xfrm>
+          <a:prstGeom prst="rect">
+            <a:avLst/>
+          </a:prstGeom>
+        </p:spPr>
+      </p:pic>
+      <p:pic>
+        <p:nvPicPr>
+          <p:cNvPr id="10" name="Picture 9" descr="in-situ-unopt-bar.pdf"/>
+          <p:cNvPicPr>
+            <a:picLocks noChangeAspect="1"/>
+          </p:cNvPicPr>
+          <p:nvPr/>
+        </p:nvPicPr>
+        <p:blipFill>
+          <a:blip r:embed="rId6">
+            <a:extLst>
+              <a:ext uri="{28A0092B-C50C-407E-A947-70E740481C1C}">
+                <a14:useLocalDpi xmlns:a14="http://schemas.microsoft.com/office/drawing/2010/main" val="0"/>
+              </a:ext>
+            </a:extLst>
+          </a:blip>
+          <a:stretch>
+            <a:fillRect/>
+          </a:stretch>
+        </p:blipFill>
+        <p:spPr>
+          <a:xfrm>
+            <a:off x="0" y="914400"/>
+            <a:ext cx="3044952" cy="2435962"/>
+          </a:xfrm>
+          <a:prstGeom prst="rect">
+            <a:avLst/>
+          </a:prstGeom>
+        </p:spPr>
+      </p:pic>
+      <p:sp>
+        <p:nvSpPr>
+          <p:cNvPr id="2" name="Title 1"/>
+          <p:cNvSpPr>
+            <a:spLocks noGrp="1"/>
+          </p:cNvSpPr>
+          <p:nvPr>
+            <p:ph type="title"/>
+          </p:nvPr>
+        </p:nvSpPr>
+        <p:spPr/>
+        <p:txBody>
+          <a:bodyPr/>
+          <a:lstStyle/>
+          <a:p>
+            <a:r>
+              <a:rPr lang="en-US" dirty="0" smtClean="0"/>
+              <a:t>Timing Per Task</a:t>
+            </a:r>
+            <a:endParaRPr lang="en-US" dirty="0"/>
+          </a:p>
+        </p:txBody>
+      </p:sp>
+      <p:sp>
+        <p:nvSpPr>
+          <p:cNvPr id="3" name="Slide Number Placeholder 2"/>
+          <p:cNvSpPr>
+            <a:spLocks noGrp="1"/>
+          </p:cNvSpPr>
+          <p:nvPr>
+            <p:ph type="sldNum" sz="quarter" idx="12"/>
+          </p:nvPr>
+        </p:nvSpPr>
+        <p:spPr/>
+        <p:txBody>
+          <a:bodyPr/>
+          <a:lstStyle/>
+          <a:p>
+            <a:fld id="{A5E55A7B-7854-E145-92D9-B491DF4BAE2D}" type="slidenum">
+              <a:rPr lang="en-US" smtClean="0"/>
+              <a:pPr/>
+              <a:t>23</a:t>
+            </a:fld>
+            <a:endParaRPr lang="en-US" dirty="0"/>
+          </a:p>
+        </p:txBody>
+      </p:sp>
+      <p:sp>
+        <p:nvSpPr>
+          <p:cNvPr id="17" name="TextBox 16"/>
+          <p:cNvSpPr txBox="1"/>
+          <p:nvPr/>
+        </p:nvSpPr>
+        <p:spPr>
+          <a:xfrm>
+            <a:off x="805824" y="3237468"/>
+            <a:ext cx="1433305" cy="338554"/>
+          </a:xfrm>
+          <a:prstGeom prst="rect">
+            <a:avLst/>
+          </a:prstGeom>
+          <a:noFill/>
+        </p:spPr>
+        <p:txBody>
+          <a:bodyPr wrap="none" rtlCol="0">
+            <a:spAutoFit/>
+          </a:bodyPr>
+          <a:lstStyle/>
+          <a:p>
+            <a:r>
+              <a:rPr lang="en-US" sz="1600" i="1" dirty="0" smtClean="0"/>
+              <a:t>In situ </a:t>
+            </a:r>
+            <a:r>
+              <a:rPr lang="en-US" sz="1600" dirty="0" smtClean="0"/>
+              <a:t>baseline</a:t>
+            </a:r>
+            <a:endParaRPr lang="en-US" sz="1600" dirty="0"/>
+          </a:p>
+        </p:txBody>
+      </p:sp>
+      <p:sp>
+        <p:nvSpPr>
+          <p:cNvPr id="18" name="TextBox 17"/>
+          <p:cNvSpPr txBox="1"/>
+          <p:nvPr/>
+        </p:nvSpPr>
+        <p:spPr>
+          <a:xfrm>
+            <a:off x="3899005" y="3242846"/>
+            <a:ext cx="1345991" cy="338554"/>
+          </a:xfrm>
+          <a:prstGeom prst="rect">
+            <a:avLst/>
+          </a:prstGeom>
+          <a:noFill/>
+        </p:spPr>
+        <p:txBody>
+          <a:bodyPr wrap="none" rtlCol="0">
+            <a:spAutoFit/>
+          </a:bodyPr>
+          <a:lstStyle/>
+          <a:p>
+            <a:r>
+              <a:rPr lang="en-US" sz="1600" i="1" dirty="0" smtClean="0"/>
+              <a:t>In situ </a:t>
+            </a:r>
+            <a:r>
+              <a:rPr lang="en-US" sz="1600" dirty="0" smtClean="0"/>
+              <a:t>refined</a:t>
+            </a:r>
+            <a:endParaRPr lang="en-US" sz="1600" dirty="0"/>
+          </a:p>
+        </p:txBody>
+      </p:sp>
+      <p:sp>
+        <p:nvSpPr>
+          <p:cNvPr id="19" name="TextBox 18"/>
+          <p:cNvSpPr txBox="1"/>
+          <p:nvPr/>
+        </p:nvSpPr>
+        <p:spPr>
+          <a:xfrm>
+            <a:off x="544610" y="5909846"/>
+            <a:ext cx="1972665" cy="338554"/>
+          </a:xfrm>
+          <a:prstGeom prst="rect">
+            <a:avLst/>
+          </a:prstGeom>
+          <a:noFill/>
+        </p:spPr>
+        <p:txBody>
+          <a:bodyPr wrap="none" rtlCol="0">
+            <a:spAutoFit/>
+          </a:bodyPr>
+          <a:lstStyle/>
+          <a:p>
+            <a:r>
+              <a:rPr lang="en-US" sz="1600" i="1" dirty="0" smtClean="0"/>
+              <a:t>In transit </a:t>
+            </a:r>
+            <a:r>
+              <a:rPr lang="en-US" sz="1600" dirty="0" smtClean="0"/>
+              <a:t>extra nodes</a:t>
+            </a:r>
+            <a:endParaRPr lang="en-US" sz="1600" dirty="0"/>
+          </a:p>
+        </p:txBody>
+      </p:sp>
+      <p:sp>
+        <p:nvSpPr>
+          <p:cNvPr id="20" name="TextBox 19"/>
+          <p:cNvSpPr txBox="1"/>
+          <p:nvPr/>
+        </p:nvSpPr>
+        <p:spPr>
+          <a:xfrm>
+            <a:off x="3474259" y="5909846"/>
+            <a:ext cx="2195483" cy="338554"/>
+          </a:xfrm>
+          <a:prstGeom prst="rect">
+            <a:avLst/>
+          </a:prstGeom>
+          <a:noFill/>
+        </p:spPr>
+        <p:txBody>
+          <a:bodyPr wrap="none" rtlCol="0">
+            <a:spAutoFit/>
+          </a:bodyPr>
+          <a:lstStyle/>
+          <a:p>
+            <a:r>
+              <a:rPr lang="en-US" sz="1600" i="1" dirty="0" smtClean="0"/>
+              <a:t>In transit </a:t>
+            </a:r>
+            <a:r>
+              <a:rPr lang="en-US" sz="1600" dirty="0" smtClean="0"/>
+              <a:t>internal nodes</a:t>
+            </a:r>
+            <a:endParaRPr lang="en-US" sz="1600" dirty="0"/>
+          </a:p>
+        </p:txBody>
+      </p:sp>
+      <p:cxnSp>
+        <p:nvCxnSpPr>
+          <p:cNvPr id="15" name="Straight Arrow Connector 14"/>
+          <p:cNvCxnSpPr/>
+          <p:nvPr/>
+        </p:nvCxnSpPr>
+        <p:spPr>
+          <a:xfrm flipH="1" flipV="1">
+            <a:off x="5669743" y="2658534"/>
+            <a:ext cx="502457" cy="1608666"/>
+          </a:xfrm>
+          <a:prstGeom prst="straightConnector1">
+            <a:avLst/>
+          </a:prstGeom>
+          <a:ln>
+            <a:tailEnd type="arrow"/>
+          </a:ln>
+        </p:spPr>
+        <p:style>
+          <a:lnRef idx="2">
+            <a:schemeClr val="accent1"/>
+          </a:lnRef>
+          <a:fillRef idx="0">
+            <a:schemeClr val="accent1"/>
+          </a:fillRef>
+          <a:effectRef idx="1">
+            <a:schemeClr val="accent1"/>
+          </a:effectRef>
+          <a:fontRef idx="minor">
+            <a:schemeClr val="tx1"/>
+          </a:fontRef>
+        </p:style>
+      </p:cxnSp>
+      <p:sp>
+        <p:nvSpPr>
+          <p:cNvPr id="14" name="Rectangle 13"/>
+          <p:cNvSpPr/>
+          <p:nvPr/>
+        </p:nvSpPr>
+        <p:spPr>
+          <a:xfrm>
+            <a:off x="6172200" y="3733800"/>
+            <a:ext cx="2828144" cy="2452941"/>
+          </a:xfrm>
+          <a:prstGeom prst="rect">
+            <a:avLst/>
+          </a:prstGeom>
+          <a:solidFill>
+            <a:schemeClr val="bg1">
+              <a:lumMod val="50000"/>
+            </a:schemeClr>
+          </a:solidFill>
+          <a:ln>
+            <a:solidFill>
+              <a:schemeClr val="tx1"/>
+            </a:solidFill>
+          </a:ln>
+        </p:spPr>
+        <p:style>
+          <a:lnRef idx="1">
+            <a:schemeClr val="accent1"/>
+          </a:lnRef>
+          <a:fillRef idx="3">
+            <a:schemeClr val="accent1"/>
+          </a:fillRef>
+          <a:effectRef idx="2">
+            <a:schemeClr val="accent1"/>
+          </a:effectRef>
+          <a:fontRef idx="minor">
+            <a:schemeClr val="lt1"/>
+          </a:fontRef>
+        </p:style>
+        <p:txBody>
+          <a:bodyPr rtlCol="0" anchor="t" anchorCtr="0"/>
+          <a:lstStyle/>
+          <a:p>
+            <a:pPr algn="just"/>
+            <a:r>
+              <a:rPr lang="en-US" dirty="0" smtClean="0"/>
+              <a:t>Refined analysis has much lower overhead, but initialization is problematic.  </a:t>
+            </a:r>
+          </a:p>
+          <a:p>
+            <a:pPr algn="just"/>
+            <a:endParaRPr lang="en-US" dirty="0" smtClean="0"/>
+          </a:p>
+          <a:p>
+            <a:pPr algn="just"/>
+            <a:r>
+              <a:rPr lang="en-US" dirty="0" smtClean="0"/>
+              <a:t>Refined algorithm requires </a:t>
+            </a:r>
+            <a:r>
+              <a:rPr lang="en-US" dirty="0"/>
+              <a:t>additional data to be </a:t>
+            </a:r>
+            <a:r>
+              <a:rPr lang="en-US" dirty="0" smtClean="0"/>
+              <a:t>passed. Not done for </a:t>
+            </a:r>
+            <a:r>
+              <a:rPr lang="en-US" i="1" dirty="0" smtClean="0"/>
+              <a:t>in transit</a:t>
+            </a:r>
+            <a:r>
+              <a:rPr lang="en-US" dirty="0" smtClean="0"/>
+              <a:t> </a:t>
+            </a:r>
+            <a:r>
+              <a:rPr lang="en-US" dirty="0" smtClean="0"/>
+              <a:t>experiments.</a:t>
+            </a:r>
+            <a:endParaRPr lang="en-US" dirty="0"/>
+          </a:p>
+          <a:p>
+            <a:pPr algn="just"/>
+            <a:endParaRPr lang="en-US" dirty="0"/>
+          </a:p>
+        </p:txBody>
+      </p:sp>
+      <p:pic>
+        <p:nvPicPr>
+          <p:cNvPr id="16" name="Picture 15" descr="spyplot-file-bar.pdf"/>
+          <p:cNvPicPr>
+            <a:picLocks noChangeAspect="1"/>
+          </p:cNvPicPr>
+          <p:nvPr/>
+        </p:nvPicPr>
+        <p:blipFill>
+          <a:blip r:embed="rId7">
+            <a:extLst>
+              <a:ext uri="{28A0092B-C50C-407E-A947-70E740481C1C}">
+                <a14:useLocalDpi xmlns:a14="http://schemas.microsoft.com/office/drawing/2010/main" val="0"/>
+              </a:ext>
+            </a:extLst>
+          </a:blip>
+          <a:stretch>
+            <a:fillRect/>
+          </a:stretch>
+        </p:blipFill>
+        <p:spPr>
+          <a:xfrm>
+            <a:off x="6103620" y="914400"/>
+            <a:ext cx="3040380" cy="2432304"/>
+          </a:xfrm>
+          <a:prstGeom prst="rect">
+            <a:avLst/>
+          </a:prstGeom>
+        </p:spPr>
+      </p:pic>
+      <p:sp>
+        <p:nvSpPr>
+          <p:cNvPr id="21" name="TextBox 20"/>
+          <p:cNvSpPr txBox="1"/>
+          <p:nvPr/>
+        </p:nvSpPr>
+        <p:spPr>
+          <a:xfrm>
+            <a:off x="6350485" y="3242846"/>
+            <a:ext cx="2658701" cy="338554"/>
+          </a:xfrm>
+          <a:prstGeom prst="rect">
+            <a:avLst/>
+          </a:prstGeom>
+          <a:noFill/>
+        </p:spPr>
+        <p:txBody>
+          <a:bodyPr wrap="none" rtlCol="0">
+            <a:spAutoFit/>
+          </a:bodyPr>
+          <a:lstStyle/>
+          <a:p>
+            <a:r>
+              <a:rPr lang="en-US" sz="1600" dirty="0" smtClean="0"/>
+              <a:t>Spyplot I/O (post-processing)</a:t>
+            </a:r>
+            <a:endParaRPr lang="en-US" sz="1600" dirty="0"/>
+          </a:p>
+        </p:txBody>
+      </p:sp>
+    </p:spTree>
+    <p:extLst>
+      <p:ext uri="{BB962C8B-B14F-4D97-AF65-F5344CB8AC3E}">
+        <p14:creationId xmlns:p14="http://schemas.microsoft.com/office/powerpoint/2010/main" val="3507344511"/>
       </p:ext>
     </p:extLst>
   </p:cSld>
@@ -40696,13 +40980,15 @@
       <p:cxnSp>
         <p:nvCxnSpPr>
           <p:cNvPr id="15" name="Straight Arrow Connector 14"/>
-          <p:cNvCxnSpPr/>
+          <p:cNvCxnSpPr>
+            <a:stCxn id="14" idx="1"/>
+          </p:cNvCxnSpPr>
           <p:nvPr/>
         </p:nvCxnSpPr>
         <p:spPr>
           <a:xfrm flipH="1" flipV="1">
-            <a:off x="5669743" y="2658534"/>
-            <a:ext cx="502457" cy="1608666"/>
+            <a:off x="5791201" y="4800600"/>
+            <a:ext cx="380999" cy="426371"/>
           </a:xfrm>
           <a:prstGeom prst="straightConnector1">
             <a:avLst/>
@@ -40734,8 +41020,8 @@
         </p:nvSpPr>
         <p:spPr>
           <a:xfrm>
-            <a:off x="6172200" y="3733800"/>
-            <a:ext cx="2828144" cy="2452941"/>
+            <a:off x="6172200" y="4267200"/>
+            <a:ext cx="2828144" cy="1919541"/>
           </a:xfrm>
           <a:prstGeom prst="rect">
             <a:avLst/>
@@ -40771,40 +41057,16 @@
           <a:p>
             <a:pPr algn="just"/>
             <a:r>
+              <a:rPr lang="en-US" dirty="0"/>
+              <a:t>S</a:t>
+            </a:r>
+            <a:r>
               <a:rPr lang="en-US" dirty="0" smtClean="0"/>
-              <a:t>Refined analysis has much lower overhead, but initialization is problematic.  </a:t>
+              <a:t>ervice is a fixed size (800 nodes), the wait time should be independent of the number of cores on the client.</a:t>
             </a:r>
           </a:p>
           <a:p>
             <a:pPr algn="just"/>
-            <a:endParaRPr lang="en-US" dirty="0" smtClean="0"/>
-          </a:p>
-          <a:p>
-            <a:pPr algn="just"/>
-            <a:r>
-              <a:rPr lang="en-US" dirty="0" smtClean="0"/>
-              <a:t>Refined algorithm requires </a:t>
-            </a:r>
-            <a:r>
-              <a:rPr lang="en-US" dirty="0"/>
-              <a:t>additional data to be </a:t>
-            </a:r>
-            <a:r>
-              <a:rPr lang="en-US" dirty="0" smtClean="0"/>
-              <a:t>passed. Not done for </a:t>
-            </a:r>
-            <a:r>
-              <a:rPr lang="en-US" i="1" dirty="0" smtClean="0"/>
-              <a:t>in transit</a:t>
-            </a:r>
-            <a:r>
-              <a:rPr lang="en-US" dirty="0" smtClean="0"/>
-              <a:t> </a:t>
-            </a:r>
-            <a:r>
-              <a:rPr lang="en-US" dirty="0" smtClean="0"/>
-              <a:t>experiments.</a:t>
-            </a:r>
             <a:endParaRPr lang="en-US" dirty="0"/>
           </a:p>
           <a:p>
@@ -40876,7 +41138,7 @@
     </p:spTree>
     <p:extLst>
       <p:ext uri="{BB962C8B-B14F-4D97-AF65-F5344CB8AC3E}">
-        <p14:creationId xmlns:p14="http://schemas.microsoft.com/office/powerpoint/2010/main" val="3507344511"/>
+        <p14:creationId xmlns:p14="http://schemas.microsoft.com/office/powerpoint/2010/main" val="3097938817"/>
       </p:ext>
     </p:extLst>
   </p:cSld>
@@ -41222,504 +41484,6 @@
           <p:nvPr/>
         </p:nvCxnSpPr>
         <p:spPr>
-          <a:xfrm flipH="1" flipV="1">
-            <a:off x="5791201" y="4800600"/>
-            <a:ext cx="380999" cy="426371"/>
-          </a:xfrm>
-          <a:prstGeom prst="straightConnector1">
-            <a:avLst/>
-          </a:prstGeom>
-          <a:ln>
-            <a:tailEnd type="arrow"/>
-          </a:ln>
-        </p:spPr>
-        <p:style>
-          <a:lnRef idx="2">
-            <a:schemeClr val="accent1"/>
-          </a:lnRef>
-          <a:fillRef idx="0">
-            <a:schemeClr val="accent1"/>
-          </a:fillRef>
-          <a:effectRef idx="1">
-            <a:schemeClr val="accent1"/>
-          </a:effectRef>
-          <a:fontRef idx="minor">
-            <a:schemeClr val="tx1"/>
-          </a:fontRef>
-        </p:style>
-      </p:cxnSp>
-      <p:sp>
-        <p:nvSpPr>
-          <p:cNvPr id="14" name="Rectangle 13"/>
-          <p:cNvSpPr/>
-          <p:nvPr/>
-        </p:nvSpPr>
-        <p:spPr>
-          <a:xfrm>
-            <a:off x="6172200" y="4267200"/>
-            <a:ext cx="2828144" cy="1919541"/>
-          </a:xfrm>
-          <a:prstGeom prst="rect">
-            <a:avLst/>
-          </a:prstGeom>
-          <a:solidFill>
-            <a:schemeClr val="bg1">
-              <a:lumMod val="50000"/>
-            </a:schemeClr>
-          </a:solidFill>
-          <a:ln>
-            <a:solidFill>
-              <a:schemeClr val="tx1"/>
-            </a:solidFill>
-          </a:ln>
-        </p:spPr>
-        <p:style>
-          <a:lnRef idx="1">
-            <a:schemeClr val="accent1"/>
-          </a:lnRef>
-          <a:fillRef idx="3">
-            <a:schemeClr val="accent1"/>
-          </a:fillRef>
-          <a:effectRef idx="2">
-            <a:schemeClr val="accent1"/>
-          </a:effectRef>
-          <a:fontRef idx="minor">
-            <a:schemeClr val="lt1"/>
-          </a:fontRef>
-        </p:style>
-        <p:txBody>
-          <a:bodyPr rtlCol="0" anchor="t" anchorCtr="0"/>
-          <a:lstStyle/>
-          <a:p>
-            <a:pPr algn="just"/>
-            <a:r>
-              <a:rPr lang="en-US" dirty="0"/>
-              <a:t>S</a:t>
-            </a:r>
-            <a:r>
-              <a:rPr lang="en-US" dirty="0" smtClean="0"/>
-              <a:t>ervice is a fixed size (800 nodes), the wait time should be independent of the number of cores on the client.</a:t>
-            </a:r>
-          </a:p>
-          <a:p>
-            <a:pPr algn="just"/>
-            <a:endParaRPr lang="en-US" dirty="0"/>
-          </a:p>
-          <a:p>
-            <a:pPr algn="just"/>
-            <a:endParaRPr lang="en-US" dirty="0"/>
-          </a:p>
-        </p:txBody>
-      </p:sp>
-      <p:pic>
-        <p:nvPicPr>
-          <p:cNvPr id="16" name="Picture 15" descr="spyplot-file-bar.pdf"/>
-          <p:cNvPicPr>
-            <a:picLocks noChangeAspect="1"/>
-          </p:cNvPicPr>
-          <p:nvPr/>
-        </p:nvPicPr>
-        <p:blipFill>
-          <a:blip r:embed="rId7">
-            <a:extLst>
-              <a:ext uri="{28A0092B-C50C-407E-A947-70E740481C1C}">
-                <a14:useLocalDpi xmlns:a14="http://schemas.microsoft.com/office/drawing/2010/main" val="0"/>
-              </a:ext>
-            </a:extLst>
-          </a:blip>
-          <a:stretch>
-            <a:fillRect/>
-          </a:stretch>
-        </p:blipFill>
-        <p:spPr>
-          <a:xfrm>
-            <a:off x="6103620" y="914400"/>
-            <a:ext cx="3040380" cy="2432304"/>
-          </a:xfrm>
-          <a:prstGeom prst="rect">
-            <a:avLst/>
-          </a:prstGeom>
-        </p:spPr>
-      </p:pic>
-      <p:sp>
-        <p:nvSpPr>
-          <p:cNvPr id="21" name="TextBox 20"/>
-          <p:cNvSpPr txBox="1"/>
-          <p:nvPr/>
-        </p:nvSpPr>
-        <p:spPr>
-          <a:xfrm>
-            <a:off x="6350485" y="3242846"/>
-            <a:ext cx="2658701" cy="338554"/>
-          </a:xfrm>
-          <a:prstGeom prst="rect">
-            <a:avLst/>
-          </a:prstGeom>
-          <a:noFill/>
-        </p:spPr>
-        <p:txBody>
-          <a:bodyPr wrap="none" rtlCol="0">
-            <a:spAutoFit/>
-          </a:bodyPr>
-          <a:lstStyle/>
-          <a:p>
-            <a:r>
-              <a:rPr lang="en-US" sz="1600" dirty="0" smtClean="0"/>
-              <a:t>Spyplot I/O (post-processing)</a:t>
-            </a:r>
-            <a:endParaRPr lang="en-US" sz="1600" dirty="0"/>
-          </a:p>
-        </p:txBody>
-      </p:sp>
-    </p:spTree>
-    <p:extLst>
-      <p:ext uri="{BB962C8B-B14F-4D97-AF65-F5344CB8AC3E}">
-        <p14:creationId xmlns:p14="http://schemas.microsoft.com/office/powerpoint/2010/main" val="3097938817"/>
-      </p:ext>
-    </p:extLst>
-  </p:cSld>
-  <p:clrMapOvr>
-    <a:masterClrMapping/>
-  </p:clrMapOvr>
-  <p:timing>
-    <p:tnLst>
-      <p:par>
-        <p:cTn xmlns:p14="http://schemas.microsoft.com/office/powerpoint/2010/main" id="1" dur="indefinite" restart="never" nodeType="tmRoot"/>
-      </p:par>
-    </p:tnLst>
-  </p:timing>
-</p:sld>
-</file>
-
-<file path=ppt/slides/slide26.xml><?xml version="1.0" encoding="utf-8"?>
-<p:sld xmlns:a="http://schemas.openxmlformats.org/drawingml/2006/main" xmlns:r="http://schemas.openxmlformats.org/officeDocument/2006/relationships" xmlns:p="http://schemas.openxmlformats.org/presentationml/2006/main">
-  <p:cSld>
-    <p:spTree>
-      <p:nvGrpSpPr>
-        <p:cNvPr id="1" name=""/>
-        <p:cNvGrpSpPr/>
-        <p:nvPr/>
-      </p:nvGrpSpPr>
-      <p:grpSpPr>
-        <a:xfrm>
-          <a:off x="0" y="0"/>
-          <a:ext cx="0" cy="0"/>
-          <a:chOff x="0" y="0"/>
-          <a:chExt cx="0" cy="0"/>
-        </a:xfrm>
-      </p:grpSpPr>
-      <p:pic>
-        <p:nvPicPr>
-          <p:cNvPr id="12" name="Picture 11" descr="in-transit-inclusive-bar.pdf"/>
-          <p:cNvPicPr>
-            <a:picLocks noChangeAspect="1"/>
-          </p:cNvPicPr>
-          <p:nvPr/>
-        </p:nvPicPr>
-        <p:blipFill>
-          <a:blip r:embed="rId3">
-            <a:extLst>
-              <a:ext uri="{28A0092B-C50C-407E-A947-70E740481C1C}">
-                <a14:useLocalDpi xmlns:a14="http://schemas.microsoft.com/office/drawing/2010/main" val="0"/>
-              </a:ext>
-            </a:extLst>
-          </a:blip>
-          <a:stretch>
-            <a:fillRect/>
-          </a:stretch>
-        </p:blipFill>
-        <p:spPr>
-          <a:xfrm>
-            <a:off x="3049524" y="3581400"/>
-            <a:ext cx="3044952" cy="2435962"/>
-          </a:xfrm>
-          <a:prstGeom prst="rect">
-            <a:avLst/>
-          </a:prstGeom>
-        </p:spPr>
-      </p:pic>
-      <p:pic>
-        <p:nvPicPr>
-          <p:cNvPr id="11" name="Picture 10" descr="in-transit-extra-bar.pdf"/>
-          <p:cNvPicPr>
-            <a:picLocks noChangeAspect="1"/>
-          </p:cNvPicPr>
-          <p:nvPr/>
-        </p:nvPicPr>
-        <p:blipFill>
-          <a:blip r:embed="rId4">
-            <a:extLst>
-              <a:ext uri="{28A0092B-C50C-407E-A947-70E740481C1C}">
-                <a14:useLocalDpi xmlns:a14="http://schemas.microsoft.com/office/drawing/2010/main" val="0"/>
-              </a:ext>
-            </a:extLst>
-          </a:blip>
-          <a:stretch>
-            <a:fillRect/>
-          </a:stretch>
-        </p:blipFill>
-        <p:spPr>
-          <a:xfrm>
-            <a:off x="8466" y="3581400"/>
-            <a:ext cx="3044952" cy="2435962"/>
-          </a:xfrm>
-          <a:prstGeom prst="rect">
-            <a:avLst/>
-          </a:prstGeom>
-        </p:spPr>
-      </p:pic>
-      <p:pic>
-        <p:nvPicPr>
-          <p:cNvPr id="9" name="Picture 8" descr="in-situ-opt-bar.pdf"/>
-          <p:cNvPicPr>
-            <a:picLocks noChangeAspect="1"/>
-          </p:cNvPicPr>
-          <p:nvPr/>
-        </p:nvPicPr>
-        <p:blipFill>
-          <a:blip r:embed="rId5">
-            <a:extLst>
-              <a:ext uri="{28A0092B-C50C-407E-A947-70E740481C1C}">
-                <a14:useLocalDpi xmlns:a14="http://schemas.microsoft.com/office/drawing/2010/main" val="0"/>
-              </a:ext>
-            </a:extLst>
-          </a:blip>
-          <a:stretch>
-            <a:fillRect/>
-          </a:stretch>
-        </p:blipFill>
-        <p:spPr>
-          <a:xfrm>
-            <a:off x="3049524" y="914400"/>
-            <a:ext cx="3044952" cy="2435962"/>
-          </a:xfrm>
-          <a:prstGeom prst="rect">
-            <a:avLst/>
-          </a:prstGeom>
-        </p:spPr>
-      </p:pic>
-      <p:pic>
-        <p:nvPicPr>
-          <p:cNvPr id="10" name="Picture 9" descr="in-situ-unopt-bar.pdf"/>
-          <p:cNvPicPr>
-            <a:picLocks noChangeAspect="1"/>
-          </p:cNvPicPr>
-          <p:nvPr/>
-        </p:nvPicPr>
-        <p:blipFill>
-          <a:blip r:embed="rId6">
-            <a:extLst>
-              <a:ext uri="{28A0092B-C50C-407E-A947-70E740481C1C}">
-                <a14:useLocalDpi xmlns:a14="http://schemas.microsoft.com/office/drawing/2010/main" val="0"/>
-              </a:ext>
-            </a:extLst>
-          </a:blip>
-          <a:stretch>
-            <a:fillRect/>
-          </a:stretch>
-        </p:blipFill>
-        <p:spPr>
-          <a:xfrm>
-            <a:off x="0" y="914400"/>
-            <a:ext cx="3044952" cy="2435962"/>
-          </a:xfrm>
-          <a:prstGeom prst="rect">
-            <a:avLst/>
-          </a:prstGeom>
-        </p:spPr>
-      </p:pic>
-      <p:sp>
-        <p:nvSpPr>
-          <p:cNvPr id="2" name="Title 1"/>
-          <p:cNvSpPr>
-            <a:spLocks noGrp="1"/>
-          </p:cNvSpPr>
-          <p:nvPr>
-            <p:ph type="title"/>
-          </p:nvPr>
-        </p:nvSpPr>
-        <p:spPr/>
-        <p:txBody>
-          <a:bodyPr/>
-          <a:lstStyle/>
-          <a:p>
-            <a:r>
-              <a:rPr lang="en-US" dirty="0" smtClean="0"/>
-              <a:t>Timing Per Task</a:t>
-            </a:r>
-            <a:endParaRPr lang="en-US" dirty="0"/>
-          </a:p>
-        </p:txBody>
-      </p:sp>
-      <p:sp>
-        <p:nvSpPr>
-          <p:cNvPr id="3" name="Slide Number Placeholder 2"/>
-          <p:cNvSpPr>
-            <a:spLocks noGrp="1"/>
-          </p:cNvSpPr>
-          <p:nvPr>
-            <p:ph type="sldNum" sz="quarter" idx="12"/>
-          </p:nvPr>
-        </p:nvSpPr>
-        <p:spPr/>
-        <p:txBody>
-          <a:bodyPr/>
-          <a:lstStyle/>
-          <a:p>
-            <a:fld id="{A5E55A7B-7854-E145-92D9-B491DF4BAE2D}" type="slidenum">
-              <a:rPr lang="en-US" smtClean="0"/>
-              <a:pPr/>
-              <a:t>26</a:t>
-            </a:fld>
-            <a:endParaRPr lang="en-US" dirty="0"/>
-          </a:p>
-        </p:txBody>
-      </p:sp>
-      <p:sp>
-        <p:nvSpPr>
-          <p:cNvPr id="17" name="TextBox 16"/>
-          <p:cNvSpPr txBox="1"/>
-          <p:nvPr/>
-        </p:nvSpPr>
-        <p:spPr>
-          <a:xfrm>
-            <a:off x="805824" y="3237468"/>
-            <a:ext cx="1433305" cy="338554"/>
-          </a:xfrm>
-          <a:prstGeom prst="rect">
-            <a:avLst/>
-          </a:prstGeom>
-          <a:noFill/>
-        </p:spPr>
-        <p:txBody>
-          <a:bodyPr wrap="none" rtlCol="0">
-            <a:spAutoFit/>
-          </a:bodyPr>
-          <a:lstStyle/>
-          <a:p>
-            <a:r>
-              <a:rPr lang="en-US" sz="1600" i="1" dirty="0" smtClean="0"/>
-              <a:t>In situ </a:t>
-            </a:r>
-            <a:r>
-              <a:rPr lang="en-US" sz="1600" dirty="0" smtClean="0"/>
-              <a:t>baseline</a:t>
-            </a:r>
-            <a:endParaRPr lang="en-US" sz="1600" dirty="0"/>
-          </a:p>
-        </p:txBody>
-      </p:sp>
-      <p:sp>
-        <p:nvSpPr>
-          <p:cNvPr id="18" name="TextBox 17"/>
-          <p:cNvSpPr txBox="1"/>
-          <p:nvPr/>
-        </p:nvSpPr>
-        <p:spPr>
-          <a:xfrm>
-            <a:off x="3899005" y="3242846"/>
-            <a:ext cx="1345991" cy="338554"/>
-          </a:xfrm>
-          <a:prstGeom prst="rect">
-            <a:avLst/>
-          </a:prstGeom>
-          <a:noFill/>
-        </p:spPr>
-        <p:txBody>
-          <a:bodyPr wrap="none" rtlCol="0">
-            <a:spAutoFit/>
-          </a:bodyPr>
-          <a:lstStyle/>
-          <a:p>
-            <a:r>
-              <a:rPr lang="en-US" sz="1600" i="1" dirty="0" smtClean="0"/>
-              <a:t>In situ </a:t>
-            </a:r>
-            <a:r>
-              <a:rPr lang="en-US" sz="1600" dirty="0" smtClean="0"/>
-              <a:t>refined</a:t>
-            </a:r>
-            <a:endParaRPr lang="en-US" sz="1600" dirty="0"/>
-          </a:p>
-        </p:txBody>
-      </p:sp>
-      <p:sp>
-        <p:nvSpPr>
-          <p:cNvPr id="19" name="TextBox 18"/>
-          <p:cNvSpPr txBox="1"/>
-          <p:nvPr/>
-        </p:nvSpPr>
-        <p:spPr>
-          <a:xfrm>
-            <a:off x="544610" y="5909846"/>
-            <a:ext cx="1972665" cy="338554"/>
-          </a:xfrm>
-          <a:prstGeom prst="rect">
-            <a:avLst/>
-          </a:prstGeom>
-          <a:noFill/>
-        </p:spPr>
-        <p:txBody>
-          <a:bodyPr wrap="none" rtlCol="0">
-            <a:spAutoFit/>
-          </a:bodyPr>
-          <a:lstStyle/>
-          <a:p>
-            <a:r>
-              <a:rPr lang="en-US" sz="1600" i="1" dirty="0" smtClean="0"/>
-              <a:t>In transit </a:t>
-            </a:r>
-            <a:r>
-              <a:rPr lang="en-US" sz="1600" dirty="0" smtClean="0"/>
-              <a:t>extra nodes</a:t>
-            </a:r>
-            <a:endParaRPr lang="en-US" sz="1600" dirty="0"/>
-          </a:p>
-        </p:txBody>
-      </p:sp>
-      <p:sp>
-        <p:nvSpPr>
-          <p:cNvPr id="20" name="TextBox 19"/>
-          <p:cNvSpPr txBox="1"/>
-          <p:nvPr/>
-        </p:nvSpPr>
-        <p:spPr>
-          <a:xfrm>
-            <a:off x="3474259" y="5909846"/>
-            <a:ext cx="2195483" cy="338554"/>
-          </a:xfrm>
-          <a:prstGeom prst="rect">
-            <a:avLst/>
-          </a:prstGeom>
-          <a:noFill/>
-        </p:spPr>
-        <p:txBody>
-          <a:bodyPr wrap="none" rtlCol="0">
-            <a:spAutoFit/>
-          </a:bodyPr>
-          <a:lstStyle/>
-          <a:p>
-            <a:r>
-              <a:rPr lang="en-US" sz="1600" i="1" dirty="0" smtClean="0"/>
-              <a:t>In transit </a:t>
-            </a:r>
-            <a:r>
-              <a:rPr lang="en-US" sz="1600" dirty="0" smtClean="0"/>
-              <a:t>internal nodes</a:t>
-            </a:r>
-            <a:endParaRPr lang="en-US" sz="1600" dirty="0"/>
-          </a:p>
-        </p:txBody>
-      </p:sp>
-      <p:cxnSp>
-        <p:nvCxnSpPr>
-          <p:cNvPr id="15" name="Straight Arrow Connector 14"/>
-          <p:cNvCxnSpPr>
-            <a:stCxn id="14" idx="1"/>
-          </p:cNvCxnSpPr>
-          <p:nvPr/>
-        </p:nvCxnSpPr>
-        <p:spPr>
           <a:xfrm flipH="1">
             <a:off x="5334000" y="5226971"/>
             <a:ext cx="838200" cy="0"/>
@@ -41882,7 +41646,7 @@
 </p:sld>
 </file>
 
-<file path=ppt/slides/slide27.xml><?xml version="1.0" encoding="utf-8"?>
+<file path=ppt/slides/slide26.xml><?xml version="1.0" encoding="utf-8"?>
 <p:sld xmlns:a="http://schemas.openxmlformats.org/drawingml/2006/main" xmlns:r="http://schemas.openxmlformats.org/officeDocument/2006/relationships" xmlns:p="http://schemas.openxmlformats.org/presentationml/2006/main">
   <p:cSld>
     <p:spTree>
@@ -41940,7 +41704,7 @@
             <a:fld id="{A5E55A7B-7854-E145-92D9-B491DF4BAE2D}" type="slidenum">
               <a:rPr lang="en-US" smtClean="0"/>
               <a:pPr/>
-              <a:t>27</a:t>
+              <a:t>26</a:t>
             </a:fld>
             <a:endParaRPr lang="en-US" dirty="0"/>
           </a:p>
@@ -42478,7 +42242,7 @@
 </p:sld>
 </file>
 
-<file path=ppt/slides/slide28.xml><?xml version="1.0" encoding="utf-8"?>
+<file path=ppt/slides/slide27.xml><?xml version="1.0" encoding="utf-8"?>
 <p:sld xmlns:a="http://schemas.openxmlformats.org/drawingml/2006/main" xmlns:r="http://schemas.openxmlformats.org/officeDocument/2006/relationships" xmlns:p="http://schemas.openxmlformats.org/presentationml/2006/main">
   <p:cSld>
     <p:spTree>
@@ -42536,7 +42300,7 @@
             <a:fld id="{A5E55A7B-7854-E145-92D9-B491DF4BAE2D}" type="slidenum">
               <a:rPr lang="en-US" smtClean="0"/>
               <a:pPr/>
-              <a:t>28</a:t>
+              <a:t>27</a:t>
             </a:fld>
             <a:endParaRPr lang="en-US" dirty="0"/>
           </a:p>
@@ -42741,7 +42505,7 @@
 </p:sld>
 </file>
 
-<file path=ppt/slides/slide29.xml><?xml version="1.0" encoding="utf-8"?>
+<file path=ppt/slides/slide28.xml><?xml version="1.0" encoding="utf-8"?>
 <p:sld xmlns:a="http://schemas.openxmlformats.org/drawingml/2006/main" xmlns:r="http://schemas.openxmlformats.org/officeDocument/2006/relationships" xmlns:p="http://schemas.openxmlformats.org/presentationml/2006/main">
   <p:cSld>
     <p:spTree>
@@ -42799,7 +42563,7 @@
             <a:fld id="{A5E55A7B-7854-E145-92D9-B491DF4BAE2D}" type="slidenum">
               <a:rPr lang="en-US" smtClean="0"/>
               <a:pPr/>
-              <a:t>29</a:t>
+              <a:t>28</a:t>
             </a:fld>
             <a:endParaRPr lang="en-US" dirty="0"/>
           </a:p>
@@ -43008,7 +42772,7 @@
 </p:sld>
 </file>
 
-<file path=ppt/slides/slide3.xml><?xml version="1.0" encoding="utf-8"?>
+<file path=ppt/slides/slide29.xml><?xml version="1.0" encoding="utf-8"?>
 <p:sld xmlns:a="http://schemas.openxmlformats.org/drawingml/2006/main" xmlns:r="http://schemas.openxmlformats.org/officeDocument/2006/relationships" xmlns:p="http://schemas.openxmlformats.org/presentationml/2006/main">
   <p:cSld>
     <p:spTree>
@@ -43042,169 +42806,6 @@
           <a:p>
             <a:r>
               <a:rPr lang="en-US" dirty="0" smtClean="0"/>
-              <a:t>The path to Exascale</a:t>
-            </a:r>
-            <a:endParaRPr lang="en-US" dirty="0"/>
-          </a:p>
-        </p:txBody>
-      </p:sp>
-      <p:sp>
-        <p:nvSpPr>
-          <p:cNvPr id="3" name="Content Placeholder 2"/>
-          <p:cNvSpPr>
-            <a:spLocks noGrp="1"/>
-          </p:cNvSpPr>
-          <p:nvPr>
-            <p:ph idx="1"/>
-          </p:nvPr>
-        </p:nvSpPr>
-        <p:spPr/>
-        <p:txBody>
-          <a:bodyPr/>
-          <a:lstStyle/>
-          <a:p>
-            <a:pPr marL="0" indent="0" algn="just">
-              <a:buNone/>
-            </a:pPr>
-            <a:r>
-              <a:rPr lang="en-US" dirty="0" smtClean="0"/>
-              <a:t>Milestone 4745 is an important step in capability development, customer engagement, and scalability development on the path to exascale.  It represents significant work on the development of both </a:t>
-            </a:r>
-            <a:r>
-              <a:rPr lang="en-US" i="1" dirty="0" smtClean="0"/>
-              <a:t>Catalyst</a:t>
-            </a:r>
-            <a:r>
-              <a:rPr lang="en-US" dirty="0" smtClean="0"/>
-              <a:t>, an open source </a:t>
-            </a:r>
-            <a:r>
-              <a:rPr lang="en-US" i="1" dirty="0" smtClean="0"/>
-              <a:t>in situ </a:t>
-            </a:r>
-            <a:r>
-              <a:rPr lang="en-US" dirty="0" smtClean="0"/>
-              <a:t>analysis capability, and </a:t>
-            </a:r>
-            <a:r>
-              <a:rPr lang="en-US" i="1" dirty="0" smtClean="0"/>
-              <a:t>Nessie</a:t>
-            </a:r>
-            <a:r>
-              <a:rPr lang="en-US" dirty="0" smtClean="0"/>
-              <a:t>, an open source data services capability.</a:t>
-            </a:r>
-          </a:p>
-          <a:p>
-            <a:pPr marL="0" indent="0" algn="just">
-              <a:buNone/>
-            </a:pPr>
-            <a:endParaRPr lang="en-US" dirty="0"/>
-          </a:p>
-          <a:p>
-            <a:pPr marL="0" indent="0" algn="just">
-              <a:buNone/>
-            </a:pPr>
-            <a:r>
-              <a:rPr lang="en-US" dirty="0" smtClean="0"/>
-              <a:t>This Milestone is part of an integrated R&amp;D roadmap aimed at characterizing, understanding, and promoting solutions for complex analysis problems on advanced architectures.</a:t>
-            </a:r>
-          </a:p>
-          <a:p>
-            <a:pPr marL="0" indent="0" algn="just">
-              <a:buNone/>
-            </a:pPr>
-            <a:endParaRPr lang="en-US" dirty="0"/>
-          </a:p>
-          <a:p>
-            <a:pPr marL="0" indent="0" algn="just">
-              <a:buNone/>
-            </a:pPr>
-            <a:r>
-              <a:rPr lang="en-US" dirty="0" smtClean="0"/>
-              <a:t>It is an important foundation step in developing cross-cutting capabilities.</a:t>
-            </a:r>
-          </a:p>
-        </p:txBody>
-      </p:sp>
-      <p:sp>
-        <p:nvSpPr>
-          <p:cNvPr id="4" name="Slide Number Placeholder 3"/>
-          <p:cNvSpPr>
-            <a:spLocks noGrp="1"/>
-          </p:cNvSpPr>
-          <p:nvPr>
-            <p:ph type="sldNum" sz="quarter" idx="12"/>
-          </p:nvPr>
-        </p:nvSpPr>
-        <p:spPr/>
-        <p:txBody>
-          <a:bodyPr/>
-          <a:lstStyle/>
-          <a:p>
-            <a:fld id="{A5E55A7B-7854-E145-92D9-B491DF4BAE2D}" type="slidenum">
-              <a:rPr lang="en-US" smtClean="0"/>
-              <a:pPr/>
-              <a:t>3</a:t>
-            </a:fld>
-            <a:endParaRPr lang="en-US" dirty="0"/>
-          </a:p>
-        </p:txBody>
-      </p:sp>
-    </p:spTree>
-    <p:extLst>
-      <p:ext uri="{BB962C8B-B14F-4D97-AF65-F5344CB8AC3E}">
-        <p14:creationId xmlns:p14="http://schemas.microsoft.com/office/powerpoint/2010/main" val="3101572851"/>
-      </p:ext>
-    </p:extLst>
-  </p:cSld>
-  <p:clrMapOvr>
-    <a:masterClrMapping/>
-  </p:clrMapOvr>
-  <p:timing>
-    <p:tnLst>
-      <p:par>
-        <p:cTn xmlns:p14="http://schemas.microsoft.com/office/powerpoint/2010/main" id="1" dur="indefinite" restart="never" nodeType="tmRoot"/>
-      </p:par>
-    </p:tnLst>
-  </p:timing>
-</p:sld>
-</file>
-
-<file path=ppt/slides/slide30.xml><?xml version="1.0" encoding="utf-8"?>
-<p:sld xmlns:a="http://schemas.openxmlformats.org/drawingml/2006/main" xmlns:r="http://schemas.openxmlformats.org/officeDocument/2006/relationships" xmlns:p="http://schemas.openxmlformats.org/presentationml/2006/main">
-  <p:cSld>
-    <p:spTree>
-      <p:nvGrpSpPr>
-        <p:cNvPr id="1" name=""/>
-        <p:cNvGrpSpPr/>
-        <p:nvPr/>
-      </p:nvGrpSpPr>
-      <p:grpSpPr>
-        <a:xfrm>
-          <a:off x="0" y="0"/>
-          <a:ext cx="0" cy="0"/>
-          <a:chOff x="0" y="0"/>
-          <a:chExt cx="0" cy="0"/>
-        </a:xfrm>
-      </p:grpSpPr>
-      <p:sp>
-        <p:nvSpPr>
-          <p:cNvPr id="2" name="Title 1"/>
-          <p:cNvSpPr>
-            <a:spLocks noGrp="1"/>
-          </p:cNvSpPr>
-          <p:nvPr>
-            <p:ph type="title"/>
-          </p:nvPr>
-        </p:nvSpPr>
-        <p:spPr/>
-        <p:txBody>
-          <a:bodyPr/>
-          <a:lstStyle/>
-          <a:p>
-            <a:r>
-              <a:rPr lang="en-US" dirty="0" smtClean="0"/>
               <a:t>Time-Series Analysis: Variance</a:t>
             </a:r>
             <a:endParaRPr lang="en-US" dirty="0"/>
@@ -43229,7 +42830,7 @@
             <a:fld id="{A5E55A7B-7854-E145-92D9-B491DF4BAE2D}" type="slidenum">
               <a:rPr lang="en-US" smtClean="0"/>
               <a:pPr/>
-              <a:t>30</a:t>
+              <a:t>29</a:t>
             </a:fld>
             <a:endParaRPr lang="en-US" dirty="0"/>
           </a:p>
@@ -43608,7 +43209,7 @@
 </p:sld>
 </file>
 
-<file path=ppt/slides/slide31.xml><?xml version="1.0" encoding="utf-8"?>
+<file path=ppt/slides/slide3.xml><?xml version="1.0" encoding="utf-8"?>
 <p:sld xmlns:a="http://schemas.openxmlformats.org/drawingml/2006/main" xmlns:r="http://schemas.openxmlformats.org/officeDocument/2006/relationships" xmlns:p="http://schemas.openxmlformats.org/presentationml/2006/main">
   <p:cSld>
     <p:spTree>
@@ -43642,6 +43243,169 @@
           <a:p>
             <a:r>
               <a:rPr lang="en-US" dirty="0" smtClean="0"/>
+              <a:t>The path to Exascale</a:t>
+            </a:r>
+            <a:endParaRPr lang="en-US" dirty="0"/>
+          </a:p>
+        </p:txBody>
+      </p:sp>
+      <p:sp>
+        <p:nvSpPr>
+          <p:cNvPr id="3" name="Content Placeholder 2"/>
+          <p:cNvSpPr>
+            <a:spLocks noGrp="1"/>
+          </p:cNvSpPr>
+          <p:nvPr>
+            <p:ph idx="1"/>
+          </p:nvPr>
+        </p:nvSpPr>
+        <p:spPr/>
+        <p:txBody>
+          <a:bodyPr/>
+          <a:lstStyle/>
+          <a:p>
+            <a:pPr marL="0" indent="0" algn="just">
+              <a:buNone/>
+            </a:pPr>
+            <a:r>
+              <a:rPr lang="en-US" dirty="0" smtClean="0"/>
+              <a:t>Milestone 4745 is an important step in capability development, customer engagement, and scalability development on the path to exascale.  It represents significant work on the development of both </a:t>
+            </a:r>
+            <a:r>
+              <a:rPr lang="en-US" i="1" dirty="0" smtClean="0"/>
+              <a:t>Catalyst</a:t>
+            </a:r>
+            <a:r>
+              <a:rPr lang="en-US" dirty="0" smtClean="0"/>
+              <a:t>, an open source </a:t>
+            </a:r>
+            <a:r>
+              <a:rPr lang="en-US" i="1" dirty="0" smtClean="0"/>
+              <a:t>in situ </a:t>
+            </a:r>
+            <a:r>
+              <a:rPr lang="en-US" dirty="0" smtClean="0"/>
+              <a:t>analysis capability, and </a:t>
+            </a:r>
+            <a:r>
+              <a:rPr lang="en-US" i="1" dirty="0" smtClean="0"/>
+              <a:t>Nessie</a:t>
+            </a:r>
+            <a:r>
+              <a:rPr lang="en-US" dirty="0" smtClean="0"/>
+              <a:t>, an open source data services capability.</a:t>
+            </a:r>
+          </a:p>
+          <a:p>
+            <a:pPr marL="0" indent="0" algn="just">
+              <a:buNone/>
+            </a:pPr>
+            <a:endParaRPr lang="en-US" dirty="0"/>
+          </a:p>
+          <a:p>
+            <a:pPr marL="0" indent="0" algn="just">
+              <a:buNone/>
+            </a:pPr>
+            <a:r>
+              <a:rPr lang="en-US" dirty="0" smtClean="0"/>
+              <a:t>This Milestone is part of an integrated R&amp;D roadmap aimed at characterizing, understanding, and promoting solutions for complex analysis problems on advanced architectures.</a:t>
+            </a:r>
+          </a:p>
+          <a:p>
+            <a:pPr marL="0" indent="0" algn="just">
+              <a:buNone/>
+            </a:pPr>
+            <a:endParaRPr lang="en-US" dirty="0"/>
+          </a:p>
+          <a:p>
+            <a:pPr marL="0" indent="0" algn="just">
+              <a:buNone/>
+            </a:pPr>
+            <a:r>
+              <a:rPr lang="en-US" dirty="0" smtClean="0"/>
+              <a:t>It is an important foundation step in developing cross-cutting capabilities.</a:t>
+            </a:r>
+          </a:p>
+        </p:txBody>
+      </p:sp>
+      <p:sp>
+        <p:nvSpPr>
+          <p:cNvPr id="4" name="Slide Number Placeholder 3"/>
+          <p:cNvSpPr>
+            <a:spLocks noGrp="1"/>
+          </p:cNvSpPr>
+          <p:nvPr>
+            <p:ph type="sldNum" sz="quarter" idx="12"/>
+          </p:nvPr>
+        </p:nvSpPr>
+        <p:spPr/>
+        <p:txBody>
+          <a:bodyPr/>
+          <a:lstStyle/>
+          <a:p>
+            <a:fld id="{A5E55A7B-7854-E145-92D9-B491DF4BAE2D}" type="slidenum">
+              <a:rPr lang="en-US" smtClean="0"/>
+              <a:pPr/>
+              <a:t>3</a:t>
+            </a:fld>
+            <a:endParaRPr lang="en-US" dirty="0"/>
+          </a:p>
+        </p:txBody>
+      </p:sp>
+    </p:spTree>
+    <p:extLst>
+      <p:ext uri="{BB962C8B-B14F-4D97-AF65-F5344CB8AC3E}">
+        <p14:creationId xmlns:p14="http://schemas.microsoft.com/office/powerpoint/2010/main" val="3101572851"/>
+      </p:ext>
+    </p:extLst>
+  </p:cSld>
+  <p:clrMapOvr>
+    <a:masterClrMapping/>
+  </p:clrMapOvr>
+  <p:timing>
+    <p:tnLst>
+      <p:par>
+        <p:cTn xmlns:p14="http://schemas.microsoft.com/office/powerpoint/2010/main" id="1" dur="indefinite" restart="never" nodeType="tmRoot"/>
+      </p:par>
+    </p:tnLst>
+  </p:timing>
+</p:sld>
+</file>
+
+<file path=ppt/slides/slide30.xml><?xml version="1.0" encoding="utf-8"?>
+<p:sld xmlns:a="http://schemas.openxmlformats.org/drawingml/2006/main" xmlns:r="http://schemas.openxmlformats.org/officeDocument/2006/relationships" xmlns:p="http://schemas.openxmlformats.org/presentationml/2006/main">
+  <p:cSld>
+    <p:spTree>
+      <p:nvGrpSpPr>
+        <p:cNvPr id="1" name=""/>
+        <p:cNvGrpSpPr/>
+        <p:nvPr/>
+      </p:nvGrpSpPr>
+      <p:grpSpPr>
+        <a:xfrm>
+          <a:off x="0" y="0"/>
+          <a:ext cx="0" cy="0"/>
+          <a:chOff x="0" y="0"/>
+          <a:chExt cx="0" cy="0"/>
+        </a:xfrm>
+      </p:grpSpPr>
+      <p:sp>
+        <p:nvSpPr>
+          <p:cNvPr id="2" name="Title 1"/>
+          <p:cNvSpPr>
+            <a:spLocks noGrp="1"/>
+          </p:cNvSpPr>
+          <p:nvPr>
+            <p:ph type="title"/>
+          </p:nvPr>
+        </p:nvSpPr>
+        <p:spPr/>
+        <p:txBody>
+          <a:bodyPr/>
+          <a:lstStyle/>
+          <a:p>
+            <a:r>
+              <a:rPr lang="en-US" dirty="0" smtClean="0"/>
               <a:t>Block Processing Rate (Viz)</a:t>
             </a:r>
             <a:endParaRPr lang="en-US" dirty="0"/>
@@ -43666,7 +43430,7 @@
             <a:fld id="{A5E55A7B-7854-E145-92D9-B491DF4BAE2D}" type="slidenum">
               <a:rPr lang="en-US" smtClean="0"/>
               <a:pPr/>
-              <a:t>31</a:t>
+              <a:t>30</a:t>
             </a:fld>
             <a:endParaRPr lang="en-US" dirty="0"/>
           </a:p>
@@ -43863,7 +43627,7 @@
 </p:sld>
 </file>
 
-<file path=ppt/slides/slide32.xml><?xml version="1.0" encoding="utf-8"?>
+<file path=ppt/slides/slide31.xml><?xml version="1.0" encoding="utf-8"?>
 <p:sld xmlns:a="http://schemas.openxmlformats.org/drawingml/2006/main" xmlns:r="http://schemas.openxmlformats.org/officeDocument/2006/relationships" xmlns:p="http://schemas.openxmlformats.org/presentationml/2006/main">
   <p:cSld>
     <p:spTree>
@@ -43925,7 +43689,7 @@
             <a:fld id="{A5E55A7B-7854-E145-92D9-B491DF4BAE2D}" type="slidenum">
               <a:rPr lang="en-US" smtClean="0"/>
               <a:pPr/>
-              <a:t>32</a:t>
+              <a:t>31</a:t>
             </a:fld>
             <a:endParaRPr lang="en-US" dirty="0"/>
           </a:p>
@@ -44445,7 +44209,7 @@
 </p:sld>
 </file>
 
-<file path=ppt/slides/slide33.xml><?xml version="1.0" encoding="utf-8"?>
+<file path=ppt/slides/slide32.xml><?xml version="1.0" encoding="utf-8"?>
 <p:sld xmlns:a="http://schemas.openxmlformats.org/drawingml/2006/main" xmlns:r="http://schemas.openxmlformats.org/officeDocument/2006/relationships" xmlns:p="http://schemas.openxmlformats.org/presentationml/2006/main">
   <p:cSld>
     <p:spTree>
@@ -44480,7 +44244,7 @@
             <a:fld id="{A5E55A7B-7854-E145-92D9-B491DF4BAE2D}" type="slidenum">
               <a:rPr lang="en-US" smtClean="0"/>
               <a:pPr/>
-              <a:t>33</a:t>
+              <a:t>32</a:t>
             </a:fld>
             <a:endParaRPr lang="en-US" dirty="0"/>
           </a:p>
@@ -44769,7 +44533,7 @@
 </p:sld>
 </file>
 
-<file path=ppt/slides/slide34.xml><?xml version="1.0" encoding="utf-8"?>
+<file path=ppt/slides/slide33.xml><?xml version="1.0" encoding="utf-8"?>
 <p:sld xmlns:a="http://schemas.openxmlformats.org/drawingml/2006/main" xmlns:r="http://schemas.openxmlformats.org/officeDocument/2006/relationships" xmlns:p="http://schemas.openxmlformats.org/presentationml/2006/main">
   <p:cSld>
     <p:spTree>
@@ -44827,7 +44591,7 @@
             <a:fld id="{A5E55A7B-7854-E145-92D9-B491DF4BAE2D}" type="slidenum">
               <a:rPr lang="en-US" smtClean="0"/>
               <a:pPr/>
-              <a:t>34</a:t>
+              <a:t>33</a:t>
             </a:fld>
             <a:endParaRPr lang="en-US" dirty="0"/>
           </a:p>
@@ -44954,7 +44718,7 @@
 </p:sld>
 </file>
 
-<file path=ppt/slides/slide35.xml><?xml version="1.0" encoding="utf-8"?>
+<file path=ppt/slides/slide34.xml><?xml version="1.0" encoding="utf-8"?>
 <p:sld xmlns:a="http://schemas.openxmlformats.org/drawingml/2006/main" xmlns:r="http://schemas.openxmlformats.org/officeDocument/2006/relationships" xmlns:p="http://schemas.openxmlformats.org/presentationml/2006/main">
   <p:cSld>
     <p:spTree>
@@ -45012,7 +44776,7 @@
             <a:fld id="{A5E55A7B-7854-E145-92D9-B491DF4BAE2D}" type="slidenum">
               <a:rPr lang="en-US" smtClean="0"/>
               <a:pPr/>
-              <a:t>35</a:t>
+              <a:t>34</a:t>
             </a:fld>
             <a:endParaRPr lang="en-US" dirty="0"/>
           </a:p>
@@ -45150,7 +44914,7 @@
 </p:sld>
 </file>
 
-<file path=ppt/slides/slide36.xml><?xml version="1.0" encoding="utf-8"?>
+<file path=ppt/slides/slide35.xml><?xml version="1.0" encoding="utf-8"?>
 <p:sld xmlns:a="http://schemas.openxmlformats.org/drawingml/2006/main" xmlns:r="http://schemas.openxmlformats.org/officeDocument/2006/relationships" xmlns:p="http://schemas.openxmlformats.org/presentationml/2006/main">
   <p:cSld>
     <p:spTree>
@@ -45208,7 +44972,7 @@
             <a:fld id="{A5E55A7B-7854-E145-92D9-B491DF4BAE2D}" type="slidenum">
               <a:rPr lang="en-US" smtClean="0"/>
               <a:pPr/>
-              <a:t>36</a:t>
+              <a:t>35</a:t>
             </a:fld>
             <a:endParaRPr lang="en-US" dirty="0"/>
           </a:p>
@@ -45320,7 +45084,7 @@
 </p:sld>
 </file>
 
-<file path=ppt/slides/slide37.xml><?xml version="1.0" encoding="utf-8"?>
+<file path=ppt/slides/slide36.xml><?xml version="1.0" encoding="utf-8"?>
 <p:sld xmlns:a="http://schemas.openxmlformats.org/drawingml/2006/main" xmlns:r="http://schemas.openxmlformats.org/officeDocument/2006/relationships" xmlns:p="http://schemas.openxmlformats.org/presentationml/2006/main">
   <p:cSld>
     <p:spTree>
@@ -45384,7 +45148,7 @@
             <a:fld id="{A5E55A7B-7854-E145-92D9-B491DF4BAE2D}" type="slidenum">
               <a:rPr lang="en-US" smtClean="0"/>
               <a:pPr/>
-              <a:t>37</a:t>
+              <a:t>36</a:t>
             </a:fld>
             <a:endParaRPr lang="en-US" dirty="0"/>
           </a:p>
@@ -45394,6 +45158,206 @@
     <p:extLst>
       <p:ext uri="{BB962C8B-B14F-4D97-AF65-F5344CB8AC3E}">
         <p14:creationId xmlns:p14="http://schemas.microsoft.com/office/powerpoint/2010/main" val="2454360268"/>
+      </p:ext>
+    </p:extLst>
+  </p:cSld>
+  <p:clrMapOvr>
+    <a:masterClrMapping/>
+  </p:clrMapOvr>
+  <p:timing>
+    <p:tnLst>
+      <p:par>
+        <p:cTn xmlns:p14="http://schemas.microsoft.com/office/powerpoint/2010/main" id="1" dur="indefinite" restart="never" nodeType="tmRoot"/>
+      </p:par>
+    </p:tnLst>
+  </p:timing>
+</p:sld>
+</file>
+
+<file path=ppt/slides/slide37.xml><?xml version="1.0" encoding="utf-8"?>
+<p:sld xmlns:a="http://schemas.openxmlformats.org/drawingml/2006/main" xmlns:r="http://schemas.openxmlformats.org/officeDocument/2006/relationships" xmlns:p="http://schemas.openxmlformats.org/presentationml/2006/main">
+  <p:cSld>
+    <p:spTree>
+      <p:nvGrpSpPr>
+        <p:cNvPr id="1" name=""/>
+        <p:cNvGrpSpPr/>
+        <p:nvPr/>
+      </p:nvGrpSpPr>
+      <p:grpSpPr>
+        <a:xfrm>
+          <a:off x="0" y="0"/>
+          <a:ext cx="0" cy="0"/>
+          <a:chOff x="0" y="0"/>
+          <a:chExt cx="0" cy="0"/>
+        </a:xfrm>
+      </p:grpSpPr>
+      <p:sp>
+        <p:nvSpPr>
+          <p:cNvPr id="2" name="Title 1"/>
+          <p:cNvSpPr>
+            <a:spLocks noGrp="1"/>
+          </p:cNvSpPr>
+          <p:nvPr>
+            <p:ph type="title"/>
+          </p:nvPr>
+        </p:nvSpPr>
+        <p:spPr/>
+        <p:txBody>
+          <a:bodyPr/>
+          <a:lstStyle/>
+          <a:p>
+            <a:r>
+              <a:rPr lang="en-US" dirty="0" smtClean="0"/>
+              <a:t>Conclusions</a:t>
+            </a:r>
+            <a:endParaRPr lang="en-US" dirty="0"/>
+          </a:p>
+        </p:txBody>
+      </p:sp>
+      <p:sp>
+        <p:nvSpPr>
+          <p:cNvPr id="3" name="Content Placeholder 2"/>
+          <p:cNvSpPr>
+            <a:spLocks noGrp="1"/>
+          </p:cNvSpPr>
+          <p:nvPr>
+            <p:ph idx="1"/>
+          </p:nvPr>
+        </p:nvSpPr>
+        <p:spPr/>
+        <p:txBody>
+          <a:bodyPr/>
+          <a:lstStyle/>
+          <a:p>
+            <a:pPr marL="0" indent="0" algn="just">
+              <a:buNone/>
+            </a:pPr>
+            <a:r>
+              <a:rPr lang="en-US" sz="1800" b="1" i="1" dirty="0"/>
+              <a:t>In transit </a:t>
+            </a:r>
+            <a:r>
+              <a:rPr lang="en-US" sz="1800" b="1" dirty="0"/>
+              <a:t>can provide a performance improvement over </a:t>
+            </a:r>
+            <a:r>
+              <a:rPr lang="en-US" sz="1800" b="1" i="1" dirty="0"/>
+              <a:t>in situ</a:t>
+            </a:r>
+            <a:r>
+              <a:rPr lang="en-US" sz="1800" b="1" dirty="0"/>
+              <a:t> in some </a:t>
+            </a:r>
+            <a:r>
+              <a:rPr lang="en-US" sz="1800" b="1" dirty="0" smtClean="0"/>
+              <a:t>circumstances</a:t>
+            </a:r>
+            <a:r>
+              <a:rPr lang="en-US" sz="1800" b="1" dirty="0"/>
+              <a:t>, but the window is </a:t>
+            </a:r>
+            <a:r>
+              <a:rPr lang="en-US" sz="1800" b="1" dirty="0" smtClean="0"/>
+              <a:t>narrower </a:t>
+            </a:r>
+            <a:r>
+              <a:rPr lang="en-US" sz="1800" b="1" dirty="0"/>
+              <a:t>than we initially </a:t>
+            </a:r>
+            <a:r>
+              <a:rPr lang="en-US" sz="1800" b="1" dirty="0" smtClean="0"/>
+              <a:t>expected it would be. </a:t>
+            </a:r>
+          </a:p>
+          <a:p>
+            <a:pPr marL="0" indent="0" algn="just">
+              <a:buNone/>
+            </a:pPr>
+            <a:endParaRPr lang="en-US" sz="1800" dirty="0" smtClean="0"/>
+          </a:p>
+          <a:p>
+            <a:pPr marL="0" indent="0" algn="just">
+              <a:buNone/>
+            </a:pPr>
+            <a:r>
+              <a:rPr lang="en-US" sz="1800" i="1" dirty="0" smtClean="0"/>
+              <a:t>In transit</a:t>
+            </a:r>
+            <a:r>
+              <a:rPr lang="en-US" sz="1800" dirty="0" smtClean="0"/>
+              <a:t> analysis has an added overhead above embedded </a:t>
+            </a:r>
+            <a:r>
+              <a:rPr lang="en-US" sz="1800" i="1" dirty="0" smtClean="0"/>
+              <a:t>in situ</a:t>
+            </a:r>
+            <a:r>
+              <a:rPr lang="en-US" sz="1800" dirty="0" smtClean="0"/>
+              <a:t> analysis involving transferring data between parallel jobs. Given an analysis with perfect linear scalability, we suspect </a:t>
+            </a:r>
+            <a:r>
+              <a:rPr lang="en-US" sz="1800" i="1" dirty="0" smtClean="0"/>
+              <a:t>in transit</a:t>
+            </a:r>
+            <a:r>
+              <a:rPr lang="en-US" sz="1800" dirty="0" smtClean="0"/>
+              <a:t> workflows will always have an added cost, and our results support this. With an analysis that does not scale perfectly, possibly due to communication overhead, it is theoretically possible for </a:t>
+            </a:r>
+            <a:r>
+              <a:rPr lang="en-US" sz="1800" i="1" dirty="0" smtClean="0"/>
+              <a:t>in transit</a:t>
+            </a:r>
+            <a:r>
+              <a:rPr lang="en-US" sz="1800" dirty="0" smtClean="0"/>
+              <a:t> to be faster by reducing the size of the analysis job. This is one of the motivations for choosing an analysis task that requires significant communication. In our results, we do find instances where </a:t>
+            </a:r>
+            <a:r>
+              <a:rPr lang="en-US" sz="1800" i="1" dirty="0" smtClean="0"/>
+              <a:t>in transit</a:t>
+            </a:r>
+            <a:r>
+              <a:rPr lang="en-US" sz="1800" dirty="0" smtClean="0"/>
+              <a:t> is faster, but by a smaller margin and for fewer configurations than we initially anticipated. So although </a:t>
+            </a:r>
+            <a:r>
+              <a:rPr lang="en-US" sz="1800" i="1" dirty="0" smtClean="0"/>
+              <a:t>in transit</a:t>
+            </a:r>
+            <a:r>
+              <a:rPr lang="en-US" sz="1800" dirty="0" smtClean="0"/>
+              <a:t> has several other positive features, we do not anticipate performance to be the main motivations for using it.</a:t>
+            </a:r>
+          </a:p>
+        </p:txBody>
+      </p:sp>
+      <p:sp>
+        <p:nvSpPr>
+          <p:cNvPr id="4" name="Slide Number Placeholder 3"/>
+          <p:cNvSpPr>
+            <a:spLocks noGrp="1"/>
+          </p:cNvSpPr>
+          <p:nvPr>
+            <p:ph type="sldNum" sz="quarter" idx="12"/>
+          </p:nvPr>
+        </p:nvSpPr>
+        <p:spPr/>
+        <p:txBody>
+          <a:bodyPr/>
+          <a:lstStyle/>
+          <a:p>
+            <a:fld id="{A5E55A7B-7854-E145-92D9-B491DF4BAE2D}" type="slidenum">
+              <a:rPr lang="en-US" smtClean="0"/>
+              <a:pPr/>
+              <a:t>37</a:t>
+            </a:fld>
+            <a:endParaRPr lang="en-US" dirty="0"/>
+          </a:p>
+        </p:txBody>
+      </p:sp>
+    </p:spTree>
+    <p:extLst>
+      <p:ext uri="{BB962C8B-B14F-4D97-AF65-F5344CB8AC3E}">
+        <p14:creationId xmlns:p14="http://schemas.microsoft.com/office/powerpoint/2010/main" val="3340254881"/>
       </p:ext>
     </p:extLst>
   </p:cSld>
@@ -45469,100 +45433,36 @@
               <a:buNone/>
             </a:pPr>
             <a:r>
+              <a:rPr lang="en-US" sz="1800" b="1" dirty="0"/>
+              <a:t>The efficiency of </a:t>
+            </a:r>
+            <a:r>
               <a:rPr lang="en-US" sz="1800" b="1" i="1" dirty="0"/>
-              <a:t>In transit </a:t>
+              <a:t>in transit </a:t>
             </a:r>
             <a:r>
               <a:rPr lang="en-US" sz="1800" b="1" dirty="0"/>
-              <a:t>can provide a performance improvement over </a:t>
-            </a:r>
-            <a:r>
-              <a:rPr lang="en-US" sz="1800" b="1" i="1" dirty="0"/>
-              <a:t>in situ</a:t>
-            </a:r>
-            <a:r>
-              <a:rPr lang="en-US" sz="1800" b="1" dirty="0"/>
-              <a:t> in some </a:t>
-            </a:r>
-            <a:r>
-              <a:rPr lang="en-US" sz="1800" b="1" dirty="0" smtClean="0"/>
-              <a:t>circumstances</a:t>
-            </a:r>
-            <a:r>
-              <a:rPr lang="en-US" sz="1800" b="1" dirty="0"/>
-              <a:t>, but the window is </a:t>
-            </a:r>
-            <a:r>
-              <a:rPr lang="en-US" sz="1800" b="1" dirty="0" smtClean="0"/>
-              <a:t>narrower </a:t>
-            </a:r>
-            <a:r>
-              <a:rPr lang="en-US" sz="1800" b="1" dirty="0"/>
-              <a:t>than we initially </a:t>
-            </a:r>
-            <a:r>
-              <a:rPr lang="en-US" sz="1800" b="1" dirty="0" smtClean="0"/>
-              <a:t>expected it would be. </a:t>
-            </a:r>
+              <a:t>relies on balancing the time spent in simulation and analysis.</a:t>
+            </a:r>
+            <a:endParaRPr lang="en-US" sz="1800" dirty="0" smtClean="0"/>
           </a:p>
           <a:p>
             <a:pPr marL="0" indent="0" algn="just">
               <a:buNone/>
             </a:pPr>
+            <a:r>
+              <a:rPr lang="en-US" sz="1800" dirty="0"/>
+              <a:t>The significant overhead cost, apart from data transfer, in the </a:t>
+            </a:r>
+            <a:r>
+              <a:rPr lang="en-US" sz="1800" i="1" dirty="0"/>
+              <a:t>in transit </a:t>
+            </a:r>
+            <a:r>
+              <a:rPr lang="en-US" sz="1800" dirty="0"/>
+              <a:t>workflow is the idle time spent in the simulation waiting for the visualization and data analysis service to become ready or the idle time spent in the visualization and data analysis service waiting for the simulation to send more data. This idle waiting time is minimized when the simulation and analysis spend the same amount of wall clock time between transfers. Although not demonstrated in this work, it is possible to “auto-balance” the work between simulation and analysis by, at every iteration of the simulation, transfer data to the analysis if and only if the analysis service is ready to accept more work. The disadvantage of such an approach is that the idle process time could be replaced with unnecessary extra analysis or less analysis than necessary. However, we suspect that controlling the amount of visualization and data analysis performed through job allocation sizes fits well with users’ rules of thumb about resource allocation.</a:t>
+            </a:r>
             <a:endParaRPr lang="en-US" sz="1800" dirty="0" smtClean="0"/>
-          </a:p>
-          <a:p>
-            <a:pPr marL="0" indent="0" algn="just">
-              <a:buNone/>
-            </a:pPr>
-            <a:r>
-              <a:rPr lang="en-US" sz="1800" i="1" dirty="0" smtClean="0"/>
-              <a:t>In transit</a:t>
-            </a:r>
-            <a:r>
-              <a:rPr lang="en-US" sz="1800" dirty="0" smtClean="0"/>
-              <a:t> analysis has an added overhead above embedded </a:t>
-            </a:r>
-            <a:r>
-              <a:rPr lang="en-US" sz="1800" i="1" dirty="0" smtClean="0"/>
-              <a:t>in situ</a:t>
-            </a:r>
-            <a:r>
-              <a:rPr lang="en-US" sz="1800" dirty="0" smtClean="0"/>
-              <a:t> analysis involving transferring data between parallel jobs. Given an analysis with perfect linear scalability, we suspect </a:t>
-            </a:r>
-            <a:r>
-              <a:rPr lang="en-US" sz="1800" i="1" dirty="0" smtClean="0"/>
-              <a:t>in transit</a:t>
-            </a:r>
-            <a:r>
-              <a:rPr lang="en-US" sz="1800" dirty="0" smtClean="0"/>
-              <a:t> workflows will always have an added cost, and our results support this. With an analysis that does not scale perfectly, possibly due to communication overhead, it is theoretically possible for </a:t>
-            </a:r>
-            <a:r>
-              <a:rPr lang="en-US" sz="1800" i="1" dirty="0" smtClean="0"/>
-              <a:t>in transit</a:t>
-            </a:r>
-            <a:r>
-              <a:rPr lang="en-US" sz="1800" dirty="0" smtClean="0"/>
-              <a:t> to be faster by reducing the size of the analysis job. This is one of the motivations for choosing an analysis task that requires significant communication. In our results, we do find instances where </a:t>
-            </a:r>
-            <a:r>
-              <a:rPr lang="en-US" sz="1800" i="1" dirty="0" smtClean="0"/>
-              <a:t>in transit</a:t>
-            </a:r>
-            <a:r>
-              <a:rPr lang="en-US" sz="1800" dirty="0" smtClean="0"/>
-              <a:t> is faster, but by a smaller margin and for fewer configurations than we initially anticipated. So although </a:t>
-            </a:r>
-            <a:r>
-              <a:rPr lang="en-US" sz="1800" i="1" dirty="0" smtClean="0"/>
-              <a:t>in transit</a:t>
-            </a:r>
-            <a:r>
-              <a:rPr lang="en-US" sz="1800" dirty="0" smtClean="0"/>
-              <a:t> has several other positive features, we do not anticipate performance to be the main motivations for using it.</a:t>
-            </a:r>
           </a:p>
         </p:txBody>
       </p:sp>
@@ -45593,7 +45493,7 @@
     </p:spTree>
     <p:extLst>
       <p:ext uri="{BB962C8B-B14F-4D97-AF65-F5344CB8AC3E}">
-        <p14:creationId xmlns:p14="http://schemas.microsoft.com/office/powerpoint/2010/main" val="3340254881"/>
+        <p14:creationId xmlns:p14="http://schemas.microsoft.com/office/powerpoint/2010/main" val="1537622542"/>
       </p:ext>
     </p:extLst>
   </p:cSld>
@@ -45670,33 +45570,67 @@
             </a:pPr>
             <a:r>
               <a:rPr lang="en-US" sz="1800" b="1" dirty="0"/>
-              <a:t>The efficiency of </a:t>
-            </a:r>
-            <a:r>
-              <a:rPr lang="en-US" sz="1800" b="1" i="1" dirty="0"/>
-              <a:t>in transit </a:t>
-            </a:r>
-            <a:r>
-              <a:rPr lang="en-US" sz="1800" b="1" dirty="0"/>
-              <a:t>relies on balancing the time spent in simulation and analysis.</a:t>
-            </a:r>
-            <a:endParaRPr lang="en-US" sz="1800" dirty="0" smtClean="0"/>
+              <a:t>Memory overhead will be an important trade-off space.	</a:t>
+            </a:r>
+            <a:endParaRPr lang="en-US" sz="1800" b="1" dirty="0" smtClean="0"/>
           </a:p>
           <a:p>
             <a:pPr marL="0" indent="0" algn="just">
               <a:buNone/>
             </a:pPr>
+            <a:endParaRPr lang="en-US" sz="1800" dirty="0"/>
+          </a:p>
+          <a:p>
+            <a:pPr marL="0" indent="0" algn="just">
+              <a:buNone/>
+            </a:pPr>
+            <a:r>
+              <a:rPr lang="en-US" sz="1800" dirty="0" smtClean="0"/>
+              <a:t>The </a:t>
+            </a:r>
             <a:r>
               <a:rPr lang="en-US" sz="1800" dirty="0"/>
-              <a:t>The significant overhead cost, apart from data transfer, in the </a:t>
+              <a:t>baseline amount of memory added to the CTH job to perform </a:t>
             </a:r>
             <a:r>
               <a:rPr lang="en-US" sz="1800" i="1" dirty="0"/>
-              <a:t>in transit </a:t>
+              <a:t>in situ</a:t>
             </a:r>
             <a:r>
               <a:rPr lang="en-US" sz="1800" dirty="0"/>
-              <a:t>workflow is the idle time spent in the simulation waiting for the visualization and data analysis service to become ready or the idle time spent in the visualization and data analysis service waiting for the simulation to send more data. This idle waiting time is minimized when the simulation and analysis spend the same amount of wall clock time between transfers. Although not demonstrated in this work, it is possible to “auto-balance” the work between simulation and analysis by, at every iteration of the simulation, transfer data to the analysis if and only if the analysis service is ready to accept more work. The disadvantage of such an approach is that the idle process time could be replaced with unnecessary extra analysis or less analysis than necessary. However, we suspect that controlling the amount of visualization and data analysis performed through job allocation sizes fits well with users’ rules of thumb about resource allocation.</a:t>
+              <a:t> processing is roughly 100MB per core. Considering that our embedded </a:t>
+            </a:r>
+            <a:r>
+              <a:rPr lang="en-US" sz="1800" i="1" dirty="0"/>
+              <a:t>in situ</a:t>
+            </a:r>
+            <a:r>
+              <a:rPr lang="en-US" sz="1800" dirty="0"/>
+              <a:t> library is a fully featured visualization toolkit </a:t>
+            </a:r>
+            <a:r>
+              <a:rPr lang="en-US" sz="1800" dirty="0" smtClean="0"/>
+              <a:t>containing </a:t>
+            </a:r>
+            <a:r>
+              <a:rPr lang="en-US" sz="1800" dirty="0"/>
+              <a:t>over 2 million lines of code and algorithms developed over almost 2 decades, this overhead is not unreasonable. Nevertheless, this footprint can be problematic for </a:t>
+            </a:r>
+            <a:r>
+              <a:rPr lang="en-US" sz="1800" dirty="0" smtClean="0"/>
+              <a:t>simulations </a:t>
+            </a:r>
+            <a:r>
+              <a:rPr lang="en-US" sz="1800" dirty="0"/>
+              <a:t>already tight on memory. Because of this, efforts are already underway to improve our memory footprint by making finer modules and being more selective on the available algorithms. This, of course, requires a compromise between the size of the library and the algorithms that are dynamically available. We also note that our algorithm has the </a:t>
+            </a:r>
+            <a:r>
+              <a:rPr lang="en-US" sz="1800" dirty="0" smtClean="0"/>
+              <a:t>potential </a:t>
+            </a:r>
+            <a:r>
+              <a:rPr lang="en-US" sz="1800" dirty="0"/>
+              <a:t>to generate sizable meshes of its own. Thus, it may be fruitful to pursue and support incremental algorithms where possible.</a:t>
             </a:r>
             <a:endParaRPr lang="en-US" sz="1800" dirty="0" smtClean="0"/>
           </a:p>
@@ -45729,7 +45663,7 @@
     </p:spTree>
     <p:extLst>
       <p:ext uri="{BB962C8B-B14F-4D97-AF65-F5344CB8AC3E}">
-        <p14:creationId xmlns:p14="http://schemas.microsoft.com/office/powerpoint/2010/main" val="1537622542"/>
+        <p14:creationId xmlns:p14="http://schemas.microsoft.com/office/powerpoint/2010/main" val="3340254881"/>
       </p:ext>
     </p:extLst>
   </p:cSld>
@@ -45984,9 +45918,51 @@
             </a:pPr>
             <a:r>
               <a:rPr lang="en-US" sz="1800" b="1" dirty="0"/>
-              <a:t>Memory overhead will be an important trade-off space.	</a:t>
-            </a:r>
-            <a:endParaRPr lang="en-US" sz="1800" b="1" dirty="0" smtClean="0"/>
+              <a:t>Initialization time </a:t>
+            </a:r>
+            <a:r>
+              <a:rPr lang="en-US" sz="1800" b="1" dirty="0" smtClean="0"/>
+              <a:t>matters</a:t>
+            </a:r>
+          </a:p>
+          <a:p>
+            <a:pPr marL="0" indent="0" algn="just">
+              <a:buNone/>
+            </a:pPr>
+            <a:endParaRPr lang="en-US" sz="1800" dirty="0" smtClean="0"/>
+          </a:p>
+          <a:p>
+            <a:pPr marL="0" indent="0" algn="just">
+              <a:buNone/>
+            </a:pPr>
+            <a:r>
+              <a:rPr lang="en-US" sz="1800" dirty="0" smtClean="0"/>
+              <a:t>Our </a:t>
+            </a:r>
+            <a:r>
+              <a:rPr lang="en-US" sz="1800" dirty="0"/>
+              <a:t>scaling efforts to date focus on the scalability of the </a:t>
+            </a:r>
+            <a:r>
+              <a:rPr lang="en-US" sz="1800" dirty="0" smtClean="0"/>
+              <a:t>algorithms </a:t>
+            </a:r>
+            <a:r>
+              <a:rPr lang="en-US" sz="1800" dirty="0"/>
+              <a:t>invoked during the run of a simulation. The initialization cost, a one-time penalty, has yet to be seriously considered. However, based on our HPCToolkit measurements, </a:t>
+            </a:r>
+            <a:r>
+              <a:rPr lang="en-US" sz="1800" dirty="0" smtClean="0"/>
+              <a:t>initialization </a:t>
+            </a:r>
+            <a:r>
+              <a:rPr lang="en-US" sz="1800" dirty="0"/>
+              <a:t>becomes a significant cost at high process counts</a:t>
+            </a:r>
+            <a:r>
+              <a:rPr lang="en-US" sz="1800" dirty="0" smtClean="0"/>
+              <a:t>.</a:t>
+            </a:r>
           </a:p>
           <a:p>
             <a:pPr marL="0" indent="0" algn="just">
@@ -45995,56 +45971,39 @@
             <a:endParaRPr lang="en-US" sz="1800" dirty="0"/>
           </a:p>
           <a:p>
-            <a:pPr marL="0" indent="0" algn="just">
+            <a:pPr marL="0" indent="0">
               <a:buNone/>
             </a:pPr>
             <a:r>
+              <a:rPr lang="en-US" sz="1800" b="1" dirty="0" smtClean="0"/>
+              <a:t>Disk-based I/O is not dead . . . yet.	</a:t>
+            </a:r>
+          </a:p>
+          <a:p>
+            <a:pPr marL="0" indent="0">
+              <a:buNone/>
+            </a:pPr>
+            <a:endParaRPr lang="en-US" sz="1800" dirty="0"/>
+          </a:p>
+          <a:p>
+            <a:pPr marL="0" indent="0">
+              <a:buNone/>
+            </a:pPr>
+            <a:r>
               <a:rPr lang="en-US" sz="1800" dirty="0" smtClean="0"/>
-              <a:t>The </a:t>
+              <a:t>Our </a:t>
             </a:r>
             <a:r>
               <a:rPr lang="en-US" sz="1800" dirty="0"/>
-              <a:t>baseline amount of memory added to the CTH job to perform </a:t>
-            </a:r>
-            <a:r>
-              <a:rPr lang="en-US" sz="1800" i="1" dirty="0"/>
-              <a:t>in situ</a:t>
+              <a:t>initial assumption was that it would not be feasible to output full results at a fine enough temporal resolution from CTH to disk storage to perform our high fidelity analysis. However, our control workflow shows that although the overall time to write data to disk and then read back again incurs a large cost, it </a:t>
+            </a:r>
+            <a:r>
+              <a:rPr lang="en-US" sz="1800" dirty="0" smtClean="0"/>
+              <a:t>is still </a:t>
             </a:r>
             <a:r>
               <a:rPr lang="en-US" sz="1800" dirty="0"/>
-              <a:t> processing is roughly 100MB per core. Considering that our embedded </a:t>
-            </a:r>
-            <a:r>
-              <a:rPr lang="en-US" sz="1800" i="1" dirty="0"/>
-              <a:t>in situ</a:t>
-            </a:r>
-            <a:r>
-              <a:rPr lang="en-US" sz="1800" dirty="0"/>
-              <a:t> library is a fully featured visualization toolkit </a:t>
-            </a:r>
-            <a:r>
-              <a:rPr lang="en-US" sz="1800" dirty="0" smtClean="0"/>
-              <a:t>containing </a:t>
-            </a:r>
-            <a:r>
-              <a:rPr lang="en-US" sz="1800" dirty="0"/>
-              <a:t>over 2 million lines of code and algorithms developed over almost 2 decades, this overhead is not unreasonable. Nevertheless, this footprint can be problematic for </a:t>
-            </a:r>
-            <a:r>
-              <a:rPr lang="en-US" sz="1800" dirty="0" smtClean="0"/>
-              <a:t>simulations </a:t>
-            </a:r>
-            <a:r>
-              <a:rPr lang="en-US" sz="1800" dirty="0"/>
-              <a:t>already tight on memory. Because of this, efforts are already underway to improve our memory footprint by making finer modules and being more selective on the available algorithms. This, of course, requires a compromise between the size of the library and the algorithms that are dynamically available. We also note that our algorithm has the </a:t>
-            </a:r>
-            <a:r>
-              <a:rPr lang="en-US" sz="1800" dirty="0" smtClean="0"/>
-              <a:t>potential </a:t>
-            </a:r>
-            <a:r>
-              <a:rPr lang="en-US" sz="1800" dirty="0"/>
-              <a:t>to generate sizable meshes of its own. Thus, it may be fruitful to pursue and support incremental algorithms where possible.</a:t>
+              <a:t>realistic to do so. Thus, users may still choose to incur the extra overhead to use a traditional offline post-processing visualization and data analysis workflow.</a:t>
             </a:r>
             <a:endParaRPr lang="en-US" sz="1800" dirty="0" smtClean="0"/>
           </a:p>
@@ -46154,50 +46113,11 @@
             </a:pPr>
             <a:r>
               <a:rPr lang="en-US" sz="1800" b="1" dirty="0"/>
-              <a:t>Initialization time </a:t>
+              <a:t>Better job scheduling is </a:t>
             </a:r>
             <a:r>
               <a:rPr lang="en-US" sz="1800" b="1" dirty="0" smtClean="0"/>
-              <a:t>matters</a:t>
-            </a:r>
-          </a:p>
-          <a:p>
-            <a:pPr marL="0" indent="0" algn="just">
-              <a:buNone/>
-            </a:pPr>
-            <a:endParaRPr lang="en-US" sz="1800" dirty="0" smtClean="0"/>
-          </a:p>
-          <a:p>
-            <a:pPr marL="0" indent="0" algn="just">
-              <a:buNone/>
-            </a:pPr>
-            <a:r>
-              <a:rPr lang="en-US" sz="1800" dirty="0" smtClean="0"/>
-              <a:t>Our </a:t>
-            </a:r>
-            <a:r>
-              <a:rPr lang="en-US" sz="1800" dirty="0"/>
-              <a:t>scaling efforts to date focus on the scalability of the </a:t>
-            </a:r>
-            <a:r>
-              <a:rPr lang="en-US" sz="1800" dirty="0" smtClean="0"/>
-              <a:t>algorithms </a:t>
-            </a:r>
-            <a:r>
-              <a:rPr lang="en-US" sz="1800" dirty="0"/>
-              <a:t>invoked during the run of a simulation. The initialization cost, a one-time penalty, has yet to be seriously considered. However, based on our HPCToolkit measurements, </a:t>
-            </a:r>
-            <a:r>
-              <a:rPr lang="en-US" sz="1800" dirty="0" smtClean="0"/>
-              <a:t>initialization </a:t>
-            </a:r>
-            <a:r>
-              <a:rPr lang="en-US" sz="1800" dirty="0"/>
-              <a:t>becomes a significant cost at high process counts</a:t>
-            </a:r>
-            <a:r>
-              <a:rPr lang="en-US" sz="1800" dirty="0" smtClean="0"/>
-              <a:t>.</a:t>
+              <a:t>important</a:t>
             </a:r>
           </a:p>
           <a:p>
@@ -46207,39 +46127,24 @@
             <a:endParaRPr lang="en-US" sz="1800" dirty="0"/>
           </a:p>
           <a:p>
-            <a:pPr marL="0" indent="0">
+            <a:pPr marL="0" indent="0" algn="just">
               <a:buNone/>
             </a:pPr>
             <a:r>
-              <a:rPr lang="en-US" sz="1800" b="1" dirty="0" smtClean="0"/>
-              <a:t>Disk-based I/O is not dead . . . yet.	</a:t>
-            </a:r>
-          </a:p>
-          <a:p>
-            <a:pPr marL="0" indent="0">
-              <a:buNone/>
-            </a:pPr>
-            <a:endParaRPr lang="en-US" sz="1800" dirty="0"/>
-          </a:p>
-          <a:p>
-            <a:pPr marL="0" indent="0">
-              <a:buNone/>
-            </a:pPr>
-            <a:r>
               <a:rPr lang="en-US" sz="1800" dirty="0" smtClean="0"/>
-              <a:t>Our </a:t>
+              <a:t>One </a:t>
             </a:r>
             <a:r>
               <a:rPr lang="en-US" sz="1800" dirty="0"/>
-              <a:t>initial assumption was that it would not be feasible to output full results at a fine enough temporal resolution from CTH to disk storage to perform our high fidelity analysis. However, our control workflow shows that although the overall time to write data to disk and then read back again incurs a large cost, it </a:t>
-            </a:r>
-            <a:r>
-              <a:rPr lang="en-US" sz="1800" dirty="0" smtClean="0"/>
-              <a:t>is still </a:t>
+              <a:t>of the more complicated parts of running an </a:t>
+            </a:r>
+            <a:r>
+              <a:rPr lang="en-US" sz="1800" i="1" dirty="0"/>
+              <a:t>in transit</a:t>
             </a:r>
             <a:r>
               <a:rPr lang="en-US" sz="1800" dirty="0"/>
-              <a:t>realistic to do so. Thus, users may still choose to incur the extra overhead to use a traditional offline post-processing visualization and data analysis workflow.</a:t>
+              <a:t> workflow is scheduling the simulation job and service job to run in tandem. Frankly, the capabilities of the scheduler are inadequate for our needs. We cannot start and stop jobs independently and make reconnections dynamically. Another experiment we would like to do but is challenging to schedule is to allow simulation and service to share nodes. Since each node has 16 cores, perhaps we could get better transfer performance by allocating one core per node for service and the rest for simulation. A similar scheduling scheme will be important to take advantage of burst buffers in future architectures.</a:t>
             </a:r>
             <a:endParaRPr lang="en-US" sz="1800" dirty="0" smtClean="0"/>
           </a:p>
@@ -46272,7 +46177,7 @@
     </p:spTree>
     <p:extLst>
       <p:ext uri="{BB962C8B-B14F-4D97-AF65-F5344CB8AC3E}">
-        <p14:creationId xmlns:p14="http://schemas.microsoft.com/office/powerpoint/2010/main" val="3340254881"/>
+        <p14:creationId xmlns:p14="http://schemas.microsoft.com/office/powerpoint/2010/main" val="855609389"/>
       </p:ext>
     </p:extLst>
   </p:cSld>
@@ -46323,7 +46228,7 @@
           <a:p>
             <a:r>
               <a:rPr lang="en-US" dirty="0" smtClean="0"/>
-              <a:t>Conclusions</a:t>
+              <a:t>Future Work</a:t>
             </a:r>
             <a:endParaRPr lang="en-US" dirty="0"/>
           </a:p>
@@ -46344,45 +46249,119 @@
           <a:bodyPr/>
           <a:lstStyle/>
           <a:p>
-            <a:pPr marL="0" indent="0" algn="just">
-              <a:buNone/>
-            </a:pPr>
-            <a:r>
-              <a:rPr lang="en-US" sz="1800" b="1" dirty="0"/>
-              <a:t>Better job scheduling is </a:t>
-            </a:r>
-            <a:r>
-              <a:rPr lang="en-US" sz="1800" b="1" dirty="0" smtClean="0"/>
-              <a:t>important</a:t>
-            </a:r>
-          </a:p>
-          <a:p>
-            <a:pPr marL="0" indent="0" algn="just">
-              <a:buNone/>
-            </a:pPr>
-            <a:endParaRPr lang="en-US" sz="1800" dirty="0"/>
-          </a:p>
-          <a:p>
-            <a:pPr marL="0" indent="0" algn="just">
-              <a:buNone/>
-            </a:pPr>
-            <a:r>
-              <a:rPr lang="en-US" sz="1800" dirty="0" smtClean="0"/>
-              <a:t>One </a:t>
-            </a:r>
-            <a:r>
-              <a:rPr lang="en-US" sz="1800" dirty="0"/>
-              <a:t>of the more complicated parts of running an </a:t>
-            </a:r>
-            <a:r>
-              <a:rPr lang="en-US" sz="1800" i="1" dirty="0"/>
+            <a:pPr rtl="0" eaLnBrk="1" fontAlgn="base" hangingPunct="1"/>
+            <a:r>
+              <a:rPr lang="en-US" dirty="0" smtClean="0"/>
+              <a:t>Algorithm comparison.  Three similar algorithms with three different scaling </a:t>
+            </a:r>
+            <a:r>
+              <a:rPr lang="en-US" dirty="0" smtClean="0"/>
+              <a:t>behaviors</a:t>
+            </a:r>
+            <a:endParaRPr lang="en-US" dirty="0" smtClean="0"/>
+          </a:p>
+          <a:p>
+            <a:pPr lvl="1"/>
+            <a:r>
+              <a:rPr lang="en-US" dirty="0" smtClean="0">
+                <a:effectLst/>
+              </a:rPr>
+              <a:t>Contour algorithm (perfectly scalable)</a:t>
+            </a:r>
+          </a:p>
+          <a:p>
+            <a:pPr lvl="1"/>
+            <a:r>
+              <a:rPr lang="en-US" dirty="0" smtClean="0"/>
+              <a:t>Refined water tight contours (reasonably scalable)</a:t>
+            </a:r>
+          </a:p>
+          <a:p>
+            <a:pPr lvl="1"/>
+            <a:r>
+              <a:rPr lang="en-US" dirty="0" smtClean="0">
+                <a:effectLst/>
+              </a:rPr>
+              <a:t>Baseline water tight contours (not scalable)</a:t>
+            </a:r>
+          </a:p>
+          <a:p>
+            <a:r>
+              <a:rPr lang="en-US" dirty="0" smtClean="0"/>
+              <a:t>No-wait analysis </a:t>
+            </a:r>
+            <a:r>
+              <a:rPr lang="en-US" dirty="0" smtClean="0"/>
+              <a:t>(</a:t>
+            </a:r>
+            <a:r>
+              <a:rPr lang="en-US" i="1" dirty="0" smtClean="0"/>
               <a:t>in transit</a:t>
             </a:r>
             <a:r>
-              <a:rPr lang="en-US" sz="1800" dirty="0"/>
-              <a:t> workflow is scheduling the simulation job and service job to run in tandem. Frankly, the capabilities of the scheduler are inadequate for our needs. We cannot start and stop jobs independently and make reconnections dynamically. Another experiment we would like to do but is challenging to schedule is to allow simulation and service to share nodes. Since each node has 16 cores, perhaps we could get better transfer performance by allocating one core per node for service and the rest for simulation. A similar scheduling scheme will be important to take advantage of burst buffers in future architectures.</a:t>
-            </a:r>
-            <a:endParaRPr lang="en-US" sz="1800" dirty="0" smtClean="0"/>
+              <a:rPr lang="en-US" dirty="0" smtClean="0"/>
+              <a:t>)</a:t>
+            </a:r>
+            <a:endParaRPr lang="en-US" dirty="0"/>
+          </a:p>
+          <a:p>
+            <a:pPr lvl="1"/>
+            <a:r>
+              <a:rPr lang="en-US" dirty="0" smtClean="0"/>
+              <a:t>Perform analysis if and only if the service is ready</a:t>
+            </a:r>
+          </a:p>
+          <a:p>
+            <a:r>
+              <a:rPr lang="en-US" dirty="0" smtClean="0"/>
+              <a:t>Investigate initialization cost of </a:t>
+            </a:r>
+            <a:r>
+              <a:rPr lang="en-US" i="1" dirty="0" smtClean="0"/>
+              <a:t>in situ </a:t>
+            </a:r>
+            <a:r>
+              <a:rPr lang="en-US" dirty="0" smtClean="0"/>
+              <a:t>vis</a:t>
+            </a:r>
+          </a:p>
+          <a:p>
+            <a:r>
+              <a:rPr lang="en-US" dirty="0" smtClean="0"/>
+              <a:t>Zero copy transfers </a:t>
+            </a:r>
+            <a:r>
+              <a:rPr lang="en-US" dirty="0" smtClean="0"/>
+              <a:t>(</a:t>
+            </a:r>
+            <a:r>
+              <a:rPr lang="en-US" i="1" dirty="0" smtClean="0"/>
+              <a:t>in transit</a:t>
+            </a:r>
+            <a:r>
+              <a:rPr lang="en-US" dirty="0" smtClean="0"/>
+              <a:t>)</a:t>
+            </a:r>
+            <a:endParaRPr lang="en-US" dirty="0" smtClean="0"/>
+          </a:p>
+          <a:p>
+            <a:r>
+              <a:rPr lang="en-US" dirty="0" smtClean="0"/>
+              <a:t>Additional apps at Cielo scale</a:t>
+            </a:r>
+          </a:p>
+          <a:p>
+            <a:r>
+              <a:rPr lang="en-US" dirty="0" smtClean="0"/>
+              <a:t>Improved OS and runtime support</a:t>
+            </a:r>
+          </a:p>
+          <a:p>
+            <a:pPr lvl="1"/>
+            <a:r>
+              <a:rPr lang="en-US" dirty="0" smtClean="0"/>
+              <a:t>Scheduling, placement, node sharing, specialized runtimes, …</a:t>
+            </a:r>
           </a:p>
         </p:txBody>
       </p:sp>
@@ -46413,7 +46392,7 @@
     </p:spTree>
     <p:extLst>
       <p:ext uri="{BB962C8B-B14F-4D97-AF65-F5344CB8AC3E}">
-        <p14:creationId xmlns:p14="http://schemas.microsoft.com/office/powerpoint/2010/main" val="855609389"/>
+        <p14:creationId xmlns:p14="http://schemas.microsoft.com/office/powerpoint/2010/main" val="3843009092"/>
       </p:ext>
     </p:extLst>
   </p:cSld>
@@ -46464,7 +46443,7 @@
           <a:p>
             <a:r>
               <a:rPr lang="en-US" dirty="0" smtClean="0"/>
-              <a:t>Future Work</a:t>
+              <a:t>Summary</a:t>
             </a:r>
             <a:endParaRPr lang="en-US" dirty="0"/>
           </a:p>
@@ -46487,117 +46466,128 @@
           <a:p>
             <a:pPr rtl="0" eaLnBrk="1" fontAlgn="base" hangingPunct="1"/>
             <a:r>
-              <a:rPr lang="en-US" dirty="0" smtClean="0"/>
-              <a:t>Algorithm comparison.  Three similar algorithms with three different scaling </a:t>
-            </a:r>
-            <a:r>
-              <a:rPr lang="en-US" dirty="0" smtClean="0"/>
-              <a:t>behaviors</a:t>
-            </a:r>
-            <a:endParaRPr lang="en-US" dirty="0" smtClean="0"/>
-          </a:p>
-          <a:p>
-            <a:pPr lvl="1"/>
-            <a:r>
-              <a:rPr lang="en-US" dirty="0" smtClean="0">
+              <a:rPr lang="en-US" sz="2400" dirty="0" smtClean="0">
+                <a:solidFill>
+                  <a:schemeClr val="tx1"/>
+                </a:solidFill>
                 <a:effectLst/>
+                <a:latin typeface="Calibri"/>
+                <a:ea typeface="ＭＳ Ｐゴシック" charset="-128"/>
+                <a:cs typeface="Calibri"/>
               </a:rPr>
-              <a:t>Contour algorithm (perfectly scalable)</a:t>
-            </a:r>
-          </a:p>
-          <a:p>
-            <a:pPr lvl="1"/>
-            <a:r>
-              <a:rPr lang="en-US" dirty="0" smtClean="0"/>
-              <a:t>Refined water tight contours (reasonably scalable)</a:t>
-            </a:r>
-          </a:p>
-          <a:p>
-            <a:pPr lvl="1"/>
-            <a:r>
-              <a:rPr lang="en-US" dirty="0" smtClean="0">
+              <a:t>Milestone 4745 “Data Co-Processing for Extreme Scale Analysis” was successfully completed on time, and demonstrated against the letter and spirit of stated Milestone.</a:t>
+            </a:r>
+            <a:endParaRPr lang="en-US" sz="2400" dirty="0" smtClean="0">
+              <a:effectLst/>
+            </a:endParaRPr>
+          </a:p>
+          <a:p>
+            <a:pPr rtl="0" eaLnBrk="1" fontAlgn="base" hangingPunct="1"/>
+            <a:r>
+              <a:rPr lang="en-US" sz="2400" dirty="0" smtClean="0">
+                <a:solidFill>
+                  <a:schemeClr val="tx1"/>
+                </a:solidFill>
                 <a:effectLst/>
+                <a:latin typeface="Calibri"/>
+                <a:ea typeface="ＭＳ Ｐゴシック" charset="-128"/>
+                <a:cs typeface="Calibri"/>
               </a:rPr>
-              <a:t>Baseline water tight contours (not scalable)</a:t>
-            </a:r>
-          </a:p>
-          <a:p>
-            <a:r>
-              <a:rPr lang="en-US" dirty="0" smtClean="0"/>
-              <a:t>No-wait analysis </a:t>
-            </a:r>
-            <a:r>
-              <a:rPr lang="en-US" dirty="0" smtClean="0"/>
-              <a:t>(</a:t>
-            </a:r>
-            <a:r>
-              <a:rPr lang="en-US" i="1" dirty="0" smtClean="0"/>
+              <a:t>The Milestone Team completed over 9 million node hours of Cielo tests on both </a:t>
+            </a:r>
+            <a:r>
+              <a:rPr lang="en-US" sz="2400" i="1" dirty="0" smtClean="0">
+                <a:solidFill>
+                  <a:schemeClr val="tx1"/>
+                </a:solidFill>
+                <a:effectLst/>
+                <a:latin typeface="Calibri"/>
+                <a:ea typeface="ＭＳ Ｐゴシック" charset="-128"/>
+                <a:cs typeface="Calibri"/>
+              </a:rPr>
+              <a:t>in situ</a:t>
+            </a:r>
+            <a:r>
+              <a:rPr lang="en-US" sz="2400" dirty="0" smtClean="0">
+                <a:solidFill>
+                  <a:schemeClr val="tx1"/>
+                </a:solidFill>
+                <a:effectLst/>
+                <a:latin typeface="Calibri"/>
+                <a:ea typeface="ＭＳ Ｐゴシック" charset="-128"/>
+                <a:cs typeface="Calibri"/>
+              </a:rPr>
+              <a:t> </a:t>
+            </a:r>
+            <a:r>
+              <a:rPr lang="en-US" sz="2400" dirty="0" smtClean="0">
+                <a:solidFill>
+                  <a:schemeClr val="tx1"/>
+                </a:solidFill>
+                <a:effectLst/>
+                <a:latin typeface="Calibri"/>
+                <a:ea typeface="ＭＳ Ｐゴシック" charset="-128"/>
+                <a:cs typeface="Calibri"/>
+              </a:rPr>
+              <a:t>and </a:t>
+            </a:r>
+            <a:r>
+              <a:rPr lang="en-US" sz="2400" i="1" dirty="0" smtClean="0">
+                <a:solidFill>
+                  <a:schemeClr val="tx1"/>
+                </a:solidFill>
+                <a:effectLst/>
+                <a:latin typeface="Calibri"/>
+                <a:ea typeface="ＭＳ Ｐゴシック" charset="-128"/>
+                <a:cs typeface="Calibri"/>
+              </a:rPr>
               <a:t>in transit</a:t>
             </a:r>
             <a:r>
-              <a:rPr lang="en-US" dirty="0" smtClean="0"/>
-              <a:t>)</a:t>
-            </a:r>
-            <a:endParaRPr lang="en-US" dirty="0"/>
-          </a:p>
-          <a:p>
-            <a:pPr lvl="1"/>
-            <a:r>
-              <a:rPr lang="en-US" dirty="0" smtClean="0"/>
-              <a:t>Perform analysis if and only if the service is ready</a:t>
-            </a:r>
-          </a:p>
-          <a:p>
-            <a:r>
-              <a:rPr lang="en-US" dirty="0" smtClean="0"/>
-              <a:t>Investigate initialization cost of </a:t>
-            </a:r>
-            <a:r>
-              <a:rPr lang="en-US" i="1" dirty="0" smtClean="0"/>
-              <a:t>in situ </a:t>
-            </a:r>
-            <a:r>
-              <a:rPr lang="en-US" dirty="0" smtClean="0"/>
-              <a:t>vis</a:t>
-            </a:r>
-          </a:p>
-          <a:p>
-            <a:r>
-              <a:rPr lang="en-US" dirty="0" smtClean="0"/>
-              <a:t>Zero copy transfers </a:t>
-            </a:r>
-            <a:r>
-              <a:rPr lang="en-US" dirty="0" smtClean="0"/>
-              <a:t>(</a:t>
-            </a:r>
-            <a:r>
-              <a:rPr lang="en-US" i="1" dirty="0" smtClean="0"/>
-              <a:t>in transit</a:t>
-            </a:r>
-            <a:r>
-              <a:rPr lang="en-US" dirty="0" smtClean="0"/>
-              <a:t>)</a:t>
-            </a:r>
-            <a:endParaRPr lang="en-US" dirty="0" smtClean="0"/>
-          </a:p>
-          <a:p>
-            <a:r>
-              <a:rPr lang="en-US" dirty="0" smtClean="0"/>
-              <a:t>Additional apps at Cielo scale</a:t>
-            </a:r>
-          </a:p>
-          <a:p>
-            <a:r>
-              <a:rPr lang="en-US" dirty="0" smtClean="0"/>
-              <a:t>Improved OS and runtime support</a:t>
-            </a:r>
-          </a:p>
-          <a:p>
-            <a:pPr lvl="1"/>
-            <a:r>
-              <a:rPr lang="en-US" dirty="0" smtClean="0"/>
-              <a:t>Scheduling, placement, node sharing, specialized runtimes, …</a:t>
-            </a:r>
+              <a:rPr lang="en-US" sz="2400" dirty="0" smtClean="0">
+                <a:solidFill>
+                  <a:schemeClr val="tx1"/>
+                </a:solidFill>
+                <a:effectLst/>
+                <a:latin typeface="Calibri"/>
+                <a:ea typeface="ＭＳ Ｐゴシック" charset="-128"/>
+                <a:cs typeface="Calibri"/>
+              </a:rPr>
+              <a:t> </a:t>
+            </a:r>
+            <a:r>
+              <a:rPr lang="en-US" sz="2400" dirty="0" smtClean="0">
+                <a:solidFill>
+                  <a:schemeClr val="tx1"/>
+                </a:solidFill>
+                <a:effectLst/>
+                <a:latin typeface="Calibri"/>
+                <a:ea typeface="ＭＳ Ｐゴシック" charset="-128"/>
+                <a:cs typeface="Calibri"/>
+              </a:rPr>
+              <a:t>analysis capabilities on a problem provided by a Sandia analyst.</a:t>
+            </a:r>
+            <a:endParaRPr lang="en-US" dirty="0" smtClean="0">
+              <a:effectLst/>
+            </a:endParaRPr>
+          </a:p>
+          <a:p>
+            <a:pPr rtl="0" eaLnBrk="1" fontAlgn="base" hangingPunct="1"/>
+            <a:r>
+              <a:rPr lang="en-US" sz="2400" dirty="0" smtClean="0">
+                <a:solidFill>
+                  <a:schemeClr val="tx1"/>
+                </a:solidFill>
+                <a:effectLst/>
+                <a:latin typeface="Calibri"/>
+                <a:ea typeface="ＭＳ Ｐゴシック" charset="-128"/>
+                <a:cs typeface="Calibri"/>
+              </a:rPr>
+              <a:t>The results of these experiments have been detailed in a SAND report, which is published as an unclassified unlimited release document, available to the entire mod/sim community</a:t>
+            </a:r>
+            <a:endParaRPr lang="en-US" dirty="0" smtClean="0">
+              <a:effectLst/>
+            </a:endParaRPr>
           </a:p>
         </p:txBody>
       </p:sp>
@@ -46620,232 +46610,6 @@
               <a:rPr lang="en-US" smtClean="0"/>
               <a:pPr/>
               <a:t>43</a:t>
-            </a:fld>
-            <a:endParaRPr lang="en-US" dirty="0"/>
-          </a:p>
-        </p:txBody>
-      </p:sp>
-    </p:spTree>
-    <p:extLst>
-      <p:ext uri="{BB962C8B-B14F-4D97-AF65-F5344CB8AC3E}">
-        <p14:creationId xmlns:p14="http://schemas.microsoft.com/office/powerpoint/2010/main" val="3843009092"/>
-      </p:ext>
-    </p:extLst>
-  </p:cSld>
-  <p:clrMapOvr>
-    <a:masterClrMapping/>
-  </p:clrMapOvr>
-  <p:timing>
-    <p:tnLst>
-      <p:par>
-        <p:cTn xmlns:p14="http://schemas.microsoft.com/office/powerpoint/2010/main" id="1" dur="indefinite" restart="never" nodeType="tmRoot"/>
-      </p:par>
-    </p:tnLst>
-  </p:timing>
-</p:sld>
-</file>
-
-<file path=ppt/slides/slide44.xml><?xml version="1.0" encoding="utf-8"?>
-<p:sld xmlns:a="http://schemas.openxmlformats.org/drawingml/2006/main" xmlns:r="http://schemas.openxmlformats.org/officeDocument/2006/relationships" xmlns:p="http://schemas.openxmlformats.org/presentationml/2006/main">
-  <p:cSld>
-    <p:spTree>
-      <p:nvGrpSpPr>
-        <p:cNvPr id="1" name=""/>
-        <p:cNvGrpSpPr/>
-        <p:nvPr/>
-      </p:nvGrpSpPr>
-      <p:grpSpPr>
-        <a:xfrm>
-          <a:off x="0" y="0"/>
-          <a:ext cx="0" cy="0"/>
-          <a:chOff x="0" y="0"/>
-          <a:chExt cx="0" cy="0"/>
-        </a:xfrm>
-      </p:grpSpPr>
-      <p:sp>
-        <p:nvSpPr>
-          <p:cNvPr id="2" name="Title 1"/>
-          <p:cNvSpPr>
-            <a:spLocks noGrp="1"/>
-          </p:cNvSpPr>
-          <p:nvPr>
-            <p:ph type="title"/>
-          </p:nvPr>
-        </p:nvSpPr>
-        <p:spPr/>
-        <p:txBody>
-          <a:bodyPr/>
-          <a:lstStyle/>
-          <a:p>
-            <a:r>
-              <a:rPr lang="en-US" dirty="0" smtClean="0"/>
-              <a:t>Summary</a:t>
-            </a:r>
-            <a:endParaRPr lang="en-US" dirty="0"/>
-          </a:p>
-        </p:txBody>
-      </p:sp>
-      <p:sp>
-        <p:nvSpPr>
-          <p:cNvPr id="3" name="Content Placeholder 2"/>
-          <p:cNvSpPr>
-            <a:spLocks noGrp="1"/>
-          </p:cNvSpPr>
-          <p:nvPr>
-            <p:ph idx="1"/>
-          </p:nvPr>
-        </p:nvSpPr>
-        <p:spPr/>
-        <p:txBody>
-          <a:bodyPr/>
-          <a:lstStyle/>
-          <a:p>
-            <a:pPr rtl="0" eaLnBrk="1" fontAlgn="base" hangingPunct="1"/>
-            <a:r>
-              <a:rPr lang="en-US" sz="2400" dirty="0" smtClean="0">
-                <a:solidFill>
-                  <a:schemeClr val="tx1"/>
-                </a:solidFill>
-                <a:effectLst/>
-                <a:latin typeface="Calibri"/>
-                <a:ea typeface="ＭＳ Ｐゴシック" charset="-128"/>
-                <a:cs typeface="Calibri"/>
-              </a:rPr>
-              <a:t>Milestone 4745 “Data Co-Processing for Extreme Scale Analysis” was successfully completed on time, and demonstrated against the letter and spirit of stated Milestone.</a:t>
-            </a:r>
-            <a:endParaRPr lang="en-US" sz="2400" dirty="0" smtClean="0">
-              <a:effectLst/>
-            </a:endParaRPr>
-          </a:p>
-          <a:p>
-            <a:pPr rtl="0" eaLnBrk="1" fontAlgn="base" hangingPunct="1"/>
-            <a:r>
-              <a:rPr lang="en-US" sz="2400" dirty="0" smtClean="0">
-                <a:solidFill>
-                  <a:schemeClr val="tx1"/>
-                </a:solidFill>
-                <a:effectLst/>
-                <a:latin typeface="Calibri"/>
-                <a:ea typeface="ＭＳ Ｐゴシック" charset="-128"/>
-                <a:cs typeface="Calibri"/>
-              </a:rPr>
-              <a:t>The Milestone Team completed over 9 million node hours of Cielo tests on both </a:t>
-            </a:r>
-            <a:r>
-              <a:rPr lang="en-US" sz="2400" i="1" dirty="0" smtClean="0">
-                <a:solidFill>
-                  <a:schemeClr val="tx1"/>
-                </a:solidFill>
-                <a:effectLst/>
-                <a:latin typeface="Calibri"/>
-                <a:ea typeface="ＭＳ Ｐゴシック" charset="-128"/>
-                <a:cs typeface="Calibri"/>
-              </a:rPr>
-              <a:t>in situ</a:t>
-            </a:r>
-            <a:r>
-              <a:rPr lang="en-US" sz="2400" dirty="0" smtClean="0">
-                <a:solidFill>
-                  <a:schemeClr val="tx1"/>
-                </a:solidFill>
-                <a:effectLst/>
-                <a:latin typeface="Calibri"/>
-                <a:ea typeface="ＭＳ Ｐゴシック" charset="-128"/>
-                <a:cs typeface="Calibri"/>
-              </a:rPr>
-              <a:t> </a:t>
-            </a:r>
-            <a:r>
-              <a:rPr lang="en-US" sz="2400" dirty="0" smtClean="0">
-                <a:solidFill>
-                  <a:schemeClr val="tx1"/>
-                </a:solidFill>
-                <a:effectLst/>
-                <a:latin typeface="Calibri"/>
-                <a:ea typeface="ＭＳ Ｐゴシック" charset="-128"/>
-                <a:cs typeface="Calibri"/>
-              </a:rPr>
-              <a:t>and </a:t>
-            </a:r>
-            <a:r>
-              <a:rPr lang="en-US" sz="2400" i="1" dirty="0" smtClean="0">
-                <a:solidFill>
-                  <a:schemeClr val="tx1"/>
-                </a:solidFill>
-                <a:effectLst/>
-                <a:latin typeface="Calibri"/>
-                <a:ea typeface="ＭＳ Ｐゴシック" charset="-128"/>
-                <a:cs typeface="Calibri"/>
-              </a:rPr>
-              <a:t>in transit</a:t>
-            </a:r>
-            <a:r>
-              <a:rPr lang="en-US" sz="2400" dirty="0" smtClean="0">
-                <a:solidFill>
-                  <a:schemeClr val="tx1"/>
-                </a:solidFill>
-                <a:effectLst/>
-                <a:latin typeface="Calibri"/>
-                <a:ea typeface="ＭＳ Ｐゴシック" charset="-128"/>
-                <a:cs typeface="Calibri"/>
-              </a:rPr>
-              <a:t> </a:t>
-            </a:r>
-            <a:r>
-              <a:rPr lang="en-US" sz="2400" dirty="0" smtClean="0">
-                <a:solidFill>
-                  <a:schemeClr val="tx1"/>
-                </a:solidFill>
-                <a:effectLst/>
-                <a:latin typeface="Calibri"/>
-                <a:ea typeface="ＭＳ Ｐゴシック" charset="-128"/>
-                <a:cs typeface="Calibri"/>
-              </a:rPr>
-              <a:t>analysis capabilities on a problem provided by a Sandia analyst.</a:t>
-            </a:r>
-            <a:endParaRPr lang="en-US" dirty="0" smtClean="0">
-              <a:effectLst/>
-            </a:endParaRPr>
-          </a:p>
-          <a:p>
-            <a:pPr rtl="0" eaLnBrk="1" fontAlgn="base" hangingPunct="1"/>
-            <a:r>
-              <a:rPr lang="en-US" sz="2400" dirty="0" smtClean="0">
-                <a:solidFill>
-                  <a:schemeClr val="tx1"/>
-                </a:solidFill>
-                <a:effectLst/>
-                <a:latin typeface="Calibri"/>
-                <a:ea typeface="ＭＳ Ｐゴシック" charset="-128"/>
-                <a:cs typeface="Calibri"/>
-              </a:rPr>
-              <a:t>The results of these experiments have been detailed in a SAND report, which is published as an unclassified unlimited release document, available to the entire mod/sim community</a:t>
-            </a:r>
-            <a:endParaRPr lang="en-US" dirty="0" smtClean="0">
-              <a:effectLst/>
-            </a:endParaRPr>
-          </a:p>
-        </p:txBody>
-      </p:sp>
-      <p:sp>
-        <p:nvSpPr>
-          <p:cNvPr id="4" name="Slide Number Placeholder 3"/>
-          <p:cNvSpPr>
-            <a:spLocks noGrp="1"/>
-          </p:cNvSpPr>
-          <p:nvPr>
-            <p:ph type="sldNum" sz="quarter" idx="12"/>
-          </p:nvPr>
-        </p:nvSpPr>
-        <p:spPr/>
-        <p:txBody>
-          <a:bodyPr/>
-          <a:lstStyle/>
-          <a:p>
-            <a:fld id="{A5E55A7B-7854-E145-92D9-B491DF4BAE2D}" type="slidenum">
-              <a:rPr lang="en-US" smtClean="0"/>
-              <a:pPr/>
-              <a:t>44</a:t>
             </a:fld>
             <a:endParaRPr lang="en-US" dirty="0"/>
           </a:p>

</xml_diff>

<commit_message>
More changes to plots and presentation.
</commit_message>
<xml_diff>
--- a/Summary/SummarySlides.pptx
+++ b/Summary/SummarySlides.pptx
@@ -40,7 +40,7 @@
     <p:sldId id="265" r:id="rId28"/>
     <p:sldId id="312" r:id="rId29"/>
     <p:sldId id="266" r:id="rId30"/>
-    <p:sldId id="267" r:id="rId31"/>
+    <p:sldId id="315" r:id="rId31"/>
     <p:sldId id="268" r:id="rId32"/>
     <p:sldId id="313" r:id="rId33"/>
     <p:sldId id="270" r:id="rId34"/>
@@ -37742,11 +37742,7 @@
             </a:r>
             <a:r>
               <a:rPr lang="en-US" dirty="0" smtClean="0"/>
-              <a:t> </a:t>
-            </a:r>
-            <a:r>
-              <a:rPr lang="en-US" dirty="0" smtClean="0"/>
-              <a:t>applications</a:t>
+              <a:t> applications</a:t>
             </a:r>
           </a:p>
           <a:p>
@@ -38988,8 +38984,8 @@
         </p:nvCxnSpPr>
         <p:spPr>
           <a:xfrm flipV="1">
-            <a:off x="3657600" y="3962400"/>
-            <a:ext cx="3505200" cy="1676400"/>
+            <a:off x="3657600" y="4014367"/>
+            <a:ext cx="3429000" cy="1624434"/>
           </a:xfrm>
           <a:prstGeom prst="straightConnector1">
             <a:avLst/>
@@ -39117,7 +39113,31 @@
                 <a:ea typeface="ＭＳ Ｐゴシック" charset="-128"/>
                 <a:cs typeface="Calibri"/>
               </a:rPr>
-              <a:t>The Milestone Team completed over 10 million node hours of Cielo tests on both </a:t>
+              <a:t>The Milestone Team completed over </a:t>
+            </a:r>
+            <a:r>
+              <a:rPr lang="en-US" sz="2400" dirty="0" smtClean="0">
+                <a:solidFill>
+                  <a:schemeClr val="tx1"/>
+                </a:solidFill>
+                <a:effectLst/>
+                <a:latin typeface="Calibri"/>
+                <a:ea typeface="ＭＳ Ｐゴシック" charset="-128"/>
+                <a:cs typeface="Calibri"/>
+              </a:rPr>
+              <a:t>9 million </a:t>
+            </a:r>
+            <a:r>
+              <a:rPr lang="en-US" sz="2400" dirty="0" smtClean="0">
+                <a:solidFill>
+                  <a:schemeClr val="tx1"/>
+                </a:solidFill>
+                <a:effectLst/>
+                <a:latin typeface="Calibri"/>
+                <a:ea typeface="ＭＳ Ｐゴシック" charset="-128"/>
+                <a:cs typeface="Calibri"/>
+              </a:rPr>
+              <a:t>node hours of Cielo tests on both </a:t>
             </a:r>
             <a:r>
               <a:rPr lang="en-US" sz="2400" i="1" dirty="0" smtClean="0">
@@ -39141,19 +39161,7 @@
                 <a:ea typeface="ＭＳ Ｐゴシック" charset="-128"/>
                 <a:cs typeface="Calibri"/>
               </a:rPr>
-              <a:t> </a:t>
-            </a:r>
-            <a:r>
-              <a:rPr lang="en-US" sz="2400" dirty="0" smtClean="0">
-                <a:solidFill>
-                  <a:schemeClr val="tx1"/>
-                </a:solidFill>
-                <a:effectLst/>
-                <a:latin typeface="Calibri"/>
-                <a:ea typeface="ＭＳ Ｐゴシック" charset="-128"/>
-                <a:cs typeface="Calibri"/>
-              </a:rPr>
-              <a:t>and </a:t>
+              <a:t> and </a:t>
             </a:r>
             <a:r>
               <a:rPr lang="en-US" sz="2400" i="1" dirty="0" smtClean="0">
@@ -39177,19 +39185,7 @@
                 <a:ea typeface="ＭＳ Ｐゴシック" charset="-128"/>
                 <a:cs typeface="Calibri"/>
               </a:rPr>
-              <a:t> </a:t>
-            </a:r>
-            <a:r>
-              <a:rPr lang="en-US" sz="2400" dirty="0" smtClean="0">
-                <a:solidFill>
-                  <a:schemeClr val="tx1"/>
-                </a:solidFill>
-                <a:effectLst/>
-                <a:latin typeface="Calibri"/>
-                <a:ea typeface="ＭＳ Ｐゴシック" charset="-128"/>
-                <a:cs typeface="Calibri"/>
-              </a:rPr>
-              <a:t>analysis capabilities on a problem provided by a Sandia analyst.</a:t>
+              <a:t> analysis capabilities on a problem provided by a Sandia analyst.</a:t>
             </a:r>
             <a:endParaRPr lang="en-US" dirty="0" smtClean="0">
               <a:effectLst/>
@@ -39592,15 +39588,39 @@
             </a:r>
             <a:r>
               <a:rPr lang="en-US" dirty="0" smtClean="0"/>
-              <a:t> with unrefined algorithm beats </a:t>
+              <a:t> with unrefined algorithm </a:t>
+            </a:r>
+            <a:r>
+              <a:rPr lang="en-US" dirty="0" smtClean="0"/>
+              <a:t>equal to</a:t>
+            </a:r>
+            <a:r>
+              <a:rPr lang="en-US" dirty="0" smtClean="0"/>
+              <a:t> </a:t>
             </a:r>
             <a:r>
               <a:rPr lang="en-US" i="1" dirty="0" smtClean="0"/>
-              <a:t>in situ</a:t>
+              <a:t>in </a:t>
+            </a:r>
+            <a:r>
+              <a:rPr lang="en-US" i="1" dirty="0" smtClean="0"/>
+              <a:t>situ</a:t>
             </a:r>
             <a:r>
               <a:rPr lang="en-US" dirty="0" smtClean="0"/>
-              <a:t> with refined algorithm.</a:t>
+              <a:t> </a:t>
+            </a:r>
+            <a:r>
+              <a:rPr lang="en-US" dirty="0" smtClean="0"/>
+              <a:t>with </a:t>
+            </a:r>
+            <a:r>
+              <a:rPr lang="en-US" dirty="0" smtClean="0"/>
+              <a:t>refined </a:t>
+            </a:r>
+            <a:r>
+              <a:rPr lang="en-US" dirty="0" smtClean="0"/>
+              <a:t>algorithm.</a:t>
             </a:r>
             <a:endParaRPr lang="en-US" dirty="0"/>
           </a:p>
@@ -40038,7 +40058,11 @@
             </a:pPr>
             <a:r>
               <a:rPr lang="en-US" dirty="0" smtClean="0"/>
-              <a:t>Spyplot I/O not bad</a:t>
+              <a:t>Baseline </a:t>
+            </a:r>
+            <a:r>
+              <a:rPr lang="en-US" dirty="0" smtClean="0"/>
+              <a:t>algorithm does not scale</a:t>
             </a:r>
           </a:p>
           <a:p>
@@ -40047,8 +40071,12 @@
               <a:buChar char="•"/>
             </a:pPr>
             <a:r>
+              <a:rPr lang="en-US" dirty="0" err="1" smtClean="0"/>
+              <a:t>Spyplot</a:t>
+            </a:r>
+            <a:r>
               <a:rPr lang="en-US" dirty="0" smtClean="0"/>
-              <a:t>Baseline algorithm does not scale</a:t>
+              <a:t> I/O not bad</a:t>
             </a:r>
           </a:p>
           <a:p>
@@ -40465,8 +40493,8 @@
         </p:nvCxnSpPr>
         <p:spPr>
           <a:xfrm flipH="1" flipV="1">
-            <a:off x="5669743" y="2658534"/>
-            <a:ext cx="502457" cy="1608666"/>
+            <a:off x="5669742" y="2438400"/>
+            <a:ext cx="502459" cy="1828800"/>
           </a:xfrm>
           <a:prstGeom prst="straightConnector1">
             <a:avLst/>
@@ -40563,11 +40591,7 @@
             </a:r>
             <a:r>
               <a:rPr lang="en-US" dirty="0" smtClean="0"/>
-              <a:t> </a:t>
-            </a:r>
-            <a:r>
-              <a:rPr lang="en-US" dirty="0" smtClean="0"/>
-              <a:t>experiments.</a:t>
+              <a:t> experiments.</a:t>
             </a:r>
             <a:endParaRPr lang="en-US" dirty="0"/>
           </a:p>
@@ -41062,7 +41086,15 @@
             </a:r>
             <a:r>
               <a:rPr lang="en-US" dirty="0" smtClean="0"/>
-              <a:t>ervice is a fixed size (800 nodes), the wait time should be independent of the number of cores on the client.</a:t>
+              <a:t>ervice is a fixed size </a:t>
+            </a:r>
+            <a:r>
+              <a:rPr lang="en-US" dirty="0" smtClean="0"/>
+              <a:t>(100 </a:t>
+            </a:r>
+            <a:r>
+              <a:rPr lang="en-US" dirty="0" smtClean="0"/>
+              <a:t>nodes), the wait time should be independent of the number of cores on the client.</a:t>
             </a:r>
           </a:p>
           <a:p>
@@ -41663,29 +41695,6 @@
           <a:chExt cx="0" cy="0"/>
         </a:xfrm>
       </p:grpSpPr>
-      <p:sp>
-        <p:nvSpPr>
-          <p:cNvPr id="2" name="Title 1"/>
-          <p:cNvSpPr>
-            <a:spLocks noGrp="1"/>
-          </p:cNvSpPr>
-          <p:nvPr>
-            <p:ph type="title"/>
-          </p:nvPr>
-        </p:nvSpPr>
-        <p:spPr/>
-        <p:txBody>
-          <a:bodyPr/>
-          <a:lstStyle/>
-          <a:p>
-            <a:r>
-              <a:rPr lang="en-US" dirty="0" smtClean="0"/>
-              <a:t>Time-Series Analysis (8k cores)</a:t>
-            </a:r>
-            <a:endParaRPr lang="en-US" dirty="0"/>
-          </a:p>
-        </p:txBody>
-      </p:sp>
       <p:sp>
         <p:nvSpPr>
           <p:cNvPr id="3" name="Slide Number Placeholder 2"/>
@@ -42186,15 +42195,7 @@
             </a:r>
             <a:r>
               <a:rPr lang="en-US" dirty="0" smtClean="0"/>
-              <a:t> will “win” when </a:t>
-            </a:r>
-            <a:r>
-              <a:rPr lang="en-US" dirty="0" smtClean="0"/>
-              <a:t>xfer+wait</a:t>
-            </a:r>
-            <a:r>
-              <a:rPr lang="en-US" dirty="0" smtClean="0"/>
-              <a:t> is less than viz.</a:t>
+              <a:t> will “win” when xfer+wait is less than viz.</a:t>
             </a:r>
           </a:p>
           <a:p>
@@ -42219,6 +42220,40 @@
           <a:p>
             <a:pPr algn="just"/>
             <a:endParaRPr lang="en-US" dirty="0"/>
+          </a:p>
+        </p:txBody>
+      </p:sp>
+      <p:sp>
+        <p:nvSpPr>
+          <p:cNvPr id="2" name="Title 1"/>
+          <p:cNvSpPr>
+            <a:spLocks noGrp="1"/>
+          </p:cNvSpPr>
+          <p:nvPr>
+            <p:ph type="title"/>
+          </p:nvPr>
+        </p:nvSpPr>
+        <p:spPr/>
+        <p:txBody>
+          <a:bodyPr/>
+          <a:lstStyle/>
+          <a:p>
+            <a:r>
+              <a:rPr lang="en-US" dirty="0" smtClean="0"/>
+              <a:t>Time-Series Analysis (8k cores</a:t>
+            </a:r>
+            <a:r>
+              <a:rPr lang="en-US" dirty="0" smtClean="0"/>
+              <a:t>)</a:t>
+            </a:r>
+            <a:br>
+              <a:rPr lang="en-US" dirty="0" smtClean="0"/>
+            </a:br>
+            <a:r>
+              <a:rPr lang="en-US" sz="2400" dirty="0" smtClean="0"/>
+              <a:t>10-cycle increments</a:t>
+            </a:r>
+            <a:endParaRPr lang="en-US" sz="2400" dirty="0"/>
           </a:p>
         </p:txBody>
       </p:sp>
@@ -42276,9 +42311,20 @@
           <a:p>
             <a:r>
               <a:rPr lang="en-US" dirty="0" smtClean="0"/>
-              <a:t>Time-Series Analysis: Variance</a:t>
-            </a:r>
-            <a:endParaRPr lang="en-US" sz="1600" dirty="0"/>
+              <a:t>Time-Series Analysis: </a:t>
+            </a:r>
+            <a:r>
+              <a:rPr lang="en-US" dirty="0" smtClean="0"/>
+              <a:t>Variance</a:t>
+            </a:r>
+            <a:br>
+              <a:rPr lang="en-US" dirty="0" smtClean="0"/>
+            </a:br>
+            <a:r>
+              <a:rPr lang="en-US" sz="2400" dirty="0"/>
+              <a:t>10-cycle increments</a:t>
+            </a:r>
+            <a:endParaRPr lang="en-US" sz="2400" dirty="0"/>
           </a:p>
         </p:txBody>
       </p:sp>
@@ -42330,15 +42376,7 @@
           <a:p>
             <a:r>
               <a:rPr lang="en-US" sz="1600" dirty="0" smtClean="0"/>
-              <a:t>CTH (</a:t>
-            </a:r>
-            <a:r>
-              <a:rPr lang="en-US" sz="1600" dirty="0" smtClean="0"/>
-              <a:t>mean+std</a:t>
-            </a:r>
-            <a:r>
-              <a:rPr lang="en-US" sz="1600" dirty="0" smtClean="0"/>
-              <a:t>)</a:t>
+              <a:t>CTH (mean+std)</a:t>
             </a:r>
             <a:endParaRPr lang="en-US" sz="1600" dirty="0"/>
           </a:p>
@@ -42464,7 +42502,7 @@
         <p:spPr>
           <a:xfrm>
             <a:off x="6248400" y="4806893"/>
-            <a:ext cx="1515359" cy="338554"/>
+            <a:ext cx="1367482" cy="338554"/>
           </a:xfrm>
           <a:prstGeom prst="rect">
             <a:avLst/>
@@ -42479,7 +42517,11 @@
           <a:p>
             <a:r>
               <a:rPr lang="en-US" sz="1600" dirty="0" smtClean="0"/>
-              <a:t>CTH (overlayed)</a:t>
+              <a:t>CTH </a:t>
+            </a:r>
+            <a:r>
+              <a:rPr lang="en-US" sz="1600" dirty="0" smtClean="0"/>
+              <a:t>(overlaid)</a:t>
             </a:r>
             <a:endParaRPr lang="en-US" sz="1600" dirty="0"/>
           </a:p>
@@ -42539,9 +42581,20 @@
           <a:p>
             <a:r>
               <a:rPr lang="en-US" dirty="0" smtClean="0"/>
-              <a:t>Time-Series Analysis: Variance</a:t>
-            </a:r>
-            <a:endParaRPr lang="en-US" sz="1600" dirty="0"/>
+              <a:t>Time-Series Analysis: </a:t>
+            </a:r>
+            <a:r>
+              <a:rPr lang="en-US" dirty="0" smtClean="0"/>
+              <a:t>Variance</a:t>
+            </a:r>
+            <a:br>
+              <a:rPr lang="en-US" dirty="0" smtClean="0"/>
+            </a:br>
+            <a:r>
+              <a:rPr lang="en-US" sz="2400" dirty="0" smtClean="0"/>
+              <a:t>10-cycle increments</a:t>
+            </a:r>
+            <a:endParaRPr lang="en-US" sz="2400" dirty="0"/>
           </a:p>
         </p:txBody>
       </p:sp>
@@ -42789,29 +42842,6 @@
           <a:chExt cx="0" cy="0"/>
         </a:xfrm>
       </p:grpSpPr>
-      <p:sp>
-        <p:nvSpPr>
-          <p:cNvPr id="2" name="Title 1"/>
-          <p:cNvSpPr>
-            <a:spLocks noGrp="1"/>
-          </p:cNvSpPr>
-          <p:nvPr>
-            <p:ph type="title"/>
-          </p:nvPr>
-        </p:nvSpPr>
-        <p:spPr/>
-        <p:txBody>
-          <a:bodyPr/>
-          <a:lstStyle/>
-          <a:p>
-            <a:r>
-              <a:rPr lang="en-US" dirty="0" smtClean="0"/>
-              <a:t>Time-Series Analysis: Variance</a:t>
-            </a:r>
-            <a:endParaRPr lang="en-US" dirty="0"/>
-          </a:p>
-        </p:txBody>
-      </p:sp>
       <p:sp>
         <p:nvSpPr>
           <p:cNvPr id="3" name="Slide Number Placeholder 2"/>
@@ -43154,11 +43184,7 @@
             </a:r>
             <a:r>
               <a:rPr lang="en-US" dirty="0" smtClean="0"/>
-              <a:t> </a:t>
-            </a:r>
-            <a:r>
-              <a:rPr lang="en-US" dirty="0" smtClean="0"/>
-              <a:t>transfer times have noticeable variance.</a:t>
+              <a:t> transfer times have noticeable variance.</a:t>
             </a:r>
           </a:p>
           <a:p>
@@ -43186,6 +43212,40 @@
           <a:p>
             <a:pPr algn="just"/>
             <a:endParaRPr lang="en-US" dirty="0"/>
+          </a:p>
+        </p:txBody>
+      </p:sp>
+      <p:sp>
+        <p:nvSpPr>
+          <p:cNvPr id="2" name="Title 1"/>
+          <p:cNvSpPr>
+            <a:spLocks noGrp="1"/>
+          </p:cNvSpPr>
+          <p:nvPr>
+            <p:ph type="title"/>
+          </p:nvPr>
+        </p:nvSpPr>
+        <p:spPr/>
+        <p:txBody>
+          <a:bodyPr/>
+          <a:lstStyle/>
+          <a:p>
+            <a:r>
+              <a:rPr lang="en-US" dirty="0" smtClean="0"/>
+              <a:t>Time-Series Analysis: </a:t>
+            </a:r>
+            <a:r>
+              <a:rPr lang="en-US" dirty="0" smtClean="0"/>
+              <a:t>Variance</a:t>
+            </a:r>
+            <a:br>
+              <a:rPr lang="en-US" dirty="0" smtClean="0"/>
+            </a:br>
+            <a:r>
+              <a:rPr lang="en-US" sz="2400" dirty="0" smtClean="0"/>
+              <a:t>10-cycle increments</a:t>
+            </a:r>
+            <a:endParaRPr lang="en-US" sz="2400" dirty="0"/>
           </a:p>
         </p:txBody>
       </p:sp>
@@ -43444,7 +43504,7 @@
         </p:nvSpPr>
         <p:spPr>
           <a:xfrm>
-            <a:off x="1752600" y="4995446"/>
+            <a:off x="1143000" y="3242846"/>
             <a:ext cx="1433305" cy="338554"/>
           </a:xfrm>
           <a:prstGeom prst="rect">
@@ -43478,7 +43538,7 @@
         </p:nvSpPr>
         <p:spPr>
           <a:xfrm>
-            <a:off x="6248400" y="4995446"/>
+            <a:off x="4267200" y="3242846"/>
             <a:ext cx="1345991" cy="338554"/>
           </a:xfrm>
           <a:prstGeom prst="rect">
@@ -43512,8 +43572,8 @@
         </p:nvSpPr>
         <p:spPr>
           <a:xfrm>
-            <a:off x="304800" y="5791200"/>
-            <a:ext cx="8610600" cy="353204"/>
+            <a:off x="6462256" y="1219200"/>
+            <a:ext cx="2590800" cy="4933950"/>
           </a:xfrm>
           <a:prstGeom prst="rect">
             <a:avLst/>
@@ -43557,11 +43617,46 @@
               <a:t>)</a:t>
             </a:r>
           </a:p>
+          <a:p>
+            <a:pPr algn="just"/>
+            <a:endParaRPr lang="en-US" dirty="0"/>
+          </a:p>
+          <a:p>
+            <a:pPr algn="just"/>
+            <a:r>
+              <a:rPr lang="en-US" dirty="0" smtClean="0"/>
+              <a:t>In-transit plots show “effective” processing rate.   Since </a:t>
+            </a:r>
+            <a:r>
+              <a:rPr lang="en-US" dirty="0" err="1" smtClean="0"/>
+              <a:t>viz</a:t>
+            </a:r>
+            <a:r>
+              <a:rPr lang="en-US" dirty="0" smtClean="0"/>
+              <a:t> time is flat, we expect the effective rate to decrease. </a:t>
+            </a:r>
+          </a:p>
+          <a:p>
+            <a:pPr algn="just"/>
+            <a:endParaRPr lang="en-US" dirty="0"/>
+          </a:p>
+          <a:p>
+            <a:pPr algn="just"/>
+            <a:r>
+              <a:rPr lang="en-US" dirty="0" smtClean="0"/>
+              <a:t>At 4k and 8k, effective processing rate of </a:t>
+            </a:r>
+            <a:r>
+              <a:rPr lang="en-US" dirty="0" smtClean="0"/>
+              <a:t>in transit outperforms in situ. </a:t>
+            </a:r>
+            <a:endParaRPr lang="en-US" dirty="0" smtClean="0"/>
+          </a:p>
         </p:txBody>
       </p:sp>
       <p:pic>
         <p:nvPicPr>
-          <p:cNvPr id="5" name="Picture 4"/>
+          <p:cNvPr id="4" name="Picture 3"/>
           <p:cNvPicPr>
             <a:picLocks noChangeAspect="1"/>
           </p:cNvPicPr>
@@ -43575,8 +43670,8 @@
         </p:blipFill>
         <p:spPr>
           <a:xfrm>
-            <a:off x="0" y="1267102"/>
-            <a:ext cx="4572000" cy="3657600"/>
+            <a:off x="3187399" y="835152"/>
+            <a:ext cx="3051810" cy="2441448"/>
           </a:xfrm>
           <a:prstGeom prst="rect">
             <a:avLst/>
@@ -43585,7 +43680,7 @@
       </p:pic>
       <p:pic>
         <p:nvPicPr>
-          <p:cNvPr id="10" name="Picture 9"/>
+          <p:cNvPr id="6" name="Picture 5"/>
           <p:cNvPicPr>
             <a:picLocks noChangeAspect="1"/>
           </p:cNvPicPr>
@@ -43599,18 +43694,138 @@
         </p:blipFill>
         <p:spPr>
           <a:xfrm>
-            <a:off x="4495800" y="1267102"/>
-            <a:ext cx="4572000" cy="3657600"/>
+            <a:off x="135589" y="835152"/>
+            <a:ext cx="3051810" cy="2441448"/>
           </a:xfrm>
           <a:prstGeom prst="rect">
             <a:avLst/>
           </a:prstGeom>
         </p:spPr>
       </p:pic>
+      <p:pic>
+        <p:nvPicPr>
+          <p:cNvPr id="7" name="Picture 6"/>
+          <p:cNvPicPr>
+            <a:picLocks noChangeAspect="1"/>
+          </p:cNvPicPr>
+          <p:nvPr/>
+        </p:nvPicPr>
+        <p:blipFill>
+          <a:blip r:embed="rId4"/>
+          <a:stretch>
+            <a:fillRect/>
+          </a:stretch>
+        </p:blipFill>
+        <p:spPr>
+          <a:xfrm>
+            <a:off x="135589" y="3581400"/>
+            <a:ext cx="3051810" cy="2441448"/>
+          </a:xfrm>
+          <a:prstGeom prst="rect">
+            <a:avLst/>
+          </a:prstGeom>
+        </p:spPr>
+      </p:pic>
+      <p:pic>
+        <p:nvPicPr>
+          <p:cNvPr id="11" name="Picture 10"/>
+          <p:cNvPicPr>
+            <a:picLocks noChangeAspect="1"/>
+          </p:cNvPicPr>
+          <p:nvPr/>
+        </p:nvPicPr>
+        <p:blipFill>
+          <a:blip r:embed="rId5"/>
+          <a:stretch>
+            <a:fillRect/>
+          </a:stretch>
+        </p:blipFill>
+        <p:spPr>
+          <a:xfrm>
+            <a:off x="3187399" y="3581400"/>
+            <a:ext cx="3051810" cy="2441448"/>
+          </a:xfrm>
+          <a:prstGeom prst="rect">
+            <a:avLst/>
+          </a:prstGeom>
+        </p:spPr>
+      </p:pic>
+      <p:sp>
+        <p:nvSpPr>
+          <p:cNvPr id="13" name="TextBox 12"/>
+          <p:cNvSpPr txBox="1"/>
+          <p:nvPr/>
+        </p:nvSpPr>
+        <p:spPr>
+          <a:xfrm>
+            <a:off x="661101" y="5983873"/>
+            <a:ext cx="2310699" cy="338554"/>
+          </a:xfrm>
+          <a:prstGeom prst="rect">
+            <a:avLst/>
+          </a:prstGeom>
+          <a:noFill/>
+        </p:spPr>
+        <p:txBody>
+          <a:bodyPr wrap="none" rtlCol="0">
+            <a:spAutoFit/>
+          </a:bodyPr>
+          <a:lstStyle/>
+          <a:p>
+            <a:r>
+              <a:rPr lang="en-US" sz="1600" i="1" dirty="0" smtClean="0"/>
+              <a:t>In </a:t>
+            </a:r>
+            <a:r>
+              <a:rPr lang="en-US" sz="1600" i="1" dirty="0" smtClean="0"/>
+              <a:t>transit </a:t>
+            </a:r>
+            <a:r>
+              <a:rPr lang="en-US" sz="1600" dirty="0" smtClean="0"/>
+              <a:t>extra (effective)</a:t>
+            </a:r>
+            <a:endParaRPr lang="en-US" sz="1600" dirty="0"/>
+          </a:p>
+        </p:txBody>
+      </p:sp>
+      <p:sp>
+        <p:nvSpPr>
+          <p:cNvPr id="15" name="TextBox 14"/>
+          <p:cNvSpPr txBox="1"/>
+          <p:nvPr/>
+        </p:nvSpPr>
+        <p:spPr>
+          <a:xfrm>
+            <a:off x="3505200" y="5983873"/>
+            <a:ext cx="2355282" cy="338554"/>
+          </a:xfrm>
+          <a:prstGeom prst="rect">
+            <a:avLst/>
+          </a:prstGeom>
+          <a:noFill/>
+        </p:spPr>
+        <p:txBody>
+          <a:bodyPr wrap="none" rtlCol="0">
+            <a:spAutoFit/>
+          </a:bodyPr>
+          <a:lstStyle/>
+          <a:p>
+            <a:r>
+              <a:rPr lang="en-US" sz="1600" i="1" dirty="0" smtClean="0"/>
+              <a:t>In situ </a:t>
+            </a:r>
+            <a:r>
+              <a:rPr lang="en-US" sz="1600" dirty="0" smtClean="0"/>
+              <a:t>inclusive (effective)</a:t>
+            </a:r>
+            <a:endParaRPr lang="en-US" sz="1600" dirty="0"/>
+          </a:p>
+        </p:txBody>
+      </p:sp>
     </p:spTree>
     <p:extLst>
       <p:ext uri="{BB962C8B-B14F-4D97-AF65-F5344CB8AC3E}">
-        <p14:creationId xmlns:p14="http://schemas.microsoft.com/office/powerpoint/2010/main" val="3426755721"/>
+        <p14:creationId xmlns:p14="http://schemas.microsoft.com/office/powerpoint/2010/main" val="329094816"/>
       </p:ext>
     </p:extLst>
   </p:cSld>
@@ -46252,13 +46467,8 @@
             <a:pPr rtl="0" eaLnBrk="1" fontAlgn="base" hangingPunct="1"/>
             <a:r>
               <a:rPr lang="en-US" dirty="0" smtClean="0"/>
-              <a:t>Algorithm comparison.  Three similar algorithms with three different scaling </a:t>
-            </a:r>
-            <a:r>
-              <a:rPr lang="en-US" dirty="0" smtClean="0"/>
-              <a:t>behaviors</a:t>
-            </a:r>
-            <a:endParaRPr lang="en-US" dirty="0" smtClean="0"/>
+              <a:t>Algorithm comparison.  Three similar algorithms with three different scaling behaviors</a:t>
+            </a:r>
           </a:p>
           <a:p>
             <a:pPr lvl="1"/>
@@ -46288,11 +46498,7 @@
           <a:p>
             <a:r>
               <a:rPr lang="en-US" dirty="0" smtClean="0"/>
-              <a:t>No-wait analysis </a:t>
-            </a:r>
-            <a:r>
-              <a:rPr lang="en-US" dirty="0" smtClean="0"/>
-              <a:t>(</a:t>
+              <a:t>No-wait analysis (</a:t>
             </a:r>
             <a:r>
               <a:rPr lang="en-US" i="1" dirty="0" smtClean="0"/>
@@ -46328,11 +46534,7 @@
           <a:p>
             <a:r>
               <a:rPr lang="en-US" dirty="0" smtClean="0"/>
-              <a:t>Zero copy transfers </a:t>
-            </a:r>
-            <a:r>
-              <a:rPr lang="en-US" dirty="0" smtClean="0"/>
-              <a:t>(</a:t>
+              <a:t>Zero copy transfers (</a:t>
             </a:r>
             <a:r>
               <a:rPr lang="en-US" i="1" dirty="0" smtClean="0"/>
@@ -46342,7 +46544,6 @@
               <a:rPr lang="en-US" dirty="0" smtClean="0"/>
               <a:t>)</a:t>
             </a:r>
-            <a:endParaRPr lang="en-US" dirty="0" smtClean="0"/>
           </a:p>
           <a:p>
             <a:r>
@@ -46517,19 +46718,7 @@
                 <a:ea typeface="ＭＳ Ｐゴシック" charset="-128"/>
                 <a:cs typeface="Calibri"/>
               </a:rPr>
-              <a:t> </a:t>
-            </a:r>
-            <a:r>
-              <a:rPr lang="en-US" sz="2400" dirty="0" smtClean="0">
-                <a:solidFill>
-                  <a:schemeClr val="tx1"/>
-                </a:solidFill>
-                <a:effectLst/>
-                <a:latin typeface="Calibri"/>
-                <a:ea typeface="ＭＳ Ｐゴシック" charset="-128"/>
-                <a:cs typeface="Calibri"/>
-              </a:rPr>
-              <a:t>and </a:t>
+              <a:t> and </a:t>
             </a:r>
             <a:r>
               <a:rPr lang="en-US" sz="2400" i="1" dirty="0" smtClean="0">
@@ -46553,19 +46742,7 @@
                 <a:ea typeface="ＭＳ Ｐゴシック" charset="-128"/>
                 <a:cs typeface="Calibri"/>
               </a:rPr>
-              <a:t> </a:t>
-            </a:r>
-            <a:r>
-              <a:rPr lang="en-US" sz="2400" dirty="0" smtClean="0">
-                <a:solidFill>
-                  <a:schemeClr val="tx1"/>
-                </a:solidFill>
-                <a:effectLst/>
-                <a:latin typeface="Calibri"/>
-                <a:ea typeface="ＭＳ Ｐゴシック" charset="-128"/>
-                <a:cs typeface="Calibri"/>
-              </a:rPr>
-              <a:t>analysis capabilities on a problem provided by a Sandia analyst.</a:t>
+              <a:t> analysis capabilities on a problem provided by a Sandia analyst.</a:t>
             </a:r>
             <a:endParaRPr lang="en-US" dirty="0" smtClean="0">
               <a:effectLst/>
@@ -46808,11 +46985,7 @@
             </a:r>
             <a:r>
               <a:rPr lang="en-US" dirty="0" smtClean="0"/>
-              <a:t> </a:t>
-            </a:r>
-            <a:r>
-              <a:rPr lang="en-US" dirty="0" smtClean="0"/>
-              <a:t>workflows</a:t>
+              <a:t> workflows</a:t>
             </a:r>
             <a:endParaRPr lang="en-US" dirty="0"/>
           </a:p>
@@ -47053,11 +47226,7 @@
             </a:r>
             <a:r>
               <a:rPr lang="en-US" sz="1200" dirty="0" smtClean="0"/>
-              <a:t> </a:t>
-            </a:r>
-            <a:r>
-              <a:rPr lang="en-US" sz="1200" dirty="0" smtClean="0"/>
-              <a:t>workflow, in which the science code communicates with data services nodes to perform analysis operations.  This is accomplished in this Milestone through the use of </a:t>
+              <a:t> workflow, in which the science code communicates with data services nodes to perform analysis operations.  This is accomplished in this Milestone through the use of </a:t>
             </a:r>
             <a:r>
               <a:rPr lang="en-US" sz="1200" i="1" dirty="0" smtClean="0"/>
@@ -47650,15 +47819,7 @@
             </a:pPr>
             <a:r>
               <a:rPr lang="en-US" dirty="0" smtClean="0"/>
-              <a:t>Fix AMR </a:t>
-            </a:r>
-            <a:r>
-              <a:rPr lang="en-US" dirty="0" smtClean="0"/>
-              <a:t>boundaries </a:t>
-            </a:r>
-            <a:r>
-              <a:rPr lang="en-US" dirty="0" smtClean="0"/>
-              <a:t>by inserting degenerate cells</a:t>
+              <a:t>Fix AMR boundaries by inserting degenerate cells</a:t>
             </a:r>
           </a:p>
           <a:p>

</xml_diff>

<commit_message>
Updated utilization to 10.58 core hours.
</commit_message>
<xml_diff>
--- a/Summary/SummarySlides.pptx
+++ b/Summary/SummarySlides.pptx
@@ -39116,6 +39116,10 @@
               <a:t>The Milestone Team completed over </a:t>
             </a:r>
             <a:r>
+              <a:rPr lang="en-US" dirty="0" smtClean="0"/>
+              <a:t>10.5</a:t>
+            </a:r>
+            <a:r>
               <a:rPr lang="en-US" sz="2400" dirty="0" smtClean="0">
                 <a:solidFill>
                   <a:schemeClr val="tx1"/>
@@ -39125,10 +39129,10 @@
                 <a:ea typeface="ＭＳ Ｐゴシック" charset="-128"/>
                 <a:cs typeface="Calibri"/>
               </a:rPr>
-              <a:t>9 million </a:t>
-            </a:r>
-            <a:r>
-              <a:rPr lang="en-US" sz="2400" dirty="0" smtClean="0">
+              <a:t> million </a:t>
+            </a:r>
+            <a:r>
+              <a:rPr lang="en-US" sz="2400" dirty="0" err="1" smtClean="0">
                 <a:solidFill>
                   <a:schemeClr val="tx1"/>
                 </a:solidFill>
@@ -39137,7 +39141,31 @@
                 <a:ea typeface="ＭＳ Ｐゴシック" charset="-128"/>
                 <a:cs typeface="Calibri"/>
               </a:rPr>
-              <a:t>node hours of Cielo tests on both </a:t>
+              <a:t>cpu</a:t>
+            </a:r>
+            <a:r>
+              <a:rPr lang="en-US" sz="2400" dirty="0" smtClean="0">
+                <a:solidFill>
+                  <a:schemeClr val="tx1"/>
+                </a:solidFill>
+                <a:effectLst/>
+                <a:latin typeface="Calibri"/>
+                <a:ea typeface="ＭＳ Ｐゴシック" charset="-128"/>
+                <a:cs typeface="Calibri"/>
+              </a:rPr>
+              <a:t> hours </a:t>
+            </a:r>
+            <a:r>
+              <a:rPr lang="en-US" sz="2400" dirty="0" smtClean="0">
+                <a:solidFill>
+                  <a:schemeClr val="tx1"/>
+                </a:solidFill>
+                <a:effectLst/>
+                <a:latin typeface="Calibri"/>
+                <a:ea typeface="ＭＳ Ｐゴシック" charset="-128"/>
+                <a:cs typeface="Calibri"/>
+              </a:rPr>
+              <a:t>of Cielo tests on both </a:t>
             </a:r>
             <a:r>
               <a:rPr lang="en-US" sz="2400" i="1" dirty="0" smtClean="0">

</xml_diff>

<commit_message>
updating slides, letter and tex for including them
</commit_message>
<xml_diff>
--- a/Summary/SummarySlides.pptx
+++ b/Summary/SummarySlides.pptx
@@ -177,140 +177,6 @@
           <a:chExt cx="0" cy="0"/>
         </a:xfrm>
       </p:grpSpPr>
-      <p:sp>
-        <p:nvSpPr>
-          <p:cNvPr id="2" name="Header Placeholder 1"/>
-          <p:cNvSpPr>
-            <a:spLocks noGrp="1"/>
-          </p:cNvSpPr>
-          <p:nvPr>
-            <p:ph type="hdr" sz="quarter"/>
-          </p:nvPr>
-        </p:nvSpPr>
-        <p:spPr>
-          <a:xfrm>
-            <a:off x="0" y="0"/>
-            <a:ext cx="2971800" cy="457200"/>
-          </a:xfrm>
-          <a:prstGeom prst="rect">
-            <a:avLst/>
-          </a:prstGeom>
-        </p:spPr>
-        <p:txBody>
-          <a:bodyPr vert="horz" lIns="91440" tIns="45720" rIns="91440" bIns="45720" rtlCol="0"/>
-          <a:lstStyle>
-            <a:lvl1pPr algn="l">
-              <a:defRPr sz="1200"/>
-            </a:lvl1pPr>
-          </a:lstStyle>
-          <a:p>
-            <a:endParaRPr lang="en-US" dirty="0"/>
-          </a:p>
-        </p:txBody>
-      </p:sp>
-      <p:sp>
-        <p:nvSpPr>
-          <p:cNvPr id="3" name="Date Placeholder 2"/>
-          <p:cNvSpPr>
-            <a:spLocks noGrp="1"/>
-          </p:cNvSpPr>
-          <p:nvPr>
-            <p:ph type="dt" sz="quarter" idx="1"/>
-          </p:nvPr>
-        </p:nvSpPr>
-        <p:spPr>
-          <a:xfrm>
-            <a:off x="3884613" y="0"/>
-            <a:ext cx="2971800" cy="457200"/>
-          </a:xfrm>
-          <a:prstGeom prst="rect">
-            <a:avLst/>
-          </a:prstGeom>
-        </p:spPr>
-        <p:txBody>
-          <a:bodyPr vert="horz" lIns="91440" tIns="45720" rIns="91440" bIns="45720" rtlCol="0"/>
-          <a:lstStyle>
-            <a:lvl1pPr algn="r">
-              <a:defRPr sz="1200"/>
-            </a:lvl1pPr>
-          </a:lstStyle>
-          <a:p>
-            <a:fld id="{E02E8FA7-2F4C-5D49-9BA4-AF921E49AE74}" type="datetime1">
-              <a:rPr lang="en-US" smtClean="0"/>
-              <a:pPr/>
-              <a:t>3/4/13</a:t>
-            </a:fld>
-            <a:endParaRPr lang="en-US" dirty="0"/>
-          </a:p>
-        </p:txBody>
-      </p:sp>
-      <p:sp>
-        <p:nvSpPr>
-          <p:cNvPr id="4" name="Footer Placeholder 3"/>
-          <p:cNvSpPr>
-            <a:spLocks noGrp="1"/>
-          </p:cNvSpPr>
-          <p:nvPr>
-            <p:ph type="ftr" sz="quarter" idx="2"/>
-          </p:nvPr>
-        </p:nvSpPr>
-        <p:spPr>
-          <a:xfrm>
-            <a:off x="0" y="8685213"/>
-            <a:ext cx="2971800" cy="457200"/>
-          </a:xfrm>
-          <a:prstGeom prst="rect">
-            <a:avLst/>
-          </a:prstGeom>
-        </p:spPr>
-        <p:txBody>
-          <a:bodyPr vert="horz" lIns="91440" tIns="45720" rIns="91440" bIns="45720" rtlCol="0" anchor="b"/>
-          <a:lstStyle>
-            <a:lvl1pPr algn="l">
-              <a:defRPr sz="1200"/>
-            </a:lvl1pPr>
-          </a:lstStyle>
-          <a:p>
-            <a:endParaRPr lang="en-US" dirty="0"/>
-          </a:p>
-        </p:txBody>
-      </p:sp>
-      <p:sp>
-        <p:nvSpPr>
-          <p:cNvPr id="5" name="Slide Number Placeholder 4"/>
-          <p:cNvSpPr>
-            <a:spLocks noGrp="1"/>
-          </p:cNvSpPr>
-          <p:nvPr>
-            <p:ph type="sldNum" sz="quarter" idx="3"/>
-          </p:nvPr>
-        </p:nvSpPr>
-        <p:spPr>
-          <a:xfrm>
-            <a:off x="3884613" y="8685213"/>
-            <a:ext cx="2971800" cy="457200"/>
-          </a:xfrm>
-          <a:prstGeom prst="rect">
-            <a:avLst/>
-          </a:prstGeom>
-        </p:spPr>
-        <p:txBody>
-          <a:bodyPr vert="horz" lIns="91440" tIns="45720" rIns="91440" bIns="45720" rtlCol="0" anchor="b"/>
-          <a:lstStyle>
-            <a:lvl1pPr algn="r">
-              <a:defRPr sz="1200"/>
-            </a:lvl1pPr>
-          </a:lstStyle>
-          <a:p>
-            <a:fld id="{A4337E74-6FDC-BA4C-B798-CEB3174D958C}" type="slidenum">
-              <a:rPr lang="en-US" smtClean="0"/>
-              <a:pPr/>
-              <a:t>‹#›</a:t>
-            </a:fld>
-            <a:endParaRPr lang="en-US" dirty="0"/>
-          </a:p>
-        </p:txBody>
-      </p:sp>
     </p:spTree>
     <p:extLst>
       <p:ext uri="{BB962C8B-B14F-4D97-AF65-F5344CB8AC3E}">
@@ -319,7 +185,7 @@
     </p:extLst>
   </p:cSld>
   <p:clrMap bg1="lt1" tx1="dk1" bg2="lt2" tx2="dk2" accent1="accent1" accent2="accent2" accent3="accent3" accent4="accent4" accent5="accent5" accent6="accent6" hlink="hlink" folHlink="folHlink"/>
-  <p:hf sldNum="0" ftr="0" dt="0"/>
+  <p:hf sldNum="0" hdr="0" ftr="0" dt="0"/>
 </p:handoutMaster>
 </file>
 
@@ -403,10 +269,9 @@
             </a:lvl1pPr>
           </a:lstStyle>
           <a:p>
-            <a:fld id="{0426B0FB-EA67-3A40-825F-8F252A860502}" type="datetime1">
+            <a:fld id="{1E41F11C-C490-BC4C-9D98-B916474B0AA7}" type="datetime1">
               <a:rPr lang="en-US" smtClean="0"/>
-              <a:pPr/>
-              <a:t>3/4/13</a:t>
+              <a:t>3/13/13</a:t>
             </a:fld>
             <a:endParaRPr lang="en-US" dirty="0"/>
           </a:p>
@@ -582,7 +447,7 @@
     </p:extLst>
   </p:cSld>
   <p:clrMap bg1="lt1" tx1="dk1" bg2="lt2" tx2="dk2" accent1="accent1" accent2="accent2" accent3="accent3" accent4="accent4" accent5="accent5" accent6="accent6" hlink="hlink" folHlink="folHlink"/>
-  <p:hf sldNum="0" ftr="0" dt="0"/>
+  <p:hf sldNum="0" hdr="0" ftr="0" dt="0"/>
   <p:notesStyle>
     <a:lvl1pPr marL="0" algn="l" defTabSz="457200" rtl="0" eaLnBrk="1" latinLnBrk="0" hangingPunct="1">
       <a:defRPr sz="1200" kern="1200">
@@ -722,43 +587,14 @@
           <a:bodyPr/>
           <a:lstStyle/>
           <a:p>
-            <a:r>
-              <a:rPr lang="en-US" dirty="0" smtClean="0"/>
-              <a:t>I was lazy</a:t>
-            </a:r>
-            <a:r>
-              <a:rPr lang="en-US" baseline="0" dirty="0" smtClean="0"/>
-              <a:t> and just took a screenshot from the paper rather than try to recreate the table.</a:t>
-            </a:r>
-          </a:p>
-          <a:p>
-            <a:endParaRPr lang="en-US" dirty="0"/>
-          </a:p>
-        </p:txBody>
-      </p:sp>
-      <p:sp>
-        <p:nvSpPr>
-          <p:cNvPr id="4" name="Header Placeholder 3"/>
-          <p:cNvSpPr>
-            <a:spLocks noGrp="1"/>
-          </p:cNvSpPr>
-          <p:nvPr>
-            <p:ph type="hdr" sz="quarter" idx="10"/>
-          </p:nvPr>
-        </p:nvSpPr>
-        <p:spPr/>
-        <p:txBody>
-          <a:bodyPr/>
-          <a:lstStyle/>
-          <a:p>
-            <a:endParaRPr lang="en-US" dirty="0"/>
+            <a:endParaRPr lang="en-US"/>
           </a:p>
         </p:txBody>
       </p:sp>
     </p:spTree>
     <p:extLst>
       <p:ext uri="{BB962C8B-B14F-4D97-AF65-F5344CB8AC3E}">
-        <p14:creationId xmlns:p14="http://schemas.microsoft.com/office/powerpoint/2010/main" val="1058564889"/>
+        <p14:creationId xmlns:p14="http://schemas.microsoft.com/office/powerpoint/2010/main" val="4151359867"/>
       </p:ext>
     </p:extLst>
   </p:cSld>
@@ -814,93 +650,13 @@
           <a:p>
             <a:r>
               <a:rPr lang="en-US" dirty="0" smtClean="0"/>
-              <a:t>Experiments (recap)</a:t>
-            </a:r>
-          </a:p>
-          <a:p>
-            <a:pPr marL="171450" indent="-171450">
-              <a:buFont typeface="Arial"/>
-              <a:buChar char="•"/>
-            </a:pPr>
+              <a:t>I was lazy</a:t>
+            </a:r>
             <a:r>
               <a:rPr lang="en-US" baseline="0" dirty="0" smtClean="0"/>
-              <a:t>5 applications: 2 in-situ, 2 in-transit, 1 traditional post-processing</a:t>
-            </a:r>
-          </a:p>
-          <a:p>
-            <a:pPr marL="171450" indent="-171450">
-              <a:buFont typeface="Arial"/>
-              <a:buChar char="•"/>
-            </a:pPr>
-            <a:r>
-              <a:rPr lang="en-US" baseline="0" dirty="0" smtClean="0"/>
-              <a:t>3 datasets: 33k, 220k, 1.5m</a:t>
-            </a:r>
-          </a:p>
-          <a:p>
-            <a:pPr marL="171450" indent="-171450">
-              <a:buFont typeface="Arial"/>
-              <a:buChar char="•"/>
-            </a:pPr>
-            <a:endParaRPr lang="en-US" baseline="0" dirty="0" smtClean="0"/>
-          </a:p>
-          <a:p>
-            <a:pPr marL="0" indent="0">
-              <a:buFont typeface="Arial"/>
-              <a:buNone/>
-            </a:pPr>
-            <a:r>
-              <a:rPr lang="en-US" baseline="0" dirty="0" smtClean="0"/>
-              <a:t>Notes: </a:t>
-            </a:r>
-          </a:p>
-          <a:p>
-            <a:pPr marL="171450" indent="-171450">
-              <a:buFont typeface="Arial"/>
-              <a:buChar char="•"/>
-            </a:pPr>
-            <a:r>
-              <a:rPr lang="en-US" baseline="0" dirty="0" smtClean="0"/>
-              <a:t>Total runtime </a:t>
-            </a:r>
-          </a:p>
-          <a:p>
-            <a:pPr marL="171450" indent="-171450">
-              <a:buFont typeface="Arial"/>
-              <a:buChar char="•"/>
-            </a:pPr>
-            <a:r>
-              <a:rPr lang="en-US" baseline="0" dirty="0" smtClean="0"/>
-              <a:t>Strong scaling for each dataset</a:t>
-            </a:r>
-          </a:p>
-          <a:p>
-            <a:pPr marL="171450" indent="-171450">
-              <a:buFont typeface="Arial"/>
-              <a:buChar char="•"/>
-            </a:pPr>
-            <a:r>
-              <a:rPr lang="en-US" baseline="0" dirty="0" smtClean="0"/>
-              <a:t>Error bars show variance across 5 or more runs</a:t>
-            </a:r>
-            <a:endParaRPr lang="en-US" dirty="0"/>
-          </a:p>
-        </p:txBody>
-      </p:sp>
-      <p:sp>
-        <p:nvSpPr>
-          <p:cNvPr id="4" name="Header Placeholder 3"/>
-          <p:cNvSpPr>
-            <a:spLocks noGrp="1"/>
-          </p:cNvSpPr>
-          <p:nvPr>
-            <p:ph type="hdr" sz="quarter" idx="10"/>
-          </p:nvPr>
-        </p:nvSpPr>
-        <p:spPr/>
-        <p:txBody>
-          <a:bodyPr/>
-          <a:lstStyle/>
+              <a:t> and just took a screenshot from the paper rather than try to recreate the table.</a:t>
+            </a:r>
+          </a:p>
           <a:p>
             <a:endParaRPr lang="en-US" dirty="0"/>
           </a:p>
@@ -909,7 +665,7 @@
     </p:spTree>
     <p:extLst>
       <p:ext uri="{BB962C8B-B14F-4D97-AF65-F5344CB8AC3E}">
-        <p14:creationId xmlns:p14="http://schemas.microsoft.com/office/powerpoint/2010/main" val="873664476"/>
+        <p14:creationId xmlns:p14="http://schemas.microsoft.com/office/powerpoint/2010/main" val="1058564889"/>
       </p:ext>
     </p:extLst>
   </p:cSld>
@@ -965,72 +721,75 @@
           <a:p>
             <a:r>
               <a:rPr lang="en-US" dirty="0" smtClean="0"/>
+              <a:t>Experiments (recap)</a:t>
+            </a:r>
+          </a:p>
+          <a:p>
+            <a:pPr marL="171450" indent="-171450">
+              <a:buFont typeface="Arial"/>
+              <a:buChar char="•"/>
+            </a:pPr>
+            <a:r>
+              <a:rPr lang="en-US" baseline="0" dirty="0" smtClean="0"/>
+              <a:t>5 applications: 2 in-situ, 2 in-transit, 1 traditional post-processing</a:t>
+            </a:r>
+          </a:p>
+          <a:p>
+            <a:pPr marL="171450" indent="-171450">
+              <a:buFont typeface="Arial"/>
+              <a:buChar char="•"/>
+            </a:pPr>
+            <a:r>
+              <a:rPr lang="en-US" baseline="0" dirty="0" smtClean="0"/>
+              <a:t>3 datasets: 33k, 220k, 1.5m</a:t>
+            </a:r>
+          </a:p>
+          <a:p>
+            <a:pPr marL="171450" indent="-171450">
+              <a:buFont typeface="Arial"/>
+              <a:buChar char="•"/>
+            </a:pPr>
+            <a:endParaRPr lang="en-US" baseline="0" dirty="0" smtClean="0"/>
+          </a:p>
+          <a:p>
+            <a:pPr marL="0" indent="0">
+              <a:buFont typeface="Arial"/>
+              <a:buNone/>
+            </a:pPr>
+            <a:r>
+              <a:rPr lang="en-US" baseline="0" dirty="0" smtClean="0"/>
               <a:t>Notes: </a:t>
             </a:r>
           </a:p>
           <a:p>
-            <a:r>
-              <a:rPr lang="en-US" dirty="0" smtClean="0"/>
-              <a:t>  - CTH</a:t>
-            </a:r>
+            <a:pPr marL="171450" indent="-171450">
+              <a:buFont typeface="Arial"/>
+              <a:buChar char="•"/>
+            </a:pPr>
             <a:r>
               <a:rPr lang="en-US" baseline="0" dirty="0" smtClean="0"/>
-              <a:t> computation scales really well (as expected)</a:t>
-            </a:r>
-            <a:endParaRPr lang="en-US" dirty="0" smtClean="0"/>
-          </a:p>
-          <a:p>
-            <a:r>
-              <a:rPr lang="en-US" dirty="0" smtClean="0"/>
-              <a:t>  - Baseline analysis algorithm scales poorly.</a:t>
-            </a:r>
+              <a:t>Total runtime </a:t>
+            </a:r>
+          </a:p>
+          <a:p>
+            <a:pPr marL="171450" indent="-171450">
+              <a:buFont typeface="Arial"/>
+              <a:buChar char="•"/>
+            </a:pPr>
             <a:r>
               <a:rPr lang="en-US" baseline="0" dirty="0" smtClean="0"/>
-              <a:t>  Looks independent of number of cores. </a:t>
-            </a:r>
-          </a:p>
-          <a:p>
+              <a:t>Strong scaling for each dataset</a:t>
+            </a:r>
+          </a:p>
+          <a:p>
+            <a:pPr marL="171450" indent="-171450">
+              <a:buFont typeface="Arial"/>
+              <a:buChar char="•"/>
+            </a:pPr>
             <a:r>
               <a:rPr lang="en-US" baseline="0" dirty="0" smtClean="0"/>
-              <a:t>  - Refined algorithm has much lower analysis overhead, but initialization cost is problematic</a:t>
-            </a:r>
-          </a:p>
-          <a:p>
-            <a:r>
-              <a:rPr lang="en-US" baseline="0" dirty="0" smtClean="0"/>
-              <a:t>  - In-transit is compute bound at 4 &amp; 8K, analysis bound (requires waits at 16 and 32K</a:t>
-            </a:r>
-          </a:p>
-          <a:p>
-            <a:r>
-              <a:rPr lang="en-US" baseline="0" dirty="0" smtClean="0"/>
-              <a:t>     - Not enough work for the compute nodes</a:t>
-            </a:r>
-          </a:p>
-          <a:p>
-            <a:r>
-              <a:rPr lang="en-US" baseline="0" dirty="0" smtClean="0"/>
-              <a:t>     - Analysis algorithm is not scalable</a:t>
-            </a:r>
-            <a:endParaRPr lang="en-US" dirty="0"/>
-          </a:p>
-        </p:txBody>
-      </p:sp>
-      <p:sp>
-        <p:nvSpPr>
-          <p:cNvPr id="4" name="Header Placeholder 3"/>
-          <p:cNvSpPr>
-            <a:spLocks noGrp="1"/>
-          </p:cNvSpPr>
-          <p:nvPr>
-            <p:ph type="hdr" sz="quarter" idx="10"/>
-          </p:nvPr>
-        </p:nvSpPr>
-        <p:spPr/>
-        <p:txBody>
-          <a:bodyPr/>
-          <a:lstStyle/>
-          <a:p>
+              <a:t>Error bars show variance across 5 or more runs</a:t>
+            </a:r>
             <a:endParaRPr lang="en-US" dirty="0"/>
           </a:p>
         </p:txBody>
@@ -1038,7 +797,7 @@
     </p:spTree>
     <p:extLst>
       <p:ext uri="{BB962C8B-B14F-4D97-AF65-F5344CB8AC3E}">
-        <p14:creationId xmlns:p14="http://schemas.microsoft.com/office/powerpoint/2010/main" val="1800626650"/>
+        <p14:creationId xmlns:p14="http://schemas.microsoft.com/office/powerpoint/2010/main" val="873664476"/>
       </p:ext>
     </p:extLst>
   </p:cSld>
@@ -1092,25 +851,55 @@
           <a:bodyPr/>
           <a:lstStyle/>
           <a:p>
-            <a:endParaRPr lang="en-US" dirty="0"/>
-          </a:p>
-        </p:txBody>
-      </p:sp>
-      <p:sp>
-        <p:nvSpPr>
-          <p:cNvPr id="4" name="Header Placeholder 3"/>
-          <p:cNvSpPr>
-            <a:spLocks noGrp="1"/>
-          </p:cNvSpPr>
-          <p:nvPr>
-            <p:ph type="hdr" sz="quarter" idx="10"/>
-          </p:nvPr>
-        </p:nvSpPr>
-        <p:spPr/>
-        <p:txBody>
-          <a:bodyPr/>
-          <a:lstStyle/>
-          <a:p>
+            <a:r>
+              <a:rPr lang="en-US" dirty="0" smtClean="0"/>
+              <a:t>Notes: </a:t>
+            </a:r>
+          </a:p>
+          <a:p>
+            <a:r>
+              <a:rPr lang="en-US" dirty="0" smtClean="0"/>
+              <a:t>  - CTH</a:t>
+            </a:r>
+            <a:r>
+              <a:rPr lang="en-US" baseline="0" dirty="0" smtClean="0"/>
+              <a:t> computation scales really well (as expected)</a:t>
+            </a:r>
+            <a:endParaRPr lang="en-US" dirty="0" smtClean="0"/>
+          </a:p>
+          <a:p>
+            <a:r>
+              <a:rPr lang="en-US" dirty="0" smtClean="0"/>
+              <a:t>  - Baseline analysis algorithm scales poorly.</a:t>
+            </a:r>
+            <a:r>
+              <a:rPr lang="en-US" baseline="0" dirty="0" smtClean="0"/>
+              <a:t>  Looks independent of number of cores. </a:t>
+            </a:r>
+          </a:p>
+          <a:p>
+            <a:r>
+              <a:rPr lang="en-US" baseline="0" dirty="0" smtClean="0"/>
+              <a:t>  - Refined algorithm has much lower analysis overhead, but initialization cost is problematic</a:t>
+            </a:r>
+          </a:p>
+          <a:p>
+            <a:r>
+              <a:rPr lang="en-US" baseline="0" dirty="0" smtClean="0"/>
+              <a:t>  - In-transit is compute bound at 4 &amp; 8K, analysis bound (requires waits at 16 and 32K</a:t>
+            </a:r>
+          </a:p>
+          <a:p>
+            <a:r>
+              <a:rPr lang="en-US" baseline="0" dirty="0" smtClean="0"/>
+              <a:t>     - Not enough work for the compute nodes</a:t>
+            </a:r>
+          </a:p>
+          <a:p>
+            <a:r>
+              <a:rPr lang="en-US" baseline="0" dirty="0" smtClean="0"/>
+              <a:t>     - Analysis algorithm is not scalable</a:t>
+            </a:r>
             <a:endParaRPr lang="en-US" dirty="0"/>
           </a:p>
         </p:txBody>
@@ -1118,7 +907,7 @@
     </p:spTree>
     <p:extLst>
       <p:ext uri="{BB962C8B-B14F-4D97-AF65-F5344CB8AC3E}">
-        <p14:creationId xmlns:p14="http://schemas.microsoft.com/office/powerpoint/2010/main" val="3645792928"/>
+        <p14:creationId xmlns:p14="http://schemas.microsoft.com/office/powerpoint/2010/main" val="1800626650"/>
       </p:ext>
     </p:extLst>
   </p:cSld>
@@ -1176,29 +965,10 @@
           </a:p>
         </p:txBody>
       </p:sp>
-      <p:sp>
-        <p:nvSpPr>
-          <p:cNvPr id="4" name="Header Placeholder 3"/>
-          <p:cNvSpPr>
-            <a:spLocks noGrp="1"/>
-          </p:cNvSpPr>
-          <p:nvPr>
-            <p:ph type="hdr" sz="quarter" idx="10"/>
-          </p:nvPr>
-        </p:nvSpPr>
-        <p:spPr/>
-        <p:txBody>
-          <a:bodyPr/>
-          <a:lstStyle/>
-          <a:p>
-            <a:endParaRPr lang="en-US" dirty="0"/>
-          </a:p>
-        </p:txBody>
-      </p:sp>
     </p:spTree>
     <p:extLst>
       <p:ext uri="{BB962C8B-B14F-4D97-AF65-F5344CB8AC3E}">
-        <p14:creationId xmlns:p14="http://schemas.microsoft.com/office/powerpoint/2010/main" val="616688392"/>
+        <p14:creationId xmlns:p14="http://schemas.microsoft.com/office/powerpoint/2010/main" val="3645792928"/>
       </p:ext>
     </p:extLst>
   </p:cSld>
@@ -1252,33 +1022,6 @@
           <a:bodyPr/>
           <a:lstStyle/>
           <a:p>
-            <a:r>
-              <a:rPr lang="en-US" dirty="0" smtClean="0"/>
-              <a:t>Transition:  Let’s have</a:t>
-            </a:r>
-            <a:r>
-              <a:rPr lang="en-US" baseline="0" dirty="0" smtClean="0"/>
-              <a:t> a closer look at the “Sweet Spot” </a:t>
-            </a:r>
-            <a:endParaRPr lang="en-US" dirty="0"/>
-          </a:p>
-        </p:txBody>
-      </p:sp>
-      <p:sp>
-        <p:nvSpPr>
-          <p:cNvPr id="4" name="Header Placeholder 3"/>
-          <p:cNvSpPr>
-            <a:spLocks noGrp="1"/>
-          </p:cNvSpPr>
-          <p:nvPr>
-            <p:ph type="hdr" sz="quarter" idx="10"/>
-          </p:nvPr>
-        </p:nvSpPr>
-        <p:spPr/>
-        <p:txBody>
-          <a:bodyPr/>
-          <a:lstStyle/>
-          <a:p>
             <a:endParaRPr lang="en-US" dirty="0"/>
           </a:p>
         </p:txBody>
@@ -1286,7 +1029,7 @@
     </p:spTree>
     <p:extLst>
       <p:ext uri="{BB962C8B-B14F-4D97-AF65-F5344CB8AC3E}">
-        <p14:creationId xmlns:p14="http://schemas.microsoft.com/office/powerpoint/2010/main" val="540436351"/>
+        <p14:creationId xmlns:p14="http://schemas.microsoft.com/office/powerpoint/2010/main" val="616688392"/>
       </p:ext>
     </p:extLst>
   </p:cSld>
@@ -1342,36 +1085,12 @@
           <a:p>
             <a:r>
               <a:rPr lang="en-US" dirty="0" smtClean="0"/>
-              <a:t>Shows</a:t>
+              <a:t>Transition:  Let’s have</a:t>
             </a:r>
             <a:r>
               <a:rPr lang="en-US" baseline="0" dirty="0" smtClean="0"/>
-              <a:t> operation time over the course of a single execution. </a:t>
-            </a:r>
-          </a:p>
-          <a:p>
-            <a:endParaRPr lang="en-US" baseline="0" dirty="0" smtClean="0"/>
-          </a:p>
-          <a:p>
-            <a:endParaRPr lang="en-US" dirty="0"/>
-          </a:p>
-        </p:txBody>
-      </p:sp>
-      <p:sp>
-        <p:nvSpPr>
-          <p:cNvPr id="4" name="Header Placeholder 3"/>
-          <p:cNvSpPr>
-            <a:spLocks noGrp="1"/>
-          </p:cNvSpPr>
-          <p:nvPr>
-            <p:ph type="hdr" sz="quarter" idx="10"/>
-          </p:nvPr>
-        </p:nvSpPr>
-        <p:spPr/>
-        <p:txBody>
-          <a:bodyPr/>
-          <a:lstStyle/>
-          <a:p>
+              <a:t> a closer look at the “Sweet Spot” </a:t>
+            </a:r>
             <a:endParaRPr lang="en-US" dirty="0"/>
           </a:p>
         </p:txBody>
@@ -1379,7 +1098,7 @@
     </p:spTree>
     <p:extLst>
       <p:ext uri="{BB962C8B-B14F-4D97-AF65-F5344CB8AC3E}">
-        <p14:creationId xmlns:p14="http://schemas.microsoft.com/office/powerpoint/2010/main" val="4236311011"/>
+        <p14:creationId xmlns:p14="http://schemas.microsoft.com/office/powerpoint/2010/main" val="540436351"/>
       </p:ext>
     </p:extLst>
   </p:cSld>
@@ -1435,41 +1154,71 @@
           <a:p>
             <a:r>
               <a:rPr lang="en-US" dirty="0" smtClean="0"/>
-              <a:t>HPCToolkit traces of small dataset</a:t>
+              <a:t>Shows</a:t>
             </a:r>
             <a:r>
               <a:rPr lang="en-US" baseline="0" dirty="0" smtClean="0"/>
-              <a:t> on muzia</a:t>
+              <a:t> operation time over the course of a single execution. </a:t>
             </a:r>
           </a:p>
           <a:p>
             <a:endParaRPr lang="en-US" baseline="0" dirty="0" smtClean="0"/>
           </a:p>
           <a:p>
-            <a:r>
-              <a:rPr lang="en-US" baseline="0" dirty="0" smtClean="0"/>
-              <a:t>128 cores for CTH</a:t>
-            </a:r>
-          </a:p>
-          <a:p>
-            <a:endParaRPr lang="en-US" baseline="0" dirty="0" smtClean="0"/>
-          </a:p>
-          <a:p>
-            <a:r>
-              <a:rPr lang="en-US" baseline="0" dirty="0" smtClean="0"/>
-              <a:t>Testing core scaling using one server</a:t>
-            </a:r>
+            <a:endParaRPr lang="en-US" dirty="0"/>
           </a:p>
         </p:txBody>
+      </p:sp>
+    </p:spTree>
+    <p:extLst>
+      <p:ext uri="{BB962C8B-B14F-4D97-AF65-F5344CB8AC3E}">
+        <p14:creationId xmlns:p14="http://schemas.microsoft.com/office/powerpoint/2010/main" val="4236311011"/>
+      </p:ext>
+    </p:extLst>
+  </p:cSld>
+  <p:clrMapOvr>
+    <a:masterClrMapping/>
+  </p:clrMapOvr>
+</p:notes>
+</file>
+
+<file path=ppt/notesSlides/notesSlide9.xml><?xml version="1.0" encoding="utf-8"?>
+<p:notes xmlns:a="http://schemas.openxmlformats.org/drawingml/2006/main" xmlns:r="http://schemas.openxmlformats.org/officeDocument/2006/relationships" xmlns:p="http://schemas.openxmlformats.org/presentationml/2006/main">
+  <p:cSld>
+    <p:spTree>
+      <p:nvGrpSpPr>
+        <p:cNvPr id="1" name=""/>
+        <p:cNvGrpSpPr/>
+        <p:nvPr/>
+      </p:nvGrpSpPr>
+      <p:grpSpPr>
+        <a:xfrm>
+          <a:off x="0" y="0"/>
+          <a:ext cx="0" cy="0"/>
+          <a:chOff x="0" y="0"/>
+          <a:chExt cx="0" cy="0"/>
+        </a:xfrm>
+      </p:grpSpPr>
+      <p:sp>
+        <p:nvSpPr>
+          <p:cNvPr id="2" name="Slide Image Placeholder 1"/>
+          <p:cNvSpPr>
+            <a:spLocks noGrp="1" noRot="1" noChangeAspect="1"/>
+          </p:cNvSpPr>
+          <p:nvPr>
+            <p:ph type="sldImg"/>
+          </p:nvPr>
+        </p:nvSpPr>
+        <p:spPr/>
       </p:sp>
       <p:sp>
         <p:nvSpPr>
-          <p:cNvPr id="4" name="Header Placeholder 3"/>
+          <p:cNvPr id="3" name="Notes Placeholder 2"/>
           <p:cNvSpPr>
             <a:spLocks noGrp="1"/>
           </p:cNvSpPr>
           <p:nvPr>
-            <p:ph type="hdr" sz="quarter" idx="10"/>
+            <p:ph type="body" idx="1"/>
           </p:nvPr>
         </p:nvSpPr>
         <p:spPr/>
@@ -1477,7 +1226,32 @@
           <a:bodyPr/>
           <a:lstStyle/>
           <a:p>
-            <a:endParaRPr lang="en-US" dirty="0"/>
+            <a:r>
+              <a:rPr lang="en-US" dirty="0" smtClean="0"/>
+              <a:t>HPCToolkit traces of small dataset</a:t>
+            </a:r>
+            <a:r>
+              <a:rPr lang="en-US" baseline="0" dirty="0" smtClean="0"/>
+              <a:t> on muzia</a:t>
+            </a:r>
+          </a:p>
+          <a:p>
+            <a:endParaRPr lang="en-US" baseline="0" dirty="0" smtClean="0"/>
+          </a:p>
+          <a:p>
+            <a:r>
+              <a:rPr lang="en-US" baseline="0" dirty="0" smtClean="0"/>
+              <a:t>128 cores for CTH</a:t>
+            </a:r>
+          </a:p>
+          <a:p>
+            <a:endParaRPr lang="en-US" baseline="0" dirty="0" smtClean="0"/>
+          </a:p>
+          <a:p>
+            <a:r>
+              <a:rPr lang="en-US" baseline="0" dirty="0" smtClean="0"/>
+              <a:t>Testing core scaling using one server</a:t>
+            </a:r>
           </a:p>
         </p:txBody>
       </p:sp>
@@ -2086,10 +1860,9 @@
             </a:lvl1pPr>
           </a:lstStyle>
           <a:p>
-            <a:fld id="{E3A661A9-AB95-644B-88B2-9DDC7A23F4F4}" type="datetime1">
+            <a:fld id="{2B89098A-9DD0-704D-897B-46AD3E21E869}" type="datetime1">
               <a:rPr lang="en-US" smtClean="0"/>
-              <a:pPr/>
-              <a:t>3/4/13</a:t>
+              <a:t>3/13/13</a:t>
             </a:fld>
             <a:endParaRPr lang="en-US" dirty="0"/>
           </a:p>
@@ -2594,10 +2367,9 @@
             </a:lvl1pPr>
           </a:lstStyle>
           <a:p>
-            <a:fld id="{2D31639C-5EF8-8C48-833F-078F90087180}" type="datetime1">
+            <a:fld id="{274ADEFF-0DD3-C940-B04B-DADA55CED8F3}" type="datetime1">
               <a:rPr lang="en-US" smtClean="0"/>
-              <a:pPr/>
-              <a:t>3/4/13</a:t>
+              <a:t>3/13/13</a:t>
             </a:fld>
             <a:endParaRPr lang="en-US" dirty="0"/>
           </a:p>
@@ -2727,10 +2499,9 @@
             </a:lvl1pPr>
           </a:lstStyle>
           <a:p>
-            <a:fld id="{B535C3D4-B14E-194D-A22F-ABBD9D7BE7F7}" type="datetime1">
+            <a:fld id="{6A07F160-38EC-AB4C-8E07-1952CF053195}" type="datetime1">
               <a:rPr lang="en-US" smtClean="0"/>
-              <a:pPr/>
-              <a:t>3/4/13</a:t>
+              <a:t>3/13/13</a:t>
             </a:fld>
             <a:endParaRPr lang="en-US" dirty="0"/>
           </a:p>
@@ -2837,10 +2608,9 @@
             </a:lvl1pPr>
           </a:lstStyle>
           <a:p>
-            <a:fld id="{91CFF6A9-F7ED-464D-9ECE-18CDAAFFF013}" type="datetime1">
+            <a:fld id="{F884B76F-D72A-6247-9E9B-E20AA4950DAF}" type="datetime1">
               <a:rPr lang="en-US" smtClean="0"/>
-              <a:pPr/>
-              <a:t>3/4/13</a:t>
+              <a:t>3/13/13</a:t>
             </a:fld>
             <a:endParaRPr lang="en-US" dirty="0"/>
           </a:p>
@@ -3129,10 +2899,9 @@
             </a:lvl1pPr>
           </a:lstStyle>
           <a:p>
-            <a:fld id="{C7865AE2-28C7-4947-8319-D60EEB07BE79}" type="datetime1">
+            <a:fld id="{BEDB5943-9216-4740-9B52-E49457DEEC39}" type="datetime1">
               <a:rPr lang="en-US" smtClean="0"/>
-              <a:pPr/>
-              <a:t>3/4/13</a:t>
+              <a:t>3/13/13</a:t>
             </a:fld>
             <a:endParaRPr lang="en-US" dirty="0"/>
           </a:p>
@@ -3401,10 +3170,9 @@
             </a:lvl1pPr>
           </a:lstStyle>
           <a:p>
-            <a:fld id="{D6782EBC-51D7-AB40-8702-393A26BF0924}" type="datetime1">
+            <a:fld id="{CE3464F7-513A-0643-A456-60C9973792A9}" type="datetime1">
               <a:rPr lang="en-US" smtClean="0"/>
-              <a:pPr/>
-              <a:t>3/4/13</a:t>
+              <a:t>3/13/13</a:t>
             </a:fld>
             <a:endParaRPr lang="en-US" dirty="0"/>
           </a:p>
@@ -3586,10 +3354,9 @@
             </a:lvl1pPr>
           </a:lstStyle>
           <a:p>
-            <a:fld id="{199A187D-6C3F-6D41-880E-F6B6C4095670}" type="datetime1">
+            <a:fld id="{7539DBB8-13F3-344F-8629-CCFC867E05CD}" type="datetime1">
               <a:rPr lang="en-US" smtClean="0"/>
-              <a:pPr/>
-              <a:t>3/4/13</a:t>
+              <a:t>3/13/13</a:t>
             </a:fld>
             <a:endParaRPr lang="en-US" dirty="0"/>
           </a:p>
@@ -3781,10 +3548,9 @@
             </a:lvl1pPr>
           </a:lstStyle>
           <a:p>
-            <a:fld id="{AA07F8E1-8F00-1645-9B46-B2F7ACC8F53A}" type="datetime1">
+            <a:fld id="{A9A4CDC6-5B91-FE47-9E5B-4BFED9D2F143}" type="datetime1">
               <a:rPr lang="en-US" smtClean="0"/>
-              <a:pPr/>
-              <a:t>3/4/13</a:t>
+              <a:t>3/13/13</a:t>
             </a:fld>
             <a:endParaRPr lang="en-US" dirty="0"/>
           </a:p>
@@ -4088,10 +3854,9 @@
             </a:lvl1pPr>
           </a:lstStyle>
           <a:p>
-            <a:fld id="{8138B7F0-25BC-B045-8049-7CADA7B3A1D1}" type="datetime1">
+            <a:fld id="{40793677-4686-7346-81DC-BD0C6D979DE0}" type="datetime1">
               <a:rPr lang="en-US" smtClean="0"/>
-              <a:pPr/>
-              <a:t>3/4/13</a:t>
+              <a:t>3/13/13</a:t>
             </a:fld>
             <a:endParaRPr lang="en-US" dirty="0"/>
           </a:p>
@@ -4753,10 +4518,9 @@
             </a:lvl1pPr>
           </a:lstStyle>
           <a:p>
-            <a:fld id="{1B799630-9E30-DE4D-BE8D-4E9CA304B925}" type="datetime1">
+            <a:fld id="{BA17DCE3-72AA-D440-820C-A4334F8F8381}" type="datetime1">
               <a:rPr lang="en-US" smtClean="0"/>
-              <a:pPr/>
-              <a:t>3/4/13</a:t>
+              <a:t>3/13/13</a:t>
             </a:fld>
             <a:endParaRPr lang="en-US" dirty="0"/>
           </a:p>
@@ -5485,10 +5249,9 @@
             </a:lvl1pPr>
           </a:lstStyle>
           <a:p>
-            <a:fld id="{504244A8-8889-154D-9568-D8C635C53E9B}" type="datetime1">
+            <a:fld id="{DE85F4BE-571A-754E-B290-38E85A2AB13C}" type="datetime1">
               <a:rPr lang="en-US" smtClean="0"/>
-              <a:pPr/>
-              <a:t>3/4/13</a:t>
+              <a:t>3/13/13</a:t>
             </a:fld>
             <a:endParaRPr lang="en-US" dirty="0"/>
           </a:p>
@@ -6374,10 +6137,9 @@
             </a:lvl1pPr>
           </a:lstStyle>
           <a:p>
-            <a:fld id="{9522E0D4-989F-3A4B-AA2E-486ADFE0E698}" type="datetime1">
+            <a:fld id="{2721CC38-418C-9345-95E2-5F9CDED78CA1}" type="datetime1">
               <a:rPr lang="en-US" smtClean="0"/>
-              <a:pPr/>
-              <a:t>3/4/13</a:t>
+              <a:t>3/13/13</a:t>
             </a:fld>
             <a:endParaRPr lang="en-US" dirty="0"/>
           </a:p>
@@ -7071,10 +6833,9 @@
             </a:lvl1pPr>
           </a:lstStyle>
           <a:p>
-            <a:fld id="{5B35050C-AFC0-D74A-963F-148736DC45A4}" type="datetime1">
+            <a:fld id="{BBEDFB4F-0416-6641-8B2C-07BFABA598F7}" type="datetime1">
               <a:rPr lang="en-US" smtClean="0"/>
-              <a:pPr/>
-              <a:t>3/4/13</a:t>
+              <a:t>3/13/13</a:t>
             </a:fld>
             <a:endParaRPr lang="en-US" dirty="0"/>
           </a:p>
@@ -8150,10 +7911,9 @@
             </a:lvl1pPr>
           </a:lstStyle>
           <a:p>
-            <a:fld id="{7D098A99-26EF-B34F-91F8-30EA53688AF7}" type="datetime1">
+            <a:fld id="{AEC8B2BF-A675-9547-80CC-C0A85AD6F743}" type="datetime1">
               <a:rPr lang="en-US" smtClean="0"/>
-              <a:pPr/>
-              <a:t>3/4/13</a:t>
+              <a:t>3/13/13</a:t>
             </a:fld>
             <a:endParaRPr lang="en-US" dirty="0"/>
           </a:p>
@@ -8438,10 +8198,9 @@
             </a:lvl1pPr>
           </a:lstStyle>
           <a:p>
-            <a:fld id="{C9CA6C2B-6061-6F46-BF6B-C0454CDDAB35}" type="datetime1">
+            <a:fld id="{3938401E-D456-5647-8149-DE834487F23A}" type="datetime1">
               <a:rPr lang="en-US" smtClean="0"/>
-              <a:pPr/>
-              <a:t>3/4/13</a:t>
+              <a:t>3/13/13</a:t>
             </a:fld>
             <a:endParaRPr lang="en-US" dirty="0"/>
           </a:p>
@@ -8669,10 +8428,9 @@
             </a:lvl1pPr>
           </a:lstStyle>
           <a:p>
-            <a:fld id="{DADE15B5-4D50-754D-8585-236811896E05}" type="datetime1">
+            <a:fld id="{9E042A07-5C93-3A44-B2CB-DA8237221699}" type="datetime1">
               <a:rPr lang="en-US" smtClean="0"/>
-              <a:pPr/>
-              <a:t>3/4/13</a:t>
+              <a:t>3/13/13</a:t>
             </a:fld>
             <a:endParaRPr lang="en-US" dirty="0"/>
           </a:p>
@@ -8972,10 +8730,9 @@
             </a:lvl1pPr>
           </a:lstStyle>
           <a:p>
-            <a:fld id="{114F66A0-55BE-484A-9667-5C4C7A46FB26}" type="datetime1">
+            <a:fld id="{43CB7A98-1783-1C4E-ACBB-8D3428320856}" type="datetime1">
               <a:rPr lang="en-US" smtClean="0"/>
-              <a:pPr/>
-              <a:t>3/4/13</a:t>
+              <a:t>3/13/13</a:t>
             </a:fld>
             <a:endParaRPr lang="en-US" dirty="0"/>
           </a:p>
@@ -9351,10 +9108,9 @@
             </a:lvl1pPr>
           </a:lstStyle>
           <a:p>
-            <a:fld id="{30B37176-1C50-7042-8162-64D2C2671FE5}" type="datetime1">
+            <a:fld id="{1484D48B-B7AB-D840-975A-3E636DE1C0E2}" type="datetime1">
               <a:rPr lang="en-US" smtClean="0"/>
-              <a:pPr/>
-              <a:t>3/4/13</a:t>
+              <a:t>3/13/13</a:t>
             </a:fld>
             <a:endParaRPr lang="en-US" dirty="0"/>
           </a:p>
@@ -9482,7 +9238,7 @@
     <p:sldLayoutId id="2147483794" r:id="rId16"/>
     <p:sldLayoutId id="2147483795" r:id="rId17"/>
   </p:sldLayoutIdLst>
-  <p:hf hdr="0" ftr="0" dt="0"/>
+  <p:hf sldNum="0" hdr="0" ftr="0" dt="0"/>
   <p:txStyles>
     <p:titleStyle>
       <a:lvl1pPr algn="l" rtl="0" eaLnBrk="1" fontAlgn="base" hangingPunct="1">
@@ -10027,30 +9783,6 @@
       </p:sp>
       <p:sp>
         <p:nvSpPr>
-          <p:cNvPr id="4" name="Slide Number Placeholder 3"/>
-          <p:cNvSpPr>
-            <a:spLocks noGrp="1"/>
-          </p:cNvSpPr>
-          <p:nvPr>
-            <p:ph type="sldNum" sz="quarter" idx="12"/>
-          </p:nvPr>
-        </p:nvSpPr>
-        <p:spPr/>
-        <p:txBody>
-          <a:bodyPr/>
-          <a:lstStyle/>
-          <a:p>
-            <a:fld id="{A5E55A7B-7854-E145-92D9-B491DF4BAE2D}" type="slidenum">
-              <a:rPr lang="en-US" smtClean="0"/>
-              <a:pPr/>
-              <a:t>1</a:t>
-            </a:fld>
-            <a:endParaRPr lang="en-US" dirty="0"/>
-          </a:p>
-        </p:txBody>
-      </p:sp>
-      <p:sp>
-        <p:nvSpPr>
           <p:cNvPr id="6" name="Rectangle 7"/>
           <p:cNvSpPr>
             <a:spLocks noChangeArrowheads="1"/>
@@ -10279,30 +10011,6 @@
               <a:t>pyplot files from CTH, then post process analysis by reading back in and batch processing in ParaView.</a:t>
             </a:r>
             <a:endParaRPr lang="en-US" b="1" dirty="0"/>
-          </a:p>
-        </p:txBody>
-      </p:sp>
-      <p:sp>
-        <p:nvSpPr>
-          <p:cNvPr id="4" name="Slide Number Placeholder 3"/>
-          <p:cNvSpPr>
-            <a:spLocks noGrp="1"/>
-          </p:cNvSpPr>
-          <p:nvPr>
-            <p:ph type="sldNum" sz="quarter" idx="12"/>
-          </p:nvPr>
-        </p:nvSpPr>
-        <p:spPr/>
-        <p:txBody>
-          <a:bodyPr/>
-          <a:lstStyle/>
-          <a:p>
-            <a:fld id="{A5E55A7B-7854-E145-92D9-B491DF4BAE2D}" type="slidenum">
-              <a:rPr lang="en-US" smtClean="0"/>
-              <a:pPr/>
-              <a:t>10</a:t>
-            </a:fld>
-            <a:endParaRPr lang="en-US" dirty="0"/>
           </a:p>
         </p:txBody>
       </p:sp>
@@ -37760,30 +37468,6 @@
           </a:p>
         </p:txBody>
       </p:sp>
-      <p:sp>
-        <p:nvSpPr>
-          <p:cNvPr id="4" name="Slide Number Placeholder 3"/>
-          <p:cNvSpPr>
-            <a:spLocks noGrp="1"/>
-          </p:cNvSpPr>
-          <p:nvPr>
-            <p:ph type="sldNum" sz="quarter" idx="12"/>
-          </p:nvPr>
-        </p:nvSpPr>
-        <p:spPr/>
-        <p:txBody>
-          <a:bodyPr/>
-          <a:lstStyle/>
-          <a:p>
-            <a:fld id="{A5E55A7B-7854-E145-92D9-B491DF4BAE2D}" type="slidenum">
-              <a:rPr lang="en-US" smtClean="0"/>
-              <a:pPr/>
-              <a:t>13</a:t>
-            </a:fld>
-            <a:endParaRPr lang="en-US" dirty="0"/>
-          </a:p>
-        </p:txBody>
-      </p:sp>
     </p:spTree>
     <p:extLst>
       <p:ext uri="{BB962C8B-B14F-4D97-AF65-F5344CB8AC3E}">
@@ -37927,30 +37611,6 @@
               <a:rPr lang="en-US" dirty="0" smtClean="0"/>
               <a:t>.</a:t>
             </a:r>
-            <a:endParaRPr lang="en-US" dirty="0"/>
-          </a:p>
-        </p:txBody>
-      </p:sp>
-      <p:sp>
-        <p:nvSpPr>
-          <p:cNvPr id="4" name="Slide Number Placeholder 3"/>
-          <p:cNvSpPr>
-            <a:spLocks noGrp="1"/>
-          </p:cNvSpPr>
-          <p:nvPr>
-            <p:ph type="sldNum" sz="quarter" idx="12"/>
-          </p:nvPr>
-        </p:nvSpPr>
-        <p:spPr/>
-        <p:txBody>
-          <a:bodyPr/>
-          <a:lstStyle/>
-          <a:p>
-            <a:fld id="{A5E55A7B-7854-E145-92D9-B491DF4BAE2D}" type="slidenum">
-              <a:rPr lang="en-US" smtClean="0"/>
-              <a:pPr/>
-              <a:t>14</a:t>
-            </a:fld>
             <a:endParaRPr lang="en-US" dirty="0"/>
           </a:p>
         </p:txBody>
@@ -38056,30 +37716,6 @@
           <a:chExt cx="0" cy="0"/>
         </a:xfrm>
       </p:grpSpPr>
-      <p:sp>
-        <p:nvSpPr>
-          <p:cNvPr id="4" name="Slide Number Placeholder 3"/>
-          <p:cNvSpPr>
-            <a:spLocks noGrp="1"/>
-          </p:cNvSpPr>
-          <p:nvPr>
-            <p:ph type="sldNum" sz="quarter" idx="12"/>
-          </p:nvPr>
-        </p:nvSpPr>
-        <p:spPr/>
-        <p:txBody>
-          <a:bodyPr/>
-          <a:lstStyle/>
-          <a:p>
-            <a:fld id="{A5E55A7B-7854-E145-92D9-B491DF4BAE2D}" type="slidenum">
-              <a:rPr lang="en-US" smtClean="0"/>
-              <a:pPr/>
-              <a:t>15</a:t>
-            </a:fld>
-            <a:endParaRPr lang="en-US" dirty="0"/>
-          </a:p>
-        </p:txBody>
-      </p:sp>
       <p:pic>
         <p:nvPicPr>
           <p:cNvPr id="5" name="Content Placeholder 6"/>
@@ -38174,30 +37810,6 @@
               <a:rPr lang="en-US" dirty="0" smtClean="0"/>
               <a:t>Results</a:t>
             </a:r>
-            <a:endParaRPr lang="en-US" dirty="0"/>
-          </a:p>
-        </p:txBody>
-      </p:sp>
-      <p:sp>
-        <p:nvSpPr>
-          <p:cNvPr id="4" name="Slide Number Placeholder 3"/>
-          <p:cNvSpPr>
-            <a:spLocks noGrp="1"/>
-          </p:cNvSpPr>
-          <p:nvPr>
-            <p:ph type="sldNum" sz="quarter" idx="12"/>
-          </p:nvPr>
-        </p:nvSpPr>
-        <p:spPr/>
-        <p:txBody>
-          <a:bodyPr/>
-          <a:lstStyle/>
-          <a:p>
-            <a:fld id="{A5E55A7B-7854-E145-92D9-B491DF4BAE2D}" type="slidenum">
-              <a:rPr lang="en-US" smtClean="0"/>
-              <a:pPr/>
-              <a:t>16</a:t>
-            </a:fld>
             <a:endParaRPr lang="en-US" dirty="0"/>
           </a:p>
         </p:txBody>
@@ -38306,30 +37918,6 @@
               <a:rPr lang="en-US" dirty="0" smtClean="0"/>
               <a:t>Total Runtime for All Experiments</a:t>
             </a:r>
-            <a:endParaRPr lang="en-US" dirty="0"/>
-          </a:p>
-        </p:txBody>
-      </p:sp>
-      <p:sp>
-        <p:nvSpPr>
-          <p:cNvPr id="3" name="Slide Number Placeholder 2"/>
-          <p:cNvSpPr>
-            <a:spLocks noGrp="1"/>
-          </p:cNvSpPr>
-          <p:nvPr>
-            <p:ph type="sldNum" sz="quarter" idx="12"/>
-          </p:nvPr>
-        </p:nvSpPr>
-        <p:spPr/>
-        <p:txBody>
-          <a:bodyPr/>
-          <a:lstStyle/>
-          <a:p>
-            <a:fld id="{A5E55A7B-7854-E145-92D9-B491DF4BAE2D}" type="slidenum">
-              <a:rPr lang="en-US" smtClean="0"/>
-              <a:pPr/>
-              <a:t>17</a:t>
-            </a:fld>
             <a:endParaRPr lang="en-US" dirty="0"/>
           </a:p>
         </p:txBody>
@@ -38710,30 +38298,6 @@
       </p:sp>
       <p:sp>
         <p:nvSpPr>
-          <p:cNvPr id="3" name="Slide Number Placeholder 2"/>
-          <p:cNvSpPr>
-            <a:spLocks noGrp="1"/>
-          </p:cNvSpPr>
-          <p:nvPr>
-            <p:ph type="sldNum" sz="quarter" idx="12"/>
-          </p:nvPr>
-        </p:nvSpPr>
-        <p:spPr/>
-        <p:txBody>
-          <a:bodyPr/>
-          <a:lstStyle/>
-          <a:p>
-            <a:fld id="{A5E55A7B-7854-E145-92D9-B491DF4BAE2D}" type="slidenum">
-              <a:rPr lang="en-US" smtClean="0"/>
-              <a:pPr/>
-              <a:t>18</a:t>
-            </a:fld>
-            <a:endParaRPr lang="en-US" dirty="0"/>
-          </a:p>
-        </p:txBody>
-      </p:sp>
-      <p:sp>
-        <p:nvSpPr>
           <p:cNvPr id="8" name="Rectangle 7"/>
           <p:cNvSpPr/>
           <p:nvPr/>
@@ -38902,30 +38466,6 @@
       </p:sp>
       <p:sp>
         <p:nvSpPr>
-          <p:cNvPr id="3" name="Slide Number Placeholder 2"/>
-          <p:cNvSpPr>
-            <a:spLocks noGrp="1"/>
-          </p:cNvSpPr>
-          <p:nvPr>
-            <p:ph type="sldNum" sz="quarter" idx="12"/>
-          </p:nvPr>
-        </p:nvSpPr>
-        <p:spPr/>
-        <p:txBody>
-          <a:bodyPr/>
-          <a:lstStyle/>
-          <a:p>
-            <a:fld id="{A5E55A7B-7854-E145-92D9-B491DF4BAE2D}" type="slidenum">
-              <a:rPr lang="en-US" smtClean="0"/>
-              <a:pPr/>
-              <a:t>19</a:t>
-            </a:fld>
-            <a:endParaRPr lang="en-US" dirty="0"/>
-          </a:p>
-        </p:txBody>
-      </p:sp>
-      <p:sp>
-        <p:nvSpPr>
           <p:cNvPr id="8" name="Rectangle 7"/>
           <p:cNvSpPr/>
           <p:nvPr/>
@@ -39153,19 +38693,7 @@
                 <a:ea typeface="ＭＳ Ｐゴシック" charset="-128"/>
                 <a:cs typeface="Calibri"/>
               </a:rPr>
-              <a:t> hours </a:t>
-            </a:r>
-            <a:r>
-              <a:rPr lang="en-US" sz="2400" dirty="0" smtClean="0">
-                <a:solidFill>
-                  <a:schemeClr val="tx1"/>
-                </a:solidFill>
-                <a:effectLst/>
-                <a:latin typeface="Calibri"/>
-                <a:ea typeface="ＭＳ Ｐゴシック" charset="-128"/>
-                <a:cs typeface="Calibri"/>
-              </a:rPr>
-              <a:t>of Cielo tests on both </a:t>
+              <a:t> hours of Cielo tests on both </a:t>
             </a:r>
             <a:r>
               <a:rPr lang="en-US" sz="2400" i="1" dirty="0" smtClean="0">
@@ -39236,30 +38764,6 @@
             <a:endParaRPr lang="en-US" dirty="0" smtClean="0">
               <a:effectLst/>
             </a:endParaRPr>
-          </a:p>
-        </p:txBody>
-      </p:sp>
-      <p:sp>
-        <p:nvSpPr>
-          <p:cNvPr id="4" name="Slide Number Placeholder 3"/>
-          <p:cNvSpPr>
-            <a:spLocks noGrp="1"/>
-          </p:cNvSpPr>
-          <p:nvPr>
-            <p:ph type="sldNum" sz="quarter" idx="12"/>
-          </p:nvPr>
-        </p:nvSpPr>
-        <p:spPr/>
-        <p:txBody>
-          <a:bodyPr/>
-          <a:lstStyle/>
-          <a:p>
-            <a:fld id="{A5E55A7B-7854-E145-92D9-B491DF4BAE2D}" type="slidenum">
-              <a:rPr lang="en-US" smtClean="0"/>
-              <a:pPr/>
-              <a:t>2</a:t>
-            </a:fld>
-            <a:endParaRPr lang="en-US" dirty="0"/>
           </a:p>
         </p:txBody>
       </p:sp>
@@ -39343,30 +38847,6 @@
               <a:rPr lang="en-US" sz="3600" dirty="0"/>
               <a:t>Pipeline Summary Timing (1.5m blocks)</a:t>
             </a:r>
-          </a:p>
-        </p:txBody>
-      </p:sp>
-      <p:sp>
-        <p:nvSpPr>
-          <p:cNvPr id="3" name="Slide Number Placeholder 2"/>
-          <p:cNvSpPr>
-            <a:spLocks noGrp="1"/>
-          </p:cNvSpPr>
-          <p:nvPr>
-            <p:ph type="sldNum" sz="quarter" idx="12"/>
-          </p:nvPr>
-        </p:nvSpPr>
-        <p:spPr/>
-        <p:txBody>
-          <a:bodyPr/>
-          <a:lstStyle/>
-          <a:p>
-            <a:fld id="{A5E55A7B-7854-E145-92D9-B491DF4BAE2D}" type="slidenum">
-              <a:rPr lang="en-US" smtClean="0"/>
-              <a:pPr/>
-              <a:t>20</a:t>
-            </a:fld>
-            <a:endParaRPr lang="en-US" dirty="0"/>
           </a:p>
         </p:txBody>
       </p:sp>
@@ -39540,30 +39020,6 @@
       </p:sp>
       <p:sp>
         <p:nvSpPr>
-          <p:cNvPr id="3" name="Slide Number Placeholder 2"/>
-          <p:cNvSpPr>
-            <a:spLocks noGrp="1"/>
-          </p:cNvSpPr>
-          <p:nvPr>
-            <p:ph type="sldNum" sz="quarter" idx="12"/>
-          </p:nvPr>
-        </p:nvSpPr>
-        <p:spPr/>
-        <p:txBody>
-          <a:bodyPr/>
-          <a:lstStyle/>
-          <a:p>
-            <a:fld id="{A5E55A7B-7854-E145-92D9-B491DF4BAE2D}" type="slidenum">
-              <a:rPr lang="en-US" smtClean="0"/>
-              <a:pPr/>
-              <a:t>21</a:t>
-            </a:fld>
-            <a:endParaRPr lang="en-US" dirty="0"/>
-          </a:p>
-        </p:txBody>
-      </p:sp>
-      <p:sp>
-        <p:nvSpPr>
           <p:cNvPr id="8" name="Rectangle 7"/>
           <p:cNvSpPr/>
           <p:nvPr/>
@@ -39616,39 +39072,15 @@
             </a:r>
             <a:r>
               <a:rPr lang="en-US" dirty="0" smtClean="0"/>
-              <a:t> with unrefined algorithm </a:t>
+              <a:t> with unrefined algorithm equal to </a:t>
+            </a:r>
+            <a:r>
+              <a:rPr lang="en-US" i="1" dirty="0" smtClean="0"/>
+              <a:t>in situ</a:t>
             </a:r>
             <a:r>
               <a:rPr lang="en-US" dirty="0" smtClean="0"/>
-              <a:t>equal to</a:t>
-            </a:r>
-            <a:r>
-              <a:rPr lang="en-US" dirty="0" smtClean="0"/>
-              <a:t> </a:t>
-            </a:r>
-            <a:r>
-              <a:rPr lang="en-US" i="1" dirty="0" smtClean="0"/>
-              <a:t>in </a:t>
-            </a:r>
-            <a:r>
-              <a:rPr lang="en-US" i="1" dirty="0" smtClean="0"/>
-              <a:t>situ</a:t>
-            </a:r>
-            <a:r>
-              <a:rPr lang="en-US" dirty="0" smtClean="0"/>
-              <a:t> </a:t>
-            </a:r>
-            <a:r>
-              <a:rPr lang="en-US" dirty="0" smtClean="0"/>
-              <a:t>with </a:t>
-            </a:r>
-            <a:r>
-              <a:rPr lang="en-US" dirty="0" smtClean="0"/>
-              <a:t>refined </a:t>
-            </a:r>
-            <a:r>
-              <a:rPr lang="en-US" dirty="0" smtClean="0"/>
-              <a:t>algorithm.</a:t>
+              <a:t> with refined algorithm.</a:t>
             </a:r>
             <a:endParaRPr lang="en-US" dirty="0"/>
           </a:p>
@@ -39869,30 +39301,6 @@
       </p:sp>
       <p:sp>
         <p:nvSpPr>
-          <p:cNvPr id="3" name="Slide Number Placeholder 2"/>
-          <p:cNvSpPr>
-            <a:spLocks noGrp="1"/>
-          </p:cNvSpPr>
-          <p:nvPr>
-            <p:ph type="sldNum" sz="quarter" idx="12"/>
-          </p:nvPr>
-        </p:nvSpPr>
-        <p:spPr/>
-        <p:txBody>
-          <a:bodyPr/>
-          <a:lstStyle/>
-          <a:p>
-            <a:fld id="{A5E55A7B-7854-E145-92D9-B491DF4BAE2D}" type="slidenum">
-              <a:rPr lang="en-US" smtClean="0"/>
-              <a:pPr/>
-              <a:t>22</a:t>
-            </a:fld>
-            <a:endParaRPr lang="en-US" dirty="0"/>
-          </a:p>
-        </p:txBody>
-      </p:sp>
-      <p:sp>
-        <p:nvSpPr>
           <p:cNvPr id="17" name="TextBox 16"/>
           <p:cNvSpPr txBox="1"/>
           <p:nvPr/>
@@ -40086,11 +39494,7 @@
             </a:pPr>
             <a:r>
               <a:rPr lang="en-US" dirty="0" smtClean="0"/>
-              <a:t>Baseline </a:t>
-            </a:r>
-            <a:r>
-              <a:rPr lang="en-US" dirty="0" smtClean="0"/>
-              <a:t>algorithm does not scale</a:t>
+              <a:t>Baseline algorithm does not scale</a:t>
             </a:r>
           </a:p>
           <a:p>
@@ -40355,30 +39759,6 @@
       </p:sp>
       <p:sp>
         <p:nvSpPr>
-          <p:cNvPr id="3" name="Slide Number Placeholder 2"/>
-          <p:cNvSpPr>
-            <a:spLocks noGrp="1"/>
-          </p:cNvSpPr>
-          <p:nvPr>
-            <p:ph type="sldNum" sz="quarter" idx="12"/>
-          </p:nvPr>
-        </p:nvSpPr>
-        <p:spPr/>
-        <p:txBody>
-          <a:bodyPr/>
-          <a:lstStyle/>
-          <a:p>
-            <a:fld id="{A5E55A7B-7854-E145-92D9-B491DF4BAE2D}" type="slidenum">
-              <a:rPr lang="en-US" smtClean="0"/>
-              <a:pPr/>
-              <a:t>23</a:t>
-            </a:fld>
-            <a:endParaRPr lang="en-US" dirty="0"/>
-          </a:p>
-        </p:txBody>
-      </p:sp>
-      <p:sp>
-        <p:nvSpPr>
           <p:cNvPr id="17" name="TextBox 16"/>
           <p:cNvSpPr txBox="1"/>
           <p:nvPr/>
@@ -40871,30 +40251,6 @@
       </p:sp>
       <p:sp>
         <p:nvSpPr>
-          <p:cNvPr id="3" name="Slide Number Placeholder 2"/>
-          <p:cNvSpPr>
-            <a:spLocks noGrp="1"/>
-          </p:cNvSpPr>
-          <p:nvPr>
-            <p:ph type="sldNum" sz="quarter" idx="12"/>
-          </p:nvPr>
-        </p:nvSpPr>
-        <p:spPr/>
-        <p:txBody>
-          <a:bodyPr/>
-          <a:lstStyle/>
-          <a:p>
-            <a:fld id="{A5E55A7B-7854-E145-92D9-B491DF4BAE2D}" type="slidenum">
-              <a:rPr lang="en-US" smtClean="0"/>
-              <a:pPr/>
-              <a:t>24</a:t>
-            </a:fld>
-            <a:endParaRPr lang="en-US" dirty="0"/>
-          </a:p>
-        </p:txBody>
-      </p:sp>
-      <p:sp>
-        <p:nvSpPr>
           <p:cNvPr id="17" name="TextBox 16"/>
           <p:cNvSpPr txBox="1"/>
           <p:nvPr/>
@@ -41114,15 +40470,7 @@
             </a:r>
             <a:r>
               <a:rPr lang="en-US" dirty="0" smtClean="0"/>
-              <a:t>ervice is a fixed size </a:t>
-            </a:r>
-            <a:r>
-              <a:rPr lang="en-US" dirty="0" smtClean="0"/>
-              <a:t>(100 </a:t>
-            </a:r>
-            <a:r>
-              <a:rPr lang="en-US" dirty="0" smtClean="0"/>
-              <a:t>nodes), the wait time should be independent of the number of cores on the client.</a:t>
+              <a:t>ervice is a fixed size (100 nodes), the wait time should be independent of the number of cores on the client.</a:t>
             </a:r>
           </a:p>
           <a:p>
@@ -41377,30 +40725,6 @@
       </p:sp>
       <p:sp>
         <p:nvSpPr>
-          <p:cNvPr id="3" name="Slide Number Placeholder 2"/>
-          <p:cNvSpPr>
-            <a:spLocks noGrp="1"/>
-          </p:cNvSpPr>
-          <p:nvPr>
-            <p:ph type="sldNum" sz="quarter" idx="12"/>
-          </p:nvPr>
-        </p:nvSpPr>
-        <p:spPr/>
-        <p:txBody>
-          <a:bodyPr/>
-          <a:lstStyle/>
-          <a:p>
-            <a:fld id="{A5E55A7B-7854-E145-92D9-B491DF4BAE2D}" type="slidenum">
-              <a:rPr lang="en-US" smtClean="0"/>
-              <a:pPr/>
-              <a:t>25</a:t>
-            </a:fld>
-            <a:endParaRPr lang="en-US" dirty="0"/>
-          </a:p>
-        </p:txBody>
-      </p:sp>
-      <p:sp>
-        <p:nvSpPr>
           <p:cNvPr id="17" name="TextBox 16"/>
           <p:cNvSpPr txBox="1"/>
           <p:nvPr/>
@@ -41723,30 +41047,6 @@
           <a:chExt cx="0" cy="0"/>
         </a:xfrm>
       </p:grpSpPr>
-      <p:sp>
-        <p:nvSpPr>
-          <p:cNvPr id="3" name="Slide Number Placeholder 2"/>
-          <p:cNvSpPr>
-            <a:spLocks noGrp="1"/>
-          </p:cNvSpPr>
-          <p:nvPr>
-            <p:ph type="sldNum" sz="quarter" idx="12"/>
-          </p:nvPr>
-        </p:nvSpPr>
-        <p:spPr/>
-        <p:txBody>
-          <a:bodyPr/>
-          <a:lstStyle/>
-          <a:p>
-            <a:fld id="{A5E55A7B-7854-E145-92D9-B491DF4BAE2D}" type="slidenum">
-              <a:rPr lang="en-US" smtClean="0"/>
-              <a:pPr/>
-              <a:t>26</a:t>
-            </a:fld>
-            <a:endParaRPr lang="en-US" dirty="0"/>
-          </a:p>
-        </p:txBody>
-      </p:sp>
       <p:pic>
         <p:nvPicPr>
           <p:cNvPr id="4" name="Picture 3" descr="in-situ-unopt-series.pdf"/>
@@ -42268,11 +41568,7 @@
           <a:p>
             <a:r>
               <a:rPr lang="en-US" dirty="0" smtClean="0"/>
-              <a:t>Time-Series Analysis (8k cores</a:t>
-            </a:r>
-            <a:r>
-              <a:rPr lang="en-US" dirty="0" smtClean="0"/>
-              <a:t>)</a:t>
+              <a:t>Time-Series Analysis (8k cores)</a:t>
             </a:r>
             <a:br>
               <a:rPr lang="en-US" dirty="0" smtClean="0"/>
@@ -42339,11 +41635,7 @@
           <a:p>
             <a:r>
               <a:rPr lang="en-US" dirty="0" smtClean="0"/>
-              <a:t>Time-Series Analysis: </a:t>
-            </a:r>
-            <a:r>
-              <a:rPr lang="en-US" dirty="0" smtClean="0"/>
-              <a:t>Variance</a:t>
+              <a:t>Time-Series Analysis: Variance</a:t>
             </a:r>
             <a:br>
               <a:rPr lang="en-US" dirty="0" smtClean="0"/>
@@ -42352,31 +41644,6 @@
               <a:rPr lang="en-US" sz="2400" dirty="0"/>
               <a:t>10-cycle increments</a:t>
             </a:r>
-            <a:endParaRPr lang="en-US" sz="2400" dirty="0"/>
-          </a:p>
-        </p:txBody>
-      </p:sp>
-      <p:sp>
-        <p:nvSpPr>
-          <p:cNvPr id="3" name="Slide Number Placeholder 2"/>
-          <p:cNvSpPr>
-            <a:spLocks noGrp="1"/>
-          </p:cNvSpPr>
-          <p:nvPr>
-            <p:ph type="sldNum" sz="quarter" idx="12"/>
-          </p:nvPr>
-        </p:nvSpPr>
-        <p:spPr/>
-        <p:txBody>
-          <a:bodyPr/>
-          <a:lstStyle/>
-          <a:p>
-            <a:fld id="{A5E55A7B-7854-E145-92D9-B491DF4BAE2D}" type="slidenum">
-              <a:rPr lang="en-US" smtClean="0"/>
-              <a:pPr/>
-              <a:t>27</a:t>
-            </a:fld>
-            <a:endParaRPr lang="en-US" dirty="0"/>
           </a:p>
         </p:txBody>
       </p:sp>
@@ -42545,11 +41812,7 @@
           <a:p>
             <a:r>
               <a:rPr lang="en-US" sz="1600" dirty="0" smtClean="0"/>
-              <a:t>CTH </a:t>
-            </a:r>
-            <a:r>
-              <a:rPr lang="en-US" sz="1600" dirty="0" smtClean="0"/>
-              <a:t>(overlaid)</a:t>
+              <a:t>CTH (overlaid)</a:t>
             </a:r>
             <a:endParaRPr lang="en-US" sz="1600" dirty="0"/>
           </a:p>
@@ -42609,11 +41872,7 @@
           <a:p>
             <a:r>
               <a:rPr lang="en-US" dirty="0" smtClean="0"/>
-              <a:t>Time-Series Analysis: </a:t>
-            </a:r>
-            <a:r>
-              <a:rPr lang="en-US" dirty="0" smtClean="0"/>
-              <a:t>Variance</a:t>
+              <a:t>Time-Series Analysis: Variance</a:t>
             </a:r>
             <a:br>
               <a:rPr lang="en-US" dirty="0" smtClean="0"/>
@@ -42623,30 +41882,6 @@
               <a:t>10-cycle increments</a:t>
             </a:r>
             <a:endParaRPr lang="en-US" sz="2400" dirty="0"/>
-          </a:p>
-        </p:txBody>
-      </p:sp>
-      <p:sp>
-        <p:nvSpPr>
-          <p:cNvPr id="3" name="Slide Number Placeholder 2"/>
-          <p:cNvSpPr>
-            <a:spLocks noGrp="1"/>
-          </p:cNvSpPr>
-          <p:nvPr>
-            <p:ph type="sldNum" sz="quarter" idx="12"/>
-          </p:nvPr>
-        </p:nvSpPr>
-        <p:spPr/>
-        <p:txBody>
-          <a:bodyPr/>
-          <a:lstStyle/>
-          <a:p>
-            <a:fld id="{A5E55A7B-7854-E145-92D9-B491DF4BAE2D}" type="slidenum">
-              <a:rPr lang="en-US" smtClean="0"/>
-              <a:pPr/>
-              <a:t>28</a:t>
-            </a:fld>
-            <a:endParaRPr lang="en-US" dirty="0"/>
           </a:p>
         </p:txBody>
       </p:sp>
@@ -42870,30 +42105,6 @@
           <a:chExt cx="0" cy="0"/>
         </a:xfrm>
       </p:grpSpPr>
-      <p:sp>
-        <p:nvSpPr>
-          <p:cNvPr id="3" name="Slide Number Placeholder 2"/>
-          <p:cNvSpPr>
-            <a:spLocks noGrp="1"/>
-          </p:cNvSpPr>
-          <p:nvPr>
-            <p:ph type="sldNum" sz="quarter" idx="12"/>
-          </p:nvPr>
-        </p:nvSpPr>
-        <p:spPr/>
-        <p:txBody>
-          <a:bodyPr/>
-          <a:lstStyle/>
-          <a:p>
-            <a:fld id="{A5E55A7B-7854-E145-92D9-B491DF4BAE2D}" type="slidenum">
-              <a:rPr lang="en-US" smtClean="0"/>
-              <a:pPr/>
-              <a:t>29</a:t>
-            </a:fld>
-            <a:endParaRPr lang="en-US" dirty="0"/>
-          </a:p>
-        </p:txBody>
-      </p:sp>
       <p:pic>
         <p:nvPicPr>
           <p:cNvPr id="4" name="Picture 3" descr="in-transit-extra-xfer-variance.pdf"/>
@@ -43260,11 +42471,7 @@
           <a:p>
             <a:r>
               <a:rPr lang="en-US" dirty="0" smtClean="0"/>
-              <a:t>Time-Series Analysis: </a:t>
-            </a:r>
-            <a:r>
-              <a:rPr lang="en-US" dirty="0" smtClean="0"/>
-              <a:t>Variance</a:t>
+              <a:t>Time-Series Analysis: Variance</a:t>
             </a:r>
             <a:br>
               <a:rPr lang="en-US" dirty="0" smtClean="0"/>
@@ -43416,30 +42623,6 @@
           </a:p>
         </p:txBody>
       </p:sp>
-      <p:sp>
-        <p:nvSpPr>
-          <p:cNvPr id="4" name="Slide Number Placeholder 3"/>
-          <p:cNvSpPr>
-            <a:spLocks noGrp="1"/>
-          </p:cNvSpPr>
-          <p:nvPr>
-            <p:ph type="sldNum" sz="quarter" idx="12"/>
-          </p:nvPr>
-        </p:nvSpPr>
-        <p:spPr/>
-        <p:txBody>
-          <a:bodyPr/>
-          <a:lstStyle/>
-          <a:p>
-            <a:fld id="{A5E55A7B-7854-E145-92D9-B491DF4BAE2D}" type="slidenum">
-              <a:rPr lang="en-US" smtClean="0"/>
-              <a:pPr/>
-              <a:t>3</a:t>
-            </a:fld>
-            <a:endParaRPr lang="en-US" dirty="0"/>
-          </a:p>
-        </p:txBody>
-      </p:sp>
     </p:spTree>
     <p:extLst>
       <p:ext uri="{BB962C8B-B14F-4D97-AF65-F5344CB8AC3E}">
@@ -43502,30 +42685,6 @@
       </p:sp>
       <p:sp>
         <p:nvSpPr>
-          <p:cNvPr id="3" name="Slide Number Placeholder 2"/>
-          <p:cNvSpPr>
-            <a:spLocks noGrp="1"/>
-          </p:cNvSpPr>
-          <p:nvPr>
-            <p:ph type="sldNum" sz="quarter" idx="12"/>
-          </p:nvPr>
-        </p:nvSpPr>
-        <p:spPr/>
-        <p:txBody>
-          <a:bodyPr/>
-          <a:lstStyle/>
-          <a:p>
-            <a:fld id="{A5E55A7B-7854-E145-92D9-B491DF4BAE2D}" type="slidenum">
-              <a:rPr lang="en-US" smtClean="0"/>
-              <a:pPr/>
-              <a:t>30</a:t>
-            </a:fld>
-            <a:endParaRPr lang="en-US" dirty="0"/>
-          </a:p>
-        </p:txBody>
-      </p:sp>
-      <p:sp>
-        <p:nvSpPr>
           <p:cNvPr id="8" name="TextBox 7"/>
           <p:cNvSpPr txBox="1"/>
           <p:nvPr/>
@@ -43672,13 +42831,8 @@
             <a:pPr algn="just"/>
             <a:r>
               <a:rPr lang="en-US" dirty="0" smtClean="0"/>
-              <a:t>At 4k and 8k, effective processing rate of </a:t>
-            </a:r>
-            <a:r>
-              <a:rPr lang="en-US" dirty="0" smtClean="0"/>
-              <a:t>in transit outperforms in situ. </a:t>
-            </a:r>
-            <a:endParaRPr lang="en-US" dirty="0" smtClean="0"/>
+              <a:t>At 4k and 8k, effective processing rate of in transit outperforms in situ. </a:t>
+            </a:r>
           </a:p>
         </p:txBody>
       </p:sp>
@@ -43802,11 +42956,7 @@
           <a:p>
             <a:r>
               <a:rPr lang="en-US" sz="1600" i="1" dirty="0" smtClean="0"/>
-              <a:t>In </a:t>
-            </a:r>
-            <a:r>
-              <a:rPr lang="en-US" sz="1600" i="1" dirty="0" smtClean="0"/>
-              <a:t>transit </a:t>
+              <a:t>In transit </a:t>
             </a:r>
             <a:r>
               <a:rPr lang="en-US" sz="1600" dirty="0" smtClean="0"/>
@@ -43910,30 +43060,6 @@
               <a:rPr lang="en-US" dirty="0" smtClean="0"/>
               <a:t>Node Scaling</a:t>
             </a:r>
-            <a:endParaRPr lang="en-US" dirty="0"/>
-          </a:p>
-        </p:txBody>
-      </p:sp>
-      <p:sp>
-        <p:nvSpPr>
-          <p:cNvPr id="3" name="Slide Number Placeholder 2"/>
-          <p:cNvSpPr>
-            <a:spLocks noGrp="1"/>
-          </p:cNvSpPr>
-          <p:nvPr>
-            <p:ph type="sldNum" sz="quarter" idx="12"/>
-          </p:nvPr>
-        </p:nvSpPr>
-        <p:spPr/>
-        <p:txBody>
-          <a:bodyPr/>
-          <a:lstStyle/>
-          <a:p>
-            <a:fld id="{A5E55A7B-7854-E145-92D9-B491DF4BAE2D}" type="slidenum">
-              <a:rPr lang="en-US" smtClean="0"/>
-              <a:pPr/>
-              <a:t>31</a:t>
-            </a:fld>
             <a:endParaRPr lang="en-US" dirty="0"/>
           </a:p>
         </p:txBody>
@@ -44471,30 +43597,6 @@
       </p:grpSpPr>
       <p:sp>
         <p:nvSpPr>
-          <p:cNvPr id="3" name="Slide Number Placeholder 2"/>
-          <p:cNvSpPr>
-            <a:spLocks noGrp="1"/>
-          </p:cNvSpPr>
-          <p:nvPr>
-            <p:ph type="sldNum" sz="quarter" idx="12"/>
-          </p:nvPr>
-        </p:nvSpPr>
-        <p:spPr/>
-        <p:txBody>
-          <a:bodyPr/>
-          <a:lstStyle/>
-          <a:p>
-            <a:fld id="{A5E55A7B-7854-E145-92D9-B491DF4BAE2D}" type="slidenum">
-              <a:rPr lang="en-US" smtClean="0"/>
-              <a:pPr/>
-              <a:t>32</a:t>
-            </a:fld>
-            <a:endParaRPr lang="en-US" dirty="0"/>
-          </a:p>
-        </p:txBody>
-      </p:sp>
-      <p:sp>
-        <p:nvSpPr>
           <p:cNvPr id="4" name="Title 1"/>
           <p:cNvSpPr>
             <a:spLocks noGrp="1"/>
@@ -44816,30 +43918,6 @@
           </a:p>
         </p:txBody>
       </p:sp>
-      <p:sp>
-        <p:nvSpPr>
-          <p:cNvPr id="3" name="Slide Number Placeholder 2"/>
-          <p:cNvSpPr>
-            <a:spLocks noGrp="1"/>
-          </p:cNvSpPr>
-          <p:nvPr>
-            <p:ph type="sldNum" sz="quarter" idx="12"/>
-          </p:nvPr>
-        </p:nvSpPr>
-        <p:spPr/>
-        <p:txBody>
-          <a:bodyPr/>
-          <a:lstStyle/>
-          <a:p>
-            <a:fld id="{A5E55A7B-7854-E145-92D9-B491DF4BAE2D}" type="slidenum">
-              <a:rPr lang="en-US" smtClean="0"/>
-              <a:pPr/>
-              <a:t>33</a:t>
-            </a:fld>
-            <a:endParaRPr lang="en-US" dirty="0"/>
-          </a:p>
-        </p:txBody>
-      </p:sp>
       <p:pic>
         <p:nvPicPr>
           <p:cNvPr id="2" name="Picture 1" descr="MemoryUsageAll.pdf"/>
@@ -44997,30 +44075,6 @@
               <a:rPr lang="en-US" dirty="0" smtClean="0"/>
               <a:t>Memory Footprint (on code side)</a:t>
             </a:r>
-            <a:endParaRPr lang="en-US" dirty="0"/>
-          </a:p>
-        </p:txBody>
-      </p:sp>
-      <p:sp>
-        <p:nvSpPr>
-          <p:cNvPr id="3" name="Slide Number Placeholder 2"/>
-          <p:cNvSpPr>
-            <a:spLocks noGrp="1"/>
-          </p:cNvSpPr>
-          <p:nvPr>
-            <p:ph type="sldNum" sz="quarter" idx="12"/>
-          </p:nvPr>
-        </p:nvSpPr>
-        <p:spPr/>
-        <p:txBody>
-          <a:bodyPr/>
-          <a:lstStyle/>
-          <a:p>
-            <a:fld id="{A5E55A7B-7854-E145-92D9-B491DF4BAE2D}" type="slidenum">
-              <a:rPr lang="en-US" smtClean="0"/>
-              <a:pPr/>
-              <a:t>34</a:t>
-            </a:fld>
             <a:endParaRPr lang="en-US" dirty="0"/>
           </a:p>
         </p:txBody>
@@ -45197,30 +44251,6 @@
           </a:p>
         </p:txBody>
       </p:sp>
-      <p:sp>
-        <p:nvSpPr>
-          <p:cNvPr id="3" name="Slide Number Placeholder 2"/>
-          <p:cNvSpPr>
-            <a:spLocks noGrp="1"/>
-          </p:cNvSpPr>
-          <p:nvPr>
-            <p:ph type="sldNum" sz="quarter" idx="12"/>
-          </p:nvPr>
-        </p:nvSpPr>
-        <p:spPr/>
-        <p:txBody>
-          <a:bodyPr/>
-          <a:lstStyle/>
-          <a:p>
-            <a:fld id="{A5E55A7B-7854-E145-92D9-B491DF4BAE2D}" type="slidenum">
-              <a:rPr lang="en-US" smtClean="0"/>
-              <a:pPr/>
-              <a:t>35</a:t>
-            </a:fld>
-            <a:endParaRPr lang="en-US" dirty="0"/>
-          </a:p>
-        </p:txBody>
-      </p:sp>
       <p:pic>
         <p:nvPicPr>
           <p:cNvPr id="2" name="Picture 1" descr="MemoryUsageCompare.pdf"/>
@@ -45373,30 +44403,6 @@
           </a:p>
         </p:txBody>
       </p:sp>
-      <p:sp>
-        <p:nvSpPr>
-          <p:cNvPr id="4" name="Slide Number Placeholder 3"/>
-          <p:cNvSpPr>
-            <a:spLocks noGrp="1"/>
-          </p:cNvSpPr>
-          <p:nvPr>
-            <p:ph type="sldNum" sz="quarter" idx="12"/>
-          </p:nvPr>
-        </p:nvSpPr>
-        <p:spPr/>
-        <p:txBody>
-          <a:bodyPr/>
-          <a:lstStyle/>
-          <a:p>
-            <a:fld id="{A5E55A7B-7854-E145-92D9-B491DF4BAE2D}" type="slidenum">
-              <a:rPr lang="en-US" smtClean="0"/>
-              <a:pPr/>
-              <a:t>36</a:t>
-            </a:fld>
-            <a:endParaRPr lang="en-US" dirty="0"/>
-          </a:p>
-        </p:txBody>
-      </p:sp>
     </p:spTree>
     <p:extLst>
       <p:ext uri="{BB962C8B-B14F-4D97-AF65-F5344CB8AC3E}">
@@ -45570,30 +44576,6 @@
               <a:rPr lang="en-US" sz="1800" dirty="0" smtClean="0"/>
               <a:t> has several other positive features, we do not anticipate performance to be the main motivations for using it.</a:t>
             </a:r>
-          </a:p>
-        </p:txBody>
-      </p:sp>
-      <p:sp>
-        <p:nvSpPr>
-          <p:cNvPr id="4" name="Slide Number Placeholder 3"/>
-          <p:cNvSpPr>
-            <a:spLocks noGrp="1"/>
-          </p:cNvSpPr>
-          <p:nvPr>
-            <p:ph type="sldNum" sz="quarter" idx="12"/>
-          </p:nvPr>
-        </p:nvSpPr>
-        <p:spPr/>
-        <p:txBody>
-          <a:bodyPr/>
-          <a:lstStyle/>
-          <a:p>
-            <a:fld id="{A5E55A7B-7854-E145-92D9-B491DF4BAE2D}" type="slidenum">
-              <a:rPr lang="en-US" smtClean="0"/>
-              <a:pPr/>
-              <a:t>37</a:t>
-            </a:fld>
-            <a:endParaRPr lang="en-US" dirty="0"/>
           </a:p>
         </p:txBody>
       </p:sp>
@@ -45709,30 +44691,6 @@
           </a:p>
         </p:txBody>
       </p:sp>
-      <p:sp>
-        <p:nvSpPr>
-          <p:cNvPr id="4" name="Slide Number Placeholder 3"/>
-          <p:cNvSpPr>
-            <a:spLocks noGrp="1"/>
-          </p:cNvSpPr>
-          <p:nvPr>
-            <p:ph type="sldNum" sz="quarter" idx="12"/>
-          </p:nvPr>
-        </p:nvSpPr>
-        <p:spPr/>
-        <p:txBody>
-          <a:bodyPr/>
-          <a:lstStyle/>
-          <a:p>
-            <a:fld id="{A5E55A7B-7854-E145-92D9-B491DF4BAE2D}" type="slidenum">
-              <a:rPr lang="en-US" smtClean="0"/>
-              <a:pPr/>
-              <a:t>38</a:t>
-            </a:fld>
-            <a:endParaRPr lang="en-US" dirty="0"/>
-          </a:p>
-        </p:txBody>
-      </p:sp>
     </p:spTree>
     <p:extLst>
       <p:ext uri="{BB962C8B-B14F-4D97-AF65-F5344CB8AC3E}">
@@ -45876,30 +44834,6 @@
               <a:t>to generate sizable meshes of its own. Thus, it may be fruitful to pursue and support incremental algorithms where possible.</a:t>
             </a:r>
             <a:endParaRPr lang="en-US" sz="1800" dirty="0" smtClean="0"/>
-          </a:p>
-        </p:txBody>
-      </p:sp>
-      <p:sp>
-        <p:nvSpPr>
-          <p:cNvPr id="4" name="Slide Number Placeholder 3"/>
-          <p:cNvSpPr>
-            <a:spLocks noGrp="1"/>
-          </p:cNvSpPr>
-          <p:nvPr>
-            <p:ph type="sldNum" sz="quarter" idx="12"/>
-          </p:nvPr>
-        </p:nvSpPr>
-        <p:spPr/>
-        <p:txBody>
-          <a:bodyPr/>
-          <a:lstStyle/>
-          <a:p>
-            <a:fld id="{A5E55A7B-7854-E145-92D9-B491DF4BAE2D}" type="slidenum">
-              <a:rPr lang="en-US" smtClean="0"/>
-              <a:pPr/>
-              <a:t>39</a:t>
-            </a:fld>
-            <a:endParaRPr lang="en-US" dirty="0"/>
           </a:p>
         </p:txBody>
       </p:sp>
@@ -46057,30 +44991,6 @@
           </a:p>
         </p:txBody>
       </p:sp>
-      <p:sp>
-        <p:nvSpPr>
-          <p:cNvPr id="4" name="Slide Number Placeholder 3"/>
-          <p:cNvSpPr>
-            <a:spLocks noGrp="1"/>
-          </p:cNvSpPr>
-          <p:nvPr>
-            <p:ph type="sldNum" sz="quarter" idx="12"/>
-          </p:nvPr>
-        </p:nvSpPr>
-        <p:spPr/>
-        <p:txBody>
-          <a:bodyPr/>
-          <a:lstStyle/>
-          <a:p>
-            <a:fld id="{A5E55A7B-7854-E145-92D9-B491DF4BAE2D}" type="slidenum">
-              <a:rPr lang="en-US" smtClean="0"/>
-              <a:pPr/>
-              <a:t>4</a:t>
-            </a:fld>
-            <a:endParaRPr lang="en-US" dirty="0"/>
-          </a:p>
-        </p:txBody>
-      </p:sp>
     </p:spTree>
     <p:extLst>
       <p:ext uri="{BB962C8B-B14F-4D97-AF65-F5344CB8AC3E}">
@@ -46249,30 +45159,6 @@
               <a:t>realistic to do so. Thus, users may still choose to incur the extra overhead to use a traditional offline post-processing visualization and data analysis workflow.</a:t>
             </a:r>
             <a:endParaRPr lang="en-US" sz="1800" dirty="0" smtClean="0"/>
-          </a:p>
-        </p:txBody>
-      </p:sp>
-      <p:sp>
-        <p:nvSpPr>
-          <p:cNvPr id="4" name="Slide Number Placeholder 3"/>
-          <p:cNvSpPr>
-            <a:spLocks noGrp="1"/>
-          </p:cNvSpPr>
-          <p:nvPr>
-            <p:ph type="sldNum" sz="quarter" idx="12"/>
-          </p:nvPr>
-        </p:nvSpPr>
-        <p:spPr/>
-        <p:txBody>
-          <a:bodyPr/>
-          <a:lstStyle/>
-          <a:p>
-            <a:fld id="{A5E55A7B-7854-E145-92D9-B491DF4BAE2D}" type="slidenum">
-              <a:rPr lang="en-US" smtClean="0"/>
-              <a:pPr/>
-              <a:t>40</a:t>
-            </a:fld>
-            <a:endParaRPr lang="en-US" dirty="0"/>
           </a:p>
         </p:txBody>
       </p:sp>
@@ -46393,30 +45279,6 @@
           </a:p>
         </p:txBody>
       </p:sp>
-      <p:sp>
-        <p:nvSpPr>
-          <p:cNvPr id="4" name="Slide Number Placeholder 3"/>
-          <p:cNvSpPr>
-            <a:spLocks noGrp="1"/>
-          </p:cNvSpPr>
-          <p:nvPr>
-            <p:ph type="sldNum" sz="quarter" idx="12"/>
-          </p:nvPr>
-        </p:nvSpPr>
-        <p:spPr/>
-        <p:txBody>
-          <a:bodyPr/>
-          <a:lstStyle/>
-          <a:p>
-            <a:fld id="{A5E55A7B-7854-E145-92D9-B491DF4BAE2D}" type="slidenum">
-              <a:rPr lang="en-US" smtClean="0"/>
-              <a:pPr/>
-              <a:t>41</a:t>
-            </a:fld>
-            <a:endParaRPr lang="en-US" dirty="0"/>
-          </a:p>
-        </p:txBody>
-      </p:sp>
     </p:spTree>
     <p:extLst>
       <p:ext uri="{BB962C8B-B14F-4D97-AF65-F5344CB8AC3E}">
@@ -46591,30 +45453,6 @@
               <a:rPr lang="en-US" dirty="0" smtClean="0"/>
               <a:t>Scheduling, placement, node sharing, specialized runtimes, …</a:t>
             </a:r>
-          </a:p>
-        </p:txBody>
-      </p:sp>
-      <p:sp>
-        <p:nvSpPr>
-          <p:cNvPr id="4" name="Slide Number Placeholder 3"/>
-          <p:cNvSpPr>
-            <a:spLocks noGrp="1"/>
-          </p:cNvSpPr>
-          <p:nvPr>
-            <p:ph type="sldNum" sz="quarter" idx="12"/>
-          </p:nvPr>
-        </p:nvSpPr>
-        <p:spPr/>
-        <p:txBody>
-          <a:bodyPr/>
-          <a:lstStyle/>
-          <a:p>
-            <a:fld id="{A5E55A7B-7854-E145-92D9-B491DF4BAE2D}" type="slidenum">
-              <a:rPr lang="en-US" smtClean="0"/>
-              <a:pPr/>
-              <a:t>42</a:t>
-            </a:fld>
-            <a:endParaRPr lang="en-US" dirty="0"/>
           </a:p>
         </p:txBody>
       </p:sp>
@@ -46796,30 +45634,6 @@
           </a:p>
         </p:txBody>
       </p:sp>
-      <p:sp>
-        <p:nvSpPr>
-          <p:cNvPr id="4" name="Slide Number Placeholder 3"/>
-          <p:cNvSpPr>
-            <a:spLocks noGrp="1"/>
-          </p:cNvSpPr>
-          <p:nvPr>
-            <p:ph type="sldNum" sz="quarter" idx="12"/>
-          </p:nvPr>
-        </p:nvSpPr>
-        <p:spPr/>
-        <p:txBody>
-          <a:bodyPr/>
-          <a:lstStyle/>
-          <a:p>
-            <a:fld id="{A5E55A7B-7854-E145-92D9-B491DF4BAE2D}" type="slidenum">
-              <a:rPr lang="en-US" smtClean="0"/>
-              <a:pPr/>
-              <a:t>43</a:t>
-            </a:fld>
-            <a:endParaRPr lang="en-US" dirty="0"/>
-          </a:p>
-        </p:txBody>
-      </p:sp>
     </p:spTree>
     <p:extLst>
       <p:ext uri="{BB962C8B-B14F-4D97-AF65-F5344CB8AC3E}">
@@ -46920,30 +45734,6 @@
               <a:t>Note: ASC program will benefit from a detailed understanding of the relationship between analyst tasks, analysis operations, and disk I/O performance. </a:t>
             </a:r>
             <a:endParaRPr lang="en-US" i="1" dirty="0"/>
-          </a:p>
-        </p:txBody>
-      </p:sp>
-      <p:sp>
-        <p:nvSpPr>
-          <p:cNvPr id="4" name="Slide Number Placeholder 3"/>
-          <p:cNvSpPr>
-            <a:spLocks noGrp="1"/>
-          </p:cNvSpPr>
-          <p:nvPr>
-            <p:ph type="sldNum" sz="quarter" idx="12"/>
-          </p:nvPr>
-        </p:nvSpPr>
-        <p:spPr/>
-        <p:txBody>
-          <a:bodyPr/>
-          <a:lstStyle/>
-          <a:p>
-            <a:fld id="{A5E55A7B-7854-E145-92D9-B491DF4BAE2D}" type="slidenum">
-              <a:rPr lang="en-US" smtClean="0"/>
-              <a:pPr/>
-              <a:t>5</a:t>
-            </a:fld>
-            <a:endParaRPr lang="en-US" dirty="0"/>
           </a:p>
         </p:txBody>
       </p:sp>
@@ -47088,30 +45878,6 @@
             </a:r>
           </a:p>
           <a:p>
-            <a:endParaRPr lang="en-US" dirty="0"/>
-          </a:p>
-        </p:txBody>
-      </p:sp>
-      <p:sp>
-        <p:nvSpPr>
-          <p:cNvPr id="4" name="Slide Number Placeholder 3"/>
-          <p:cNvSpPr>
-            <a:spLocks noGrp="1"/>
-          </p:cNvSpPr>
-          <p:nvPr>
-            <p:ph type="sldNum" sz="quarter" idx="12"/>
-          </p:nvPr>
-        </p:nvSpPr>
-        <p:spPr/>
-        <p:txBody>
-          <a:bodyPr/>
-          <a:lstStyle/>
-          <a:p>
-            <a:fld id="{A5E55A7B-7854-E145-92D9-B491DF4BAE2D}" type="slidenum">
-              <a:rPr lang="en-US" smtClean="0"/>
-              <a:pPr/>
-              <a:t>6</a:t>
-            </a:fld>
             <a:endParaRPr lang="en-US" dirty="0"/>
           </a:p>
         </p:txBody>
@@ -47426,30 +46192,6 @@
           </a:p>
         </p:txBody>
       </p:sp>
-      <p:sp>
-        <p:nvSpPr>
-          <p:cNvPr id="4" name="Slide Number Placeholder 3"/>
-          <p:cNvSpPr>
-            <a:spLocks noGrp="1"/>
-          </p:cNvSpPr>
-          <p:nvPr>
-            <p:ph type="sldNum" sz="quarter" idx="12"/>
-          </p:nvPr>
-        </p:nvSpPr>
-        <p:spPr/>
-        <p:txBody>
-          <a:bodyPr/>
-          <a:lstStyle/>
-          <a:p>
-            <a:fld id="{A5E55A7B-7854-E145-92D9-B491DF4BAE2D}" type="slidenum">
-              <a:rPr lang="en-US" smtClean="0"/>
-              <a:pPr/>
-              <a:t>7</a:t>
-            </a:fld>
-            <a:endParaRPr lang="en-US" dirty="0"/>
-          </a:p>
-        </p:txBody>
-      </p:sp>
     </p:spTree>
     <p:extLst>
       <p:ext uri="{BB962C8B-B14F-4D97-AF65-F5344CB8AC3E}">
@@ -47718,30 +46460,6 @@
           </a:p>
         </p:txBody>
       </p:sp>
-      <p:sp>
-        <p:nvSpPr>
-          <p:cNvPr id="4" name="Slide Number Placeholder 3"/>
-          <p:cNvSpPr>
-            <a:spLocks noGrp="1"/>
-          </p:cNvSpPr>
-          <p:nvPr>
-            <p:ph type="sldNum" sz="quarter" idx="12"/>
-          </p:nvPr>
-        </p:nvSpPr>
-        <p:spPr/>
-        <p:txBody>
-          <a:bodyPr/>
-          <a:lstStyle/>
-          <a:p>
-            <a:fld id="{A5E55A7B-7854-E145-92D9-B491DF4BAE2D}" type="slidenum">
-              <a:rPr lang="en-US" smtClean="0"/>
-              <a:pPr/>
-              <a:t>8</a:t>
-            </a:fld>
-            <a:endParaRPr lang="en-US" dirty="0"/>
-          </a:p>
-        </p:txBody>
-      </p:sp>
     </p:spTree>
     <p:extLst>
       <p:ext uri="{BB962C8B-B14F-4D97-AF65-F5344CB8AC3E}">
@@ -47869,30 +46587,6 @@
               <a:rPr lang="en-US" dirty="0" smtClean="0"/>
               <a:t>Find components across neighbors</a:t>
             </a:r>
-          </a:p>
-        </p:txBody>
-      </p:sp>
-      <p:sp>
-        <p:nvSpPr>
-          <p:cNvPr id="4" name="Slide Number Placeholder 3"/>
-          <p:cNvSpPr>
-            <a:spLocks noGrp="1"/>
-          </p:cNvSpPr>
-          <p:nvPr>
-            <p:ph type="sldNum" sz="quarter" idx="12"/>
-          </p:nvPr>
-        </p:nvSpPr>
-        <p:spPr/>
-        <p:txBody>
-          <a:bodyPr/>
-          <a:lstStyle/>
-          <a:p>
-            <a:fld id="{A5E55A7B-7854-E145-92D9-B491DF4BAE2D}" type="slidenum">
-              <a:rPr lang="en-US" smtClean="0"/>
-              <a:pPr/>
-              <a:t>9</a:t>
-            </a:fld>
-            <a:endParaRPr lang="en-US" dirty="0"/>
           </a:p>
         </p:txBody>
       </p:sp>

</xml_diff>

<commit_message>
Response to several of Kim Mish's suggestions.
</commit_message>
<xml_diff>
--- a/Summary/SummarySlides.pptx
+++ b/Summary/SummarySlides.pptx
@@ -271,7 +271,7 @@
           <a:p>
             <a:fld id="{1E41F11C-C490-BC4C-9D98-B916474B0AA7}" type="datetime1">
               <a:rPr lang="en-US" smtClean="0"/>
-              <a:t>3/13/13</a:t>
+              <a:t>3/15/13</a:t>
             </a:fld>
             <a:endParaRPr lang="en-US" dirty="0"/>
           </a:p>
@@ -1862,7 +1862,7 @@
           <a:p>
             <a:fld id="{2B89098A-9DD0-704D-897B-46AD3E21E869}" type="datetime1">
               <a:rPr lang="en-US" smtClean="0"/>
-              <a:t>3/13/13</a:t>
+              <a:t>3/15/13</a:t>
             </a:fld>
             <a:endParaRPr lang="en-US" dirty="0"/>
           </a:p>
@@ -2369,7 +2369,7 @@
           <a:p>
             <a:fld id="{274ADEFF-0DD3-C940-B04B-DADA55CED8F3}" type="datetime1">
               <a:rPr lang="en-US" smtClean="0"/>
-              <a:t>3/13/13</a:t>
+              <a:t>3/15/13</a:t>
             </a:fld>
             <a:endParaRPr lang="en-US" dirty="0"/>
           </a:p>
@@ -2501,7 +2501,7 @@
           <a:p>
             <a:fld id="{6A07F160-38EC-AB4C-8E07-1952CF053195}" type="datetime1">
               <a:rPr lang="en-US" smtClean="0"/>
-              <a:t>3/13/13</a:t>
+              <a:t>3/15/13</a:t>
             </a:fld>
             <a:endParaRPr lang="en-US" dirty="0"/>
           </a:p>
@@ -2610,7 +2610,7 @@
           <a:p>
             <a:fld id="{F884B76F-D72A-6247-9E9B-E20AA4950DAF}" type="datetime1">
               <a:rPr lang="en-US" smtClean="0"/>
-              <a:t>3/13/13</a:t>
+              <a:t>3/15/13</a:t>
             </a:fld>
             <a:endParaRPr lang="en-US" dirty="0"/>
           </a:p>
@@ -2901,7 +2901,7 @@
           <a:p>
             <a:fld id="{BEDB5943-9216-4740-9B52-E49457DEEC39}" type="datetime1">
               <a:rPr lang="en-US" smtClean="0"/>
-              <a:t>3/13/13</a:t>
+              <a:t>3/15/13</a:t>
             </a:fld>
             <a:endParaRPr lang="en-US" dirty="0"/>
           </a:p>
@@ -3172,7 +3172,7 @@
           <a:p>
             <a:fld id="{CE3464F7-513A-0643-A456-60C9973792A9}" type="datetime1">
               <a:rPr lang="en-US" smtClean="0"/>
-              <a:t>3/13/13</a:t>
+              <a:t>3/15/13</a:t>
             </a:fld>
             <a:endParaRPr lang="en-US" dirty="0"/>
           </a:p>
@@ -3356,7 +3356,7 @@
           <a:p>
             <a:fld id="{7539DBB8-13F3-344F-8629-CCFC867E05CD}" type="datetime1">
               <a:rPr lang="en-US" smtClean="0"/>
-              <a:t>3/13/13</a:t>
+              <a:t>3/15/13</a:t>
             </a:fld>
             <a:endParaRPr lang="en-US" dirty="0"/>
           </a:p>
@@ -3550,7 +3550,7 @@
           <a:p>
             <a:fld id="{A9A4CDC6-5B91-FE47-9E5B-4BFED9D2F143}" type="datetime1">
               <a:rPr lang="en-US" smtClean="0"/>
-              <a:t>3/13/13</a:t>
+              <a:t>3/15/13</a:t>
             </a:fld>
             <a:endParaRPr lang="en-US" dirty="0"/>
           </a:p>
@@ -3856,7 +3856,7 @@
           <a:p>
             <a:fld id="{40793677-4686-7346-81DC-BD0C6D979DE0}" type="datetime1">
               <a:rPr lang="en-US" smtClean="0"/>
-              <a:t>3/13/13</a:t>
+              <a:t>3/15/13</a:t>
             </a:fld>
             <a:endParaRPr lang="en-US" dirty="0"/>
           </a:p>
@@ -4520,7 +4520,7 @@
           <a:p>
             <a:fld id="{BA17DCE3-72AA-D440-820C-A4334F8F8381}" type="datetime1">
               <a:rPr lang="en-US" smtClean="0"/>
-              <a:t>3/13/13</a:t>
+              <a:t>3/15/13</a:t>
             </a:fld>
             <a:endParaRPr lang="en-US" dirty="0"/>
           </a:p>
@@ -5251,7 +5251,7 @@
           <a:p>
             <a:fld id="{DE85F4BE-571A-754E-B290-38E85A2AB13C}" type="datetime1">
               <a:rPr lang="en-US" smtClean="0"/>
-              <a:t>3/13/13</a:t>
+              <a:t>3/15/13</a:t>
             </a:fld>
             <a:endParaRPr lang="en-US" dirty="0"/>
           </a:p>
@@ -6139,7 +6139,7 @@
           <a:p>
             <a:fld id="{2721CC38-418C-9345-95E2-5F9CDED78CA1}" type="datetime1">
               <a:rPr lang="en-US" smtClean="0"/>
-              <a:t>3/13/13</a:t>
+              <a:t>3/15/13</a:t>
             </a:fld>
             <a:endParaRPr lang="en-US" dirty="0"/>
           </a:p>
@@ -6835,7 +6835,7 @@
           <a:p>
             <a:fld id="{BBEDFB4F-0416-6641-8B2C-07BFABA598F7}" type="datetime1">
               <a:rPr lang="en-US" smtClean="0"/>
-              <a:t>3/13/13</a:t>
+              <a:t>3/15/13</a:t>
             </a:fld>
             <a:endParaRPr lang="en-US" dirty="0"/>
           </a:p>
@@ -7913,7 +7913,7 @@
           <a:p>
             <a:fld id="{AEC8B2BF-A675-9547-80CC-C0A85AD6F743}" type="datetime1">
               <a:rPr lang="en-US" smtClean="0"/>
-              <a:t>3/13/13</a:t>
+              <a:t>3/15/13</a:t>
             </a:fld>
             <a:endParaRPr lang="en-US" dirty="0"/>
           </a:p>
@@ -8200,7 +8200,7 @@
           <a:p>
             <a:fld id="{3938401E-D456-5647-8149-DE834487F23A}" type="datetime1">
               <a:rPr lang="en-US" smtClean="0"/>
-              <a:t>3/13/13</a:t>
+              <a:t>3/15/13</a:t>
             </a:fld>
             <a:endParaRPr lang="en-US" dirty="0"/>
           </a:p>
@@ -8430,7 +8430,7 @@
           <a:p>
             <a:fld id="{9E042A07-5C93-3A44-B2CB-DA8237221699}" type="datetime1">
               <a:rPr lang="en-US" smtClean="0"/>
-              <a:t>3/13/13</a:t>
+              <a:t>3/15/13</a:t>
             </a:fld>
             <a:endParaRPr lang="en-US" dirty="0"/>
           </a:p>
@@ -8732,7 +8732,7 @@
           <a:p>
             <a:fld id="{43CB7A98-1783-1C4E-ACBB-8D3428320856}" type="datetime1">
               <a:rPr lang="en-US" smtClean="0"/>
-              <a:t>3/13/13</a:t>
+              <a:t>3/15/13</a:t>
             </a:fld>
             <a:endParaRPr lang="en-US" dirty="0"/>
           </a:p>
@@ -9110,7 +9110,7 @@
           <a:p>
             <a:fld id="{1484D48B-B7AB-D840-975A-3E636DE1C0E2}" type="datetime1">
               <a:rPr lang="en-US" smtClean="0"/>
-              <a:t>3/13/13</a:t>
+              <a:t>3/15/13</a:t>
             </a:fld>
             <a:endParaRPr lang="en-US" dirty="0"/>
           </a:p>
@@ -9745,7 +9745,11 @@
             </a:pPr>
             <a:r>
               <a:rPr lang="en-US" sz="1600" dirty="0" smtClean="0"/>
-              <a:t>February 8, 2013</a:t>
+              <a:t>March 5, </a:t>
+            </a:r>
+            <a:r>
+              <a:rPr lang="en-US" sz="1600" dirty="0" smtClean="0"/>
+              <a:t>2013</a:t>
             </a:r>
           </a:p>
           <a:p>
@@ -9932,12 +9936,17 @@
             </a:r>
             <a:r>
               <a:rPr lang="en-US" i="1" dirty="0" smtClean="0"/>
-              <a:t>in situ</a:t>
+              <a:t>in </a:t>
+            </a:r>
+            <a:r>
+              <a:rPr lang="en-US" i="1" dirty="0" smtClean="0"/>
+              <a:t>situ</a:t>
             </a:r>
             <a:r>
               <a:rPr lang="en-US" dirty="0" smtClean="0"/>
-              <a:t> analysis</a:t>
-            </a:r>
+              <a:t> data analysis</a:t>
+            </a:r>
+            <a:endParaRPr lang="en-US" dirty="0" smtClean="0"/>
           </a:p>
           <a:p>
             <a:pPr lvl="1"/>
@@ -9990,7 +9999,15 @@
             </a:r>
             <a:r>
               <a:rPr lang="en-US" dirty="0" smtClean="0"/>
-              <a:t>: CTH job given less nodes that are assigned to VDA service so that together both jobs use the same nodes as other runs</a:t>
+              <a:t>: CTH job given </a:t>
+            </a:r>
+            <a:r>
+              <a:rPr lang="en-US" dirty="0" smtClean="0"/>
+              <a:t>fewer nodes </a:t>
+            </a:r>
+            <a:r>
+              <a:rPr lang="en-US" dirty="0" smtClean="0"/>
+              <a:t>that are assigned to VDA service so that together both jobs use the same nodes as other runs</a:t>
             </a:r>
           </a:p>
           <a:p>
@@ -10067,8 +10084,8 @@
           </a:prstGeom>
           <a:solidFill>
             <a:schemeClr val="accent3">
-              <a:lumMod val="20000"/>
-              <a:lumOff val="80000"/>
+              <a:lumMod val="60000"/>
+              <a:lumOff val="40000"/>
             </a:schemeClr>
           </a:solidFill>
           <a:ln>
@@ -37078,8 +37095,8 @@
             </a:prstGeom>
             <a:solidFill>
               <a:schemeClr val="accent3">
-                <a:lumMod val="40000"/>
-                <a:lumOff val="60000"/>
+                <a:lumMod val="60000"/>
+                <a:lumOff val="40000"/>
                 <a:alpha val="75000"/>
               </a:schemeClr>
             </a:solidFill>
@@ -37308,8 +37325,13 @@
             <a:pPr lvl="1"/>
             <a:r>
               <a:rPr lang="en-US" dirty="0"/>
-              <a:t>32 GB memory/core</a:t>
-            </a:r>
+              <a:t>32 GB memory</a:t>
+            </a:r>
+            <a:r>
+              <a:rPr lang="en-US" dirty="0" smtClean="0"/>
+              <a:t>/node</a:t>
+            </a:r>
+            <a:endParaRPr lang="en-US" dirty="0"/>
           </a:p>
           <a:p>
             <a:endParaRPr lang="en-US" dirty="0"/>
@@ -37615,38 +37637,6 @@
           </a:p>
         </p:txBody>
       </p:sp>
-      <p:pic>
-        <p:nvPicPr>
-          <p:cNvPr id="5" name="Content Placeholder 6"/>
-          <p:cNvPicPr>
-            <a:picLocks noChangeAspect="1"/>
-          </p:cNvPicPr>
-          <p:nvPr/>
-        </p:nvPicPr>
-        <p:blipFill>
-          <a:blip r:embed="rId2"/>
-          <a:srcRect l="-11191" r="-11191"/>
-          <a:stretch>
-            <a:fillRect/>
-          </a:stretch>
-        </p:blipFill>
-        <p:spPr bwMode="auto">
-          <a:xfrm>
-            <a:off x="2660997" y="3337352"/>
-            <a:ext cx="4190946" cy="2468564"/>
-          </a:xfrm>
-          <a:prstGeom prst="rect">
-            <a:avLst/>
-          </a:prstGeom>
-          <a:noFill/>
-          <a:ln w="9525">
-            <a:noFill/>
-            <a:miter lim="800000"/>
-            <a:headEnd/>
-            <a:tailEnd/>
-          </a:ln>
-        </p:spPr>
-      </p:pic>
       <p:sp>
         <p:nvSpPr>
           <p:cNvPr id="6" name="TextBox 5"/>
@@ -37671,7 +37661,15 @@
           <a:p>
             <a:r>
               <a:rPr lang="en-US" sz="1000" dirty="0"/>
-              <a:t>Table shows the range of core sizes used for the various experiments.  For every application we used the maximum 16 cores-per-node for the CTH client, since CTH is primarily bound b computation and scales very well.</a:t>
+              <a:t>Table shows the range of core sizes used for the various experiments.  For every application we used the maximum 16 cores-per-node for the CTH client, since CTH is primarily bound </a:t>
+            </a:r>
+            <a:r>
+              <a:rPr lang="en-US" sz="1000" dirty="0" smtClean="0"/>
+              <a:t>by </a:t>
+            </a:r>
+            <a:r>
+              <a:rPr lang="en-US" sz="1000" dirty="0"/>
+              <a:t>computation and scales very well.</a:t>
             </a:r>
           </a:p>
           <a:p>
@@ -37679,6 +37677,30 @@
           </a:p>
         </p:txBody>
       </p:sp>
+      <p:pic>
+        <p:nvPicPr>
+          <p:cNvPr id="4" name="Picture 3"/>
+          <p:cNvPicPr>
+            <a:picLocks noChangeAspect="1"/>
+          </p:cNvPicPr>
+          <p:nvPr/>
+        </p:nvPicPr>
+        <p:blipFill>
+          <a:blip r:embed="rId2"/>
+          <a:stretch>
+            <a:fillRect/>
+          </a:stretch>
+        </p:blipFill>
+        <p:spPr>
+          <a:xfrm>
+            <a:off x="2866045" y="3337352"/>
+            <a:ext cx="3411911" cy="2468880"/>
+          </a:xfrm>
+          <a:prstGeom prst="rect">
+            <a:avLst/>
+          </a:prstGeom>
+        </p:spPr>
+      </p:pic>
     </p:spTree>
     <p:extLst>
       <p:ext uri="{BB962C8B-B14F-4D97-AF65-F5344CB8AC3E}">
@@ -37716,36 +37738,47 @@
           <a:chExt cx="0" cy="0"/>
         </a:xfrm>
       </p:grpSpPr>
+      <p:sp>
+        <p:nvSpPr>
+          <p:cNvPr id="3" name="Title 2"/>
+          <p:cNvSpPr>
+            <a:spLocks noGrp="1"/>
+          </p:cNvSpPr>
+          <p:nvPr>
+            <p:ph type="title"/>
+          </p:nvPr>
+        </p:nvSpPr>
+        <p:spPr/>
+        <p:txBody>
+          <a:bodyPr/>
+          <a:lstStyle/>
+          <a:p>
+            <a:endParaRPr lang="en-US"/>
+          </a:p>
+        </p:txBody>
+      </p:sp>
       <p:pic>
         <p:nvPicPr>
-          <p:cNvPr id="5" name="Content Placeholder 6"/>
+          <p:cNvPr id="6" name="Content Placeholder 5"/>
           <p:cNvPicPr>
-            <a:picLocks noChangeAspect="1"/>
+            <a:picLocks noGrp="1" noChangeAspect="1"/>
           </p:cNvPicPr>
-          <p:nvPr/>
+          <p:nvPr>
+            <p:ph idx="1"/>
+          </p:nvPr>
         </p:nvPicPr>
         <p:blipFill>
           <a:blip r:embed="rId2"/>
-          <a:srcRect l="-11191" r="-11191"/>
+          <a:srcRect l="-11434" r="-11434"/>
           <a:stretch>
             <a:fillRect/>
           </a:stretch>
         </p:blipFill>
-        <p:spPr bwMode="auto">
+        <p:spPr>
           <a:xfrm>
-            <a:off x="352211" y="990600"/>
-            <a:ext cx="8563189" cy="5043916"/>
+            <a:off x="457200" y="1279525"/>
+            <a:ext cx="8229600" cy="4846638"/>
           </a:xfrm>
-          <a:prstGeom prst="rect">
-            <a:avLst/>
-          </a:prstGeom>
-          <a:noFill/>
-          <a:ln w="9525">
-            <a:noFill/>
-            <a:miter lim="800000"/>
-            <a:headEnd/>
-            <a:tailEnd/>
-          </a:ln>
         </p:spPr>
       </p:pic>
     </p:spTree>
@@ -44529,53 +44562,58 @@
               <a:buNone/>
             </a:pPr>
             <a:r>
+              <a:rPr lang="en-US" sz="1800" i="1" dirty="0"/>
+              <a:t>In transit </a:t>
+            </a:r>
+            <a:r>
+              <a:rPr lang="en-US" sz="1800" dirty="0"/>
+              <a:t>data analysis has an added overhead above embedded </a:t>
+            </a:r>
+            <a:r>
+              <a:rPr lang="en-US" sz="1800" i="1" dirty="0"/>
+              <a:t>in situ </a:t>
+            </a:r>
+            <a:r>
+              <a:rPr lang="en-US" sz="1800" dirty="0"/>
+              <a:t>data analysis involving transferring data between parallel jobs. Given a data analysis algorithm with perfect linear scalability, we suspect </a:t>
+            </a:r>
+            <a:r>
+              <a:rPr lang="en-US" sz="1800" i="1" dirty="0"/>
+              <a:t>in transit</a:t>
+            </a:r>
+            <a:r>
+              <a:rPr lang="en-US" sz="1800" dirty="0"/>
+              <a:t> workflows will always have an added cost, and our results support this. With a data analysis algorithm that does not scale perfectly, possibly due to communication overhead, it is theoretically possible for </a:t>
+            </a:r>
+            <a:r>
               <a:rPr lang="en-US" sz="1800" i="1" dirty="0" smtClean="0"/>
-              <a:t>In transit</a:t>
+              <a:t>in transit</a:t>
             </a:r>
             <a:r>
               <a:rPr lang="en-US" sz="1800" dirty="0" smtClean="0"/>
-              <a:t> analysis has an added overhead above embedded </a:t>
-            </a:r>
-            <a:r>
-              <a:rPr lang="en-US" sz="1800" i="1" dirty="0" smtClean="0"/>
-              <a:t>in situ</a:t>
-            </a:r>
-            <a:r>
-              <a:rPr lang="en-US" sz="1800" dirty="0" smtClean="0"/>
-              <a:t> analysis involving transferring data between parallel jobs. Given an analysis with perfect linear scalability, we suspect </a:t>
-            </a:r>
-            <a:r>
-              <a:rPr lang="en-US" sz="1800" i="1" dirty="0" smtClean="0"/>
+              <a:t> </a:t>
+            </a:r>
+            <a:r>
+              <a:rPr lang="en-US" sz="1800" dirty="0"/>
+              <a:t>to be faster by reducing the size of the data analysis job. This is one of the motivations for choosing a data analysis task that requires significant communication. In our results, we do find instances where </a:t>
+            </a:r>
+            <a:r>
+              <a:rPr lang="en-US" sz="1800" i="1" dirty="0"/>
               <a:t>in transit</a:t>
             </a:r>
             <a:r>
-              <a:rPr lang="en-US" sz="1800" dirty="0" smtClean="0"/>
-              <a:t> workflows will always have an added cost, and our results support this. With an analysis that does not scale perfectly, possibly due to communication overhead, it is theoretically possible for </a:t>
-            </a:r>
-            <a:r>
-              <a:rPr lang="en-US" sz="1800" i="1" dirty="0" smtClean="0"/>
+              <a:rPr lang="en-US" sz="1800" dirty="0"/>
+              <a:t> is faster, but by a smaller margin and for fewer configurations than we initially anticipated. So although </a:t>
+            </a:r>
+            <a:r>
+              <a:rPr lang="en-US" sz="1800" i="1" dirty="0"/>
               <a:t>in transit</a:t>
             </a:r>
             <a:r>
-              <a:rPr lang="en-US" sz="1800" dirty="0" smtClean="0"/>
-              <a:t> to be faster by reducing the size of the analysis job. This is one of the motivations for choosing an analysis task that requires significant communication. In our results, we do find instances where </a:t>
-            </a:r>
-            <a:r>
-              <a:rPr lang="en-US" sz="1800" i="1" dirty="0" smtClean="0"/>
-              <a:t>in transit</a:t>
-            </a:r>
-            <a:r>
-              <a:rPr lang="en-US" sz="1800" dirty="0" smtClean="0"/>
-              <a:t> is faster, but by a smaller margin and for fewer configurations than we initially anticipated. So although </a:t>
-            </a:r>
-            <a:r>
-              <a:rPr lang="en-US" sz="1800" i="1" dirty="0" smtClean="0"/>
-              <a:t>in transit</a:t>
-            </a:r>
-            <a:r>
-              <a:rPr lang="en-US" sz="1800" dirty="0" smtClean="0"/>
+              <a:rPr lang="en-US" sz="1800" dirty="0"/>
               <a:t> has several other positive features, we do not anticipate performance to be the main motivations for using it.</a:t>
             </a:r>
+            <a:endParaRPr lang="en-US" sz="1800" dirty="0" smtClean="0"/>
           </a:p>
         </p:txBody>
       </p:sp>
@@ -44667,9 +44705,12 @@
             </a:r>
             <a:r>
               <a:rPr lang="en-US" sz="1800" b="1" dirty="0"/>
-              <a:t>relies on balancing the time spent in simulation and analysis.</a:t>
-            </a:r>
-            <a:endParaRPr lang="en-US" sz="1800" dirty="0" smtClean="0"/>
+              <a:t>relies on balancing the time spent in simulation and data analysis</a:t>
+            </a:r>
+            <a:r>
+              <a:rPr lang="en-US" sz="1800" b="1" dirty="0" smtClean="0"/>
+              <a:t>.</a:t>
+            </a:r>
           </a:p>
           <a:p>
             <a:pPr marL="0" indent="0" algn="just">
@@ -44681,11 +44722,11 @@
             </a:r>
             <a:r>
               <a:rPr lang="en-US" sz="1800" i="1" dirty="0"/>
-              <a:t>in transit </a:t>
+              <a:t>in transit</a:t>
             </a:r>
             <a:r>
               <a:rPr lang="en-US" sz="1800" dirty="0"/>
-              <a:t>workflow is the idle time spent in the simulation waiting for the visualization and data analysis service to become ready or the idle time spent in the visualization and data analysis service waiting for the simulation to send more data. This idle waiting time is minimized when the simulation and analysis spend the same amount of wall clock time between transfers. Although not demonstrated in this work, it is possible to “auto-balance” the work between simulation and analysis by, at every iteration of the simulation, transfer data to the analysis if and only if the analysis service is ready to accept more work. The disadvantage of such an approach is that the idle process time could be replaced with unnecessary extra analysis or less analysis than necessary. However, we suspect that controlling the amount of visualization and data analysis performed through job allocation sizes fits well with users’ rules of thumb about resource allocation.</a:t>
+              <a:t> workflow is the idle time spent in the simulation waiting for the visualization and data analysis service to become ready or the idle time spent in the visualization and data analysis service waiting for the simulation to send more data. This idle waiting time is minimized when the simulation and data analysis spend the same amount of wall clock time between transfers. Although not demonstrated in this work, it is possible to “auto-balance” the work between simulation and data analysis by, at every iteration of the simulation, transfer data to the data analysis if and only if the data analysis service is ready to accept more work. The disadvantage of such an approach is that the idle process time could be replaced with unnecessary extra data analysis or less data analysis than necessary. However, we suspect that controlling the amount of visualization and data analysis performed through job allocation sizes fits well with users’ rules of thumb about resource allocation.</a:t>
             </a:r>
             <a:endParaRPr lang="en-US" sz="1800" dirty="0" smtClean="0"/>
           </a:p>
@@ -45148,7 +45189,15 @@
             </a:r>
             <a:r>
               <a:rPr lang="en-US" sz="1800" dirty="0"/>
-              <a:t>initial assumption was that it would not be feasible to output full results at a fine enough temporal resolution from CTH to disk storage to perform our high fidelity analysis. However, our control workflow shows that although the overall time to write data to disk and then read back again incurs a large cost, it </a:t>
+              <a:t>initial assumption was that it would not be feasible to output full results at a fine enough temporal resolution from CTH to disk storage to perform our high fidelity </a:t>
+            </a:r>
+            <a:r>
+              <a:rPr lang="en-US" sz="1800" dirty="0" smtClean="0"/>
+              <a:t>data analysis</a:t>
+            </a:r>
+            <a:r>
+              <a:rPr lang="en-US" sz="1800" dirty="0"/>
+              <a:t>. However, our control workflow shows that although the overall time to write data to disk and then read back again incurs a large cost, it </a:t>
             </a:r>
             <a:r>
               <a:rPr lang="en-US" sz="1800" dirty="0" smtClean="0"/>
@@ -46410,8 +46459,9 @@
             <a:pPr lvl="1"/>
             <a:r>
               <a:rPr lang="en-US" sz="1800" dirty="0" smtClean="0"/>
-              <a:t>Retain relevant data</a:t>
-            </a:r>
+              <a:t>Extract useful information</a:t>
+            </a:r>
+            <a:endParaRPr lang="en-US" sz="1800" dirty="0" smtClean="0"/>
           </a:p>
           <a:p>
             <a:pPr lvl="1"/>
@@ -46565,8 +46615,9 @@
             </a:pPr>
             <a:r>
               <a:rPr lang="en-US" dirty="0" smtClean="0"/>
-              <a:t>Fix AMR boundaries by inserting degenerate cells</a:t>
-            </a:r>
+              <a:t>Build a conforming mesh over AMR boundaries</a:t>
+            </a:r>
+            <a:endParaRPr lang="en-US" dirty="0" smtClean="0"/>
           </a:p>
           <a:p>
             <a:pPr marL="914400" lvl="1" indent="-457200">
@@ -46575,8 +46626,9 @@
             </a:pPr>
             <a:r>
               <a:rPr lang="en-US" dirty="0" smtClean="0"/>
-              <a:t>Create surfaces</a:t>
-            </a:r>
+              <a:t>Identify boundaries of fragments</a:t>
+            </a:r>
+            <a:endParaRPr lang="en-US" dirty="0" smtClean="0"/>
           </a:p>
           <a:p>
             <a:pPr marL="914400" lvl="1" indent="-457200">
@@ -46585,8 +46637,9 @@
             </a:pPr>
             <a:r>
               <a:rPr lang="en-US" dirty="0" smtClean="0"/>
-              <a:t>Find components across neighbors</a:t>
-            </a:r>
+              <a:t>Find the fragment connected components</a:t>
+            </a:r>
+            <a:endParaRPr lang="en-US" dirty="0" smtClean="0"/>
           </a:p>
         </p:txBody>
       </p:sp>

</xml_diff>

<commit_message>
Updating 'post-processing' text on plots
</commit_message>
<xml_diff>
--- a/Summary/SummarySlides.pptx
+++ b/Summary/SummarySlides.pptx
@@ -271,7 +271,7 @@
           <a:p>
             <a:fld id="{1E41F11C-C490-BC4C-9D98-B916474B0AA7}" type="datetime1">
               <a:rPr lang="en-US" smtClean="0"/>
-              <a:t>3/15/13</a:t>
+              <a:t>3/20/13</a:t>
             </a:fld>
             <a:endParaRPr lang="en-US" dirty="0"/>
           </a:p>
@@ -1862,7 +1862,7 @@
           <a:p>
             <a:fld id="{2B89098A-9DD0-704D-897B-46AD3E21E869}" type="datetime1">
               <a:rPr lang="en-US" smtClean="0"/>
-              <a:t>3/15/13</a:t>
+              <a:t>3/20/13</a:t>
             </a:fld>
             <a:endParaRPr lang="en-US" dirty="0"/>
           </a:p>
@@ -2369,7 +2369,7 @@
           <a:p>
             <a:fld id="{274ADEFF-0DD3-C940-B04B-DADA55CED8F3}" type="datetime1">
               <a:rPr lang="en-US" smtClean="0"/>
-              <a:t>3/15/13</a:t>
+              <a:t>3/20/13</a:t>
             </a:fld>
             <a:endParaRPr lang="en-US" dirty="0"/>
           </a:p>
@@ -2501,7 +2501,7 @@
           <a:p>
             <a:fld id="{6A07F160-38EC-AB4C-8E07-1952CF053195}" type="datetime1">
               <a:rPr lang="en-US" smtClean="0"/>
-              <a:t>3/15/13</a:t>
+              <a:t>3/20/13</a:t>
             </a:fld>
             <a:endParaRPr lang="en-US" dirty="0"/>
           </a:p>
@@ -2610,7 +2610,7 @@
           <a:p>
             <a:fld id="{F884B76F-D72A-6247-9E9B-E20AA4950DAF}" type="datetime1">
               <a:rPr lang="en-US" smtClean="0"/>
-              <a:t>3/15/13</a:t>
+              <a:t>3/20/13</a:t>
             </a:fld>
             <a:endParaRPr lang="en-US" dirty="0"/>
           </a:p>
@@ -2901,7 +2901,7 @@
           <a:p>
             <a:fld id="{BEDB5943-9216-4740-9B52-E49457DEEC39}" type="datetime1">
               <a:rPr lang="en-US" smtClean="0"/>
-              <a:t>3/15/13</a:t>
+              <a:t>3/20/13</a:t>
             </a:fld>
             <a:endParaRPr lang="en-US" dirty="0"/>
           </a:p>
@@ -3172,7 +3172,7 @@
           <a:p>
             <a:fld id="{CE3464F7-513A-0643-A456-60C9973792A9}" type="datetime1">
               <a:rPr lang="en-US" smtClean="0"/>
-              <a:t>3/15/13</a:t>
+              <a:t>3/20/13</a:t>
             </a:fld>
             <a:endParaRPr lang="en-US" dirty="0"/>
           </a:p>
@@ -3356,7 +3356,7 @@
           <a:p>
             <a:fld id="{7539DBB8-13F3-344F-8629-CCFC867E05CD}" type="datetime1">
               <a:rPr lang="en-US" smtClean="0"/>
-              <a:t>3/15/13</a:t>
+              <a:t>3/20/13</a:t>
             </a:fld>
             <a:endParaRPr lang="en-US" dirty="0"/>
           </a:p>
@@ -3550,7 +3550,7 @@
           <a:p>
             <a:fld id="{A9A4CDC6-5B91-FE47-9E5B-4BFED9D2F143}" type="datetime1">
               <a:rPr lang="en-US" smtClean="0"/>
-              <a:t>3/15/13</a:t>
+              <a:t>3/20/13</a:t>
             </a:fld>
             <a:endParaRPr lang="en-US" dirty="0"/>
           </a:p>
@@ -3856,7 +3856,7 @@
           <a:p>
             <a:fld id="{40793677-4686-7346-81DC-BD0C6D979DE0}" type="datetime1">
               <a:rPr lang="en-US" smtClean="0"/>
-              <a:t>3/15/13</a:t>
+              <a:t>3/20/13</a:t>
             </a:fld>
             <a:endParaRPr lang="en-US" dirty="0"/>
           </a:p>
@@ -4520,7 +4520,7 @@
           <a:p>
             <a:fld id="{BA17DCE3-72AA-D440-820C-A4334F8F8381}" type="datetime1">
               <a:rPr lang="en-US" smtClean="0"/>
-              <a:t>3/15/13</a:t>
+              <a:t>3/20/13</a:t>
             </a:fld>
             <a:endParaRPr lang="en-US" dirty="0"/>
           </a:p>
@@ -5251,7 +5251,7 @@
           <a:p>
             <a:fld id="{DE85F4BE-571A-754E-B290-38E85A2AB13C}" type="datetime1">
               <a:rPr lang="en-US" smtClean="0"/>
-              <a:t>3/15/13</a:t>
+              <a:t>3/20/13</a:t>
             </a:fld>
             <a:endParaRPr lang="en-US" dirty="0"/>
           </a:p>
@@ -6139,7 +6139,7 @@
           <a:p>
             <a:fld id="{2721CC38-418C-9345-95E2-5F9CDED78CA1}" type="datetime1">
               <a:rPr lang="en-US" smtClean="0"/>
-              <a:t>3/15/13</a:t>
+              <a:t>3/20/13</a:t>
             </a:fld>
             <a:endParaRPr lang="en-US" dirty="0"/>
           </a:p>
@@ -6835,7 +6835,7 @@
           <a:p>
             <a:fld id="{BBEDFB4F-0416-6641-8B2C-07BFABA598F7}" type="datetime1">
               <a:rPr lang="en-US" smtClean="0"/>
-              <a:t>3/15/13</a:t>
+              <a:t>3/20/13</a:t>
             </a:fld>
             <a:endParaRPr lang="en-US" dirty="0"/>
           </a:p>
@@ -7913,7 +7913,7 @@
           <a:p>
             <a:fld id="{AEC8B2BF-A675-9547-80CC-C0A85AD6F743}" type="datetime1">
               <a:rPr lang="en-US" smtClean="0"/>
-              <a:t>3/15/13</a:t>
+              <a:t>3/20/13</a:t>
             </a:fld>
             <a:endParaRPr lang="en-US" dirty="0"/>
           </a:p>
@@ -8200,7 +8200,7 @@
           <a:p>
             <a:fld id="{3938401E-D456-5647-8149-DE834487F23A}" type="datetime1">
               <a:rPr lang="en-US" smtClean="0"/>
-              <a:t>3/15/13</a:t>
+              <a:t>3/20/13</a:t>
             </a:fld>
             <a:endParaRPr lang="en-US" dirty="0"/>
           </a:p>
@@ -8430,7 +8430,7 @@
           <a:p>
             <a:fld id="{9E042A07-5C93-3A44-B2CB-DA8237221699}" type="datetime1">
               <a:rPr lang="en-US" smtClean="0"/>
-              <a:t>3/15/13</a:t>
+              <a:t>3/20/13</a:t>
             </a:fld>
             <a:endParaRPr lang="en-US" dirty="0"/>
           </a:p>
@@ -8732,7 +8732,7 @@
           <a:p>
             <a:fld id="{43CB7A98-1783-1C4E-ACBB-8D3428320856}" type="datetime1">
               <a:rPr lang="en-US" smtClean="0"/>
-              <a:t>3/15/13</a:t>
+              <a:t>3/20/13</a:t>
             </a:fld>
             <a:endParaRPr lang="en-US" dirty="0"/>
           </a:p>
@@ -9110,7 +9110,7 @@
           <a:p>
             <a:fld id="{1484D48B-B7AB-D840-975A-3E636DE1C0E2}" type="datetime1">
               <a:rPr lang="en-US" smtClean="0"/>
-              <a:t>3/15/13</a:t>
+              <a:t>3/20/13</a:t>
             </a:fld>
             <a:endParaRPr lang="en-US" dirty="0"/>
           </a:p>
@@ -9718,7 +9718,11 @@
             </a:pPr>
             <a:r>
               <a:rPr lang="en-US" sz="1600" dirty="0" smtClean="0"/>
-              <a:t>Preliminary Executive Summary of Milestone Report</a:t>
+              <a:t>Executive </a:t>
+            </a:r>
+            <a:r>
+              <a:rPr lang="en-US" sz="1600" dirty="0" smtClean="0"/>
+              <a:t>Summary of Milestone Report</a:t>
             </a:r>
           </a:p>
           <a:p>
@@ -9745,11 +9749,7 @@
             </a:pPr>
             <a:r>
               <a:rPr lang="en-US" sz="1600" dirty="0" smtClean="0"/>
-              <a:t>March 5, </a:t>
-            </a:r>
-            <a:r>
-              <a:rPr lang="en-US" sz="1600" dirty="0" smtClean="0"/>
-              <a:t>2013</a:t>
+              <a:t>March 5, 2013</a:t>
             </a:r>
           </a:p>
           <a:p>
@@ -9936,17 +9936,12 @@
             </a:r>
             <a:r>
               <a:rPr lang="en-US" i="1" dirty="0" smtClean="0"/>
-              <a:t>in </a:t>
-            </a:r>
-            <a:r>
-              <a:rPr lang="en-US" i="1" dirty="0" smtClean="0"/>
-              <a:t>situ</a:t>
+              <a:t>in situ</a:t>
             </a:r>
             <a:r>
               <a:rPr lang="en-US" dirty="0" smtClean="0"/>
               <a:t> data analysis</a:t>
             </a:r>
-            <a:endParaRPr lang="en-US" dirty="0" smtClean="0"/>
           </a:p>
           <a:p>
             <a:pPr lvl="1"/>
@@ -9999,25 +9994,25 @@
             </a:r>
             <a:r>
               <a:rPr lang="en-US" dirty="0" smtClean="0"/>
-              <a:t>: CTH job given </a:t>
+              <a:t>: CTH job given fewer nodes that are assigned to VDA service so that together both jobs use the same nodes as other runs</a:t>
+            </a:r>
+          </a:p>
+          <a:p>
+            <a:r>
+              <a:rPr lang="en-US" b="1" dirty="0" smtClean="0"/>
+              <a:t>Post</a:t>
+            </a:r>
+            <a:r>
+              <a:rPr lang="en-US" b="1" smtClean="0"/>
+              <a:t>-processing</a:t>
+            </a:r>
+            <a:r>
+              <a:rPr lang="en-US" smtClean="0"/>
+              <a:t>: </a:t>
             </a:r>
             <a:r>
               <a:rPr lang="en-US" dirty="0" smtClean="0"/>
-              <a:t>fewer nodes </a:t>
-            </a:r>
-            <a:r>
-              <a:rPr lang="en-US" dirty="0" smtClean="0"/>
-              <a:t>that are assigned to VDA service so that together both jobs use the same nodes as other runs</a:t>
-            </a:r>
-          </a:p>
-          <a:p>
-            <a:r>
-              <a:rPr lang="en-US" b="1" dirty="0" smtClean="0"/>
-              <a:t>Spyplot file</a:t>
-            </a:r>
-            <a:r>
-              <a:rPr lang="en-US" dirty="0" smtClean="0"/>
-              <a:t>: Write </a:t>
+              <a:t>Write </a:t>
             </a:r>
             <a:r>
               <a:rPr lang="en-US" dirty="0"/>
@@ -38413,6 +38408,38 @@
           </a:prstGeom>
         </p:spPr>
       </p:pic>
+      <p:sp>
+        <p:nvSpPr>
+          <p:cNvPr id="3" name="TextBox 2"/>
+          <p:cNvSpPr txBox="1"/>
+          <p:nvPr/>
+        </p:nvSpPr>
+        <p:spPr>
+          <a:xfrm>
+            <a:off x="6195151" y="2264052"/>
+            <a:ext cx="1095568" cy="246221"/>
+          </a:xfrm>
+          <a:prstGeom prst="rect">
+            <a:avLst/>
+          </a:prstGeom>
+          <a:solidFill>
+            <a:schemeClr val="bg1"/>
+          </a:solidFill>
+        </p:spPr>
+        <p:txBody>
+          <a:bodyPr wrap="square" rtlCol="0">
+            <a:spAutoFit/>
+          </a:bodyPr>
+          <a:lstStyle/>
+          <a:p>
+            <a:r>
+              <a:rPr lang="en-US" sz="1000" dirty="0" smtClean="0"/>
+              <a:t>(Post Processing)</a:t>
+            </a:r>
+            <a:endParaRPr lang="en-US" sz="1000" dirty="0"/>
+          </a:p>
+        </p:txBody>
+      </p:sp>
     </p:spTree>
     <p:extLst>
       <p:ext uri="{BB962C8B-B14F-4D97-AF65-F5344CB8AC3E}">
@@ -38582,6 +38609,38 @@
           </a:fontRef>
         </p:style>
       </p:cxnSp>
+      <p:sp>
+        <p:nvSpPr>
+          <p:cNvPr id="7" name="TextBox 6"/>
+          <p:cNvSpPr txBox="1"/>
+          <p:nvPr/>
+        </p:nvSpPr>
+        <p:spPr>
+          <a:xfrm>
+            <a:off x="6195151" y="2271703"/>
+            <a:ext cx="1095568" cy="246221"/>
+          </a:xfrm>
+          <a:prstGeom prst="rect">
+            <a:avLst/>
+          </a:prstGeom>
+          <a:solidFill>
+            <a:schemeClr val="bg1"/>
+          </a:solidFill>
+        </p:spPr>
+        <p:txBody>
+          <a:bodyPr wrap="square" rtlCol="0">
+            <a:spAutoFit/>
+          </a:bodyPr>
+          <a:lstStyle/>
+          <a:p>
+            <a:r>
+              <a:rPr lang="en-US" sz="1000" dirty="0" smtClean="0"/>
+              <a:t>(Post Processing)</a:t>
+            </a:r>
+            <a:endParaRPr lang="en-US" sz="1000" dirty="0"/>
+          </a:p>
+        </p:txBody>
+      </p:sp>
     </p:spTree>
     <p:extLst>
       <p:ext uri="{BB962C8B-B14F-4D97-AF65-F5344CB8AC3E}">
@@ -38968,6 +39027,38 @@
           </a:fontRef>
         </p:style>
       </p:cxnSp>
+      <p:sp>
+        <p:nvSpPr>
+          <p:cNvPr id="7" name="TextBox 6"/>
+          <p:cNvSpPr txBox="1"/>
+          <p:nvPr/>
+        </p:nvSpPr>
+        <p:spPr>
+          <a:xfrm>
+            <a:off x="6195151" y="2264052"/>
+            <a:ext cx="1095568" cy="246221"/>
+          </a:xfrm>
+          <a:prstGeom prst="rect">
+            <a:avLst/>
+          </a:prstGeom>
+          <a:solidFill>
+            <a:schemeClr val="bg1"/>
+          </a:solidFill>
+        </p:spPr>
+        <p:txBody>
+          <a:bodyPr wrap="square" rtlCol="0">
+            <a:spAutoFit/>
+          </a:bodyPr>
+          <a:lstStyle/>
+          <a:p>
+            <a:r>
+              <a:rPr lang="en-US" sz="1000" dirty="0" smtClean="0"/>
+              <a:t>(Post Processing)</a:t>
+            </a:r>
+            <a:endParaRPr lang="en-US" sz="1000" dirty="0"/>
+          </a:p>
+        </p:txBody>
+      </p:sp>
     </p:spTree>
     <p:extLst>
       <p:ext uri="{BB962C8B-B14F-4D97-AF65-F5344CB8AC3E}">
@@ -39152,6 +39243,38 @@
           </a:fontRef>
         </p:style>
       </p:cxnSp>
+      <p:sp>
+        <p:nvSpPr>
+          <p:cNvPr id="7" name="TextBox 6"/>
+          <p:cNvSpPr txBox="1"/>
+          <p:nvPr/>
+        </p:nvSpPr>
+        <p:spPr>
+          <a:xfrm>
+            <a:off x="6195151" y="2264052"/>
+            <a:ext cx="1095568" cy="246221"/>
+          </a:xfrm>
+          <a:prstGeom prst="rect">
+            <a:avLst/>
+          </a:prstGeom>
+          <a:solidFill>
+            <a:schemeClr val="bg1"/>
+          </a:solidFill>
+        </p:spPr>
+        <p:txBody>
+          <a:bodyPr wrap="square" rtlCol="0">
+            <a:spAutoFit/>
+          </a:bodyPr>
+          <a:lstStyle/>
+          <a:p>
+            <a:r>
+              <a:rPr lang="en-US" sz="1000" dirty="0" smtClean="0"/>
+              <a:t>(Post Processing)</a:t>
+            </a:r>
+            <a:endParaRPr lang="en-US" sz="1000" dirty="0"/>
+          </a:p>
+        </p:txBody>
+      </p:sp>
     </p:spTree>
     <p:extLst>
       <p:ext uri="{BB962C8B-B14F-4D97-AF65-F5344CB8AC3E}">
@@ -46461,7 +46584,6 @@
               <a:rPr lang="en-US" sz="1800" dirty="0" smtClean="0"/>
               <a:t>Extract useful information</a:t>
             </a:r>
-            <a:endParaRPr lang="en-US" sz="1800" dirty="0" smtClean="0"/>
           </a:p>
           <a:p>
             <a:pPr lvl="1"/>
@@ -46617,7 +46739,6 @@
               <a:rPr lang="en-US" dirty="0" smtClean="0"/>
               <a:t>Build a conforming mesh over AMR boundaries</a:t>
             </a:r>
-            <a:endParaRPr lang="en-US" dirty="0" smtClean="0"/>
           </a:p>
           <a:p>
             <a:pPr marL="914400" lvl="1" indent="-457200">
@@ -46628,7 +46749,6 @@
               <a:rPr lang="en-US" dirty="0" smtClean="0"/>
               <a:t>Identify boundaries of fragments</a:t>
             </a:r>
-            <a:endParaRPr lang="en-US" dirty="0" smtClean="0"/>
           </a:p>
           <a:p>
             <a:pPr marL="914400" lvl="1" indent="-457200">
@@ -46639,7 +46759,6 @@
               <a:rPr lang="en-US" dirty="0" smtClean="0"/>
               <a:t>Find the fragment connected components</a:t>
             </a:r>
-            <a:endParaRPr lang="en-US" dirty="0" smtClean="0"/>
           </a:p>
         </p:txBody>
       </p:sp>

</xml_diff>

<commit_message>
Made sure all images/captions in slides match the doc
</commit_message>
<xml_diff>
--- a/Summary/SummarySlides.pptx
+++ b/Summary/SummarySlides.pptx
@@ -271,7 +271,7 @@
           <a:p>
             <a:fld id="{1E41F11C-C490-BC4C-9D98-B916474B0AA7}" type="datetime1">
               <a:rPr lang="en-US" smtClean="0"/>
-              <a:t>3/20/13</a:t>
+              <a:t>3/25/13</a:t>
             </a:fld>
             <a:endParaRPr lang="en-US" dirty="0"/>
           </a:p>
@@ -1862,7 +1862,7 @@
           <a:p>
             <a:fld id="{2B89098A-9DD0-704D-897B-46AD3E21E869}" type="datetime1">
               <a:rPr lang="en-US" smtClean="0"/>
-              <a:t>3/20/13</a:t>
+              <a:t>3/25/13</a:t>
             </a:fld>
             <a:endParaRPr lang="en-US" dirty="0"/>
           </a:p>
@@ -2369,7 +2369,7 @@
           <a:p>
             <a:fld id="{274ADEFF-0DD3-C940-B04B-DADA55CED8F3}" type="datetime1">
               <a:rPr lang="en-US" smtClean="0"/>
-              <a:t>3/20/13</a:t>
+              <a:t>3/25/13</a:t>
             </a:fld>
             <a:endParaRPr lang="en-US" dirty="0"/>
           </a:p>
@@ -2501,7 +2501,7 @@
           <a:p>
             <a:fld id="{6A07F160-38EC-AB4C-8E07-1952CF053195}" type="datetime1">
               <a:rPr lang="en-US" smtClean="0"/>
-              <a:t>3/20/13</a:t>
+              <a:t>3/25/13</a:t>
             </a:fld>
             <a:endParaRPr lang="en-US" dirty="0"/>
           </a:p>
@@ -2610,7 +2610,7 @@
           <a:p>
             <a:fld id="{F884B76F-D72A-6247-9E9B-E20AA4950DAF}" type="datetime1">
               <a:rPr lang="en-US" smtClean="0"/>
-              <a:t>3/20/13</a:t>
+              <a:t>3/25/13</a:t>
             </a:fld>
             <a:endParaRPr lang="en-US" dirty="0"/>
           </a:p>
@@ -2901,7 +2901,7 @@
           <a:p>
             <a:fld id="{BEDB5943-9216-4740-9B52-E49457DEEC39}" type="datetime1">
               <a:rPr lang="en-US" smtClean="0"/>
-              <a:t>3/20/13</a:t>
+              <a:t>3/25/13</a:t>
             </a:fld>
             <a:endParaRPr lang="en-US" dirty="0"/>
           </a:p>
@@ -3172,7 +3172,7 @@
           <a:p>
             <a:fld id="{CE3464F7-513A-0643-A456-60C9973792A9}" type="datetime1">
               <a:rPr lang="en-US" smtClean="0"/>
-              <a:t>3/20/13</a:t>
+              <a:t>3/25/13</a:t>
             </a:fld>
             <a:endParaRPr lang="en-US" dirty="0"/>
           </a:p>
@@ -3356,7 +3356,7 @@
           <a:p>
             <a:fld id="{7539DBB8-13F3-344F-8629-CCFC867E05CD}" type="datetime1">
               <a:rPr lang="en-US" smtClean="0"/>
-              <a:t>3/20/13</a:t>
+              <a:t>3/25/13</a:t>
             </a:fld>
             <a:endParaRPr lang="en-US" dirty="0"/>
           </a:p>
@@ -3550,7 +3550,7 @@
           <a:p>
             <a:fld id="{A9A4CDC6-5B91-FE47-9E5B-4BFED9D2F143}" type="datetime1">
               <a:rPr lang="en-US" smtClean="0"/>
-              <a:t>3/20/13</a:t>
+              <a:t>3/25/13</a:t>
             </a:fld>
             <a:endParaRPr lang="en-US" dirty="0"/>
           </a:p>
@@ -3856,7 +3856,7 @@
           <a:p>
             <a:fld id="{40793677-4686-7346-81DC-BD0C6D979DE0}" type="datetime1">
               <a:rPr lang="en-US" smtClean="0"/>
-              <a:t>3/20/13</a:t>
+              <a:t>3/25/13</a:t>
             </a:fld>
             <a:endParaRPr lang="en-US" dirty="0"/>
           </a:p>
@@ -4520,7 +4520,7 @@
           <a:p>
             <a:fld id="{BA17DCE3-72AA-D440-820C-A4334F8F8381}" type="datetime1">
               <a:rPr lang="en-US" smtClean="0"/>
-              <a:t>3/20/13</a:t>
+              <a:t>3/25/13</a:t>
             </a:fld>
             <a:endParaRPr lang="en-US" dirty="0"/>
           </a:p>
@@ -5251,7 +5251,7 @@
           <a:p>
             <a:fld id="{DE85F4BE-571A-754E-B290-38E85A2AB13C}" type="datetime1">
               <a:rPr lang="en-US" smtClean="0"/>
-              <a:t>3/20/13</a:t>
+              <a:t>3/25/13</a:t>
             </a:fld>
             <a:endParaRPr lang="en-US" dirty="0"/>
           </a:p>
@@ -6139,7 +6139,7 @@
           <a:p>
             <a:fld id="{2721CC38-418C-9345-95E2-5F9CDED78CA1}" type="datetime1">
               <a:rPr lang="en-US" smtClean="0"/>
-              <a:t>3/20/13</a:t>
+              <a:t>3/25/13</a:t>
             </a:fld>
             <a:endParaRPr lang="en-US" dirty="0"/>
           </a:p>
@@ -6835,7 +6835,7 @@
           <a:p>
             <a:fld id="{BBEDFB4F-0416-6641-8B2C-07BFABA598F7}" type="datetime1">
               <a:rPr lang="en-US" smtClean="0"/>
-              <a:t>3/20/13</a:t>
+              <a:t>3/25/13</a:t>
             </a:fld>
             <a:endParaRPr lang="en-US" dirty="0"/>
           </a:p>
@@ -7913,7 +7913,7 @@
           <a:p>
             <a:fld id="{AEC8B2BF-A675-9547-80CC-C0A85AD6F743}" type="datetime1">
               <a:rPr lang="en-US" smtClean="0"/>
-              <a:t>3/20/13</a:t>
+              <a:t>3/25/13</a:t>
             </a:fld>
             <a:endParaRPr lang="en-US" dirty="0"/>
           </a:p>
@@ -8200,7 +8200,7 @@
           <a:p>
             <a:fld id="{3938401E-D456-5647-8149-DE834487F23A}" type="datetime1">
               <a:rPr lang="en-US" smtClean="0"/>
-              <a:t>3/20/13</a:t>
+              <a:t>3/25/13</a:t>
             </a:fld>
             <a:endParaRPr lang="en-US" dirty="0"/>
           </a:p>
@@ -8430,7 +8430,7 @@
           <a:p>
             <a:fld id="{9E042A07-5C93-3A44-B2CB-DA8237221699}" type="datetime1">
               <a:rPr lang="en-US" smtClean="0"/>
-              <a:t>3/20/13</a:t>
+              <a:t>3/25/13</a:t>
             </a:fld>
             <a:endParaRPr lang="en-US" dirty="0"/>
           </a:p>
@@ -8732,7 +8732,7 @@
           <a:p>
             <a:fld id="{43CB7A98-1783-1C4E-ACBB-8D3428320856}" type="datetime1">
               <a:rPr lang="en-US" smtClean="0"/>
-              <a:t>3/20/13</a:t>
+              <a:t>3/25/13</a:t>
             </a:fld>
             <a:endParaRPr lang="en-US" dirty="0"/>
           </a:p>
@@ -9110,7 +9110,7 @@
           <a:p>
             <a:fld id="{1484D48B-B7AB-D840-975A-3E636DE1C0E2}" type="datetime1">
               <a:rPr lang="en-US" smtClean="0"/>
-              <a:t>3/20/13</a:t>
+              <a:t>3/25/13</a:t>
             </a:fld>
             <a:endParaRPr lang="en-US" dirty="0"/>
           </a:p>
@@ -9718,11 +9718,7 @@
             </a:pPr>
             <a:r>
               <a:rPr lang="en-US" sz="1600" dirty="0" smtClean="0"/>
-              <a:t>Executive </a:t>
-            </a:r>
-            <a:r>
-              <a:rPr lang="en-US" sz="1600" dirty="0" smtClean="0"/>
-              <a:t>Summary of Milestone Report</a:t>
+              <a:t>Executive Summary of Milestone Report</a:t>
             </a:r>
           </a:p>
           <a:p>
@@ -38095,7 +38091,7 @@
         <p:spPr>
           <a:xfrm>
             <a:off x="6469062" y="3257275"/>
-            <a:ext cx="2598738" cy="338554"/>
+            <a:ext cx="2453316" cy="338554"/>
           </a:xfrm>
           <a:prstGeom prst="rect">
             <a:avLst/>
@@ -38109,8 +38105,12 @@
           <a:lstStyle/>
           <a:p>
             <a:r>
+              <a:rPr lang="en-US" sz="1600" dirty="0"/>
+              <a:t>Disk</a:t>
+            </a:r>
+            <a:r>
               <a:rPr lang="en-US" sz="1600" dirty="0" smtClean="0"/>
-              <a:t>Spyplot I/O (post-processing)</a:t>
+              <a:t>-based post-processing</a:t>
             </a:r>
             <a:endParaRPr lang="en-US" sz="1600" dirty="0"/>
           </a:p>
@@ -38393,7 +38393,13 @@
           <p:nvPr/>
         </p:nvPicPr>
         <p:blipFill>
-          <a:blip r:embed="rId2"/>
+          <a:blip r:embed="rId2">
+            <a:extLst>
+              <a:ext uri="{28A0092B-C50C-407E-A947-70E740481C1C}">
+                <a14:useLocalDpi xmlns:a14="http://schemas.microsoft.com/office/drawing/2010/main" val="0"/>
+              </a:ext>
+            </a:extLst>
+          </a:blip>
           <a:stretch>
             <a:fillRect/>
           </a:stretch>
@@ -38486,7 +38492,13 @@
           <p:nvPr/>
         </p:nvPicPr>
         <p:blipFill>
-          <a:blip r:embed="rId2"/>
+          <a:blip r:embed="rId2">
+            <a:extLst>
+              <a:ext uri="{28A0092B-C50C-407E-A947-70E740481C1C}">
+                <a14:useLocalDpi xmlns:a14="http://schemas.microsoft.com/office/drawing/2010/main" val="0"/>
+              </a:ext>
+            </a:extLst>
+          </a:blip>
           <a:stretch>
             <a:fillRect/>
           </a:stretch>
@@ -38905,7 +38917,13 @@
           <p:nvPr/>
         </p:nvPicPr>
         <p:blipFill>
-          <a:blip r:embed="rId2"/>
+          <a:blip r:embed="rId2">
+            <a:extLst>
+              <a:ext uri="{28A0092B-C50C-407E-A947-70E740481C1C}">
+                <a14:useLocalDpi xmlns:a14="http://schemas.microsoft.com/office/drawing/2010/main" val="0"/>
+              </a:ext>
+            </a:extLst>
+          </a:blip>
           <a:stretch>
             <a:fillRect/>
           </a:stretch>
@@ -39105,7 +39123,13 @@
           <p:nvPr/>
         </p:nvPicPr>
         <p:blipFill>
-          <a:blip r:embed="rId2"/>
+          <a:blip r:embed="rId2">
+            <a:extLst>
+              <a:ext uri="{28A0092B-C50C-407E-A947-70E740481C1C}">
+                <a14:useLocalDpi xmlns:a14="http://schemas.microsoft.com/office/drawing/2010/main" val="0"/>
+              </a:ext>
+            </a:extLst>
+          </a:blip>
           <a:stretch>
             <a:fillRect/>
           </a:stretch>
@@ -39659,12 +39683,12 @@
               <a:buChar char="•"/>
             </a:pPr>
             <a:r>
-              <a:rPr lang="en-US" dirty="0" err="1" smtClean="0"/>
-              <a:t>Spyplot</a:t>
-            </a:r>
-            <a:r>
               <a:rPr lang="en-US" dirty="0" smtClean="0"/>
-              <a:t> I/O not bad</a:t>
+              <a:t>Disk I</a:t>
+            </a:r>
+            <a:r>
+              <a:rPr lang="en-US" dirty="0" smtClean="0"/>
+              <a:t>/O not bad</a:t>
             </a:r>
           </a:p>
           <a:p>
@@ -39712,7 +39736,7 @@
         <p:spPr>
           <a:xfrm>
             <a:off x="6350485" y="3242846"/>
-            <a:ext cx="2658701" cy="338554"/>
+            <a:ext cx="2453316" cy="338554"/>
           </a:xfrm>
           <a:prstGeom prst="rect">
             <a:avLst/>
@@ -39726,8 +39750,8 @@
           <a:lstStyle/>
           <a:p>
             <a:r>
-              <a:rPr lang="en-US" sz="1600" dirty="0" smtClean="0"/>
-              <a:t>Spyplot I/O (post-processing)</a:t>
+              <a:rPr lang="en-US" sz="1600" dirty="0"/>
+              <a:t>Disk-based post-processing</a:t>
             </a:r>
             <a:endParaRPr lang="en-US" sz="1600" dirty="0"/>
           </a:p>
@@ -40204,7 +40228,7 @@
         <p:spPr>
           <a:xfrm>
             <a:off x="6350485" y="3242846"/>
-            <a:ext cx="2658701" cy="338554"/>
+            <a:ext cx="2453316" cy="338554"/>
           </a:xfrm>
           <a:prstGeom prst="rect">
             <a:avLst/>
@@ -40218,8 +40242,12 @@
           <a:lstStyle/>
           <a:p>
             <a:r>
+              <a:rPr lang="en-US" sz="1600" dirty="0"/>
+              <a:t>Disk</a:t>
+            </a:r>
+            <a:r>
               <a:rPr lang="en-US" sz="1600" dirty="0" smtClean="0"/>
-              <a:t>Spyplot I/O (post-processing)</a:t>
+              <a:t>-based post-processing</a:t>
             </a:r>
             <a:endParaRPr lang="en-US" sz="1600" dirty="0"/>
           </a:p>
@@ -40678,7 +40706,7 @@
         <p:spPr>
           <a:xfrm>
             <a:off x="6350485" y="3242846"/>
-            <a:ext cx="2658701" cy="338554"/>
+            <a:ext cx="2453316" cy="338554"/>
           </a:xfrm>
           <a:prstGeom prst="rect">
             <a:avLst/>
@@ -40692,8 +40720,8 @@
           <a:lstStyle/>
           <a:p>
             <a:r>
-              <a:rPr lang="en-US" sz="1600" dirty="0" smtClean="0"/>
-              <a:t>Spyplot I/O (post-processing)</a:t>
+              <a:rPr lang="en-US" sz="1600" dirty="0"/>
+              <a:t>Disk-based post-processing</a:t>
             </a:r>
             <a:endParaRPr lang="en-US" sz="1600" dirty="0"/>
           </a:p>
@@ -41145,7 +41173,7 @@
         <p:spPr>
           <a:xfrm>
             <a:off x="6350485" y="3242846"/>
-            <a:ext cx="2658701" cy="338554"/>
+            <a:ext cx="2453316" cy="338554"/>
           </a:xfrm>
           <a:prstGeom prst="rect">
             <a:avLst/>
@@ -41159,8 +41187,8 @@
           <a:lstStyle/>
           <a:p>
             <a:r>
-              <a:rPr lang="en-US" sz="1600" dirty="0" smtClean="0"/>
-              <a:t>Spyplot I/O (post-processing)</a:t>
+              <a:rPr lang="en-US" sz="1600" dirty="0"/>
+              <a:t>Disk-based post-processing</a:t>
             </a:r>
             <a:endParaRPr lang="en-US" sz="1600" dirty="0"/>
           </a:p>

</xml_diff>

<commit_message>
Updating fragment detection to have only the three steps in the experiment
</commit_message>
<xml_diff>
--- a/Summary/SummarySlides.pptx
+++ b/Summary/SummarySlides.pptx
@@ -271,7 +271,7 @@
           <a:p>
             <a:fld id="{1E41F11C-C490-BC4C-9D98-B916474B0AA7}" type="datetime1">
               <a:rPr lang="en-US" smtClean="0"/>
-              <a:t>3/25/13</a:t>
+              <a:t>3/26/13</a:t>
             </a:fld>
             <a:endParaRPr lang="en-US" dirty="0"/>
           </a:p>
@@ -1862,7 +1862,7 @@
           <a:p>
             <a:fld id="{2B89098A-9DD0-704D-897B-46AD3E21E869}" type="datetime1">
               <a:rPr lang="en-US" smtClean="0"/>
-              <a:t>3/25/13</a:t>
+              <a:t>3/26/13</a:t>
             </a:fld>
             <a:endParaRPr lang="en-US" dirty="0"/>
           </a:p>
@@ -2369,7 +2369,7 @@
           <a:p>
             <a:fld id="{274ADEFF-0DD3-C940-B04B-DADA55CED8F3}" type="datetime1">
               <a:rPr lang="en-US" smtClean="0"/>
-              <a:t>3/25/13</a:t>
+              <a:t>3/26/13</a:t>
             </a:fld>
             <a:endParaRPr lang="en-US" dirty="0"/>
           </a:p>
@@ -2501,7 +2501,7 @@
           <a:p>
             <a:fld id="{6A07F160-38EC-AB4C-8E07-1952CF053195}" type="datetime1">
               <a:rPr lang="en-US" smtClean="0"/>
-              <a:t>3/25/13</a:t>
+              <a:t>3/26/13</a:t>
             </a:fld>
             <a:endParaRPr lang="en-US" dirty="0"/>
           </a:p>
@@ -2610,7 +2610,7 @@
           <a:p>
             <a:fld id="{F884B76F-D72A-6247-9E9B-E20AA4950DAF}" type="datetime1">
               <a:rPr lang="en-US" smtClean="0"/>
-              <a:t>3/25/13</a:t>
+              <a:t>3/26/13</a:t>
             </a:fld>
             <a:endParaRPr lang="en-US" dirty="0"/>
           </a:p>
@@ -2901,7 +2901,7 @@
           <a:p>
             <a:fld id="{BEDB5943-9216-4740-9B52-E49457DEEC39}" type="datetime1">
               <a:rPr lang="en-US" smtClean="0"/>
-              <a:t>3/25/13</a:t>
+              <a:t>3/26/13</a:t>
             </a:fld>
             <a:endParaRPr lang="en-US" dirty="0"/>
           </a:p>
@@ -3172,7 +3172,7 @@
           <a:p>
             <a:fld id="{CE3464F7-513A-0643-A456-60C9973792A9}" type="datetime1">
               <a:rPr lang="en-US" smtClean="0"/>
-              <a:t>3/25/13</a:t>
+              <a:t>3/26/13</a:t>
             </a:fld>
             <a:endParaRPr lang="en-US" dirty="0"/>
           </a:p>
@@ -3356,7 +3356,7 @@
           <a:p>
             <a:fld id="{7539DBB8-13F3-344F-8629-CCFC867E05CD}" type="datetime1">
               <a:rPr lang="en-US" smtClean="0"/>
-              <a:t>3/25/13</a:t>
+              <a:t>3/26/13</a:t>
             </a:fld>
             <a:endParaRPr lang="en-US" dirty="0"/>
           </a:p>
@@ -3550,7 +3550,7 @@
           <a:p>
             <a:fld id="{A9A4CDC6-5B91-FE47-9E5B-4BFED9D2F143}" type="datetime1">
               <a:rPr lang="en-US" smtClean="0"/>
-              <a:t>3/25/13</a:t>
+              <a:t>3/26/13</a:t>
             </a:fld>
             <a:endParaRPr lang="en-US" dirty="0"/>
           </a:p>
@@ -3856,7 +3856,7 @@
           <a:p>
             <a:fld id="{40793677-4686-7346-81DC-BD0C6D979DE0}" type="datetime1">
               <a:rPr lang="en-US" smtClean="0"/>
-              <a:t>3/25/13</a:t>
+              <a:t>3/26/13</a:t>
             </a:fld>
             <a:endParaRPr lang="en-US" dirty="0"/>
           </a:p>
@@ -4520,7 +4520,7 @@
           <a:p>
             <a:fld id="{BA17DCE3-72AA-D440-820C-A4334F8F8381}" type="datetime1">
               <a:rPr lang="en-US" smtClean="0"/>
-              <a:t>3/25/13</a:t>
+              <a:t>3/26/13</a:t>
             </a:fld>
             <a:endParaRPr lang="en-US" dirty="0"/>
           </a:p>
@@ -5251,7 +5251,7 @@
           <a:p>
             <a:fld id="{DE85F4BE-571A-754E-B290-38E85A2AB13C}" type="datetime1">
               <a:rPr lang="en-US" smtClean="0"/>
-              <a:t>3/25/13</a:t>
+              <a:t>3/26/13</a:t>
             </a:fld>
             <a:endParaRPr lang="en-US" dirty="0"/>
           </a:p>
@@ -6139,7 +6139,7 @@
           <a:p>
             <a:fld id="{2721CC38-418C-9345-95E2-5F9CDED78CA1}" type="datetime1">
               <a:rPr lang="en-US" smtClean="0"/>
-              <a:t>3/25/13</a:t>
+              <a:t>3/26/13</a:t>
             </a:fld>
             <a:endParaRPr lang="en-US" dirty="0"/>
           </a:p>
@@ -6835,7 +6835,7 @@
           <a:p>
             <a:fld id="{BBEDFB4F-0416-6641-8B2C-07BFABA598F7}" type="datetime1">
               <a:rPr lang="en-US" smtClean="0"/>
-              <a:t>3/25/13</a:t>
+              <a:t>3/26/13</a:t>
             </a:fld>
             <a:endParaRPr lang="en-US" dirty="0"/>
           </a:p>
@@ -7913,7 +7913,7 @@
           <a:p>
             <a:fld id="{AEC8B2BF-A675-9547-80CC-C0A85AD6F743}" type="datetime1">
               <a:rPr lang="en-US" smtClean="0"/>
-              <a:t>3/25/13</a:t>
+              <a:t>3/26/13</a:t>
             </a:fld>
             <a:endParaRPr lang="en-US" dirty="0"/>
           </a:p>
@@ -8200,7 +8200,7 @@
           <a:p>
             <a:fld id="{3938401E-D456-5647-8149-DE834487F23A}" type="datetime1">
               <a:rPr lang="en-US" smtClean="0"/>
-              <a:t>3/25/13</a:t>
+              <a:t>3/26/13</a:t>
             </a:fld>
             <a:endParaRPr lang="en-US" dirty="0"/>
           </a:p>
@@ -8430,7 +8430,7 @@
           <a:p>
             <a:fld id="{9E042A07-5C93-3A44-B2CB-DA8237221699}" type="datetime1">
               <a:rPr lang="en-US" smtClean="0"/>
-              <a:t>3/25/13</a:t>
+              <a:t>3/26/13</a:t>
             </a:fld>
             <a:endParaRPr lang="en-US" dirty="0"/>
           </a:p>
@@ -8732,7 +8732,7 @@
           <a:p>
             <a:fld id="{43CB7A98-1783-1C4E-ACBB-8D3428320856}" type="datetime1">
               <a:rPr lang="en-US" smtClean="0"/>
-              <a:t>3/25/13</a:t>
+              <a:t>3/26/13</a:t>
             </a:fld>
             <a:endParaRPr lang="en-US" dirty="0"/>
           </a:p>
@@ -9110,7 +9110,7 @@
           <a:p>
             <a:fld id="{1484D48B-B7AB-D840-975A-3E636DE1C0E2}" type="datetime1">
               <a:rPr lang="en-US" smtClean="0"/>
-              <a:t>3/25/13</a:t>
+              <a:t>3/26/13</a:t>
             </a:fld>
             <a:endParaRPr lang="en-US" dirty="0"/>
           </a:p>
@@ -39684,11 +39684,7 @@
             </a:pPr>
             <a:r>
               <a:rPr lang="en-US" dirty="0" smtClean="0"/>
-              <a:t>Disk I</a:t>
-            </a:r>
-            <a:r>
-              <a:rPr lang="en-US" dirty="0" smtClean="0"/>
-              <a:t>/O not bad</a:t>
+              <a:t>Disk I/O not bad</a:t>
             </a:r>
           </a:p>
           <a:p>
@@ -39753,7 +39749,6 @@
               <a:rPr lang="en-US" sz="1600" dirty="0"/>
               <a:t>Disk-based post-processing</a:t>
             </a:r>
-            <a:endParaRPr lang="en-US" sz="1600" dirty="0"/>
           </a:p>
         </p:txBody>
       </p:sp>
@@ -40723,7 +40718,6 @@
               <a:rPr lang="en-US" sz="1600" dirty="0"/>
               <a:t>Disk-based post-processing</a:t>
             </a:r>
-            <a:endParaRPr lang="en-US" sz="1600" dirty="0"/>
           </a:p>
         </p:txBody>
       </p:sp>
@@ -41190,7 +41184,6 @@
               <a:rPr lang="en-US" sz="1600" dirty="0"/>
               <a:t>Disk-based post-processing</a:t>
             </a:r>
-            <a:endParaRPr lang="en-US" sz="1600" dirty="0"/>
           </a:p>
         </p:txBody>
       </p:sp>
@@ -46775,18 +46768,13 @@
             </a:pPr>
             <a:r>
               <a:rPr lang="en-US" dirty="0" smtClean="0"/>
-              <a:t>Identify boundaries of fragments</a:t>
-            </a:r>
-          </a:p>
-          <a:p>
-            <a:pPr marL="914400" lvl="1" indent="-457200">
-              <a:buFont typeface="+mj-lt"/>
-              <a:buAutoNum type="arabicPeriod"/>
-            </a:pPr>
+              <a:t>Identify boundaries of </a:t>
+            </a:r>
             <a:r>
               <a:rPr lang="en-US" dirty="0" smtClean="0"/>
-              <a:t>Find the fragment connected components</a:t>
-            </a:r>
+              <a:t>fragments</a:t>
+            </a:r>
+            <a:endParaRPr lang="en-US" dirty="0" smtClean="0"/>
           </a:p>
         </p:txBody>
       </p:sp>
@@ -46811,7 +46799,7 @@
         </p:blipFill>
         <p:spPr>
           <a:xfrm>
-            <a:off x="3352800" y="3844042"/>
+            <a:off x="4661376" y="3792731"/>
             <a:ext cx="2477729" cy="1828800"/>
           </a:xfrm>
           <a:prstGeom prst="rect">
@@ -46840,124 +46828,8 @@
         </p:blipFill>
         <p:spPr>
           <a:xfrm>
-            <a:off x="304800" y="3844042"/>
+            <a:off x="1613376" y="3792731"/>
             <a:ext cx="2449157" cy="1828800"/>
-          </a:xfrm>
-          <a:prstGeom prst="rect">
-            <a:avLst/>
-          </a:prstGeom>
-        </p:spPr>
-      </p:pic>
-      <p:pic>
-        <p:nvPicPr>
-          <p:cNvPr id="8" name="Picture 7" descr="Fragment-Ushaped.pdf"/>
-          <p:cNvPicPr>
-            <a:picLocks noChangeAspect="1"/>
-          </p:cNvPicPr>
-          <p:nvPr/>
-        </p:nvPicPr>
-        <p:blipFill rotWithShape="1">
-          <a:blip r:embed="rId4">
-            <a:extLst>
-              <a:ext uri="{28A0092B-C50C-407E-A947-70E740481C1C}">
-                <a14:useLocalDpi xmlns:a14="http://schemas.microsoft.com/office/drawing/2010/main" val="0"/>
-              </a:ext>
-            </a:extLst>
-          </a:blip>
-          <a:srcRect l="28995" t="29332" r="54003" b="49601"/>
-          <a:stretch/>
-        </p:blipFill>
-        <p:spPr>
-          <a:xfrm>
-            <a:off x="6400800" y="3820131"/>
-            <a:ext cx="929640" cy="864018"/>
-          </a:xfrm>
-          <a:prstGeom prst="rect">
-            <a:avLst/>
-          </a:prstGeom>
-        </p:spPr>
-      </p:pic>
-      <p:pic>
-        <p:nvPicPr>
-          <p:cNvPr id="9" name="Picture 8" descr="Fragment-Ushaped.pdf"/>
-          <p:cNvPicPr>
-            <a:picLocks noChangeAspect="1"/>
-          </p:cNvPicPr>
-          <p:nvPr/>
-        </p:nvPicPr>
-        <p:blipFill rotWithShape="1">
-          <a:blip r:embed="rId4">
-            <a:extLst>
-              <a:ext uri="{28A0092B-C50C-407E-A947-70E740481C1C}">
-                <a14:useLocalDpi xmlns:a14="http://schemas.microsoft.com/office/drawing/2010/main" val="0"/>
-              </a:ext>
-            </a:extLst>
-          </a:blip>
-          <a:srcRect l="54028" t="29332" r="28970" b="49601"/>
-          <a:stretch/>
-        </p:blipFill>
-        <p:spPr>
-          <a:xfrm>
-            <a:off x="7528560" y="3817253"/>
-            <a:ext cx="929640" cy="864018"/>
-          </a:xfrm>
-          <a:prstGeom prst="rect">
-            <a:avLst/>
-          </a:prstGeom>
-        </p:spPr>
-      </p:pic>
-      <p:pic>
-        <p:nvPicPr>
-          <p:cNvPr id="10" name="Picture 9" descr="Fragment-Ushaped.pdf"/>
-          <p:cNvPicPr>
-            <a:picLocks noChangeAspect="1"/>
-          </p:cNvPicPr>
-          <p:nvPr/>
-        </p:nvPicPr>
-        <p:blipFill rotWithShape="1">
-          <a:blip r:embed="rId4">
-            <a:extLst>
-              <a:ext uri="{28A0092B-C50C-407E-A947-70E740481C1C}">
-                <a14:useLocalDpi xmlns:a14="http://schemas.microsoft.com/office/drawing/2010/main" val="0"/>
-              </a:ext>
-            </a:extLst>
-          </a:blip>
-          <a:srcRect l="28995" t="50037" r="54003" b="28896"/>
-          <a:stretch/>
-        </p:blipFill>
-        <p:spPr>
-          <a:xfrm>
-            <a:off x="6400800" y="4833044"/>
-            <a:ext cx="929640" cy="864018"/>
-          </a:xfrm>
-          <a:prstGeom prst="rect">
-            <a:avLst/>
-          </a:prstGeom>
-        </p:spPr>
-      </p:pic>
-      <p:pic>
-        <p:nvPicPr>
-          <p:cNvPr id="11" name="Picture 10" descr="Fragment-Ushaped.pdf"/>
-          <p:cNvPicPr>
-            <a:picLocks noChangeAspect="1"/>
-          </p:cNvPicPr>
-          <p:nvPr/>
-        </p:nvPicPr>
-        <p:blipFill rotWithShape="1">
-          <a:blip r:embed="rId4">
-            <a:extLst>
-              <a:ext uri="{28A0092B-C50C-407E-A947-70E740481C1C}">
-                <a14:useLocalDpi xmlns:a14="http://schemas.microsoft.com/office/drawing/2010/main" val="0"/>
-              </a:ext>
-            </a:extLst>
-          </a:blip>
-          <a:srcRect l="53995" t="50082" r="29003" b="28851"/>
-          <a:stretch/>
-        </p:blipFill>
-        <p:spPr>
-          <a:xfrm>
-            <a:off x="7528560" y="4833044"/>
-            <a:ext cx="929640" cy="864018"/>
           </a:xfrm>
           <a:prstGeom prst="rect">
             <a:avLst/>
@@ -46972,7 +46844,7 @@
         </p:nvSpPr>
         <p:spPr>
           <a:xfrm>
-            <a:off x="1046421" y="5783818"/>
+            <a:off x="2354997" y="5732507"/>
             <a:ext cx="773356" cy="369332"/>
           </a:xfrm>
           <a:prstGeom prst="rect">
@@ -46996,43 +46868,13 @@
       </p:sp>
       <p:sp>
         <p:nvSpPr>
-          <p:cNvPr id="13" name="TextBox 12"/>
-          <p:cNvSpPr txBox="1"/>
-          <p:nvPr/>
-        </p:nvSpPr>
-        <p:spPr>
-          <a:xfrm>
-            <a:off x="7028200" y="5783818"/>
-            <a:ext cx="774571" cy="369332"/>
-          </a:xfrm>
-          <a:prstGeom prst="rect">
-            <a:avLst/>
-          </a:prstGeom>
-          <a:noFill/>
-        </p:spPr>
-        <p:txBody>
-          <a:bodyPr wrap="none" rtlCol="0">
-            <a:spAutoFit/>
-          </a:bodyPr>
-          <a:lstStyle/>
-          <a:p>
-            <a:r>
-              <a:rPr lang="en-US" dirty="0" smtClean="0"/>
-              <a:t>Step 4</a:t>
-            </a:r>
-            <a:endParaRPr lang="en-US" dirty="0"/>
-          </a:p>
-        </p:txBody>
-      </p:sp>
-      <p:sp>
-        <p:nvSpPr>
           <p:cNvPr id="14" name="TextBox 13"/>
           <p:cNvSpPr txBox="1"/>
           <p:nvPr/>
         </p:nvSpPr>
         <p:spPr>
           <a:xfrm>
-            <a:off x="4191000" y="5783818"/>
+            <a:off x="5499576" y="5732507"/>
             <a:ext cx="773356" cy="369332"/>
           </a:xfrm>
           <a:prstGeom prst="rect">

</xml_diff>